<commit_message>
5/9/2023: Update project notes slide deck following zoom brainstorm session.
</commit_message>
<xml_diff>
--- a/Project notes.pptx
+++ b/Project notes.pptx
@@ -5,7 +5,7 @@
     <p:sldMasterId id="2147483696" r:id="rId1"/>
   </p:sldMasterIdLst>
   <p:notesMasterIdLst>
-    <p:notesMasterId r:id="rId8"/>
+    <p:notesMasterId r:id="rId13"/>
   </p:notesMasterIdLst>
   <p:sldIdLst>
     <p:sldId id="256" r:id="rId2"/>
@@ -14,6 +14,11 @@
     <p:sldId id="259" r:id="rId5"/>
     <p:sldId id="260" r:id="rId6"/>
     <p:sldId id="261" r:id="rId7"/>
+    <p:sldId id="263" r:id="rId8"/>
+    <p:sldId id="264" r:id="rId9"/>
+    <p:sldId id="265" r:id="rId10"/>
+    <p:sldId id="267" r:id="rId11"/>
+    <p:sldId id="266" r:id="rId12"/>
   </p:sldIdLst>
   <p:sldSz cx="12192000" cy="6858000"/>
   <p:notesSz cx="6858000" cy="9144000"/>
@@ -4345,6 +4350,745 @@
 </p:sld>
 </file>
 
+<file path=ppt/slides/slide10.xml><?xml version="1.0" encoding="utf-8"?>
+<p:sld xmlns:a="http://schemas.openxmlformats.org/drawingml/2006/main" xmlns:r="http://schemas.openxmlformats.org/officeDocument/2006/relationships" xmlns:p="http://schemas.openxmlformats.org/presentationml/2006/main">
+  <p:cSld>
+    <p:spTree>
+      <p:nvGrpSpPr>
+        <p:cNvPr id="1" name=""/>
+        <p:cNvGrpSpPr/>
+        <p:nvPr/>
+      </p:nvGrpSpPr>
+      <p:grpSpPr>
+        <a:xfrm>
+          <a:off x="0" y="0"/>
+          <a:ext cx="0" cy="0"/>
+          <a:chOff x="0" y="0"/>
+          <a:chExt cx="0" cy="0"/>
+        </a:xfrm>
+      </p:grpSpPr>
+      <p:sp>
+        <p:nvSpPr>
+          <p:cNvPr id="2" name="Content Placeholder 2">
+            <a:extLst>
+              <a:ext uri="{FF2B5EF4-FFF2-40B4-BE49-F238E27FC236}">
+                <a16:creationId xmlns:a16="http://schemas.microsoft.com/office/drawing/2014/main" id="{10068C32-8F59-D5F4-3644-514FE45C30EA}"/>
+              </a:ext>
+            </a:extLst>
+          </p:cNvPr>
+          <p:cNvSpPr txBox="1">
+            <a:spLocks/>
+          </p:cNvSpPr>
+          <p:nvPr/>
+        </p:nvSpPr>
+        <p:spPr>
+          <a:xfrm>
+            <a:off x="101600" y="815976"/>
+            <a:ext cx="12090400" cy="6042024"/>
+          </a:xfrm>
+          <a:prstGeom prst="rect">
+            <a:avLst/>
+          </a:prstGeom>
+        </p:spPr>
+        <p:txBody>
+          <a:bodyPr/>
+          <a:lstStyle>
+            <a:lvl1pPr marL="91440" indent="-91440" algn="l" defTabSz="914400" rtl="0" eaLnBrk="1" latinLnBrk="0" hangingPunct="1">
+              <a:lnSpc>
+                <a:spcPct val="90000"/>
+              </a:lnSpc>
+              <a:spcBef>
+                <a:spcPts val="1200"/>
+              </a:spcBef>
+              <a:spcAft>
+                <a:spcPts val="200"/>
+              </a:spcAft>
+              <a:buClr>
+                <a:schemeClr val="accent1"/>
+              </a:buClr>
+              <a:buSzPct val="100000"/>
+              <a:buFont typeface="Calibri" panose="020F0502020204030204" pitchFamily="34" charset="0"/>
+              <a:buChar char=" "/>
+              <a:defRPr sz="2000" kern="1200">
+                <a:solidFill>
+                  <a:schemeClr val="tx1">
+                    <a:lumMod val="75000"/>
+                    <a:lumOff val="25000"/>
+                  </a:schemeClr>
+                </a:solidFill>
+                <a:latin typeface="+mn-lt"/>
+                <a:ea typeface="+mn-ea"/>
+                <a:cs typeface="+mn-cs"/>
+              </a:defRPr>
+            </a:lvl1pPr>
+            <a:lvl2pPr marL="384048" indent="-182880" algn="l" defTabSz="914400" rtl="0" eaLnBrk="1" latinLnBrk="0" hangingPunct="1">
+              <a:lnSpc>
+                <a:spcPct val="90000"/>
+              </a:lnSpc>
+              <a:spcBef>
+                <a:spcPts val="200"/>
+              </a:spcBef>
+              <a:spcAft>
+                <a:spcPts val="400"/>
+              </a:spcAft>
+              <a:buClr>
+                <a:schemeClr val="accent1"/>
+              </a:buClr>
+              <a:buFont typeface="Calibri" pitchFamily="34" charset="0"/>
+              <a:buChar char="◦"/>
+              <a:defRPr sz="1800" kern="1200">
+                <a:solidFill>
+                  <a:schemeClr val="tx1">
+                    <a:lumMod val="75000"/>
+                    <a:lumOff val="25000"/>
+                  </a:schemeClr>
+                </a:solidFill>
+                <a:latin typeface="+mn-lt"/>
+                <a:ea typeface="+mn-ea"/>
+                <a:cs typeface="+mn-cs"/>
+              </a:defRPr>
+            </a:lvl2pPr>
+            <a:lvl3pPr marL="566928" indent="-182880" algn="l" defTabSz="914400" rtl="0" eaLnBrk="1" latinLnBrk="0" hangingPunct="1">
+              <a:lnSpc>
+                <a:spcPct val="90000"/>
+              </a:lnSpc>
+              <a:spcBef>
+                <a:spcPts val="200"/>
+              </a:spcBef>
+              <a:spcAft>
+                <a:spcPts val="400"/>
+              </a:spcAft>
+              <a:buClr>
+                <a:schemeClr val="accent1"/>
+              </a:buClr>
+              <a:buFont typeface="Calibri" pitchFamily="34" charset="0"/>
+              <a:buChar char="◦"/>
+              <a:defRPr sz="1400" kern="1200">
+                <a:solidFill>
+                  <a:schemeClr val="tx1">
+                    <a:lumMod val="75000"/>
+                    <a:lumOff val="25000"/>
+                  </a:schemeClr>
+                </a:solidFill>
+                <a:latin typeface="+mn-lt"/>
+                <a:ea typeface="+mn-ea"/>
+                <a:cs typeface="+mn-cs"/>
+              </a:defRPr>
+            </a:lvl3pPr>
+            <a:lvl4pPr marL="749808" indent="-182880" algn="l" defTabSz="914400" rtl="0" eaLnBrk="1" latinLnBrk="0" hangingPunct="1">
+              <a:lnSpc>
+                <a:spcPct val="90000"/>
+              </a:lnSpc>
+              <a:spcBef>
+                <a:spcPts val="200"/>
+              </a:spcBef>
+              <a:spcAft>
+                <a:spcPts val="400"/>
+              </a:spcAft>
+              <a:buClr>
+                <a:schemeClr val="accent1"/>
+              </a:buClr>
+              <a:buFont typeface="Calibri" pitchFamily="34" charset="0"/>
+              <a:buChar char="◦"/>
+              <a:defRPr sz="1400" kern="1200">
+                <a:solidFill>
+                  <a:schemeClr val="tx1">
+                    <a:lumMod val="75000"/>
+                    <a:lumOff val="25000"/>
+                  </a:schemeClr>
+                </a:solidFill>
+                <a:latin typeface="+mn-lt"/>
+                <a:ea typeface="+mn-ea"/>
+                <a:cs typeface="+mn-cs"/>
+              </a:defRPr>
+            </a:lvl4pPr>
+            <a:lvl5pPr marL="932688" indent="-182880" algn="l" defTabSz="914400" rtl="0" eaLnBrk="1" latinLnBrk="0" hangingPunct="1">
+              <a:lnSpc>
+                <a:spcPct val="90000"/>
+              </a:lnSpc>
+              <a:spcBef>
+                <a:spcPts val="200"/>
+              </a:spcBef>
+              <a:spcAft>
+                <a:spcPts val="400"/>
+              </a:spcAft>
+              <a:buClr>
+                <a:schemeClr val="accent1"/>
+              </a:buClr>
+              <a:buFont typeface="Calibri" pitchFamily="34" charset="0"/>
+              <a:buChar char="◦"/>
+              <a:defRPr sz="1400" kern="1200">
+                <a:solidFill>
+                  <a:schemeClr val="tx1">
+                    <a:lumMod val="75000"/>
+                    <a:lumOff val="25000"/>
+                  </a:schemeClr>
+                </a:solidFill>
+                <a:latin typeface="+mn-lt"/>
+                <a:ea typeface="+mn-ea"/>
+                <a:cs typeface="+mn-cs"/>
+              </a:defRPr>
+            </a:lvl5pPr>
+            <a:lvl6pPr marL="1100000" indent="-228600" algn="l" defTabSz="914400" rtl="0" eaLnBrk="1" latinLnBrk="0" hangingPunct="1">
+              <a:lnSpc>
+                <a:spcPct val="90000"/>
+              </a:lnSpc>
+              <a:spcBef>
+                <a:spcPts val="200"/>
+              </a:spcBef>
+              <a:spcAft>
+                <a:spcPts val="400"/>
+              </a:spcAft>
+              <a:buClr>
+                <a:schemeClr val="accent1"/>
+              </a:buClr>
+              <a:buFont typeface="Calibri" pitchFamily="34" charset="0"/>
+              <a:buChar char="◦"/>
+              <a:defRPr sz="1400" kern="1200">
+                <a:solidFill>
+                  <a:schemeClr val="tx1">
+                    <a:lumMod val="75000"/>
+                    <a:lumOff val="25000"/>
+                  </a:schemeClr>
+                </a:solidFill>
+                <a:latin typeface="+mn-lt"/>
+                <a:ea typeface="+mn-ea"/>
+                <a:cs typeface="+mn-cs"/>
+              </a:defRPr>
+            </a:lvl6pPr>
+            <a:lvl7pPr marL="1300000" indent="-228600" algn="l" defTabSz="914400" rtl="0" eaLnBrk="1" latinLnBrk="0" hangingPunct="1">
+              <a:lnSpc>
+                <a:spcPct val="90000"/>
+              </a:lnSpc>
+              <a:spcBef>
+                <a:spcPts val="200"/>
+              </a:spcBef>
+              <a:spcAft>
+                <a:spcPts val="400"/>
+              </a:spcAft>
+              <a:buClr>
+                <a:schemeClr val="accent1"/>
+              </a:buClr>
+              <a:buFont typeface="Calibri" pitchFamily="34" charset="0"/>
+              <a:buChar char="◦"/>
+              <a:defRPr sz="1400" kern="1200">
+                <a:solidFill>
+                  <a:schemeClr val="tx1">
+                    <a:lumMod val="75000"/>
+                    <a:lumOff val="25000"/>
+                  </a:schemeClr>
+                </a:solidFill>
+                <a:latin typeface="+mn-lt"/>
+                <a:ea typeface="+mn-ea"/>
+                <a:cs typeface="+mn-cs"/>
+              </a:defRPr>
+            </a:lvl7pPr>
+            <a:lvl8pPr marL="1500000" indent="-228600" algn="l" defTabSz="914400" rtl="0" eaLnBrk="1" latinLnBrk="0" hangingPunct="1">
+              <a:lnSpc>
+                <a:spcPct val="90000"/>
+              </a:lnSpc>
+              <a:spcBef>
+                <a:spcPts val="200"/>
+              </a:spcBef>
+              <a:spcAft>
+                <a:spcPts val="400"/>
+              </a:spcAft>
+              <a:buClr>
+                <a:schemeClr val="accent1"/>
+              </a:buClr>
+              <a:buFont typeface="Calibri" pitchFamily="34" charset="0"/>
+              <a:buChar char="◦"/>
+              <a:defRPr sz="1400" kern="1200">
+                <a:solidFill>
+                  <a:schemeClr val="tx1">
+                    <a:lumMod val="75000"/>
+                    <a:lumOff val="25000"/>
+                  </a:schemeClr>
+                </a:solidFill>
+                <a:latin typeface="+mn-lt"/>
+                <a:ea typeface="+mn-ea"/>
+                <a:cs typeface="+mn-cs"/>
+              </a:defRPr>
+            </a:lvl8pPr>
+            <a:lvl9pPr marL="1700000" indent="-228600" algn="l" defTabSz="914400" rtl="0" eaLnBrk="1" latinLnBrk="0" hangingPunct="1">
+              <a:lnSpc>
+                <a:spcPct val="90000"/>
+              </a:lnSpc>
+              <a:spcBef>
+                <a:spcPts val="200"/>
+              </a:spcBef>
+              <a:spcAft>
+                <a:spcPts val="400"/>
+              </a:spcAft>
+              <a:buClr>
+                <a:schemeClr val="accent1"/>
+              </a:buClr>
+              <a:buFont typeface="Calibri" pitchFamily="34" charset="0"/>
+              <a:buChar char="◦"/>
+              <a:defRPr sz="1400" kern="1200">
+                <a:solidFill>
+                  <a:schemeClr val="tx1">
+                    <a:lumMod val="75000"/>
+                    <a:lumOff val="25000"/>
+                  </a:schemeClr>
+                </a:solidFill>
+                <a:latin typeface="+mn-lt"/>
+                <a:ea typeface="+mn-ea"/>
+                <a:cs typeface="+mn-cs"/>
+              </a:defRPr>
+            </a:lvl9pPr>
+          </a:lstStyle>
+          <a:p>
+            <a:pPr>
+              <a:buClrTx/>
+              <a:buFont typeface="Arial" panose="020B0604020202020204" pitchFamily="34" charset="0"/>
+              <a:buChar char="•"/>
+            </a:pPr>
+            <a:r>
+              <a:rPr lang="en-US" dirty="0"/>
+              <a:t>Project Title</a:t>
+            </a:r>
+          </a:p>
+          <a:p>
+            <a:pPr marL="201168" lvl="1" indent="0">
+              <a:buClrTx/>
+              <a:buNone/>
+            </a:pPr>
+            <a:r>
+              <a:rPr lang="en-US" dirty="0"/>
+              <a:t>Covid-19 Vaccination Rates by State Federal Funds Usage</a:t>
+            </a:r>
+          </a:p>
+          <a:p>
+            <a:pPr>
+              <a:buClrTx/>
+              <a:buFont typeface="Arial" panose="020B0604020202020204" pitchFamily="34" charset="0"/>
+              <a:buChar char="•"/>
+            </a:pPr>
+            <a:r>
+              <a:rPr lang="en-US" dirty="0"/>
+              <a:t>Team Members (see slack channel)</a:t>
+            </a:r>
+          </a:p>
+          <a:p>
+            <a:pPr>
+              <a:buClrTx/>
+              <a:buFont typeface="Arial" panose="020B0604020202020204" pitchFamily="34" charset="0"/>
+              <a:buChar char="•"/>
+            </a:pPr>
+            <a:r>
+              <a:rPr lang="en-US" dirty="0"/>
+              <a:t>Project Description/Outline</a:t>
+            </a:r>
+          </a:p>
+          <a:p>
+            <a:pPr lvl="1">
+              <a:buClrTx/>
+              <a:buFont typeface="Wingdings" panose="05000000000000000000" pitchFamily="2" charset="2"/>
+              <a:buChar char="§"/>
+            </a:pPr>
+            <a:r>
+              <a:rPr lang="en-US" dirty="0"/>
+              <a:t>Analyze state by state federal funding usage for Covid-19 and compare to vaccination rates per state.</a:t>
+            </a:r>
+          </a:p>
+          <a:p>
+            <a:pPr>
+              <a:buClrTx/>
+              <a:buFont typeface="Arial" panose="020B0604020202020204" pitchFamily="34" charset="0"/>
+              <a:buChar char="•"/>
+            </a:pPr>
+            <a:r>
+              <a:rPr lang="en-US" dirty="0"/>
+              <a:t>Research Questions to Answer</a:t>
+            </a:r>
+          </a:p>
+          <a:p>
+            <a:pPr marL="544068" lvl="1" indent="-342900">
+              <a:buClrTx/>
+              <a:buFont typeface="+mj-lt"/>
+              <a:buAutoNum type="arabicPeriod"/>
+            </a:pPr>
+            <a:r>
+              <a:rPr lang="en-US" dirty="0"/>
+              <a:t>Which states spent ARPA money on vaccination programs, and how much/how many programs?</a:t>
+            </a:r>
+          </a:p>
+          <a:p>
+            <a:pPr lvl="2">
+              <a:buClrTx/>
+              <a:buFont typeface="Wingdings" panose="05000000000000000000" pitchFamily="2" charset="2"/>
+              <a:buChar char="§"/>
+            </a:pPr>
+            <a:r>
+              <a:rPr lang="en-US" dirty="0"/>
+              <a:t>The summary will show us top 2, bottom 2 for federal grant spending per state. Drill down in following questions:</a:t>
+            </a:r>
+          </a:p>
+          <a:p>
+            <a:pPr marL="544068" lvl="1" indent="-342900">
+              <a:buClrTx/>
+              <a:buFont typeface="+mj-lt"/>
+              <a:buAutoNum type="arabicPeriod"/>
+            </a:pPr>
+            <a:r>
+              <a:rPr lang="en-US" dirty="0"/>
+              <a:t>Compare pt 1 vaccination grant spending to vaccination rates in each state.</a:t>
+            </a:r>
+          </a:p>
+          <a:p>
+            <a:pPr lvl="2">
+              <a:buClrTx/>
+              <a:buFont typeface="Wingdings" panose="05000000000000000000" pitchFamily="2" charset="2"/>
+              <a:buChar char="§"/>
+            </a:pPr>
+            <a:r>
+              <a:rPr lang="en-US" dirty="0"/>
+              <a:t>Correlate in scatter if able.</a:t>
+            </a:r>
+          </a:p>
+          <a:p>
+            <a:pPr lvl="2">
+              <a:buClrTx/>
+              <a:buFont typeface="Wingdings" panose="05000000000000000000" pitchFamily="2" charset="2"/>
+              <a:buChar char="§"/>
+            </a:pPr>
+            <a:r>
+              <a:rPr lang="en-US" dirty="0"/>
+              <a:t>Map rates by states with </a:t>
+            </a:r>
+            <a:r>
+              <a:rPr lang="en-US" dirty="0" err="1"/>
+              <a:t>geoViews</a:t>
+            </a:r>
+            <a:r>
+              <a:rPr lang="en-US" dirty="0"/>
+              <a:t> library</a:t>
+            </a:r>
+          </a:p>
+          <a:p>
+            <a:pPr marL="544068" lvl="1" indent="-342900">
+              <a:buClrTx/>
+              <a:buFont typeface="+mj-lt"/>
+              <a:buAutoNum type="arabicPeriod"/>
+            </a:pPr>
+            <a:endParaRPr lang="en-US" dirty="0"/>
+          </a:p>
+          <a:p>
+            <a:pPr>
+              <a:buClrTx/>
+              <a:buFont typeface="Arial" panose="020B0604020202020204" pitchFamily="34" charset="0"/>
+              <a:buChar char="•"/>
+            </a:pPr>
+            <a:r>
+              <a:rPr lang="en-US" dirty="0"/>
+              <a:t>Datasets to Be Used</a:t>
+            </a:r>
+          </a:p>
+          <a:p>
+            <a:pPr marL="544068" lvl="1" indent="-342900">
+              <a:buClrTx/>
+              <a:buFont typeface="+mj-lt"/>
+              <a:buAutoNum type="arabicPeriod"/>
+            </a:pPr>
+            <a:r>
+              <a:rPr lang="en-US" dirty="0"/>
+              <a:t>EARN SLFRF Workbook, Q4 2022</a:t>
+            </a:r>
+          </a:p>
+          <a:p>
+            <a:pPr marL="544068" lvl="1" indent="-342900">
+              <a:buClrTx/>
+              <a:buFont typeface="+mj-lt"/>
+              <a:buAutoNum type="arabicPeriod"/>
+            </a:pPr>
+            <a:r>
+              <a:rPr lang="en-US" dirty="0">
+                <a:hlinkClick r:id="rId2"/>
+              </a:rPr>
+              <a:t>https://health.google.com/covid-19/open-data/</a:t>
+            </a:r>
+            <a:endParaRPr lang="en-US" dirty="0"/>
+          </a:p>
+          <a:p>
+            <a:pPr marL="726948" lvl="2" indent="-342900">
+              <a:buClrTx/>
+              <a:buFont typeface="+mj-lt"/>
+              <a:buAutoNum type="arabicPeriod"/>
+            </a:pPr>
+            <a:r>
+              <a:rPr lang="en-US" dirty="0"/>
+              <a:t>Review if we can call any of this from an API for the bonus</a:t>
+            </a:r>
+          </a:p>
+          <a:p>
+            <a:pPr marL="726948" lvl="2" indent="-342900">
+              <a:buClrTx/>
+              <a:buFont typeface="+mj-lt"/>
+              <a:buAutoNum type="arabicPeriod"/>
+            </a:pPr>
+            <a:r>
+              <a:rPr lang="en-US" dirty="0"/>
+              <a:t>This dataset is aggregated from the CDC</a:t>
+            </a:r>
+          </a:p>
+          <a:p>
+            <a:pPr marL="201168" lvl="1" indent="0">
+              <a:buClrTx/>
+              <a:buNone/>
+            </a:pPr>
+            <a:endParaRPr lang="en-US" dirty="0"/>
+          </a:p>
+        </p:txBody>
+      </p:sp>
+      <p:sp>
+        <p:nvSpPr>
+          <p:cNvPr id="3" name="Title 1">
+            <a:extLst>
+              <a:ext uri="{FF2B5EF4-FFF2-40B4-BE49-F238E27FC236}">
+                <a16:creationId xmlns:a16="http://schemas.microsoft.com/office/drawing/2014/main" id="{A88B47C8-6D82-3329-21EC-05C92318D31E}"/>
+              </a:ext>
+            </a:extLst>
+          </p:cNvPr>
+          <p:cNvSpPr txBox="1">
+            <a:spLocks/>
+          </p:cNvSpPr>
+          <p:nvPr/>
+        </p:nvSpPr>
+        <p:spPr>
+          <a:xfrm>
+            <a:off x="1066800" y="77053"/>
+            <a:ext cx="10058400" cy="702303"/>
+          </a:xfrm>
+          <a:prstGeom prst="rect">
+            <a:avLst/>
+          </a:prstGeom>
+        </p:spPr>
+        <p:txBody>
+          <a:bodyPr>
+            <a:normAutofit fontScale="97500" lnSpcReduction="10000"/>
+          </a:bodyPr>
+          <a:lstStyle>
+            <a:lvl1pPr algn="l" defTabSz="914400" rtl="0" eaLnBrk="1" latinLnBrk="0" hangingPunct="1">
+              <a:lnSpc>
+                <a:spcPct val="85000"/>
+              </a:lnSpc>
+              <a:spcBef>
+                <a:spcPct val="0"/>
+              </a:spcBef>
+              <a:buNone/>
+              <a:defRPr sz="4800" kern="1200" spc="-50" baseline="0">
+                <a:solidFill>
+                  <a:schemeClr val="tx1">
+                    <a:lumMod val="75000"/>
+                    <a:lumOff val="25000"/>
+                  </a:schemeClr>
+                </a:solidFill>
+                <a:latin typeface="+mj-lt"/>
+                <a:ea typeface="+mj-ea"/>
+                <a:cs typeface="+mj-cs"/>
+              </a:defRPr>
+            </a:lvl1pPr>
+          </a:lstStyle>
+          <a:p>
+            <a:r>
+              <a:rPr lang="en-US" dirty="0"/>
+              <a:t>Project Proposal</a:t>
+            </a:r>
+          </a:p>
+        </p:txBody>
+      </p:sp>
+    </p:spTree>
+    <p:extLst>
+      <p:ext uri="{BB962C8B-B14F-4D97-AF65-F5344CB8AC3E}">
+        <p14:creationId xmlns:p14="http://schemas.microsoft.com/office/powerpoint/2010/main" val="3724797497"/>
+      </p:ext>
+    </p:extLst>
+  </p:cSld>
+  <p:clrMapOvr>
+    <a:masterClrMapping/>
+  </p:clrMapOvr>
+</p:sld>
+</file>
+
+<file path=ppt/slides/slide11.xml><?xml version="1.0" encoding="utf-8"?>
+<p:sld xmlns:a="http://schemas.openxmlformats.org/drawingml/2006/main" xmlns:r="http://schemas.openxmlformats.org/officeDocument/2006/relationships" xmlns:p="http://schemas.openxmlformats.org/presentationml/2006/main">
+  <p:cSld>
+    <p:spTree>
+      <p:nvGrpSpPr>
+        <p:cNvPr id="1" name=""/>
+        <p:cNvGrpSpPr/>
+        <p:nvPr/>
+      </p:nvGrpSpPr>
+      <p:grpSpPr>
+        <a:xfrm>
+          <a:off x="0" y="0"/>
+          <a:ext cx="0" cy="0"/>
+          <a:chOff x="0" y="0"/>
+          <a:chExt cx="0" cy="0"/>
+        </a:xfrm>
+      </p:grpSpPr>
+      <p:sp>
+        <p:nvSpPr>
+          <p:cNvPr id="2" name="Title 1">
+            <a:extLst>
+              <a:ext uri="{FF2B5EF4-FFF2-40B4-BE49-F238E27FC236}">
+                <a16:creationId xmlns:a16="http://schemas.microsoft.com/office/drawing/2014/main" id="{94456D86-A2FB-D487-C5E7-F7D55A1C70AA}"/>
+              </a:ext>
+            </a:extLst>
+          </p:cNvPr>
+          <p:cNvSpPr>
+            <a:spLocks noGrp="1"/>
+          </p:cNvSpPr>
+          <p:nvPr>
+            <p:ph type="title"/>
+          </p:nvPr>
+        </p:nvSpPr>
+        <p:spPr>
+          <a:xfrm>
+            <a:off x="1097280" y="286603"/>
+            <a:ext cx="10058400" cy="1002447"/>
+          </a:xfrm>
+        </p:spPr>
+        <p:txBody>
+          <a:bodyPr/>
+          <a:lstStyle/>
+          <a:p>
+            <a:r>
+              <a:rPr lang="en-US" dirty="0"/>
+              <a:t>Breakdown of Tasks</a:t>
+            </a:r>
+          </a:p>
+        </p:txBody>
+      </p:sp>
+      <p:sp>
+        <p:nvSpPr>
+          <p:cNvPr id="3" name="Content Placeholder 2">
+            <a:extLst>
+              <a:ext uri="{FF2B5EF4-FFF2-40B4-BE49-F238E27FC236}">
+                <a16:creationId xmlns:a16="http://schemas.microsoft.com/office/drawing/2014/main" id="{5E3E40F8-E566-7F42-1FBB-745782052EF2}"/>
+              </a:ext>
+            </a:extLst>
+          </p:cNvPr>
+          <p:cNvSpPr>
+            <a:spLocks noGrp="1"/>
+          </p:cNvSpPr>
+          <p:nvPr>
+            <p:ph idx="1"/>
+          </p:nvPr>
+        </p:nvSpPr>
+        <p:spPr>
+          <a:xfrm>
+            <a:off x="1097280" y="1845734"/>
+            <a:ext cx="10058400" cy="4256616"/>
+          </a:xfrm>
+        </p:spPr>
+        <p:txBody>
+          <a:bodyPr/>
+          <a:lstStyle/>
+          <a:p>
+            <a:r>
+              <a:rPr lang="en-US" dirty="0"/>
+              <a:t>Split presentation deck into 6 parts: each group member to speak during presentation</a:t>
+            </a:r>
+          </a:p>
+          <a:p>
+            <a:pPr lvl="1"/>
+            <a:r>
+              <a:rPr lang="en-US" dirty="0"/>
+              <a:t>Sarah: Data clean (data </a:t>
+            </a:r>
+            <a:r>
+              <a:rPr lang="en-US" dirty="0" err="1"/>
+              <a:t>engr</a:t>
+            </a:r>
+            <a:r>
+              <a:rPr lang="en-US" dirty="0"/>
+              <a:t>)</a:t>
+            </a:r>
+          </a:p>
+          <a:p>
+            <a:pPr lvl="1"/>
+            <a:r>
+              <a:rPr lang="en-US" dirty="0"/>
+              <a:t>Kendal: Visuals planning and execution</a:t>
+            </a:r>
+          </a:p>
+          <a:p>
+            <a:pPr lvl="1"/>
+            <a:r>
+              <a:rPr lang="en-US" dirty="0"/>
+              <a:t>Greg: Debug, technical issues, overall support, CDC API (based off questions to be answered)</a:t>
+            </a:r>
+          </a:p>
+          <a:p>
+            <a:pPr lvl="1"/>
+            <a:r>
+              <a:rPr lang="en-US" dirty="0"/>
+              <a:t>Aaliyah: overall support</a:t>
+            </a:r>
+          </a:p>
+          <a:p>
+            <a:pPr lvl="1"/>
+            <a:r>
+              <a:rPr lang="en-US" dirty="0"/>
+              <a:t>Evan: Data collection (CDC API bonus support), write pseudo-code</a:t>
+            </a:r>
+          </a:p>
+          <a:p>
+            <a:pPr lvl="1"/>
+            <a:r>
+              <a:rPr lang="en-US" dirty="0"/>
+              <a:t>Joanna: Visuals planning and execution</a:t>
+            </a:r>
+          </a:p>
+          <a:p>
+            <a:pPr lvl="1"/>
+            <a:endParaRPr lang="en-US" dirty="0"/>
+          </a:p>
+          <a:p>
+            <a:pPr lvl="1"/>
+            <a:endParaRPr lang="en-US" dirty="0"/>
+          </a:p>
+          <a:p>
+            <a:r>
+              <a:rPr lang="en-US" dirty="0"/>
+              <a:t>Keep slide deck clear and concise. Further detail is captured in the Analysis Readme.</a:t>
+            </a:r>
+          </a:p>
+          <a:p>
+            <a:pPr lvl="1"/>
+            <a:r>
+              <a:rPr lang="en-US" dirty="0"/>
+              <a:t>More visuals than bullet points</a:t>
+            </a:r>
+          </a:p>
+          <a:p>
+            <a:pPr lvl="1"/>
+            <a:endParaRPr lang="en-US" dirty="0"/>
+          </a:p>
+          <a:p>
+            <a:pPr lvl="1"/>
+            <a:endParaRPr lang="en-US" dirty="0"/>
+          </a:p>
+          <a:p>
+            <a:endParaRPr lang="en-US" dirty="0"/>
+          </a:p>
+        </p:txBody>
+      </p:sp>
+    </p:spTree>
+    <p:extLst>
+      <p:ext uri="{BB962C8B-B14F-4D97-AF65-F5344CB8AC3E}">
+        <p14:creationId xmlns:p14="http://schemas.microsoft.com/office/powerpoint/2010/main" val="63745696"/>
+      </p:ext>
+    </p:extLst>
+  </p:cSld>
+  <p:clrMapOvr>
+    <a:masterClrMapping/>
+  </p:clrMapOvr>
+</p:sld>
+</file>
+
 <file path=ppt/slides/slide2.xml><?xml version="1.0" encoding="utf-8"?>
 <p:sld xmlns:a="http://schemas.openxmlformats.org/drawingml/2006/main" xmlns:r="http://schemas.openxmlformats.org/officeDocument/2006/relationships" xmlns:p="http://schemas.openxmlformats.org/presentationml/2006/main">
   <p:cSld>
@@ -4415,7 +5159,9 @@
           </a:ln>
         </p:spPr>
         <p:txBody>
-          <a:bodyPr/>
+          <a:bodyPr>
+            <a:normAutofit fontScale="85000" lnSpcReduction="20000"/>
+          </a:bodyPr>
           <a:lstStyle/>
           <a:p>
             <a:r>
@@ -4476,7 +5222,9 @@
           </a:ln>
         </p:spPr>
         <p:txBody>
-          <a:bodyPr/>
+          <a:bodyPr>
+            <a:normAutofit fontScale="85000" lnSpcReduction="20000"/>
+          </a:bodyPr>
           <a:lstStyle/>
           <a:p>
             <a:r>
@@ -4485,12 +5233,47 @@
             </a:r>
           </a:p>
           <a:p>
+            <a:pPr lvl="1">
+              <a:buClrTx/>
+              <a:buFont typeface="Wingdings" panose="05000000000000000000" pitchFamily="2" charset="2"/>
+              <a:buChar char="§"/>
+            </a:pPr>
+            <a:r>
+              <a:rPr lang="en-US" dirty="0"/>
+              <a:t>Timeframe: post March 11, 2021 – end of 2022</a:t>
+            </a:r>
+          </a:p>
+          <a:p>
+            <a:pPr lvl="1">
+              <a:buClrTx/>
+              <a:buFont typeface="Wingdings" panose="05000000000000000000" pitchFamily="2" charset="2"/>
+              <a:buChar char="§"/>
+            </a:pPr>
+            <a:r>
+              <a:rPr lang="en-US" dirty="0"/>
+              <a:t>All US states, narrow to top 3 and bottom 3 in analysis (can change)</a:t>
+            </a:r>
+          </a:p>
+          <a:p>
+            <a:pPr lvl="1">
+              <a:buClrTx/>
+              <a:buFont typeface="Wingdings" panose="05000000000000000000" pitchFamily="2" charset="2"/>
+              <a:buChar char="§"/>
+            </a:pPr>
             <a:endParaRPr lang="en-US" dirty="0"/>
           </a:p>
           <a:p>
+            <a:pPr lvl="1">
+              <a:buClrTx/>
+              <a:buFont typeface="Wingdings" panose="05000000000000000000" pitchFamily="2" charset="2"/>
+              <a:buChar char="§"/>
+            </a:pPr>
             <a:endParaRPr lang="en-US" dirty="0"/>
           </a:p>
           <a:p>
+            <a:endParaRPr lang="en-US" dirty="0"/>
+          </a:p>
+          <a:p>
             <a:r>
               <a:rPr lang="en-US" dirty="0"/>
               <a:t>What this project is not</a:t>
@@ -4503,10 +5286,40 @@
             <a:endParaRPr lang="en-US" dirty="0"/>
           </a:p>
           <a:p>
+            <a:pPr marL="0" indent="0">
+              <a:buNone/>
+            </a:pPr>
             <a:r>
               <a:rPr lang="en-US" dirty="0"/>
               <a:t>Data source constraints and assumptions</a:t>
             </a:r>
+          </a:p>
+          <a:p>
+            <a:pPr>
+              <a:buFont typeface="Arial" panose="020B0604020202020204" pitchFamily="34" charset="0"/>
+              <a:buChar char="•"/>
+            </a:pPr>
+            <a:r>
+              <a:rPr lang="en-US" sz="1600" dirty="0"/>
+              <a:t>State size/population not taken into account</a:t>
+            </a:r>
+          </a:p>
+          <a:p>
+            <a:pPr>
+              <a:buFont typeface="Arial" panose="020B0604020202020204" pitchFamily="34" charset="0"/>
+              <a:buChar char="•"/>
+            </a:pPr>
+            <a:r>
+              <a:rPr lang="en-US" sz="1600" dirty="0"/>
+              <a:t>Different qualification criteria per state</a:t>
+            </a:r>
+          </a:p>
+          <a:p>
+            <a:pPr>
+              <a:buFont typeface="Arial" panose="020B0604020202020204" pitchFamily="34" charset="0"/>
+              <a:buChar char="•"/>
+            </a:pPr>
+            <a:endParaRPr lang="en-US" sz="1600" dirty="0"/>
           </a:p>
         </p:txBody>
       </p:sp>
@@ -4864,7 +5677,7 @@
             <a:pPr lvl="1"/>
             <a:r>
               <a:rPr lang="en-US" dirty="0"/>
-              <a:t>Greg: Debug, technical issues, overall support</a:t>
+              <a:t>Greg: Debug, technical issues, overall support, CDC API (based off questions to be answered)</a:t>
             </a:r>
           </a:p>
           <a:p>
@@ -4878,7 +5691,7 @@
             <a:pPr lvl="1"/>
             <a:r>
               <a:rPr lang="en-US" dirty="0"/>
-              <a:t>Evan: Data collection</a:t>
+              <a:t>Evan: Data collection (CDC API bonus support), write pseudo-code</a:t>
             </a:r>
           </a:p>
           <a:p>
@@ -5098,6 +5911,1487 @@
     <p:extLst>
       <p:ext uri="{BB962C8B-B14F-4D97-AF65-F5344CB8AC3E}">
         <p14:creationId xmlns:p14="http://schemas.microsoft.com/office/powerpoint/2010/main" val="1873696182"/>
+      </p:ext>
+    </p:extLst>
+  </p:cSld>
+  <p:clrMapOvr>
+    <a:masterClrMapping/>
+  </p:clrMapOvr>
+</p:sld>
+</file>
+
+<file path=ppt/slides/slide7.xml><?xml version="1.0" encoding="utf-8"?>
+<p:sld xmlns:a="http://schemas.openxmlformats.org/drawingml/2006/main" xmlns:r="http://schemas.openxmlformats.org/officeDocument/2006/relationships" xmlns:p="http://schemas.openxmlformats.org/presentationml/2006/main">
+  <p:cSld>
+    <p:spTree>
+      <p:nvGrpSpPr>
+        <p:cNvPr id="1" name=""/>
+        <p:cNvGrpSpPr/>
+        <p:nvPr/>
+      </p:nvGrpSpPr>
+      <p:grpSpPr>
+        <a:xfrm>
+          <a:off x="0" y="0"/>
+          <a:ext cx="0" cy="0"/>
+          <a:chOff x="0" y="0"/>
+          <a:chExt cx="0" cy="0"/>
+        </a:xfrm>
+      </p:grpSpPr>
+      <p:sp>
+        <p:nvSpPr>
+          <p:cNvPr id="2" name="Content Placeholder 2">
+            <a:extLst>
+              <a:ext uri="{FF2B5EF4-FFF2-40B4-BE49-F238E27FC236}">
+                <a16:creationId xmlns:a16="http://schemas.microsoft.com/office/drawing/2014/main" id="{10068C32-8F59-D5F4-3644-514FE45C30EA}"/>
+              </a:ext>
+            </a:extLst>
+          </p:cNvPr>
+          <p:cNvSpPr txBox="1">
+            <a:spLocks/>
+          </p:cNvSpPr>
+          <p:nvPr/>
+        </p:nvSpPr>
+        <p:spPr>
+          <a:xfrm>
+            <a:off x="101600" y="815976"/>
+            <a:ext cx="12090400" cy="5746749"/>
+          </a:xfrm>
+          <a:prstGeom prst="rect">
+            <a:avLst/>
+          </a:prstGeom>
+        </p:spPr>
+        <p:txBody>
+          <a:bodyPr/>
+          <a:lstStyle>
+            <a:lvl1pPr marL="91440" indent="-91440" algn="l" defTabSz="914400" rtl="0" eaLnBrk="1" latinLnBrk="0" hangingPunct="1">
+              <a:lnSpc>
+                <a:spcPct val="90000"/>
+              </a:lnSpc>
+              <a:spcBef>
+                <a:spcPts val="1200"/>
+              </a:spcBef>
+              <a:spcAft>
+                <a:spcPts val="200"/>
+              </a:spcAft>
+              <a:buClr>
+                <a:schemeClr val="accent1"/>
+              </a:buClr>
+              <a:buSzPct val="100000"/>
+              <a:buFont typeface="Calibri" panose="020F0502020204030204" pitchFamily="34" charset="0"/>
+              <a:buChar char=" "/>
+              <a:defRPr sz="2000" kern="1200">
+                <a:solidFill>
+                  <a:schemeClr val="tx1">
+                    <a:lumMod val="75000"/>
+                    <a:lumOff val="25000"/>
+                  </a:schemeClr>
+                </a:solidFill>
+                <a:latin typeface="+mn-lt"/>
+                <a:ea typeface="+mn-ea"/>
+                <a:cs typeface="+mn-cs"/>
+              </a:defRPr>
+            </a:lvl1pPr>
+            <a:lvl2pPr marL="384048" indent="-182880" algn="l" defTabSz="914400" rtl="0" eaLnBrk="1" latinLnBrk="0" hangingPunct="1">
+              <a:lnSpc>
+                <a:spcPct val="90000"/>
+              </a:lnSpc>
+              <a:spcBef>
+                <a:spcPts val="200"/>
+              </a:spcBef>
+              <a:spcAft>
+                <a:spcPts val="400"/>
+              </a:spcAft>
+              <a:buClr>
+                <a:schemeClr val="accent1"/>
+              </a:buClr>
+              <a:buFont typeface="Calibri" pitchFamily="34" charset="0"/>
+              <a:buChar char="◦"/>
+              <a:defRPr sz="1800" kern="1200">
+                <a:solidFill>
+                  <a:schemeClr val="tx1">
+                    <a:lumMod val="75000"/>
+                    <a:lumOff val="25000"/>
+                  </a:schemeClr>
+                </a:solidFill>
+                <a:latin typeface="+mn-lt"/>
+                <a:ea typeface="+mn-ea"/>
+                <a:cs typeface="+mn-cs"/>
+              </a:defRPr>
+            </a:lvl2pPr>
+            <a:lvl3pPr marL="566928" indent="-182880" algn="l" defTabSz="914400" rtl="0" eaLnBrk="1" latinLnBrk="0" hangingPunct="1">
+              <a:lnSpc>
+                <a:spcPct val="90000"/>
+              </a:lnSpc>
+              <a:spcBef>
+                <a:spcPts val="200"/>
+              </a:spcBef>
+              <a:spcAft>
+                <a:spcPts val="400"/>
+              </a:spcAft>
+              <a:buClr>
+                <a:schemeClr val="accent1"/>
+              </a:buClr>
+              <a:buFont typeface="Calibri" pitchFamily="34" charset="0"/>
+              <a:buChar char="◦"/>
+              <a:defRPr sz="1400" kern="1200">
+                <a:solidFill>
+                  <a:schemeClr val="tx1">
+                    <a:lumMod val="75000"/>
+                    <a:lumOff val="25000"/>
+                  </a:schemeClr>
+                </a:solidFill>
+                <a:latin typeface="+mn-lt"/>
+                <a:ea typeface="+mn-ea"/>
+                <a:cs typeface="+mn-cs"/>
+              </a:defRPr>
+            </a:lvl3pPr>
+            <a:lvl4pPr marL="749808" indent="-182880" algn="l" defTabSz="914400" rtl="0" eaLnBrk="1" latinLnBrk="0" hangingPunct="1">
+              <a:lnSpc>
+                <a:spcPct val="90000"/>
+              </a:lnSpc>
+              <a:spcBef>
+                <a:spcPts val="200"/>
+              </a:spcBef>
+              <a:spcAft>
+                <a:spcPts val="400"/>
+              </a:spcAft>
+              <a:buClr>
+                <a:schemeClr val="accent1"/>
+              </a:buClr>
+              <a:buFont typeface="Calibri" pitchFamily="34" charset="0"/>
+              <a:buChar char="◦"/>
+              <a:defRPr sz="1400" kern="1200">
+                <a:solidFill>
+                  <a:schemeClr val="tx1">
+                    <a:lumMod val="75000"/>
+                    <a:lumOff val="25000"/>
+                  </a:schemeClr>
+                </a:solidFill>
+                <a:latin typeface="+mn-lt"/>
+                <a:ea typeface="+mn-ea"/>
+                <a:cs typeface="+mn-cs"/>
+              </a:defRPr>
+            </a:lvl4pPr>
+            <a:lvl5pPr marL="932688" indent="-182880" algn="l" defTabSz="914400" rtl="0" eaLnBrk="1" latinLnBrk="0" hangingPunct="1">
+              <a:lnSpc>
+                <a:spcPct val="90000"/>
+              </a:lnSpc>
+              <a:spcBef>
+                <a:spcPts val="200"/>
+              </a:spcBef>
+              <a:spcAft>
+                <a:spcPts val="400"/>
+              </a:spcAft>
+              <a:buClr>
+                <a:schemeClr val="accent1"/>
+              </a:buClr>
+              <a:buFont typeface="Calibri" pitchFamily="34" charset="0"/>
+              <a:buChar char="◦"/>
+              <a:defRPr sz="1400" kern="1200">
+                <a:solidFill>
+                  <a:schemeClr val="tx1">
+                    <a:lumMod val="75000"/>
+                    <a:lumOff val="25000"/>
+                  </a:schemeClr>
+                </a:solidFill>
+                <a:latin typeface="+mn-lt"/>
+                <a:ea typeface="+mn-ea"/>
+                <a:cs typeface="+mn-cs"/>
+              </a:defRPr>
+            </a:lvl5pPr>
+            <a:lvl6pPr marL="1100000" indent="-228600" algn="l" defTabSz="914400" rtl="0" eaLnBrk="1" latinLnBrk="0" hangingPunct="1">
+              <a:lnSpc>
+                <a:spcPct val="90000"/>
+              </a:lnSpc>
+              <a:spcBef>
+                <a:spcPts val="200"/>
+              </a:spcBef>
+              <a:spcAft>
+                <a:spcPts val="400"/>
+              </a:spcAft>
+              <a:buClr>
+                <a:schemeClr val="accent1"/>
+              </a:buClr>
+              <a:buFont typeface="Calibri" pitchFamily="34" charset="0"/>
+              <a:buChar char="◦"/>
+              <a:defRPr sz="1400" kern="1200">
+                <a:solidFill>
+                  <a:schemeClr val="tx1">
+                    <a:lumMod val="75000"/>
+                    <a:lumOff val="25000"/>
+                  </a:schemeClr>
+                </a:solidFill>
+                <a:latin typeface="+mn-lt"/>
+                <a:ea typeface="+mn-ea"/>
+                <a:cs typeface="+mn-cs"/>
+              </a:defRPr>
+            </a:lvl6pPr>
+            <a:lvl7pPr marL="1300000" indent="-228600" algn="l" defTabSz="914400" rtl="0" eaLnBrk="1" latinLnBrk="0" hangingPunct="1">
+              <a:lnSpc>
+                <a:spcPct val="90000"/>
+              </a:lnSpc>
+              <a:spcBef>
+                <a:spcPts val="200"/>
+              </a:spcBef>
+              <a:spcAft>
+                <a:spcPts val="400"/>
+              </a:spcAft>
+              <a:buClr>
+                <a:schemeClr val="accent1"/>
+              </a:buClr>
+              <a:buFont typeface="Calibri" pitchFamily="34" charset="0"/>
+              <a:buChar char="◦"/>
+              <a:defRPr sz="1400" kern="1200">
+                <a:solidFill>
+                  <a:schemeClr val="tx1">
+                    <a:lumMod val="75000"/>
+                    <a:lumOff val="25000"/>
+                  </a:schemeClr>
+                </a:solidFill>
+                <a:latin typeface="+mn-lt"/>
+                <a:ea typeface="+mn-ea"/>
+                <a:cs typeface="+mn-cs"/>
+              </a:defRPr>
+            </a:lvl7pPr>
+            <a:lvl8pPr marL="1500000" indent="-228600" algn="l" defTabSz="914400" rtl="0" eaLnBrk="1" latinLnBrk="0" hangingPunct="1">
+              <a:lnSpc>
+                <a:spcPct val="90000"/>
+              </a:lnSpc>
+              <a:spcBef>
+                <a:spcPts val="200"/>
+              </a:spcBef>
+              <a:spcAft>
+                <a:spcPts val="400"/>
+              </a:spcAft>
+              <a:buClr>
+                <a:schemeClr val="accent1"/>
+              </a:buClr>
+              <a:buFont typeface="Calibri" pitchFamily="34" charset="0"/>
+              <a:buChar char="◦"/>
+              <a:defRPr sz="1400" kern="1200">
+                <a:solidFill>
+                  <a:schemeClr val="tx1">
+                    <a:lumMod val="75000"/>
+                    <a:lumOff val="25000"/>
+                  </a:schemeClr>
+                </a:solidFill>
+                <a:latin typeface="+mn-lt"/>
+                <a:ea typeface="+mn-ea"/>
+                <a:cs typeface="+mn-cs"/>
+              </a:defRPr>
+            </a:lvl8pPr>
+            <a:lvl9pPr marL="1700000" indent="-228600" algn="l" defTabSz="914400" rtl="0" eaLnBrk="1" latinLnBrk="0" hangingPunct="1">
+              <a:lnSpc>
+                <a:spcPct val="90000"/>
+              </a:lnSpc>
+              <a:spcBef>
+                <a:spcPts val="200"/>
+              </a:spcBef>
+              <a:spcAft>
+                <a:spcPts val="400"/>
+              </a:spcAft>
+              <a:buClr>
+                <a:schemeClr val="accent1"/>
+              </a:buClr>
+              <a:buFont typeface="Calibri" pitchFamily="34" charset="0"/>
+              <a:buChar char="◦"/>
+              <a:defRPr sz="1400" kern="1200">
+                <a:solidFill>
+                  <a:schemeClr val="tx1">
+                    <a:lumMod val="75000"/>
+                    <a:lumOff val="25000"/>
+                  </a:schemeClr>
+                </a:solidFill>
+                <a:latin typeface="+mn-lt"/>
+                <a:ea typeface="+mn-ea"/>
+                <a:cs typeface="+mn-cs"/>
+              </a:defRPr>
+            </a:lvl9pPr>
+          </a:lstStyle>
+          <a:p>
+            <a:pPr>
+              <a:buClrTx/>
+              <a:buFont typeface="Arial" panose="020B0604020202020204" pitchFamily="34" charset="0"/>
+              <a:buChar char="•"/>
+            </a:pPr>
+            <a:r>
+              <a:rPr lang="en-US" dirty="0"/>
+              <a:t> Questions that you found interesting and what motivated you to answer them</a:t>
+            </a:r>
+          </a:p>
+          <a:p>
+            <a:pPr marL="544068" lvl="1" indent="-342900">
+              <a:buClrTx/>
+              <a:buFont typeface="+mj-lt"/>
+              <a:buAutoNum type="arabicPeriod"/>
+            </a:pPr>
+            <a:endParaRPr lang="en-US" dirty="0"/>
+          </a:p>
+          <a:p>
+            <a:pPr>
+              <a:buClrTx/>
+              <a:buFont typeface="Arial" panose="020B0604020202020204" pitchFamily="34" charset="0"/>
+              <a:buChar char="•"/>
+            </a:pPr>
+            <a:r>
+              <a:rPr lang="en-US" dirty="0"/>
+              <a:t> Where and how you found the data you used to answer these questions</a:t>
+            </a:r>
+          </a:p>
+          <a:p>
+            <a:pPr marL="544068" lvl="1" indent="-342900">
+              <a:buClrTx/>
+              <a:buFont typeface="+mj-lt"/>
+              <a:buAutoNum type="arabicPeriod"/>
+            </a:pPr>
+            <a:endParaRPr lang="en-US" dirty="0"/>
+          </a:p>
+          <a:p>
+            <a:pPr>
+              <a:buClrTx/>
+              <a:buFont typeface="Arial" panose="020B0604020202020204" pitchFamily="34" charset="0"/>
+              <a:buChar char="•"/>
+            </a:pPr>
+            <a:r>
+              <a:rPr lang="en-US" dirty="0"/>
+              <a:t> The data exploration and cleanup process (accompanied by your </a:t>
+            </a:r>
+            <a:r>
+              <a:rPr lang="en-US" dirty="0" err="1"/>
+              <a:t>Jupyter</a:t>
+            </a:r>
+            <a:r>
+              <a:rPr lang="en-US" dirty="0"/>
+              <a:t> notebook)</a:t>
+            </a:r>
+          </a:p>
+          <a:p>
+            <a:pPr marL="544068" lvl="1" indent="-342900">
+              <a:buClrTx/>
+              <a:buFont typeface="+mj-lt"/>
+              <a:buAutoNum type="arabicPeriod"/>
+            </a:pPr>
+            <a:endParaRPr lang="en-US" dirty="0"/>
+          </a:p>
+          <a:p>
+            <a:pPr>
+              <a:buClrTx/>
+              <a:buFont typeface="Arial" panose="020B0604020202020204" pitchFamily="34" charset="0"/>
+              <a:buChar char="•"/>
+            </a:pPr>
+            <a:r>
+              <a:rPr lang="en-US" dirty="0"/>
+              <a:t> The analysis process (accompanied by your </a:t>
+            </a:r>
+            <a:r>
+              <a:rPr lang="en-US" dirty="0" err="1"/>
+              <a:t>Jupyter</a:t>
+            </a:r>
+            <a:r>
+              <a:rPr lang="en-US" dirty="0"/>
+              <a:t> notebook)</a:t>
+            </a:r>
+          </a:p>
+          <a:p>
+            <a:pPr marL="544068" lvl="1" indent="-342900">
+              <a:buClrTx/>
+              <a:buFont typeface="+mj-lt"/>
+              <a:buAutoNum type="arabicPeriod"/>
+            </a:pPr>
+            <a:endParaRPr lang="en-US" dirty="0"/>
+          </a:p>
+          <a:p>
+            <a:pPr>
+              <a:buClrTx/>
+              <a:buFont typeface="Arial" panose="020B0604020202020204" pitchFamily="34" charset="0"/>
+              <a:buChar char="•"/>
+            </a:pPr>
+            <a:r>
+              <a:rPr lang="en-US" dirty="0"/>
+              <a:t> Your conclusions, including a numerical summary and visualizations of the summary</a:t>
+            </a:r>
+          </a:p>
+          <a:p>
+            <a:pPr marL="544068" lvl="1" indent="-342900">
+              <a:buClrTx/>
+              <a:buFont typeface="+mj-lt"/>
+              <a:buAutoNum type="arabicPeriod"/>
+            </a:pPr>
+            <a:endParaRPr lang="en-US" dirty="0"/>
+          </a:p>
+          <a:p>
+            <a:pPr>
+              <a:buClrTx/>
+              <a:buFont typeface="Arial" panose="020B0604020202020204" pitchFamily="34" charset="0"/>
+              <a:buChar char="•"/>
+            </a:pPr>
+            <a:r>
+              <a:rPr lang="en-US" dirty="0"/>
+              <a:t> The implications of your findings: what do your findings mean?</a:t>
+            </a:r>
+          </a:p>
+          <a:p>
+            <a:pPr marL="544068" lvl="1" indent="-342900">
+              <a:buClrTx/>
+              <a:buFont typeface="+mj-lt"/>
+              <a:buAutoNum type="arabicPeriod"/>
+            </a:pPr>
+            <a:endParaRPr lang="en-US" dirty="0"/>
+          </a:p>
+        </p:txBody>
+      </p:sp>
+      <p:sp>
+        <p:nvSpPr>
+          <p:cNvPr id="3" name="Title 1">
+            <a:extLst>
+              <a:ext uri="{FF2B5EF4-FFF2-40B4-BE49-F238E27FC236}">
+                <a16:creationId xmlns:a16="http://schemas.microsoft.com/office/drawing/2014/main" id="{A88B47C8-6D82-3329-21EC-05C92318D31E}"/>
+              </a:ext>
+            </a:extLst>
+          </p:cNvPr>
+          <p:cNvSpPr txBox="1">
+            <a:spLocks/>
+          </p:cNvSpPr>
+          <p:nvPr/>
+        </p:nvSpPr>
+        <p:spPr>
+          <a:xfrm>
+            <a:off x="1066800" y="77053"/>
+            <a:ext cx="10058400" cy="702303"/>
+          </a:xfrm>
+          <a:prstGeom prst="rect">
+            <a:avLst/>
+          </a:prstGeom>
+        </p:spPr>
+        <p:txBody>
+          <a:bodyPr>
+            <a:normAutofit fontScale="97500" lnSpcReduction="10000"/>
+          </a:bodyPr>
+          <a:lstStyle>
+            <a:lvl1pPr algn="l" defTabSz="914400" rtl="0" eaLnBrk="1" latinLnBrk="0" hangingPunct="1">
+              <a:lnSpc>
+                <a:spcPct val="85000"/>
+              </a:lnSpc>
+              <a:spcBef>
+                <a:spcPct val="0"/>
+              </a:spcBef>
+              <a:buNone/>
+              <a:defRPr sz="4800" kern="1200" spc="-50" baseline="0">
+                <a:solidFill>
+                  <a:schemeClr val="tx1">
+                    <a:lumMod val="75000"/>
+                    <a:lumOff val="25000"/>
+                  </a:schemeClr>
+                </a:solidFill>
+                <a:latin typeface="+mj-lt"/>
+                <a:ea typeface="+mj-ea"/>
+                <a:cs typeface="+mj-cs"/>
+              </a:defRPr>
+            </a:lvl1pPr>
+          </a:lstStyle>
+          <a:p>
+            <a:r>
+              <a:rPr lang="en-US" dirty="0"/>
+              <a:t>Presentation Requirements</a:t>
+            </a:r>
+          </a:p>
+        </p:txBody>
+      </p:sp>
+    </p:spTree>
+    <p:extLst>
+      <p:ext uri="{BB962C8B-B14F-4D97-AF65-F5344CB8AC3E}">
+        <p14:creationId xmlns:p14="http://schemas.microsoft.com/office/powerpoint/2010/main" val="2614040401"/>
+      </p:ext>
+    </p:extLst>
+  </p:cSld>
+  <p:clrMapOvr>
+    <a:masterClrMapping/>
+  </p:clrMapOvr>
+</p:sld>
+</file>
+
+<file path=ppt/slides/slide8.xml><?xml version="1.0" encoding="utf-8"?>
+<p:sld xmlns:a="http://schemas.openxmlformats.org/drawingml/2006/main" xmlns:r="http://schemas.openxmlformats.org/officeDocument/2006/relationships" xmlns:p="http://schemas.openxmlformats.org/presentationml/2006/main">
+  <p:cSld>
+    <p:spTree>
+      <p:nvGrpSpPr>
+        <p:cNvPr id="1" name=""/>
+        <p:cNvGrpSpPr/>
+        <p:nvPr/>
+      </p:nvGrpSpPr>
+      <p:grpSpPr>
+        <a:xfrm>
+          <a:off x="0" y="0"/>
+          <a:ext cx="0" cy="0"/>
+          <a:chOff x="0" y="0"/>
+          <a:chExt cx="0" cy="0"/>
+        </a:xfrm>
+      </p:grpSpPr>
+      <p:sp>
+        <p:nvSpPr>
+          <p:cNvPr id="2" name="Content Placeholder 2">
+            <a:extLst>
+              <a:ext uri="{FF2B5EF4-FFF2-40B4-BE49-F238E27FC236}">
+                <a16:creationId xmlns:a16="http://schemas.microsoft.com/office/drawing/2014/main" id="{10068C32-8F59-D5F4-3644-514FE45C30EA}"/>
+              </a:ext>
+            </a:extLst>
+          </p:cNvPr>
+          <p:cNvSpPr txBox="1">
+            <a:spLocks/>
+          </p:cNvSpPr>
+          <p:nvPr/>
+        </p:nvSpPr>
+        <p:spPr>
+          <a:xfrm>
+            <a:off x="101600" y="815976"/>
+            <a:ext cx="12090400" cy="5746749"/>
+          </a:xfrm>
+          <a:prstGeom prst="rect">
+            <a:avLst/>
+          </a:prstGeom>
+        </p:spPr>
+        <p:txBody>
+          <a:bodyPr/>
+          <a:lstStyle>
+            <a:lvl1pPr marL="91440" indent="-91440" algn="l" defTabSz="914400" rtl="0" eaLnBrk="1" latinLnBrk="0" hangingPunct="1">
+              <a:lnSpc>
+                <a:spcPct val="90000"/>
+              </a:lnSpc>
+              <a:spcBef>
+                <a:spcPts val="1200"/>
+              </a:spcBef>
+              <a:spcAft>
+                <a:spcPts val="200"/>
+              </a:spcAft>
+              <a:buClr>
+                <a:schemeClr val="accent1"/>
+              </a:buClr>
+              <a:buSzPct val="100000"/>
+              <a:buFont typeface="Calibri" panose="020F0502020204030204" pitchFamily="34" charset="0"/>
+              <a:buChar char=" "/>
+              <a:defRPr sz="2000" kern="1200">
+                <a:solidFill>
+                  <a:schemeClr val="tx1">
+                    <a:lumMod val="75000"/>
+                    <a:lumOff val="25000"/>
+                  </a:schemeClr>
+                </a:solidFill>
+                <a:latin typeface="+mn-lt"/>
+                <a:ea typeface="+mn-ea"/>
+                <a:cs typeface="+mn-cs"/>
+              </a:defRPr>
+            </a:lvl1pPr>
+            <a:lvl2pPr marL="384048" indent="-182880" algn="l" defTabSz="914400" rtl="0" eaLnBrk="1" latinLnBrk="0" hangingPunct="1">
+              <a:lnSpc>
+                <a:spcPct val="90000"/>
+              </a:lnSpc>
+              <a:spcBef>
+                <a:spcPts val="200"/>
+              </a:spcBef>
+              <a:spcAft>
+                <a:spcPts val="400"/>
+              </a:spcAft>
+              <a:buClr>
+                <a:schemeClr val="accent1"/>
+              </a:buClr>
+              <a:buFont typeface="Calibri" pitchFamily="34" charset="0"/>
+              <a:buChar char="◦"/>
+              <a:defRPr sz="1800" kern="1200">
+                <a:solidFill>
+                  <a:schemeClr val="tx1">
+                    <a:lumMod val="75000"/>
+                    <a:lumOff val="25000"/>
+                  </a:schemeClr>
+                </a:solidFill>
+                <a:latin typeface="+mn-lt"/>
+                <a:ea typeface="+mn-ea"/>
+                <a:cs typeface="+mn-cs"/>
+              </a:defRPr>
+            </a:lvl2pPr>
+            <a:lvl3pPr marL="566928" indent="-182880" algn="l" defTabSz="914400" rtl="0" eaLnBrk="1" latinLnBrk="0" hangingPunct="1">
+              <a:lnSpc>
+                <a:spcPct val="90000"/>
+              </a:lnSpc>
+              <a:spcBef>
+                <a:spcPts val="200"/>
+              </a:spcBef>
+              <a:spcAft>
+                <a:spcPts val="400"/>
+              </a:spcAft>
+              <a:buClr>
+                <a:schemeClr val="accent1"/>
+              </a:buClr>
+              <a:buFont typeface="Calibri" pitchFamily="34" charset="0"/>
+              <a:buChar char="◦"/>
+              <a:defRPr sz="1400" kern="1200">
+                <a:solidFill>
+                  <a:schemeClr val="tx1">
+                    <a:lumMod val="75000"/>
+                    <a:lumOff val="25000"/>
+                  </a:schemeClr>
+                </a:solidFill>
+                <a:latin typeface="+mn-lt"/>
+                <a:ea typeface="+mn-ea"/>
+                <a:cs typeface="+mn-cs"/>
+              </a:defRPr>
+            </a:lvl3pPr>
+            <a:lvl4pPr marL="749808" indent="-182880" algn="l" defTabSz="914400" rtl="0" eaLnBrk="1" latinLnBrk="0" hangingPunct="1">
+              <a:lnSpc>
+                <a:spcPct val="90000"/>
+              </a:lnSpc>
+              <a:spcBef>
+                <a:spcPts val="200"/>
+              </a:spcBef>
+              <a:spcAft>
+                <a:spcPts val="400"/>
+              </a:spcAft>
+              <a:buClr>
+                <a:schemeClr val="accent1"/>
+              </a:buClr>
+              <a:buFont typeface="Calibri" pitchFamily="34" charset="0"/>
+              <a:buChar char="◦"/>
+              <a:defRPr sz="1400" kern="1200">
+                <a:solidFill>
+                  <a:schemeClr val="tx1">
+                    <a:lumMod val="75000"/>
+                    <a:lumOff val="25000"/>
+                  </a:schemeClr>
+                </a:solidFill>
+                <a:latin typeface="+mn-lt"/>
+                <a:ea typeface="+mn-ea"/>
+                <a:cs typeface="+mn-cs"/>
+              </a:defRPr>
+            </a:lvl4pPr>
+            <a:lvl5pPr marL="932688" indent="-182880" algn="l" defTabSz="914400" rtl="0" eaLnBrk="1" latinLnBrk="0" hangingPunct="1">
+              <a:lnSpc>
+                <a:spcPct val="90000"/>
+              </a:lnSpc>
+              <a:spcBef>
+                <a:spcPts val="200"/>
+              </a:spcBef>
+              <a:spcAft>
+                <a:spcPts val="400"/>
+              </a:spcAft>
+              <a:buClr>
+                <a:schemeClr val="accent1"/>
+              </a:buClr>
+              <a:buFont typeface="Calibri" pitchFamily="34" charset="0"/>
+              <a:buChar char="◦"/>
+              <a:defRPr sz="1400" kern="1200">
+                <a:solidFill>
+                  <a:schemeClr val="tx1">
+                    <a:lumMod val="75000"/>
+                    <a:lumOff val="25000"/>
+                  </a:schemeClr>
+                </a:solidFill>
+                <a:latin typeface="+mn-lt"/>
+                <a:ea typeface="+mn-ea"/>
+                <a:cs typeface="+mn-cs"/>
+              </a:defRPr>
+            </a:lvl5pPr>
+            <a:lvl6pPr marL="1100000" indent="-228600" algn="l" defTabSz="914400" rtl="0" eaLnBrk="1" latinLnBrk="0" hangingPunct="1">
+              <a:lnSpc>
+                <a:spcPct val="90000"/>
+              </a:lnSpc>
+              <a:spcBef>
+                <a:spcPts val="200"/>
+              </a:spcBef>
+              <a:spcAft>
+                <a:spcPts val="400"/>
+              </a:spcAft>
+              <a:buClr>
+                <a:schemeClr val="accent1"/>
+              </a:buClr>
+              <a:buFont typeface="Calibri" pitchFamily="34" charset="0"/>
+              <a:buChar char="◦"/>
+              <a:defRPr sz="1400" kern="1200">
+                <a:solidFill>
+                  <a:schemeClr val="tx1">
+                    <a:lumMod val="75000"/>
+                    <a:lumOff val="25000"/>
+                  </a:schemeClr>
+                </a:solidFill>
+                <a:latin typeface="+mn-lt"/>
+                <a:ea typeface="+mn-ea"/>
+                <a:cs typeface="+mn-cs"/>
+              </a:defRPr>
+            </a:lvl6pPr>
+            <a:lvl7pPr marL="1300000" indent="-228600" algn="l" defTabSz="914400" rtl="0" eaLnBrk="1" latinLnBrk="0" hangingPunct="1">
+              <a:lnSpc>
+                <a:spcPct val="90000"/>
+              </a:lnSpc>
+              <a:spcBef>
+                <a:spcPts val="200"/>
+              </a:spcBef>
+              <a:spcAft>
+                <a:spcPts val="400"/>
+              </a:spcAft>
+              <a:buClr>
+                <a:schemeClr val="accent1"/>
+              </a:buClr>
+              <a:buFont typeface="Calibri" pitchFamily="34" charset="0"/>
+              <a:buChar char="◦"/>
+              <a:defRPr sz="1400" kern="1200">
+                <a:solidFill>
+                  <a:schemeClr val="tx1">
+                    <a:lumMod val="75000"/>
+                    <a:lumOff val="25000"/>
+                  </a:schemeClr>
+                </a:solidFill>
+                <a:latin typeface="+mn-lt"/>
+                <a:ea typeface="+mn-ea"/>
+                <a:cs typeface="+mn-cs"/>
+              </a:defRPr>
+            </a:lvl7pPr>
+            <a:lvl8pPr marL="1500000" indent="-228600" algn="l" defTabSz="914400" rtl="0" eaLnBrk="1" latinLnBrk="0" hangingPunct="1">
+              <a:lnSpc>
+                <a:spcPct val="90000"/>
+              </a:lnSpc>
+              <a:spcBef>
+                <a:spcPts val="200"/>
+              </a:spcBef>
+              <a:spcAft>
+                <a:spcPts val="400"/>
+              </a:spcAft>
+              <a:buClr>
+                <a:schemeClr val="accent1"/>
+              </a:buClr>
+              <a:buFont typeface="Calibri" pitchFamily="34" charset="0"/>
+              <a:buChar char="◦"/>
+              <a:defRPr sz="1400" kern="1200">
+                <a:solidFill>
+                  <a:schemeClr val="tx1">
+                    <a:lumMod val="75000"/>
+                    <a:lumOff val="25000"/>
+                  </a:schemeClr>
+                </a:solidFill>
+                <a:latin typeface="+mn-lt"/>
+                <a:ea typeface="+mn-ea"/>
+                <a:cs typeface="+mn-cs"/>
+              </a:defRPr>
+            </a:lvl8pPr>
+            <a:lvl9pPr marL="1700000" indent="-228600" algn="l" defTabSz="914400" rtl="0" eaLnBrk="1" latinLnBrk="0" hangingPunct="1">
+              <a:lnSpc>
+                <a:spcPct val="90000"/>
+              </a:lnSpc>
+              <a:spcBef>
+                <a:spcPts val="200"/>
+              </a:spcBef>
+              <a:spcAft>
+                <a:spcPts val="400"/>
+              </a:spcAft>
+              <a:buClr>
+                <a:schemeClr val="accent1"/>
+              </a:buClr>
+              <a:buFont typeface="Calibri" pitchFamily="34" charset="0"/>
+              <a:buChar char="◦"/>
+              <a:defRPr sz="1400" kern="1200">
+                <a:solidFill>
+                  <a:schemeClr val="tx1">
+                    <a:lumMod val="75000"/>
+                    <a:lumOff val="25000"/>
+                  </a:schemeClr>
+                </a:solidFill>
+                <a:latin typeface="+mn-lt"/>
+                <a:ea typeface="+mn-ea"/>
+                <a:cs typeface="+mn-cs"/>
+              </a:defRPr>
+            </a:lvl9pPr>
+          </a:lstStyle>
+          <a:p>
+            <a:pPr>
+              <a:buClrTx/>
+              <a:buFont typeface="Arial" panose="020B0604020202020204" pitchFamily="34" charset="0"/>
+              <a:buChar char="•"/>
+            </a:pPr>
+            <a:r>
+              <a:rPr lang="en-US" dirty="0"/>
+              <a:t>Use Pandas to clean and format your dataset or datasets.</a:t>
+            </a:r>
+          </a:p>
+          <a:p>
+            <a:pPr>
+              <a:buClrTx/>
+              <a:buFont typeface="Arial" panose="020B0604020202020204" pitchFamily="34" charset="0"/>
+              <a:buChar char="•"/>
+            </a:pPr>
+            <a:r>
+              <a:rPr lang="en-US" dirty="0"/>
+              <a:t>Create a </a:t>
+            </a:r>
+            <a:r>
+              <a:rPr lang="en-US" dirty="0" err="1"/>
+              <a:t>Jupyter</a:t>
+            </a:r>
+            <a:r>
+              <a:rPr lang="en-US" dirty="0"/>
+              <a:t> notebook describing the data exploration and cleanup process.</a:t>
+            </a:r>
+          </a:p>
+          <a:p>
+            <a:pPr>
+              <a:buClrTx/>
+              <a:buFont typeface="Arial" panose="020B0604020202020204" pitchFamily="34" charset="0"/>
+              <a:buChar char="•"/>
+            </a:pPr>
+            <a:r>
+              <a:rPr lang="en-US" dirty="0"/>
+              <a:t>Create a </a:t>
+            </a:r>
+            <a:r>
+              <a:rPr lang="en-US" dirty="0" err="1"/>
+              <a:t>Jupyter</a:t>
+            </a:r>
+            <a:r>
+              <a:rPr lang="en-US" dirty="0"/>
+              <a:t> notebook illustrating the final data analysis.</a:t>
+            </a:r>
+          </a:p>
+          <a:p>
+            <a:pPr>
+              <a:buClrTx/>
+              <a:buFont typeface="Arial" panose="020B0604020202020204" pitchFamily="34" charset="0"/>
+              <a:buChar char="•"/>
+            </a:pPr>
+            <a:r>
+              <a:rPr lang="en-US" dirty="0"/>
+              <a:t>Use Matplotlib to create 6 to 8 visualizations of your data</a:t>
+            </a:r>
+          </a:p>
+          <a:p>
+            <a:pPr>
+              <a:buClrTx/>
+              <a:buFont typeface="Arial" panose="020B0604020202020204" pitchFamily="34" charset="0"/>
+              <a:buChar char="•"/>
+            </a:pPr>
+            <a:r>
+              <a:rPr lang="en-US" dirty="0"/>
+              <a:t>(ideally, at least 2 visualizations per “question” that you ask your data).</a:t>
+            </a:r>
+          </a:p>
+          <a:p>
+            <a:pPr>
+              <a:buClrTx/>
+              <a:buFont typeface="Arial" panose="020B0604020202020204" pitchFamily="34" charset="0"/>
+              <a:buChar char="•"/>
+            </a:pPr>
+            <a:r>
+              <a:rPr lang="en-US" dirty="0"/>
+              <a:t>Save PNG images of your visualizations to distribute to the class and instructional team—and for</a:t>
+            </a:r>
+          </a:p>
+          <a:p>
+            <a:pPr>
+              <a:buClrTx/>
+              <a:buFont typeface="Arial" panose="020B0604020202020204" pitchFamily="34" charset="0"/>
+              <a:buChar char="•"/>
+            </a:pPr>
+            <a:r>
+              <a:rPr lang="en-US" dirty="0"/>
+              <a:t>inclusion in your presentation.</a:t>
+            </a:r>
+          </a:p>
+          <a:p>
+            <a:pPr>
+              <a:buClrTx/>
+              <a:buFont typeface="Arial" panose="020B0604020202020204" pitchFamily="34" charset="0"/>
+              <a:buChar char="•"/>
+            </a:pPr>
+            <a:r>
+              <a:rPr lang="en-US" dirty="0"/>
+              <a:t>Create a write-up summarizing your major findings. This should include a heading for each “question”</a:t>
+            </a:r>
+          </a:p>
+          <a:p>
+            <a:pPr>
+              <a:buClrTx/>
+              <a:buFont typeface="Arial" panose="020B0604020202020204" pitchFamily="34" charset="0"/>
+              <a:buChar char="•"/>
+            </a:pPr>
+            <a:r>
+              <a:rPr lang="en-US" dirty="0"/>
+              <a:t>that you asked your data as well as a short description of your findings and any relevant plots.</a:t>
+            </a:r>
+          </a:p>
+          <a:p>
+            <a:pPr>
+              <a:buClrTx/>
+              <a:buFont typeface="Arial" panose="020B0604020202020204" pitchFamily="34" charset="0"/>
+              <a:buChar char="•"/>
+            </a:pPr>
+            <a:r>
+              <a:rPr lang="en-US" dirty="0"/>
+              <a:t>Bonus Use at least one API—if you can find one with data pertinent to your primary research questions.</a:t>
+            </a:r>
+          </a:p>
+        </p:txBody>
+      </p:sp>
+      <p:sp>
+        <p:nvSpPr>
+          <p:cNvPr id="3" name="Title 1">
+            <a:extLst>
+              <a:ext uri="{FF2B5EF4-FFF2-40B4-BE49-F238E27FC236}">
+                <a16:creationId xmlns:a16="http://schemas.microsoft.com/office/drawing/2014/main" id="{A88B47C8-6D82-3329-21EC-05C92318D31E}"/>
+              </a:ext>
+            </a:extLst>
+          </p:cNvPr>
+          <p:cNvSpPr txBox="1">
+            <a:spLocks/>
+          </p:cNvSpPr>
+          <p:nvPr/>
+        </p:nvSpPr>
+        <p:spPr>
+          <a:xfrm>
+            <a:off x="1066800" y="77053"/>
+            <a:ext cx="10058400" cy="702303"/>
+          </a:xfrm>
+          <a:prstGeom prst="rect">
+            <a:avLst/>
+          </a:prstGeom>
+        </p:spPr>
+        <p:txBody>
+          <a:bodyPr>
+            <a:normAutofit fontScale="97500" lnSpcReduction="10000"/>
+          </a:bodyPr>
+          <a:lstStyle>
+            <a:lvl1pPr algn="l" defTabSz="914400" rtl="0" eaLnBrk="1" latinLnBrk="0" hangingPunct="1">
+              <a:lnSpc>
+                <a:spcPct val="85000"/>
+              </a:lnSpc>
+              <a:spcBef>
+                <a:spcPct val="0"/>
+              </a:spcBef>
+              <a:buNone/>
+              <a:defRPr sz="4800" kern="1200" spc="-50" baseline="0">
+                <a:solidFill>
+                  <a:schemeClr val="tx1">
+                    <a:lumMod val="75000"/>
+                    <a:lumOff val="25000"/>
+                  </a:schemeClr>
+                </a:solidFill>
+                <a:latin typeface="+mj-lt"/>
+                <a:ea typeface="+mj-ea"/>
+                <a:cs typeface="+mj-cs"/>
+              </a:defRPr>
+            </a:lvl1pPr>
+          </a:lstStyle>
+          <a:p>
+            <a:r>
+              <a:rPr lang="en-US" dirty="0"/>
+              <a:t>Development Requirements</a:t>
+            </a:r>
+          </a:p>
+        </p:txBody>
+      </p:sp>
+    </p:spTree>
+    <p:extLst>
+      <p:ext uri="{BB962C8B-B14F-4D97-AF65-F5344CB8AC3E}">
+        <p14:creationId xmlns:p14="http://schemas.microsoft.com/office/powerpoint/2010/main" val="908844552"/>
+      </p:ext>
+    </p:extLst>
+  </p:cSld>
+  <p:clrMapOvr>
+    <a:masterClrMapping/>
+  </p:clrMapOvr>
+</p:sld>
+</file>
+
+<file path=ppt/slides/slide9.xml><?xml version="1.0" encoding="utf-8"?>
+<p:sld xmlns:a="http://schemas.openxmlformats.org/drawingml/2006/main" xmlns:r="http://schemas.openxmlformats.org/officeDocument/2006/relationships" xmlns:p="http://schemas.openxmlformats.org/presentationml/2006/main">
+  <p:cSld>
+    <p:spTree>
+      <p:nvGrpSpPr>
+        <p:cNvPr id="1" name=""/>
+        <p:cNvGrpSpPr/>
+        <p:nvPr/>
+      </p:nvGrpSpPr>
+      <p:grpSpPr>
+        <a:xfrm>
+          <a:off x="0" y="0"/>
+          <a:ext cx="0" cy="0"/>
+          <a:chOff x="0" y="0"/>
+          <a:chExt cx="0" cy="0"/>
+        </a:xfrm>
+      </p:grpSpPr>
+      <p:sp>
+        <p:nvSpPr>
+          <p:cNvPr id="2" name="Content Placeholder 2">
+            <a:extLst>
+              <a:ext uri="{FF2B5EF4-FFF2-40B4-BE49-F238E27FC236}">
+                <a16:creationId xmlns:a16="http://schemas.microsoft.com/office/drawing/2014/main" id="{10068C32-8F59-D5F4-3644-514FE45C30EA}"/>
+              </a:ext>
+            </a:extLst>
+          </p:cNvPr>
+          <p:cNvSpPr txBox="1">
+            <a:spLocks/>
+          </p:cNvSpPr>
+          <p:nvPr/>
+        </p:nvSpPr>
+        <p:spPr>
+          <a:xfrm>
+            <a:off x="101600" y="815976"/>
+            <a:ext cx="12090400" cy="6042024"/>
+          </a:xfrm>
+          <a:prstGeom prst="rect">
+            <a:avLst/>
+          </a:prstGeom>
+        </p:spPr>
+        <p:txBody>
+          <a:bodyPr/>
+          <a:lstStyle>
+            <a:lvl1pPr marL="91440" indent="-91440" algn="l" defTabSz="914400" rtl="0" eaLnBrk="1" latinLnBrk="0" hangingPunct="1">
+              <a:lnSpc>
+                <a:spcPct val="90000"/>
+              </a:lnSpc>
+              <a:spcBef>
+                <a:spcPts val="1200"/>
+              </a:spcBef>
+              <a:spcAft>
+                <a:spcPts val="200"/>
+              </a:spcAft>
+              <a:buClr>
+                <a:schemeClr val="accent1"/>
+              </a:buClr>
+              <a:buSzPct val="100000"/>
+              <a:buFont typeface="Calibri" panose="020F0502020204030204" pitchFamily="34" charset="0"/>
+              <a:buChar char=" "/>
+              <a:defRPr sz="2000" kern="1200">
+                <a:solidFill>
+                  <a:schemeClr val="tx1">
+                    <a:lumMod val="75000"/>
+                    <a:lumOff val="25000"/>
+                  </a:schemeClr>
+                </a:solidFill>
+                <a:latin typeface="+mn-lt"/>
+                <a:ea typeface="+mn-ea"/>
+                <a:cs typeface="+mn-cs"/>
+              </a:defRPr>
+            </a:lvl1pPr>
+            <a:lvl2pPr marL="384048" indent="-182880" algn="l" defTabSz="914400" rtl="0" eaLnBrk="1" latinLnBrk="0" hangingPunct="1">
+              <a:lnSpc>
+                <a:spcPct val="90000"/>
+              </a:lnSpc>
+              <a:spcBef>
+                <a:spcPts val="200"/>
+              </a:spcBef>
+              <a:spcAft>
+                <a:spcPts val="400"/>
+              </a:spcAft>
+              <a:buClr>
+                <a:schemeClr val="accent1"/>
+              </a:buClr>
+              <a:buFont typeface="Calibri" pitchFamily="34" charset="0"/>
+              <a:buChar char="◦"/>
+              <a:defRPr sz="1800" kern="1200">
+                <a:solidFill>
+                  <a:schemeClr val="tx1">
+                    <a:lumMod val="75000"/>
+                    <a:lumOff val="25000"/>
+                  </a:schemeClr>
+                </a:solidFill>
+                <a:latin typeface="+mn-lt"/>
+                <a:ea typeface="+mn-ea"/>
+                <a:cs typeface="+mn-cs"/>
+              </a:defRPr>
+            </a:lvl2pPr>
+            <a:lvl3pPr marL="566928" indent="-182880" algn="l" defTabSz="914400" rtl="0" eaLnBrk="1" latinLnBrk="0" hangingPunct="1">
+              <a:lnSpc>
+                <a:spcPct val="90000"/>
+              </a:lnSpc>
+              <a:spcBef>
+                <a:spcPts val="200"/>
+              </a:spcBef>
+              <a:spcAft>
+                <a:spcPts val="400"/>
+              </a:spcAft>
+              <a:buClr>
+                <a:schemeClr val="accent1"/>
+              </a:buClr>
+              <a:buFont typeface="Calibri" pitchFamily="34" charset="0"/>
+              <a:buChar char="◦"/>
+              <a:defRPr sz="1400" kern="1200">
+                <a:solidFill>
+                  <a:schemeClr val="tx1">
+                    <a:lumMod val="75000"/>
+                    <a:lumOff val="25000"/>
+                  </a:schemeClr>
+                </a:solidFill>
+                <a:latin typeface="+mn-lt"/>
+                <a:ea typeface="+mn-ea"/>
+                <a:cs typeface="+mn-cs"/>
+              </a:defRPr>
+            </a:lvl3pPr>
+            <a:lvl4pPr marL="749808" indent="-182880" algn="l" defTabSz="914400" rtl="0" eaLnBrk="1" latinLnBrk="0" hangingPunct="1">
+              <a:lnSpc>
+                <a:spcPct val="90000"/>
+              </a:lnSpc>
+              <a:spcBef>
+                <a:spcPts val="200"/>
+              </a:spcBef>
+              <a:spcAft>
+                <a:spcPts val="400"/>
+              </a:spcAft>
+              <a:buClr>
+                <a:schemeClr val="accent1"/>
+              </a:buClr>
+              <a:buFont typeface="Calibri" pitchFamily="34" charset="0"/>
+              <a:buChar char="◦"/>
+              <a:defRPr sz="1400" kern="1200">
+                <a:solidFill>
+                  <a:schemeClr val="tx1">
+                    <a:lumMod val="75000"/>
+                    <a:lumOff val="25000"/>
+                  </a:schemeClr>
+                </a:solidFill>
+                <a:latin typeface="+mn-lt"/>
+                <a:ea typeface="+mn-ea"/>
+                <a:cs typeface="+mn-cs"/>
+              </a:defRPr>
+            </a:lvl4pPr>
+            <a:lvl5pPr marL="932688" indent="-182880" algn="l" defTabSz="914400" rtl="0" eaLnBrk="1" latinLnBrk="0" hangingPunct="1">
+              <a:lnSpc>
+                <a:spcPct val="90000"/>
+              </a:lnSpc>
+              <a:spcBef>
+                <a:spcPts val="200"/>
+              </a:spcBef>
+              <a:spcAft>
+                <a:spcPts val="400"/>
+              </a:spcAft>
+              <a:buClr>
+                <a:schemeClr val="accent1"/>
+              </a:buClr>
+              <a:buFont typeface="Calibri" pitchFamily="34" charset="0"/>
+              <a:buChar char="◦"/>
+              <a:defRPr sz="1400" kern="1200">
+                <a:solidFill>
+                  <a:schemeClr val="tx1">
+                    <a:lumMod val="75000"/>
+                    <a:lumOff val="25000"/>
+                  </a:schemeClr>
+                </a:solidFill>
+                <a:latin typeface="+mn-lt"/>
+                <a:ea typeface="+mn-ea"/>
+                <a:cs typeface="+mn-cs"/>
+              </a:defRPr>
+            </a:lvl5pPr>
+            <a:lvl6pPr marL="1100000" indent="-228600" algn="l" defTabSz="914400" rtl="0" eaLnBrk="1" latinLnBrk="0" hangingPunct="1">
+              <a:lnSpc>
+                <a:spcPct val="90000"/>
+              </a:lnSpc>
+              <a:spcBef>
+                <a:spcPts val="200"/>
+              </a:spcBef>
+              <a:spcAft>
+                <a:spcPts val="400"/>
+              </a:spcAft>
+              <a:buClr>
+                <a:schemeClr val="accent1"/>
+              </a:buClr>
+              <a:buFont typeface="Calibri" pitchFamily="34" charset="0"/>
+              <a:buChar char="◦"/>
+              <a:defRPr sz="1400" kern="1200">
+                <a:solidFill>
+                  <a:schemeClr val="tx1">
+                    <a:lumMod val="75000"/>
+                    <a:lumOff val="25000"/>
+                  </a:schemeClr>
+                </a:solidFill>
+                <a:latin typeface="+mn-lt"/>
+                <a:ea typeface="+mn-ea"/>
+                <a:cs typeface="+mn-cs"/>
+              </a:defRPr>
+            </a:lvl6pPr>
+            <a:lvl7pPr marL="1300000" indent="-228600" algn="l" defTabSz="914400" rtl="0" eaLnBrk="1" latinLnBrk="0" hangingPunct="1">
+              <a:lnSpc>
+                <a:spcPct val="90000"/>
+              </a:lnSpc>
+              <a:spcBef>
+                <a:spcPts val="200"/>
+              </a:spcBef>
+              <a:spcAft>
+                <a:spcPts val="400"/>
+              </a:spcAft>
+              <a:buClr>
+                <a:schemeClr val="accent1"/>
+              </a:buClr>
+              <a:buFont typeface="Calibri" pitchFamily="34" charset="0"/>
+              <a:buChar char="◦"/>
+              <a:defRPr sz="1400" kern="1200">
+                <a:solidFill>
+                  <a:schemeClr val="tx1">
+                    <a:lumMod val="75000"/>
+                    <a:lumOff val="25000"/>
+                  </a:schemeClr>
+                </a:solidFill>
+                <a:latin typeface="+mn-lt"/>
+                <a:ea typeface="+mn-ea"/>
+                <a:cs typeface="+mn-cs"/>
+              </a:defRPr>
+            </a:lvl7pPr>
+            <a:lvl8pPr marL="1500000" indent="-228600" algn="l" defTabSz="914400" rtl="0" eaLnBrk="1" latinLnBrk="0" hangingPunct="1">
+              <a:lnSpc>
+                <a:spcPct val="90000"/>
+              </a:lnSpc>
+              <a:spcBef>
+                <a:spcPts val="200"/>
+              </a:spcBef>
+              <a:spcAft>
+                <a:spcPts val="400"/>
+              </a:spcAft>
+              <a:buClr>
+                <a:schemeClr val="accent1"/>
+              </a:buClr>
+              <a:buFont typeface="Calibri" pitchFamily="34" charset="0"/>
+              <a:buChar char="◦"/>
+              <a:defRPr sz="1400" kern="1200">
+                <a:solidFill>
+                  <a:schemeClr val="tx1">
+                    <a:lumMod val="75000"/>
+                    <a:lumOff val="25000"/>
+                  </a:schemeClr>
+                </a:solidFill>
+                <a:latin typeface="+mn-lt"/>
+                <a:ea typeface="+mn-ea"/>
+                <a:cs typeface="+mn-cs"/>
+              </a:defRPr>
+            </a:lvl8pPr>
+            <a:lvl9pPr marL="1700000" indent="-228600" algn="l" defTabSz="914400" rtl="0" eaLnBrk="1" latinLnBrk="0" hangingPunct="1">
+              <a:lnSpc>
+                <a:spcPct val="90000"/>
+              </a:lnSpc>
+              <a:spcBef>
+                <a:spcPts val="200"/>
+              </a:spcBef>
+              <a:spcAft>
+                <a:spcPts val="400"/>
+              </a:spcAft>
+              <a:buClr>
+                <a:schemeClr val="accent1"/>
+              </a:buClr>
+              <a:buFont typeface="Calibri" pitchFamily="34" charset="0"/>
+              <a:buChar char="◦"/>
+              <a:defRPr sz="1400" kern="1200">
+                <a:solidFill>
+                  <a:schemeClr val="tx1">
+                    <a:lumMod val="75000"/>
+                    <a:lumOff val="25000"/>
+                  </a:schemeClr>
+                </a:solidFill>
+                <a:latin typeface="+mn-lt"/>
+                <a:ea typeface="+mn-ea"/>
+                <a:cs typeface="+mn-cs"/>
+              </a:defRPr>
+            </a:lvl9pPr>
+          </a:lstStyle>
+          <a:p>
+            <a:pPr>
+              <a:buClrTx/>
+              <a:buFont typeface="Arial" panose="020B0604020202020204" pitchFamily="34" charset="0"/>
+              <a:buChar char="•"/>
+            </a:pPr>
+            <a:r>
+              <a:rPr lang="en-US" dirty="0"/>
+              <a:t>Project Title</a:t>
+            </a:r>
+          </a:p>
+          <a:p>
+            <a:pPr marL="201168" lvl="1" indent="0">
+              <a:buClrTx/>
+              <a:buNone/>
+            </a:pPr>
+            <a:r>
+              <a:rPr lang="en-US" dirty="0"/>
+              <a:t>Covid-19 Vaccination Rates by State Federal Funds Usage</a:t>
+            </a:r>
+          </a:p>
+          <a:p>
+            <a:pPr>
+              <a:buClrTx/>
+              <a:buFont typeface="Arial" panose="020B0604020202020204" pitchFamily="34" charset="0"/>
+              <a:buChar char="•"/>
+            </a:pPr>
+            <a:r>
+              <a:rPr lang="en-US" dirty="0"/>
+              <a:t>Team Members (see slack channel)</a:t>
+            </a:r>
+          </a:p>
+          <a:p>
+            <a:pPr>
+              <a:buClrTx/>
+              <a:buFont typeface="Arial" panose="020B0604020202020204" pitchFamily="34" charset="0"/>
+              <a:buChar char="•"/>
+            </a:pPr>
+            <a:r>
+              <a:rPr lang="en-US" dirty="0"/>
+              <a:t>Project Description/Outline</a:t>
+            </a:r>
+          </a:p>
+          <a:p>
+            <a:pPr lvl="1">
+              <a:buClrTx/>
+              <a:buFont typeface="Wingdings" panose="05000000000000000000" pitchFamily="2" charset="2"/>
+              <a:buChar char="§"/>
+            </a:pPr>
+            <a:r>
+              <a:rPr lang="en-US" dirty="0"/>
+              <a:t>Analyze state by state federal funding usage for Covid-19 and compare to vaccination rates per state.</a:t>
+            </a:r>
+          </a:p>
+          <a:p>
+            <a:pPr>
+              <a:buClrTx/>
+              <a:buFont typeface="Arial" panose="020B0604020202020204" pitchFamily="34" charset="0"/>
+              <a:buChar char="•"/>
+            </a:pPr>
+            <a:r>
+              <a:rPr lang="en-US" dirty="0"/>
+              <a:t>Research Questions to Answer</a:t>
+            </a:r>
+          </a:p>
+          <a:p>
+            <a:pPr marL="544068" lvl="1" indent="-342900">
+              <a:buClrTx/>
+              <a:buFont typeface="+mj-lt"/>
+              <a:buAutoNum type="arabicPeriod"/>
+            </a:pPr>
+            <a:r>
+              <a:rPr lang="en-US" dirty="0"/>
+              <a:t>Which states spent ARPA money on vaccination programs, and how much/how many programs?</a:t>
+            </a:r>
+          </a:p>
+          <a:p>
+            <a:pPr marL="544068" lvl="1" indent="-342900">
+              <a:buClrTx/>
+              <a:buFont typeface="+mj-lt"/>
+              <a:buAutoNum type="arabicPeriod"/>
+            </a:pPr>
+            <a:r>
+              <a:rPr lang="en-US" dirty="0"/>
+              <a:t>Compare vaccination grant spending to vaccination rates in each state.</a:t>
+            </a:r>
+          </a:p>
+          <a:p>
+            <a:pPr marL="544068" lvl="1" indent="-342900">
+              <a:buClrTx/>
+              <a:buFont typeface="+mj-lt"/>
+              <a:buAutoNum type="arabicPeriod"/>
+            </a:pPr>
+            <a:endParaRPr lang="en-US" dirty="0"/>
+          </a:p>
+          <a:p>
+            <a:pPr marL="201168" lvl="1" indent="0">
+              <a:buClrTx/>
+              <a:buNone/>
+            </a:pPr>
+            <a:endParaRPr lang="en-US" dirty="0"/>
+          </a:p>
+          <a:p>
+            <a:pPr>
+              <a:buClrTx/>
+              <a:buFont typeface="Arial" panose="020B0604020202020204" pitchFamily="34" charset="0"/>
+              <a:buChar char="•"/>
+            </a:pPr>
+            <a:r>
+              <a:rPr lang="en-US" dirty="0"/>
+              <a:t>Datasets to Be Used</a:t>
+            </a:r>
+          </a:p>
+          <a:p>
+            <a:pPr marL="544068" lvl="1" indent="-342900">
+              <a:buClrTx/>
+              <a:buFont typeface="+mj-lt"/>
+              <a:buAutoNum type="arabicPeriod"/>
+            </a:pPr>
+            <a:r>
+              <a:rPr lang="en-US" dirty="0"/>
+              <a:t>EARN SLFRF Workbook, Q4 2022 (ref </a:t>
+            </a:r>
+            <a:r>
+              <a:rPr lang="en-US" dirty="0">
+                <a:hlinkClick r:id="rId2"/>
+              </a:rPr>
+              <a:t>https://www.epi.org/resources/budget/)</a:t>
+            </a:r>
+            <a:endParaRPr lang="en-US" dirty="0"/>
+          </a:p>
+          <a:p>
+            <a:pPr marL="544068" lvl="1" indent="-342900">
+              <a:buClrTx/>
+              <a:buFont typeface="+mj-lt"/>
+              <a:buAutoNum type="arabicPeriod"/>
+            </a:pPr>
+            <a:r>
+              <a:rPr lang="en-US" dirty="0">
+                <a:hlinkClick r:id="rId3"/>
+              </a:rPr>
+              <a:t>https://health.google.com/covid-19/open-data/</a:t>
+            </a:r>
+            <a:endParaRPr lang="en-US" dirty="0"/>
+          </a:p>
+        </p:txBody>
+      </p:sp>
+      <p:sp>
+        <p:nvSpPr>
+          <p:cNvPr id="3" name="Title 1">
+            <a:extLst>
+              <a:ext uri="{FF2B5EF4-FFF2-40B4-BE49-F238E27FC236}">
+                <a16:creationId xmlns:a16="http://schemas.microsoft.com/office/drawing/2014/main" id="{A88B47C8-6D82-3329-21EC-05C92318D31E}"/>
+              </a:ext>
+            </a:extLst>
+          </p:cNvPr>
+          <p:cNvSpPr txBox="1">
+            <a:spLocks/>
+          </p:cNvSpPr>
+          <p:nvPr/>
+        </p:nvSpPr>
+        <p:spPr>
+          <a:xfrm>
+            <a:off x="1066800" y="77053"/>
+            <a:ext cx="10058400" cy="702303"/>
+          </a:xfrm>
+          <a:prstGeom prst="rect">
+            <a:avLst/>
+          </a:prstGeom>
+        </p:spPr>
+        <p:txBody>
+          <a:bodyPr>
+            <a:normAutofit fontScale="97500" lnSpcReduction="10000"/>
+          </a:bodyPr>
+          <a:lstStyle>
+            <a:lvl1pPr algn="l" defTabSz="914400" rtl="0" eaLnBrk="1" latinLnBrk="0" hangingPunct="1">
+              <a:lnSpc>
+                <a:spcPct val="85000"/>
+              </a:lnSpc>
+              <a:spcBef>
+                <a:spcPct val="0"/>
+              </a:spcBef>
+              <a:buNone/>
+              <a:defRPr sz="4800" kern="1200" spc="-50" baseline="0">
+                <a:solidFill>
+                  <a:schemeClr val="tx1">
+                    <a:lumMod val="75000"/>
+                    <a:lumOff val="25000"/>
+                  </a:schemeClr>
+                </a:solidFill>
+                <a:latin typeface="+mj-lt"/>
+                <a:ea typeface="+mj-ea"/>
+                <a:cs typeface="+mj-cs"/>
+              </a:defRPr>
+            </a:lvl1pPr>
+          </a:lstStyle>
+          <a:p>
+            <a:r>
+              <a:rPr lang="en-US" dirty="0"/>
+              <a:t>Project Proposal</a:t>
+            </a:r>
+          </a:p>
+        </p:txBody>
+      </p:sp>
+    </p:spTree>
+    <p:extLst>
+      <p:ext uri="{BB962C8B-B14F-4D97-AF65-F5344CB8AC3E}">
+        <p14:creationId xmlns:p14="http://schemas.microsoft.com/office/powerpoint/2010/main" val="331821678"/>
       </p:ext>
     </p:extLst>
   </p:cSld>

</xml_diff>

<commit_message>
5/9/2023: Update project description. Update tasks breakdown slide.
</commit_message>
<xml_diff>
--- a/Project notes.pptx
+++ b/Project notes.pptx
@@ -5,20 +5,18 @@
     <p:sldMasterId id="2147483696" r:id="rId1"/>
   </p:sldMasterIdLst>
   <p:notesMasterIdLst>
-    <p:notesMasterId r:id="rId13"/>
+    <p:notesMasterId r:id="rId11"/>
   </p:notesMasterIdLst>
   <p:sldIdLst>
     <p:sldId id="256" r:id="rId2"/>
     <p:sldId id="258" r:id="rId3"/>
     <p:sldId id="257" r:id="rId4"/>
     <p:sldId id="259" r:id="rId5"/>
-    <p:sldId id="260" r:id="rId6"/>
-    <p:sldId id="261" r:id="rId7"/>
-    <p:sldId id="263" r:id="rId8"/>
-    <p:sldId id="264" r:id="rId9"/>
-    <p:sldId id="265" r:id="rId10"/>
-    <p:sldId id="267" r:id="rId11"/>
-    <p:sldId id="266" r:id="rId12"/>
+    <p:sldId id="261" r:id="rId6"/>
+    <p:sldId id="263" r:id="rId7"/>
+    <p:sldId id="264" r:id="rId8"/>
+    <p:sldId id="265" r:id="rId9"/>
+    <p:sldId id="266" r:id="rId10"/>
   </p:sldIdLst>
   <p:sldSz cx="12192000" cy="6858000"/>
   <p:notesSz cx="6858000" cy="9144000"/>
@@ -569,6 +567,184 @@
     <p:extLst>
       <p:ext uri="{BB962C8B-B14F-4D97-AF65-F5344CB8AC3E}">
         <p14:creationId xmlns:p14="http://schemas.microsoft.com/office/powerpoint/2010/main" val="2597049469"/>
+      </p:ext>
+    </p:extLst>
+  </p:cSld>
+  <p:clrMapOvr>
+    <a:masterClrMapping/>
+  </p:clrMapOvr>
+</p:notes>
+</file>
+
+<file path=ppt/notesSlides/notesSlide2.xml><?xml version="1.0" encoding="utf-8"?>
+<p:notes xmlns:a="http://schemas.openxmlformats.org/drawingml/2006/main" xmlns:r="http://schemas.openxmlformats.org/officeDocument/2006/relationships" xmlns:p="http://schemas.openxmlformats.org/presentationml/2006/main">
+  <p:cSld>
+    <p:spTree>
+      <p:nvGrpSpPr>
+        <p:cNvPr id="1" name=""/>
+        <p:cNvGrpSpPr/>
+        <p:nvPr/>
+      </p:nvGrpSpPr>
+      <p:grpSpPr>
+        <a:xfrm>
+          <a:off x="0" y="0"/>
+          <a:ext cx="0" cy="0"/>
+          <a:chOff x="0" y="0"/>
+          <a:chExt cx="0" cy="0"/>
+        </a:xfrm>
+      </p:grpSpPr>
+      <p:sp>
+        <p:nvSpPr>
+          <p:cNvPr id="2" name="Slide Image Placeholder 1"/>
+          <p:cNvSpPr>
+            <a:spLocks noGrp="1" noRot="1" noChangeAspect="1"/>
+          </p:cNvSpPr>
+          <p:nvPr>
+            <p:ph type="sldImg"/>
+          </p:nvPr>
+        </p:nvSpPr>
+        <p:spPr/>
+      </p:sp>
+      <p:sp>
+        <p:nvSpPr>
+          <p:cNvPr id="3" name="Notes Placeholder 2"/>
+          <p:cNvSpPr>
+            <a:spLocks noGrp="1"/>
+          </p:cNvSpPr>
+          <p:nvPr>
+            <p:ph type="body" idx="1"/>
+          </p:nvPr>
+        </p:nvSpPr>
+        <p:spPr/>
+        <p:txBody>
+          <a:bodyPr/>
+          <a:lstStyle/>
+          <a:p>
+            <a:pPr marL="0" marR="0" lvl="0" indent="0" algn="l" defTabSz="914400" rtl="0" eaLnBrk="1" fontAlgn="auto" latinLnBrk="0" hangingPunct="1">
+              <a:lnSpc>
+                <a:spcPct val="100000"/>
+              </a:lnSpc>
+              <a:spcBef>
+                <a:spcPts val="0"/>
+              </a:spcBef>
+              <a:spcAft>
+                <a:spcPts val="0"/>
+              </a:spcAft>
+              <a:buClrTx/>
+              <a:buSzTx/>
+              <a:buFontTx/>
+              <a:buNone/>
+              <a:tabLst/>
+              <a:defRPr/>
+            </a:pPr>
+            <a:r>
+              <a:rPr lang="en-US" dirty="0"/>
+              <a:t>Correlate in scatter if able.</a:t>
+            </a:r>
+          </a:p>
+          <a:p>
+            <a:pPr marL="0" marR="0" lvl="0" indent="0" algn="l" defTabSz="914400" rtl="0" eaLnBrk="1" fontAlgn="auto" latinLnBrk="0" hangingPunct="1">
+              <a:lnSpc>
+                <a:spcPct val="100000"/>
+              </a:lnSpc>
+              <a:spcBef>
+                <a:spcPts val="0"/>
+              </a:spcBef>
+              <a:spcAft>
+                <a:spcPts val="0"/>
+              </a:spcAft>
+              <a:buClrTx/>
+              <a:buSzTx/>
+              <a:buFontTx/>
+              <a:buNone/>
+              <a:tabLst/>
+              <a:defRPr/>
+            </a:pPr>
+            <a:r>
+              <a:rPr lang="en-US" dirty="0"/>
+              <a:t>Map rates by states with </a:t>
+            </a:r>
+            <a:r>
+              <a:rPr lang="en-US" dirty="0" err="1"/>
+              <a:t>geoViews</a:t>
+            </a:r>
+            <a:r>
+              <a:rPr lang="en-US" dirty="0"/>
+              <a:t> library</a:t>
+            </a:r>
+          </a:p>
+          <a:p>
+            <a:pPr marL="0" marR="0" lvl="0" indent="0" algn="l" defTabSz="914400" rtl="0" eaLnBrk="1" fontAlgn="auto" latinLnBrk="0" hangingPunct="1">
+              <a:lnSpc>
+                <a:spcPct val="100000"/>
+              </a:lnSpc>
+              <a:spcBef>
+                <a:spcPts val="0"/>
+              </a:spcBef>
+              <a:spcAft>
+                <a:spcPts val="0"/>
+              </a:spcAft>
+              <a:buClrTx/>
+              <a:buSzTx/>
+              <a:buFontTx/>
+              <a:buNone/>
+              <a:tabLst/>
+              <a:defRPr/>
+            </a:pPr>
+            <a:endParaRPr lang="en-US" dirty="0"/>
+          </a:p>
+          <a:p>
+            <a:pPr marL="0" marR="0" lvl="0" indent="0" algn="l" defTabSz="914400" rtl="0" eaLnBrk="1" fontAlgn="auto" latinLnBrk="0" hangingPunct="1">
+              <a:lnSpc>
+                <a:spcPct val="100000"/>
+              </a:lnSpc>
+              <a:spcBef>
+                <a:spcPts val="0"/>
+              </a:spcBef>
+              <a:spcAft>
+                <a:spcPts val="0"/>
+              </a:spcAft>
+              <a:buClrTx/>
+              <a:buSzTx/>
+              <a:buFontTx/>
+              <a:buNone/>
+              <a:tabLst/>
+              <a:defRPr/>
+            </a:pPr>
+            <a:r>
+              <a:rPr lang="en-US" dirty="0"/>
+              <a:t>Review if we can call any of  the google data from an API for the bonus criteria.</a:t>
+            </a:r>
+          </a:p>
+        </p:txBody>
+      </p:sp>
+      <p:sp>
+        <p:nvSpPr>
+          <p:cNvPr id="4" name="Slide Number Placeholder 3"/>
+          <p:cNvSpPr>
+            <a:spLocks noGrp="1"/>
+          </p:cNvSpPr>
+          <p:nvPr>
+            <p:ph type="sldNum" sz="quarter" idx="5"/>
+          </p:nvPr>
+        </p:nvSpPr>
+        <p:spPr/>
+        <p:txBody>
+          <a:bodyPr/>
+          <a:lstStyle/>
+          <a:p>
+            <a:fld id="{F1D59B1D-B0BC-4C10-A0E9-E068C37A006F}" type="slidenum">
+              <a:rPr lang="en-US" smtClean="0"/>
+              <a:t>8</a:t>
+            </a:fld>
+            <a:endParaRPr lang="en-US"/>
+          </a:p>
+        </p:txBody>
+      </p:sp>
+    </p:spTree>
+    <p:extLst>
+      <p:ext uri="{BB962C8B-B14F-4D97-AF65-F5344CB8AC3E}">
+        <p14:creationId xmlns:p14="http://schemas.microsoft.com/office/powerpoint/2010/main" val="3424234292"/>
       </p:ext>
     </p:extLst>
   </p:cSld>
@@ -4350,7 +4526,7 @@
 </p:sld>
 </file>
 
-<file path=ppt/slides/slide10.xml><?xml version="1.0" encoding="utf-8"?>
+<file path=ppt/slides/slide2.xml><?xml version="1.0" encoding="utf-8"?>
 <p:sld xmlns:a="http://schemas.openxmlformats.org/drawingml/2006/main" xmlns:r="http://schemas.openxmlformats.org/officeDocument/2006/relationships" xmlns:p="http://schemas.openxmlformats.org/presentationml/2006/main">
   <p:cSld>
     <p:spTree>
@@ -4369,6 +4545,669 @@
       </p:grpSpPr>
       <p:sp>
         <p:nvSpPr>
+          <p:cNvPr id="2" name="Title 1">
+            <a:extLst>
+              <a:ext uri="{FF2B5EF4-FFF2-40B4-BE49-F238E27FC236}">
+                <a16:creationId xmlns:a16="http://schemas.microsoft.com/office/drawing/2014/main" id="{203531D7-F961-0363-14A1-DC3CC04F8BEF}"/>
+              </a:ext>
+            </a:extLst>
+          </p:cNvPr>
+          <p:cNvSpPr>
+            <a:spLocks noGrp="1"/>
+          </p:cNvSpPr>
+          <p:nvPr>
+            <p:ph type="title"/>
+          </p:nvPr>
+        </p:nvSpPr>
+        <p:spPr/>
+        <p:txBody>
+          <a:bodyPr/>
+          <a:lstStyle/>
+          <a:p>
+            <a:pPr algn="ctr"/>
+            <a:r>
+              <a:rPr lang="en-US" dirty="0"/>
+              <a:t>Purpose and Scope</a:t>
+            </a:r>
+          </a:p>
+        </p:txBody>
+      </p:sp>
+      <p:sp>
+        <p:nvSpPr>
+          <p:cNvPr id="3" name="Content Placeholder 2">
+            <a:extLst>
+              <a:ext uri="{FF2B5EF4-FFF2-40B4-BE49-F238E27FC236}">
+                <a16:creationId xmlns:a16="http://schemas.microsoft.com/office/drawing/2014/main" id="{C2ECC505-913C-7EFF-4818-930E44C5DC49}"/>
+              </a:ext>
+            </a:extLst>
+          </p:cNvPr>
+          <p:cNvSpPr>
+            <a:spLocks noGrp="1"/>
+          </p:cNvSpPr>
+          <p:nvPr>
+            <p:ph sz="half" idx="1"/>
+          </p:nvPr>
+        </p:nvSpPr>
+        <p:spPr>
+          <a:ln>
+            <a:solidFill>
+              <a:schemeClr val="tx1"/>
+            </a:solidFill>
+          </a:ln>
+        </p:spPr>
+        <p:txBody>
+          <a:bodyPr>
+            <a:normAutofit fontScale="85000" lnSpcReduction="20000"/>
+          </a:bodyPr>
+          <a:lstStyle/>
+          <a:p>
+            <a:r>
+              <a:rPr lang="en-US" dirty="0"/>
+              <a:t>The kind of data you’d like to work with and the field you’re interested in (finance, healthcare surveys, etc.)</a:t>
+            </a:r>
+          </a:p>
+          <a:p>
+            <a:endParaRPr lang="en-US" dirty="0"/>
+          </a:p>
+          <a:p>
+            <a:r>
+              <a:rPr lang="en-US" dirty="0"/>
+              <a:t>The questions you’ll ask of the data</a:t>
+            </a:r>
+          </a:p>
+          <a:p>
+            <a:endParaRPr lang="en-US" dirty="0"/>
+          </a:p>
+          <a:p>
+            <a:endParaRPr lang="en-US" dirty="0"/>
+          </a:p>
+          <a:p>
+            <a:r>
+              <a:rPr lang="en-US" dirty="0"/>
+              <a:t>Possible source for the data</a:t>
+            </a:r>
+          </a:p>
+          <a:p>
+            <a:endParaRPr lang="en-US" dirty="0"/>
+          </a:p>
+          <a:p>
+            <a:endParaRPr lang="en-US" dirty="0"/>
+          </a:p>
+        </p:txBody>
+      </p:sp>
+      <p:sp>
+        <p:nvSpPr>
+          <p:cNvPr id="4" name="Content Placeholder 3">
+            <a:extLst>
+              <a:ext uri="{FF2B5EF4-FFF2-40B4-BE49-F238E27FC236}">
+                <a16:creationId xmlns:a16="http://schemas.microsoft.com/office/drawing/2014/main" id="{CA9972A8-3C16-4FAC-9278-D90F135356E0}"/>
+              </a:ext>
+            </a:extLst>
+          </p:cNvPr>
+          <p:cNvSpPr>
+            <a:spLocks noGrp="1"/>
+          </p:cNvSpPr>
+          <p:nvPr>
+            <p:ph sz="half" idx="2"/>
+          </p:nvPr>
+        </p:nvSpPr>
+        <p:spPr>
+          <a:ln>
+            <a:solidFill>
+              <a:schemeClr val="tx1"/>
+            </a:solidFill>
+          </a:ln>
+        </p:spPr>
+        <p:txBody>
+          <a:bodyPr>
+            <a:normAutofit fontScale="85000" lnSpcReduction="20000"/>
+          </a:bodyPr>
+          <a:lstStyle/>
+          <a:p>
+            <a:r>
+              <a:rPr lang="en-US" dirty="0"/>
+              <a:t>What this project is</a:t>
+            </a:r>
+          </a:p>
+          <a:p>
+            <a:pPr lvl="1">
+              <a:buClrTx/>
+              <a:buFont typeface="Wingdings" panose="05000000000000000000" pitchFamily="2" charset="2"/>
+              <a:buChar char="§"/>
+            </a:pPr>
+            <a:r>
+              <a:rPr lang="en-US" dirty="0"/>
+              <a:t>Timeframe: post March 11, 2021 – end of 2022</a:t>
+            </a:r>
+          </a:p>
+          <a:p>
+            <a:pPr lvl="1">
+              <a:buClrTx/>
+              <a:buFont typeface="Wingdings" panose="05000000000000000000" pitchFamily="2" charset="2"/>
+              <a:buChar char="§"/>
+            </a:pPr>
+            <a:r>
+              <a:rPr lang="en-US" dirty="0"/>
+              <a:t>All US states, narrow to top 3 and bottom 3 in analysis (can change)</a:t>
+            </a:r>
+          </a:p>
+          <a:p>
+            <a:pPr lvl="1">
+              <a:buClrTx/>
+              <a:buFont typeface="Wingdings" panose="05000000000000000000" pitchFamily="2" charset="2"/>
+              <a:buChar char="§"/>
+            </a:pPr>
+            <a:endParaRPr lang="en-US" dirty="0"/>
+          </a:p>
+          <a:p>
+            <a:pPr lvl="1">
+              <a:buClrTx/>
+              <a:buFont typeface="Wingdings" panose="05000000000000000000" pitchFamily="2" charset="2"/>
+              <a:buChar char="§"/>
+            </a:pPr>
+            <a:endParaRPr lang="en-US" dirty="0"/>
+          </a:p>
+          <a:p>
+            <a:endParaRPr lang="en-US" dirty="0"/>
+          </a:p>
+          <a:p>
+            <a:r>
+              <a:rPr lang="en-US" dirty="0"/>
+              <a:t>What this project is not</a:t>
+            </a:r>
+          </a:p>
+          <a:p>
+            <a:endParaRPr lang="en-US" dirty="0"/>
+          </a:p>
+          <a:p>
+            <a:endParaRPr lang="en-US" dirty="0"/>
+          </a:p>
+          <a:p>
+            <a:pPr marL="0" indent="0">
+              <a:buNone/>
+            </a:pPr>
+            <a:r>
+              <a:rPr lang="en-US" dirty="0"/>
+              <a:t>Data source constraints and assumptions</a:t>
+            </a:r>
+          </a:p>
+          <a:p>
+            <a:pPr>
+              <a:buFont typeface="Arial" panose="020B0604020202020204" pitchFamily="34" charset="0"/>
+              <a:buChar char="•"/>
+            </a:pPr>
+            <a:r>
+              <a:rPr lang="en-US" sz="1600" dirty="0"/>
+              <a:t>State size/population not taken into account</a:t>
+            </a:r>
+          </a:p>
+          <a:p>
+            <a:pPr>
+              <a:buFont typeface="Arial" panose="020B0604020202020204" pitchFamily="34" charset="0"/>
+              <a:buChar char="•"/>
+            </a:pPr>
+            <a:r>
+              <a:rPr lang="en-US" sz="1600" dirty="0"/>
+              <a:t>Different qualification criteria per state</a:t>
+            </a:r>
+          </a:p>
+          <a:p>
+            <a:pPr>
+              <a:buFont typeface="Arial" panose="020B0604020202020204" pitchFamily="34" charset="0"/>
+              <a:buChar char="•"/>
+            </a:pPr>
+            <a:endParaRPr lang="en-US" sz="1600" dirty="0"/>
+          </a:p>
+        </p:txBody>
+      </p:sp>
+    </p:spTree>
+    <p:extLst>
+      <p:ext uri="{BB962C8B-B14F-4D97-AF65-F5344CB8AC3E}">
+        <p14:creationId xmlns:p14="http://schemas.microsoft.com/office/powerpoint/2010/main" val="3699768426"/>
+      </p:ext>
+    </p:extLst>
+  </p:cSld>
+  <p:clrMapOvr>
+    <a:masterClrMapping/>
+  </p:clrMapOvr>
+</p:sld>
+</file>
+
+<file path=ppt/slides/slide3.xml><?xml version="1.0" encoding="utf-8"?>
+<p:sld xmlns:a="http://schemas.openxmlformats.org/drawingml/2006/main" xmlns:r="http://schemas.openxmlformats.org/officeDocument/2006/relationships" xmlns:p="http://schemas.openxmlformats.org/presentationml/2006/main">
+  <p:cSld>
+    <p:spTree>
+      <p:nvGrpSpPr>
+        <p:cNvPr id="1" name=""/>
+        <p:cNvGrpSpPr/>
+        <p:nvPr/>
+      </p:nvGrpSpPr>
+      <p:grpSpPr>
+        <a:xfrm>
+          <a:off x="0" y="0"/>
+          <a:ext cx="0" cy="0"/>
+          <a:chOff x="0" y="0"/>
+          <a:chExt cx="0" cy="0"/>
+        </a:xfrm>
+      </p:grpSpPr>
+      <p:sp>
+        <p:nvSpPr>
+          <p:cNvPr id="2" name="Title 1">
+            <a:extLst>
+              <a:ext uri="{FF2B5EF4-FFF2-40B4-BE49-F238E27FC236}">
+                <a16:creationId xmlns:a16="http://schemas.microsoft.com/office/drawing/2014/main" id="{ADDD956C-F39F-0B1F-680C-BCC4B1596D4C}"/>
+              </a:ext>
+            </a:extLst>
+          </p:cNvPr>
+          <p:cNvSpPr>
+            <a:spLocks noGrp="1"/>
+          </p:cNvSpPr>
+          <p:nvPr>
+            <p:ph type="title"/>
+          </p:nvPr>
+        </p:nvSpPr>
+        <p:spPr/>
+        <p:txBody>
+          <a:bodyPr/>
+          <a:lstStyle/>
+          <a:p>
+            <a:r>
+              <a:rPr lang="en-US" dirty="0"/>
+              <a:t>Data Source(s)</a:t>
+            </a:r>
+          </a:p>
+        </p:txBody>
+      </p:sp>
+      <p:sp>
+        <p:nvSpPr>
+          <p:cNvPr id="3" name="Content Placeholder 2">
+            <a:extLst>
+              <a:ext uri="{FF2B5EF4-FFF2-40B4-BE49-F238E27FC236}">
+                <a16:creationId xmlns:a16="http://schemas.microsoft.com/office/drawing/2014/main" id="{B21C263D-C578-C11E-2FD8-4C82039826FD}"/>
+              </a:ext>
+            </a:extLst>
+          </p:cNvPr>
+          <p:cNvSpPr>
+            <a:spLocks noGrp="1"/>
+          </p:cNvSpPr>
+          <p:nvPr>
+            <p:ph idx="1"/>
+          </p:nvPr>
+        </p:nvSpPr>
+        <p:spPr/>
+        <p:txBody>
+          <a:bodyPr>
+            <a:normAutofit/>
+          </a:bodyPr>
+          <a:lstStyle/>
+          <a:p>
+            <a:r>
+              <a:rPr lang="en-US" dirty="0"/>
+              <a:t>Describe the data source here. Include hyperlinks where relevant</a:t>
+            </a:r>
+          </a:p>
+          <a:p>
+            <a:endParaRPr lang="en-US" dirty="0"/>
+          </a:p>
+          <a:p>
+            <a:pPr marL="914400" lvl="1" indent="-457200">
+              <a:buFont typeface="+mj-lt"/>
+              <a:buAutoNum type="arabicPeriod"/>
+            </a:pPr>
+            <a:r>
+              <a:rPr lang="en-US" dirty="0"/>
+              <a:t>Check for copyright protections, and make sure that the way you plan to use this dataset is within the bounds of fair use.</a:t>
+            </a:r>
+          </a:p>
+          <a:p>
+            <a:pPr marL="914400" lvl="1" indent="-457200">
+              <a:buFont typeface="+mj-lt"/>
+              <a:buAutoNum type="arabicPeriod"/>
+            </a:pPr>
+            <a:endParaRPr lang="en-US" dirty="0"/>
+          </a:p>
+          <a:p>
+            <a:pPr marL="914400" lvl="1" indent="-457200">
+              <a:buFont typeface="+mj-lt"/>
+              <a:buAutoNum type="arabicPeriod"/>
+            </a:pPr>
+            <a:r>
+              <a:rPr lang="en-US" dirty="0"/>
+              <a:t>Document how you intend to use this dataset now and in the future. Find any licenses or terms of use associated with the dataset, and review them to confirm that your intended use is in compliance.</a:t>
+            </a:r>
+          </a:p>
+          <a:p>
+            <a:pPr marL="914400" lvl="1" indent="-457200">
+              <a:buFont typeface="+mj-lt"/>
+              <a:buAutoNum type="arabicPeriod"/>
+            </a:pPr>
+            <a:endParaRPr lang="en-US" dirty="0"/>
+          </a:p>
+          <a:p>
+            <a:pPr marL="914400" lvl="1" indent="-457200">
+              <a:buFont typeface="+mj-lt"/>
+              <a:buAutoNum type="arabicPeriod"/>
+            </a:pPr>
+            <a:r>
+              <a:rPr lang="en-US" dirty="0"/>
+              <a:t>Investigate how the dataset was collected. Identify any indicators that the data was obtained from a source that the compilers were not authorized to access.</a:t>
+            </a:r>
+          </a:p>
+        </p:txBody>
+      </p:sp>
+    </p:spTree>
+    <p:extLst>
+      <p:ext uri="{BB962C8B-B14F-4D97-AF65-F5344CB8AC3E}">
+        <p14:creationId xmlns:p14="http://schemas.microsoft.com/office/powerpoint/2010/main" val="808098577"/>
+      </p:ext>
+    </p:extLst>
+  </p:cSld>
+  <p:clrMapOvr>
+    <a:masterClrMapping/>
+  </p:clrMapOvr>
+</p:sld>
+</file>
+
+<file path=ppt/slides/slide4.xml><?xml version="1.0" encoding="utf-8"?>
+<p:sld xmlns:a="http://schemas.openxmlformats.org/drawingml/2006/main" xmlns:r="http://schemas.openxmlformats.org/officeDocument/2006/relationships" xmlns:p="http://schemas.openxmlformats.org/presentationml/2006/main">
+  <p:cSld>
+    <p:spTree>
+      <p:nvGrpSpPr>
+        <p:cNvPr id="1" name=""/>
+        <p:cNvGrpSpPr/>
+        <p:nvPr/>
+      </p:nvGrpSpPr>
+      <p:grpSpPr>
+        <a:xfrm>
+          <a:off x="0" y="0"/>
+          <a:ext cx="0" cy="0"/>
+          <a:chOff x="0" y="0"/>
+          <a:chExt cx="0" cy="0"/>
+        </a:xfrm>
+      </p:grpSpPr>
+      <p:sp>
+        <p:nvSpPr>
+          <p:cNvPr id="2" name="Title 1">
+            <a:extLst>
+              <a:ext uri="{FF2B5EF4-FFF2-40B4-BE49-F238E27FC236}">
+                <a16:creationId xmlns:a16="http://schemas.microsoft.com/office/drawing/2014/main" id="{B312BC9A-7B15-E9B0-96DF-05AA5E13C113}"/>
+              </a:ext>
+            </a:extLst>
+          </p:cNvPr>
+          <p:cNvSpPr>
+            <a:spLocks noGrp="1"/>
+          </p:cNvSpPr>
+          <p:nvPr>
+            <p:ph type="title"/>
+          </p:nvPr>
+        </p:nvSpPr>
+        <p:spPr/>
+        <p:txBody>
+          <a:bodyPr/>
+          <a:lstStyle/>
+          <a:p>
+            <a:r>
+              <a:rPr lang="en-US" dirty="0"/>
+              <a:t>Analysis Methods</a:t>
+            </a:r>
+          </a:p>
+        </p:txBody>
+      </p:sp>
+      <p:sp>
+        <p:nvSpPr>
+          <p:cNvPr id="3" name="Content Placeholder 2">
+            <a:extLst>
+              <a:ext uri="{FF2B5EF4-FFF2-40B4-BE49-F238E27FC236}">
+                <a16:creationId xmlns:a16="http://schemas.microsoft.com/office/drawing/2014/main" id="{8150B3B9-A2CD-564D-1DE3-F0A9722F9629}"/>
+              </a:ext>
+            </a:extLst>
+          </p:cNvPr>
+          <p:cNvSpPr>
+            <a:spLocks noGrp="1"/>
+          </p:cNvSpPr>
+          <p:nvPr>
+            <p:ph idx="1"/>
+          </p:nvPr>
+        </p:nvSpPr>
+        <p:spPr/>
+        <p:txBody>
+          <a:bodyPr/>
+          <a:lstStyle/>
+          <a:p>
+            <a:r>
+              <a:rPr lang="en-US" dirty="0"/>
+              <a:t>The analysis process can be broken into two broad phases: (1) exploration and cleanup, and (2) analysis.</a:t>
+            </a:r>
+          </a:p>
+          <a:p>
+            <a:endParaRPr lang="en-US" dirty="0"/>
+          </a:p>
+          <a:p>
+            <a:r>
+              <a:rPr lang="en-US" dirty="0"/>
+              <a:t>Describe here how we plan to answer the questions laid out in our Purpose section.</a:t>
+            </a:r>
+          </a:p>
+          <a:p>
+            <a:pPr lvl="1"/>
+            <a:r>
+              <a:rPr lang="en-US" dirty="0"/>
+              <a:t>Ex) Summarize first, then narrow scope. </a:t>
+            </a:r>
+          </a:p>
+          <a:p>
+            <a:pPr lvl="1"/>
+            <a:r>
+              <a:rPr lang="en-US" dirty="0"/>
+              <a:t>“We recommend focusing your analysis on multiple techniques, such as aggregation, correlation, comparison, summary statistics, sentiment analysis, and time-series analysis.”</a:t>
+            </a:r>
+          </a:p>
+        </p:txBody>
+      </p:sp>
+    </p:spTree>
+    <p:extLst>
+      <p:ext uri="{BB962C8B-B14F-4D97-AF65-F5344CB8AC3E}">
+        <p14:creationId xmlns:p14="http://schemas.microsoft.com/office/powerpoint/2010/main" val="3055247817"/>
+      </p:ext>
+    </p:extLst>
+  </p:cSld>
+  <p:clrMapOvr>
+    <a:masterClrMapping/>
+  </p:clrMapOvr>
+</p:sld>
+</file>
+
+<file path=ppt/slides/slide5.xml><?xml version="1.0" encoding="utf-8"?>
+<p:sld xmlns:a="http://schemas.openxmlformats.org/drawingml/2006/main" xmlns:r="http://schemas.openxmlformats.org/officeDocument/2006/relationships" xmlns:p="http://schemas.openxmlformats.org/presentationml/2006/main">
+  <p:cSld>
+    <p:spTree>
+      <p:nvGrpSpPr>
+        <p:cNvPr id="1" name=""/>
+        <p:cNvGrpSpPr/>
+        <p:nvPr/>
+      </p:nvGrpSpPr>
+      <p:grpSpPr>
+        <a:xfrm>
+          <a:off x="0" y="0"/>
+          <a:ext cx="0" cy="0"/>
+          <a:chOff x="0" y="0"/>
+          <a:chExt cx="0" cy="0"/>
+        </a:xfrm>
+      </p:grpSpPr>
+      <p:sp>
+        <p:nvSpPr>
+          <p:cNvPr id="2" name="Title 1">
+            <a:extLst>
+              <a:ext uri="{FF2B5EF4-FFF2-40B4-BE49-F238E27FC236}">
+                <a16:creationId xmlns:a16="http://schemas.microsoft.com/office/drawing/2014/main" id="{6A03C364-BD8D-E30B-C37E-136CB4BDCA73}"/>
+              </a:ext>
+            </a:extLst>
+          </p:cNvPr>
+          <p:cNvSpPr>
+            <a:spLocks noGrp="1"/>
+          </p:cNvSpPr>
+          <p:nvPr>
+            <p:ph type="title"/>
+          </p:nvPr>
+        </p:nvSpPr>
+        <p:spPr/>
+        <p:txBody>
+          <a:bodyPr/>
+          <a:lstStyle/>
+          <a:p>
+            <a:r>
+              <a:rPr lang="en-US" dirty="0" err="1"/>
+              <a:t>Github</a:t>
+            </a:r>
+            <a:r>
+              <a:rPr lang="en-US" dirty="0"/>
+              <a:t> Repo</a:t>
+            </a:r>
+          </a:p>
+        </p:txBody>
+      </p:sp>
+      <p:sp>
+        <p:nvSpPr>
+          <p:cNvPr id="3" name="Content Placeholder 2">
+            <a:extLst>
+              <a:ext uri="{FF2B5EF4-FFF2-40B4-BE49-F238E27FC236}">
+                <a16:creationId xmlns:a16="http://schemas.microsoft.com/office/drawing/2014/main" id="{47B18CE2-894E-BAE1-C77A-13E6D8B29A21}"/>
+              </a:ext>
+            </a:extLst>
+          </p:cNvPr>
+          <p:cNvSpPr>
+            <a:spLocks noGrp="1"/>
+          </p:cNvSpPr>
+          <p:nvPr>
+            <p:ph idx="1"/>
+          </p:nvPr>
+        </p:nvSpPr>
+        <p:spPr/>
+        <p:txBody>
+          <a:bodyPr/>
+          <a:lstStyle/>
+          <a:p>
+            <a:r>
+              <a:rPr lang="en-US" dirty="0"/>
+              <a:t>One person to own the repo (Evan volunteers)</a:t>
+            </a:r>
+          </a:p>
+          <a:p>
+            <a:r>
+              <a:rPr lang="en-US" dirty="0"/>
+              <a:t>Make sure local repos are always up-to-date with the github.com repo</a:t>
+            </a:r>
+          </a:p>
+          <a:p>
+            <a:pPr lvl="1"/>
+            <a:r>
+              <a:rPr lang="en-US" dirty="0"/>
+              <a:t>Pull each time you work on your portion</a:t>
+            </a:r>
+          </a:p>
+          <a:p>
+            <a:pPr lvl="1"/>
+            <a:r>
+              <a:rPr lang="en-US" dirty="0"/>
+              <a:t>Commit all local changes and push to </a:t>
+            </a:r>
+            <a:r>
+              <a:rPr lang="en-US" dirty="0" err="1"/>
+              <a:t>github</a:t>
+            </a:r>
+            <a:r>
+              <a:rPr lang="en-US" dirty="0"/>
+              <a:t> repo when done working</a:t>
+            </a:r>
+          </a:p>
+          <a:p>
+            <a:pPr lvl="1"/>
+            <a:r>
+              <a:rPr lang="en-US" dirty="0"/>
+              <a:t>Tip from William: Use a single .</a:t>
+            </a:r>
+            <a:r>
+              <a:rPr lang="en-US" dirty="0" err="1"/>
+              <a:t>ipynb</a:t>
+            </a:r>
+            <a:r>
+              <a:rPr lang="en-US" dirty="0"/>
+              <a:t> file for the project. Each person will pull that into their local repo.</a:t>
+            </a:r>
+          </a:p>
+          <a:p>
+            <a:pPr lvl="2"/>
+            <a:r>
+              <a:rPr lang="en-US" dirty="0"/>
+              <a:t>Section off your code section with blocks #--------------------------- so that you have clear areas of work to prevent merge issues per line.</a:t>
+            </a:r>
+          </a:p>
+          <a:p>
+            <a:pPr lvl="1"/>
+            <a:endParaRPr lang="en-US" dirty="0"/>
+          </a:p>
+          <a:p>
+            <a:pPr marL="201168" lvl="1" indent="0">
+              <a:buNone/>
+            </a:pPr>
+            <a:r>
+              <a:rPr lang="en-US" dirty="0"/>
+              <a:t>See </a:t>
+            </a:r>
+            <a:r>
+              <a:rPr lang="en-US" dirty="0">
+                <a:hlinkClick r:id="rId2"/>
+              </a:rPr>
+              <a:t>https://docs.github.com/en/issues/organizing-your-work-with-project-boards/managing-project-boards</a:t>
+            </a:r>
+            <a:endParaRPr lang="en-US" dirty="0"/>
+          </a:p>
+          <a:p>
+            <a:pPr marL="201168" lvl="1" indent="0">
+              <a:buNone/>
+            </a:pPr>
+            <a:endParaRPr lang="en-US" dirty="0"/>
+          </a:p>
+          <a:p>
+            <a:pPr marL="201168" lvl="1" indent="0">
+              <a:buNone/>
+            </a:pPr>
+            <a:endParaRPr lang="en-US" dirty="0"/>
+          </a:p>
+        </p:txBody>
+      </p:sp>
+    </p:spTree>
+    <p:extLst>
+      <p:ext uri="{BB962C8B-B14F-4D97-AF65-F5344CB8AC3E}">
+        <p14:creationId xmlns:p14="http://schemas.microsoft.com/office/powerpoint/2010/main" val="1873696182"/>
+      </p:ext>
+    </p:extLst>
+  </p:cSld>
+  <p:clrMapOvr>
+    <a:masterClrMapping/>
+  </p:clrMapOvr>
+</p:sld>
+</file>
+
+<file path=ppt/slides/slide6.xml><?xml version="1.0" encoding="utf-8"?>
+<p:sld xmlns:a="http://schemas.openxmlformats.org/drawingml/2006/main" xmlns:r="http://schemas.openxmlformats.org/officeDocument/2006/relationships" xmlns:p="http://schemas.openxmlformats.org/presentationml/2006/main">
+  <p:cSld>
+    <p:spTree>
+      <p:nvGrpSpPr>
+        <p:cNvPr id="1" name=""/>
+        <p:cNvGrpSpPr/>
+        <p:nvPr/>
+      </p:nvGrpSpPr>
+      <p:grpSpPr>
+        <a:xfrm>
+          <a:off x="0" y="0"/>
+          <a:ext cx="0" cy="0"/>
+          <a:chOff x="0" y="0"/>
+          <a:chExt cx="0" cy="0"/>
+        </a:xfrm>
+      </p:grpSpPr>
+      <p:sp>
+        <p:nvSpPr>
           <p:cNvPr id="2" name="Content Placeholder 2">
             <a:extLst>
               <a:ext uri="{FF2B5EF4-FFF2-40B4-BE49-F238E27FC236}">
@@ -4384,7 +5223,7 @@
         <p:spPr>
           <a:xfrm>
             <a:off x="101600" y="815976"/>
-            <a:ext cx="12090400" cy="6042024"/>
+            <a:ext cx="12090400" cy="5746749"/>
           </a:xfrm>
           <a:prstGeom prst="rect">
             <a:avLst/>
@@ -4646,124 +5485,7 @@
             </a:pPr>
             <a:r>
               <a:rPr lang="en-US" dirty="0"/>
-              <a:t>Project Title</a:t>
-            </a:r>
-          </a:p>
-          <a:p>
-            <a:pPr marL="201168" lvl="1" indent="0">
-              <a:buClrTx/>
-              <a:buNone/>
-            </a:pPr>
-            <a:r>
-              <a:rPr lang="en-US" dirty="0"/>
-              <a:t>Covid-19 Vaccination Rates by State Federal Funds Usage</a:t>
-            </a:r>
-          </a:p>
-          <a:p>
-            <a:pPr>
-              <a:buClrTx/>
-              <a:buFont typeface="Arial" panose="020B0604020202020204" pitchFamily="34" charset="0"/>
-              <a:buChar char="•"/>
-            </a:pPr>
-            <a:r>
-              <a:rPr lang="en-US" dirty="0"/>
-              <a:t>Team Members (see slack channel)</a:t>
-            </a:r>
-          </a:p>
-          <a:p>
-            <a:pPr>
-              <a:buClrTx/>
-              <a:buFont typeface="Arial" panose="020B0604020202020204" pitchFamily="34" charset="0"/>
-              <a:buChar char="•"/>
-            </a:pPr>
-            <a:r>
-              <a:rPr lang="en-US" dirty="0"/>
-              <a:t>Project Description/Outline</a:t>
-            </a:r>
-          </a:p>
-          <a:p>
-            <a:pPr lvl="1">
-              <a:buClrTx/>
-              <a:buFont typeface="Wingdings" panose="05000000000000000000" pitchFamily="2" charset="2"/>
-              <a:buChar char="§"/>
-            </a:pPr>
-            <a:r>
-              <a:rPr lang="en-US" dirty="0"/>
-              <a:t>Analyze state by state federal funding usage for Covid-19 and compare to vaccination rates per state.</a:t>
-            </a:r>
-          </a:p>
-          <a:p>
-            <a:pPr>
-              <a:buClrTx/>
-              <a:buFont typeface="Arial" panose="020B0604020202020204" pitchFamily="34" charset="0"/>
-              <a:buChar char="•"/>
-            </a:pPr>
-            <a:r>
-              <a:rPr lang="en-US" dirty="0"/>
-              <a:t>Research Questions to Answer</a:t>
-            </a:r>
-          </a:p>
-          <a:p>
-            <a:pPr marL="544068" lvl="1" indent="-342900">
-              <a:buClrTx/>
-              <a:buFont typeface="+mj-lt"/>
-              <a:buAutoNum type="arabicPeriod"/>
-            </a:pPr>
-            <a:r>
-              <a:rPr lang="en-US" dirty="0"/>
-              <a:t>Which states spent ARPA money on vaccination programs, and how much/how many programs?</a:t>
-            </a:r>
-          </a:p>
-          <a:p>
-            <a:pPr lvl="2">
-              <a:buClrTx/>
-              <a:buFont typeface="Wingdings" panose="05000000000000000000" pitchFamily="2" charset="2"/>
-              <a:buChar char="§"/>
-            </a:pPr>
-            <a:r>
-              <a:rPr lang="en-US" dirty="0"/>
-              <a:t>The summary will show us top 2, bottom 2 for federal grant spending per state. Drill down in following questions:</a:t>
-            </a:r>
-          </a:p>
-          <a:p>
-            <a:pPr marL="544068" lvl="1" indent="-342900">
-              <a:buClrTx/>
-              <a:buFont typeface="+mj-lt"/>
-              <a:buAutoNum type="arabicPeriod"/>
-            </a:pPr>
-            <a:r>
-              <a:rPr lang="en-US" dirty="0"/>
-              <a:t>Compare pt 1 vaccination grant spending to vaccination rates in each state.</a:t>
-            </a:r>
-          </a:p>
-          <a:p>
-            <a:pPr lvl="2">
-              <a:buClrTx/>
-              <a:buFont typeface="Wingdings" panose="05000000000000000000" pitchFamily="2" charset="2"/>
-              <a:buChar char="§"/>
-            </a:pPr>
-            <a:r>
-              <a:rPr lang="en-US" dirty="0"/>
-              <a:t>Correlate in scatter if able.</a:t>
-            </a:r>
-          </a:p>
-          <a:p>
-            <a:pPr lvl="2">
-              <a:buClrTx/>
-              <a:buFont typeface="Wingdings" panose="05000000000000000000" pitchFamily="2" charset="2"/>
-              <a:buChar char="§"/>
-            </a:pPr>
-            <a:r>
-              <a:rPr lang="en-US" dirty="0"/>
-              <a:t>Map rates by states with </a:t>
-            </a:r>
-            <a:r>
-              <a:rPr lang="en-US" dirty="0" err="1"/>
-              <a:t>geoViews</a:t>
-            </a:r>
-            <a:r>
-              <a:rPr lang="en-US" dirty="0"/>
-              <a:t> library</a:t>
+              <a:t> Questions that you found interesting and what motivated you to answer them</a:t>
             </a:r>
           </a:p>
           <a:p>
@@ -4782,7 +5504,7 @@
             </a:pPr>
             <a:r>
               <a:rPr lang="en-US" dirty="0"/>
-              <a:t>Datasets to Be Used</a:t>
+              <a:t> Where and how you found the data you used to answer these questions</a:t>
             </a:r>
           </a:p>
           <a:p>
@@ -4791,9 +5513,17 @@
               <a:buFont typeface="+mj-lt"/>
               <a:buAutoNum type="arabicPeriod"/>
             </a:pPr>
+            <a:endParaRPr lang="en-US" dirty="0"/>
+          </a:p>
+          <a:p>
+            <a:pPr>
+              <a:buClrTx/>
+              <a:buFont typeface="Arial" panose="020B0604020202020204" pitchFamily="34" charset="0"/>
+              <a:buChar char="•"/>
+            </a:pPr>
             <a:r>
               <a:rPr lang="en-US" dirty="0"/>
-              <a:t>EARN SLFRF Workbook, Q4 2022</a:t>
+              <a:t> The data exploration and cleanup process (accompanied by your Jupyter notebook)</a:t>
             </a:r>
           </a:p>
           <a:p>
@@ -4802,40 +5532,62 @@
               <a:buFont typeface="+mj-lt"/>
               <a:buAutoNum type="arabicPeriod"/>
             </a:pPr>
-            <a:r>
-              <a:rPr lang="en-US" dirty="0">
-                <a:hlinkClick r:id="rId2"/>
-              </a:rPr>
-              <a:t>https://health.google.com/covid-19/open-data/</a:t>
-            </a:r>
             <a:endParaRPr lang="en-US" dirty="0"/>
           </a:p>
           <a:p>
-            <a:pPr marL="726948" lvl="2" indent="-342900">
+            <a:pPr>
+              <a:buClrTx/>
+              <a:buFont typeface="Arial" panose="020B0604020202020204" pitchFamily="34" charset="0"/>
+              <a:buChar char="•"/>
+            </a:pPr>
+            <a:r>
+              <a:rPr lang="en-US" dirty="0"/>
+              <a:t> The analysis process (accompanied by your Jupyter notebook)</a:t>
+            </a:r>
+          </a:p>
+          <a:p>
+            <a:pPr marL="544068" lvl="1" indent="-342900">
               <a:buClrTx/>
               <a:buFont typeface="+mj-lt"/>
               <a:buAutoNum type="arabicPeriod"/>
             </a:pPr>
+            <a:endParaRPr lang="en-US" dirty="0"/>
+          </a:p>
+          <a:p>
+            <a:pPr>
+              <a:buClrTx/>
+              <a:buFont typeface="Arial" panose="020B0604020202020204" pitchFamily="34" charset="0"/>
+              <a:buChar char="•"/>
+            </a:pPr>
             <a:r>
               <a:rPr lang="en-US" dirty="0"/>
-              <a:t>Review if we can call any of this from an API for the bonus</a:t>
-            </a:r>
-          </a:p>
-          <a:p>
-            <a:pPr marL="726948" lvl="2" indent="-342900">
+              <a:t> Your conclusions, including a numerical summary and visualizations of the summary</a:t>
+            </a:r>
+          </a:p>
+          <a:p>
+            <a:pPr marL="544068" lvl="1" indent="-342900">
               <a:buClrTx/>
               <a:buFont typeface="+mj-lt"/>
               <a:buAutoNum type="arabicPeriod"/>
             </a:pPr>
+            <a:endParaRPr lang="en-US" dirty="0"/>
+          </a:p>
+          <a:p>
+            <a:pPr>
+              <a:buClrTx/>
+              <a:buFont typeface="Arial" panose="020B0604020202020204" pitchFamily="34" charset="0"/>
+              <a:buChar char="•"/>
+            </a:pPr>
             <a:r>
               <a:rPr lang="en-US" dirty="0"/>
-              <a:t>This dataset is aggregated from the CDC</a:t>
-            </a:r>
-          </a:p>
-          <a:p>
-            <a:pPr marL="201168" lvl="1" indent="0">
+              <a:t> The implications of your findings: what do your findings mean?</a:t>
+            </a:r>
+          </a:p>
+          <a:p>
+            <a:pPr marL="544068" lvl="1" indent="-342900">
               <a:buClrTx/>
-              <a:buNone/>
+              <a:buFont typeface="+mj-lt"/>
+              <a:buAutoNum type="arabicPeriod"/>
             </a:pPr>
             <a:endParaRPr lang="en-US" dirty="0"/>
           </a:p>
@@ -4893,7 +5645,7 @@
           <a:p>
             <a:r>
               <a:rPr lang="en-US" dirty="0"/>
-              <a:t>Project Proposal</a:t>
+              <a:t>Presentation Requirements</a:t>
             </a:r>
           </a:p>
         </p:txBody>
@@ -4901,1016 +5653,7 @@
     </p:spTree>
     <p:extLst>
       <p:ext uri="{BB962C8B-B14F-4D97-AF65-F5344CB8AC3E}">
-        <p14:creationId xmlns:p14="http://schemas.microsoft.com/office/powerpoint/2010/main" val="3724797497"/>
-      </p:ext>
-    </p:extLst>
-  </p:cSld>
-  <p:clrMapOvr>
-    <a:masterClrMapping/>
-  </p:clrMapOvr>
-</p:sld>
-</file>
-
-<file path=ppt/slides/slide11.xml><?xml version="1.0" encoding="utf-8"?>
-<p:sld xmlns:a="http://schemas.openxmlformats.org/drawingml/2006/main" xmlns:r="http://schemas.openxmlformats.org/officeDocument/2006/relationships" xmlns:p="http://schemas.openxmlformats.org/presentationml/2006/main">
-  <p:cSld>
-    <p:spTree>
-      <p:nvGrpSpPr>
-        <p:cNvPr id="1" name=""/>
-        <p:cNvGrpSpPr/>
-        <p:nvPr/>
-      </p:nvGrpSpPr>
-      <p:grpSpPr>
-        <a:xfrm>
-          <a:off x="0" y="0"/>
-          <a:ext cx="0" cy="0"/>
-          <a:chOff x="0" y="0"/>
-          <a:chExt cx="0" cy="0"/>
-        </a:xfrm>
-      </p:grpSpPr>
-      <p:sp>
-        <p:nvSpPr>
-          <p:cNvPr id="2" name="Title 1">
-            <a:extLst>
-              <a:ext uri="{FF2B5EF4-FFF2-40B4-BE49-F238E27FC236}">
-                <a16:creationId xmlns:a16="http://schemas.microsoft.com/office/drawing/2014/main" id="{94456D86-A2FB-D487-C5E7-F7D55A1C70AA}"/>
-              </a:ext>
-            </a:extLst>
-          </p:cNvPr>
-          <p:cNvSpPr>
-            <a:spLocks noGrp="1"/>
-          </p:cNvSpPr>
-          <p:nvPr>
-            <p:ph type="title"/>
-          </p:nvPr>
-        </p:nvSpPr>
-        <p:spPr>
-          <a:xfrm>
-            <a:off x="1097280" y="286603"/>
-            <a:ext cx="10058400" cy="1002447"/>
-          </a:xfrm>
-        </p:spPr>
-        <p:txBody>
-          <a:bodyPr/>
-          <a:lstStyle/>
-          <a:p>
-            <a:r>
-              <a:rPr lang="en-US" dirty="0"/>
-              <a:t>Breakdown of Tasks</a:t>
-            </a:r>
-          </a:p>
-        </p:txBody>
-      </p:sp>
-      <p:sp>
-        <p:nvSpPr>
-          <p:cNvPr id="3" name="Content Placeholder 2">
-            <a:extLst>
-              <a:ext uri="{FF2B5EF4-FFF2-40B4-BE49-F238E27FC236}">
-                <a16:creationId xmlns:a16="http://schemas.microsoft.com/office/drawing/2014/main" id="{5E3E40F8-E566-7F42-1FBB-745782052EF2}"/>
-              </a:ext>
-            </a:extLst>
-          </p:cNvPr>
-          <p:cNvSpPr>
-            <a:spLocks noGrp="1"/>
-          </p:cNvSpPr>
-          <p:nvPr>
-            <p:ph idx="1"/>
-          </p:nvPr>
-        </p:nvSpPr>
-        <p:spPr>
-          <a:xfrm>
-            <a:off x="1097280" y="1845734"/>
-            <a:ext cx="10058400" cy="4256616"/>
-          </a:xfrm>
-        </p:spPr>
-        <p:txBody>
-          <a:bodyPr/>
-          <a:lstStyle/>
-          <a:p>
-            <a:r>
-              <a:rPr lang="en-US" dirty="0"/>
-              <a:t>Split presentation deck into 6 parts: each group member to speak during presentation</a:t>
-            </a:r>
-          </a:p>
-          <a:p>
-            <a:pPr lvl="1"/>
-            <a:r>
-              <a:rPr lang="en-US" dirty="0"/>
-              <a:t>Sarah: Data clean (data </a:t>
-            </a:r>
-            <a:r>
-              <a:rPr lang="en-US" dirty="0" err="1"/>
-              <a:t>engr</a:t>
-            </a:r>
-            <a:r>
-              <a:rPr lang="en-US" dirty="0"/>
-              <a:t>)</a:t>
-            </a:r>
-          </a:p>
-          <a:p>
-            <a:pPr lvl="1"/>
-            <a:r>
-              <a:rPr lang="en-US" dirty="0"/>
-              <a:t>Kendal: Visuals planning and execution</a:t>
-            </a:r>
-          </a:p>
-          <a:p>
-            <a:pPr lvl="1"/>
-            <a:r>
-              <a:rPr lang="en-US" dirty="0"/>
-              <a:t>Greg: Debug, technical issues, overall support, CDC API (based off questions to be answered)</a:t>
-            </a:r>
-          </a:p>
-          <a:p>
-            <a:pPr lvl="1"/>
-            <a:r>
-              <a:rPr lang="en-US" dirty="0"/>
-              <a:t>Aaliyah: overall support</a:t>
-            </a:r>
-          </a:p>
-          <a:p>
-            <a:pPr lvl="1"/>
-            <a:r>
-              <a:rPr lang="en-US" dirty="0"/>
-              <a:t>Evan: Data collection (CDC API bonus support), write pseudo-code</a:t>
-            </a:r>
-          </a:p>
-          <a:p>
-            <a:pPr lvl="1"/>
-            <a:r>
-              <a:rPr lang="en-US" dirty="0"/>
-              <a:t>Joanna: Visuals planning and execution</a:t>
-            </a:r>
-          </a:p>
-          <a:p>
-            <a:pPr lvl="1"/>
-            <a:endParaRPr lang="en-US" dirty="0"/>
-          </a:p>
-          <a:p>
-            <a:pPr lvl="1"/>
-            <a:endParaRPr lang="en-US" dirty="0"/>
-          </a:p>
-          <a:p>
-            <a:r>
-              <a:rPr lang="en-US" dirty="0"/>
-              <a:t>Keep slide deck clear and concise. Further detail is captured in the Analysis Readme.</a:t>
-            </a:r>
-          </a:p>
-          <a:p>
-            <a:pPr lvl="1"/>
-            <a:r>
-              <a:rPr lang="en-US" dirty="0"/>
-              <a:t>More visuals than bullet points</a:t>
-            </a:r>
-          </a:p>
-          <a:p>
-            <a:pPr lvl="1"/>
-            <a:endParaRPr lang="en-US" dirty="0"/>
-          </a:p>
-          <a:p>
-            <a:pPr lvl="1"/>
-            <a:endParaRPr lang="en-US" dirty="0"/>
-          </a:p>
-          <a:p>
-            <a:endParaRPr lang="en-US" dirty="0"/>
-          </a:p>
-        </p:txBody>
-      </p:sp>
-    </p:spTree>
-    <p:extLst>
-      <p:ext uri="{BB962C8B-B14F-4D97-AF65-F5344CB8AC3E}">
-        <p14:creationId xmlns:p14="http://schemas.microsoft.com/office/powerpoint/2010/main" val="63745696"/>
-      </p:ext>
-    </p:extLst>
-  </p:cSld>
-  <p:clrMapOvr>
-    <a:masterClrMapping/>
-  </p:clrMapOvr>
-</p:sld>
-</file>
-
-<file path=ppt/slides/slide2.xml><?xml version="1.0" encoding="utf-8"?>
-<p:sld xmlns:a="http://schemas.openxmlformats.org/drawingml/2006/main" xmlns:r="http://schemas.openxmlformats.org/officeDocument/2006/relationships" xmlns:p="http://schemas.openxmlformats.org/presentationml/2006/main">
-  <p:cSld>
-    <p:spTree>
-      <p:nvGrpSpPr>
-        <p:cNvPr id="1" name=""/>
-        <p:cNvGrpSpPr/>
-        <p:nvPr/>
-      </p:nvGrpSpPr>
-      <p:grpSpPr>
-        <a:xfrm>
-          <a:off x="0" y="0"/>
-          <a:ext cx="0" cy="0"/>
-          <a:chOff x="0" y="0"/>
-          <a:chExt cx="0" cy="0"/>
-        </a:xfrm>
-      </p:grpSpPr>
-      <p:sp>
-        <p:nvSpPr>
-          <p:cNvPr id="2" name="Title 1">
-            <a:extLst>
-              <a:ext uri="{FF2B5EF4-FFF2-40B4-BE49-F238E27FC236}">
-                <a16:creationId xmlns:a16="http://schemas.microsoft.com/office/drawing/2014/main" id="{203531D7-F961-0363-14A1-DC3CC04F8BEF}"/>
-              </a:ext>
-            </a:extLst>
-          </p:cNvPr>
-          <p:cNvSpPr>
-            <a:spLocks noGrp="1"/>
-          </p:cNvSpPr>
-          <p:nvPr>
-            <p:ph type="title"/>
-          </p:nvPr>
-        </p:nvSpPr>
-        <p:spPr/>
-        <p:txBody>
-          <a:bodyPr/>
-          <a:lstStyle/>
-          <a:p>
-            <a:pPr algn="ctr"/>
-            <a:r>
-              <a:rPr lang="en-US" dirty="0"/>
-              <a:t>Purpose and Scope</a:t>
-            </a:r>
-          </a:p>
-        </p:txBody>
-      </p:sp>
-      <p:sp>
-        <p:nvSpPr>
-          <p:cNvPr id="3" name="Content Placeholder 2">
-            <a:extLst>
-              <a:ext uri="{FF2B5EF4-FFF2-40B4-BE49-F238E27FC236}">
-                <a16:creationId xmlns:a16="http://schemas.microsoft.com/office/drawing/2014/main" id="{C2ECC505-913C-7EFF-4818-930E44C5DC49}"/>
-              </a:ext>
-            </a:extLst>
-          </p:cNvPr>
-          <p:cNvSpPr>
-            <a:spLocks noGrp="1"/>
-          </p:cNvSpPr>
-          <p:nvPr>
-            <p:ph sz="half" idx="1"/>
-          </p:nvPr>
-        </p:nvSpPr>
-        <p:spPr>
-          <a:ln>
-            <a:solidFill>
-              <a:schemeClr val="tx1"/>
-            </a:solidFill>
-          </a:ln>
-        </p:spPr>
-        <p:txBody>
-          <a:bodyPr>
-            <a:normAutofit fontScale="85000" lnSpcReduction="20000"/>
-          </a:bodyPr>
-          <a:lstStyle/>
-          <a:p>
-            <a:r>
-              <a:rPr lang="en-US" dirty="0"/>
-              <a:t>The kind of data you’d like to work with and the field you’re interested in (finance, healthcare surveys, etc.)</a:t>
-            </a:r>
-          </a:p>
-          <a:p>
-            <a:endParaRPr lang="en-US" dirty="0"/>
-          </a:p>
-          <a:p>
-            <a:r>
-              <a:rPr lang="en-US" dirty="0"/>
-              <a:t>The questions you’ll ask of the data</a:t>
-            </a:r>
-          </a:p>
-          <a:p>
-            <a:endParaRPr lang="en-US" dirty="0"/>
-          </a:p>
-          <a:p>
-            <a:endParaRPr lang="en-US" dirty="0"/>
-          </a:p>
-          <a:p>
-            <a:r>
-              <a:rPr lang="en-US" dirty="0"/>
-              <a:t>Possible source for the data</a:t>
-            </a:r>
-          </a:p>
-          <a:p>
-            <a:endParaRPr lang="en-US" dirty="0"/>
-          </a:p>
-          <a:p>
-            <a:endParaRPr lang="en-US" dirty="0"/>
-          </a:p>
-        </p:txBody>
-      </p:sp>
-      <p:sp>
-        <p:nvSpPr>
-          <p:cNvPr id="4" name="Content Placeholder 3">
-            <a:extLst>
-              <a:ext uri="{FF2B5EF4-FFF2-40B4-BE49-F238E27FC236}">
-                <a16:creationId xmlns:a16="http://schemas.microsoft.com/office/drawing/2014/main" id="{CA9972A8-3C16-4FAC-9278-D90F135356E0}"/>
-              </a:ext>
-            </a:extLst>
-          </p:cNvPr>
-          <p:cNvSpPr>
-            <a:spLocks noGrp="1"/>
-          </p:cNvSpPr>
-          <p:nvPr>
-            <p:ph sz="half" idx="2"/>
-          </p:nvPr>
-        </p:nvSpPr>
-        <p:spPr>
-          <a:ln>
-            <a:solidFill>
-              <a:schemeClr val="tx1"/>
-            </a:solidFill>
-          </a:ln>
-        </p:spPr>
-        <p:txBody>
-          <a:bodyPr>
-            <a:normAutofit fontScale="85000" lnSpcReduction="20000"/>
-          </a:bodyPr>
-          <a:lstStyle/>
-          <a:p>
-            <a:r>
-              <a:rPr lang="en-US" dirty="0"/>
-              <a:t>What this project is</a:t>
-            </a:r>
-          </a:p>
-          <a:p>
-            <a:pPr lvl="1">
-              <a:buClrTx/>
-              <a:buFont typeface="Wingdings" panose="05000000000000000000" pitchFamily="2" charset="2"/>
-              <a:buChar char="§"/>
-            </a:pPr>
-            <a:r>
-              <a:rPr lang="en-US" dirty="0"/>
-              <a:t>Timeframe: post March 11, 2021 – end of 2022</a:t>
-            </a:r>
-          </a:p>
-          <a:p>
-            <a:pPr lvl="1">
-              <a:buClrTx/>
-              <a:buFont typeface="Wingdings" panose="05000000000000000000" pitchFamily="2" charset="2"/>
-              <a:buChar char="§"/>
-            </a:pPr>
-            <a:r>
-              <a:rPr lang="en-US" dirty="0"/>
-              <a:t>All US states, narrow to top 3 and bottom 3 in analysis (can change)</a:t>
-            </a:r>
-          </a:p>
-          <a:p>
-            <a:pPr lvl="1">
-              <a:buClrTx/>
-              <a:buFont typeface="Wingdings" panose="05000000000000000000" pitchFamily="2" charset="2"/>
-              <a:buChar char="§"/>
-            </a:pPr>
-            <a:endParaRPr lang="en-US" dirty="0"/>
-          </a:p>
-          <a:p>
-            <a:pPr lvl="1">
-              <a:buClrTx/>
-              <a:buFont typeface="Wingdings" panose="05000000000000000000" pitchFamily="2" charset="2"/>
-              <a:buChar char="§"/>
-            </a:pPr>
-            <a:endParaRPr lang="en-US" dirty="0"/>
-          </a:p>
-          <a:p>
-            <a:endParaRPr lang="en-US" dirty="0"/>
-          </a:p>
-          <a:p>
-            <a:r>
-              <a:rPr lang="en-US" dirty="0"/>
-              <a:t>What this project is not</a:t>
-            </a:r>
-          </a:p>
-          <a:p>
-            <a:endParaRPr lang="en-US" dirty="0"/>
-          </a:p>
-          <a:p>
-            <a:endParaRPr lang="en-US" dirty="0"/>
-          </a:p>
-          <a:p>
-            <a:pPr marL="0" indent="0">
-              <a:buNone/>
-            </a:pPr>
-            <a:r>
-              <a:rPr lang="en-US" dirty="0"/>
-              <a:t>Data source constraints and assumptions</a:t>
-            </a:r>
-          </a:p>
-          <a:p>
-            <a:pPr>
-              <a:buFont typeface="Arial" panose="020B0604020202020204" pitchFamily="34" charset="0"/>
-              <a:buChar char="•"/>
-            </a:pPr>
-            <a:r>
-              <a:rPr lang="en-US" sz="1600" dirty="0"/>
-              <a:t>State size/population not taken into account</a:t>
-            </a:r>
-          </a:p>
-          <a:p>
-            <a:pPr>
-              <a:buFont typeface="Arial" panose="020B0604020202020204" pitchFamily="34" charset="0"/>
-              <a:buChar char="•"/>
-            </a:pPr>
-            <a:r>
-              <a:rPr lang="en-US" sz="1600" dirty="0"/>
-              <a:t>Different qualification criteria per state</a:t>
-            </a:r>
-          </a:p>
-          <a:p>
-            <a:pPr>
-              <a:buFont typeface="Arial" panose="020B0604020202020204" pitchFamily="34" charset="0"/>
-              <a:buChar char="•"/>
-            </a:pPr>
-            <a:endParaRPr lang="en-US" sz="1600" dirty="0"/>
-          </a:p>
-        </p:txBody>
-      </p:sp>
-    </p:spTree>
-    <p:extLst>
-      <p:ext uri="{BB962C8B-B14F-4D97-AF65-F5344CB8AC3E}">
-        <p14:creationId xmlns:p14="http://schemas.microsoft.com/office/powerpoint/2010/main" val="3699768426"/>
-      </p:ext>
-    </p:extLst>
-  </p:cSld>
-  <p:clrMapOvr>
-    <a:masterClrMapping/>
-  </p:clrMapOvr>
-</p:sld>
-</file>
-
-<file path=ppt/slides/slide3.xml><?xml version="1.0" encoding="utf-8"?>
-<p:sld xmlns:a="http://schemas.openxmlformats.org/drawingml/2006/main" xmlns:r="http://schemas.openxmlformats.org/officeDocument/2006/relationships" xmlns:p="http://schemas.openxmlformats.org/presentationml/2006/main">
-  <p:cSld>
-    <p:spTree>
-      <p:nvGrpSpPr>
-        <p:cNvPr id="1" name=""/>
-        <p:cNvGrpSpPr/>
-        <p:nvPr/>
-      </p:nvGrpSpPr>
-      <p:grpSpPr>
-        <a:xfrm>
-          <a:off x="0" y="0"/>
-          <a:ext cx="0" cy="0"/>
-          <a:chOff x="0" y="0"/>
-          <a:chExt cx="0" cy="0"/>
-        </a:xfrm>
-      </p:grpSpPr>
-      <p:sp>
-        <p:nvSpPr>
-          <p:cNvPr id="2" name="Title 1">
-            <a:extLst>
-              <a:ext uri="{FF2B5EF4-FFF2-40B4-BE49-F238E27FC236}">
-                <a16:creationId xmlns:a16="http://schemas.microsoft.com/office/drawing/2014/main" id="{ADDD956C-F39F-0B1F-680C-BCC4B1596D4C}"/>
-              </a:ext>
-            </a:extLst>
-          </p:cNvPr>
-          <p:cNvSpPr>
-            <a:spLocks noGrp="1"/>
-          </p:cNvSpPr>
-          <p:nvPr>
-            <p:ph type="title"/>
-          </p:nvPr>
-        </p:nvSpPr>
-        <p:spPr/>
-        <p:txBody>
-          <a:bodyPr/>
-          <a:lstStyle/>
-          <a:p>
-            <a:r>
-              <a:rPr lang="en-US" dirty="0"/>
-              <a:t>Data Source(s)</a:t>
-            </a:r>
-          </a:p>
-        </p:txBody>
-      </p:sp>
-      <p:sp>
-        <p:nvSpPr>
-          <p:cNvPr id="3" name="Content Placeholder 2">
-            <a:extLst>
-              <a:ext uri="{FF2B5EF4-FFF2-40B4-BE49-F238E27FC236}">
-                <a16:creationId xmlns:a16="http://schemas.microsoft.com/office/drawing/2014/main" id="{B21C263D-C578-C11E-2FD8-4C82039826FD}"/>
-              </a:ext>
-            </a:extLst>
-          </p:cNvPr>
-          <p:cNvSpPr>
-            <a:spLocks noGrp="1"/>
-          </p:cNvSpPr>
-          <p:nvPr>
-            <p:ph idx="1"/>
-          </p:nvPr>
-        </p:nvSpPr>
-        <p:spPr/>
-        <p:txBody>
-          <a:bodyPr>
-            <a:normAutofit/>
-          </a:bodyPr>
-          <a:lstStyle/>
-          <a:p>
-            <a:r>
-              <a:rPr lang="en-US" dirty="0"/>
-              <a:t>Describe the data source here. Include hyperlinks where relevant</a:t>
-            </a:r>
-          </a:p>
-          <a:p>
-            <a:endParaRPr lang="en-US" dirty="0"/>
-          </a:p>
-          <a:p>
-            <a:pPr marL="914400" lvl="1" indent="-457200">
-              <a:buFont typeface="+mj-lt"/>
-              <a:buAutoNum type="arabicPeriod"/>
-            </a:pPr>
-            <a:r>
-              <a:rPr lang="en-US" dirty="0"/>
-              <a:t>Check for copyright protections, and make sure that the way you plan to use this dataset is within the bounds of fair use.</a:t>
-            </a:r>
-          </a:p>
-          <a:p>
-            <a:pPr marL="914400" lvl="1" indent="-457200">
-              <a:buFont typeface="+mj-lt"/>
-              <a:buAutoNum type="arabicPeriod"/>
-            </a:pPr>
-            <a:endParaRPr lang="en-US" dirty="0"/>
-          </a:p>
-          <a:p>
-            <a:pPr marL="914400" lvl="1" indent="-457200">
-              <a:buFont typeface="+mj-lt"/>
-              <a:buAutoNum type="arabicPeriod"/>
-            </a:pPr>
-            <a:r>
-              <a:rPr lang="en-US" dirty="0"/>
-              <a:t>Document how you intend to use this dataset now and in the future. Find any licenses or terms of use associated with the dataset, and review them to confirm that your intended use is in compliance.</a:t>
-            </a:r>
-          </a:p>
-          <a:p>
-            <a:pPr marL="914400" lvl="1" indent="-457200">
-              <a:buFont typeface="+mj-lt"/>
-              <a:buAutoNum type="arabicPeriod"/>
-            </a:pPr>
-            <a:endParaRPr lang="en-US" dirty="0"/>
-          </a:p>
-          <a:p>
-            <a:pPr marL="914400" lvl="1" indent="-457200">
-              <a:buFont typeface="+mj-lt"/>
-              <a:buAutoNum type="arabicPeriod"/>
-            </a:pPr>
-            <a:r>
-              <a:rPr lang="en-US" dirty="0"/>
-              <a:t>Investigate how the dataset was collected. Identify any indicators that the data was obtained from a source that the compilers were not authorized to access.</a:t>
-            </a:r>
-          </a:p>
-        </p:txBody>
-      </p:sp>
-    </p:spTree>
-    <p:extLst>
-      <p:ext uri="{BB962C8B-B14F-4D97-AF65-F5344CB8AC3E}">
-        <p14:creationId xmlns:p14="http://schemas.microsoft.com/office/powerpoint/2010/main" val="808098577"/>
-      </p:ext>
-    </p:extLst>
-  </p:cSld>
-  <p:clrMapOvr>
-    <a:masterClrMapping/>
-  </p:clrMapOvr>
-</p:sld>
-</file>
-
-<file path=ppt/slides/slide4.xml><?xml version="1.0" encoding="utf-8"?>
-<p:sld xmlns:a="http://schemas.openxmlformats.org/drawingml/2006/main" xmlns:r="http://schemas.openxmlformats.org/officeDocument/2006/relationships" xmlns:p="http://schemas.openxmlformats.org/presentationml/2006/main">
-  <p:cSld>
-    <p:spTree>
-      <p:nvGrpSpPr>
-        <p:cNvPr id="1" name=""/>
-        <p:cNvGrpSpPr/>
-        <p:nvPr/>
-      </p:nvGrpSpPr>
-      <p:grpSpPr>
-        <a:xfrm>
-          <a:off x="0" y="0"/>
-          <a:ext cx="0" cy="0"/>
-          <a:chOff x="0" y="0"/>
-          <a:chExt cx="0" cy="0"/>
-        </a:xfrm>
-      </p:grpSpPr>
-      <p:sp>
-        <p:nvSpPr>
-          <p:cNvPr id="2" name="Title 1">
-            <a:extLst>
-              <a:ext uri="{FF2B5EF4-FFF2-40B4-BE49-F238E27FC236}">
-                <a16:creationId xmlns:a16="http://schemas.microsoft.com/office/drawing/2014/main" id="{B312BC9A-7B15-E9B0-96DF-05AA5E13C113}"/>
-              </a:ext>
-            </a:extLst>
-          </p:cNvPr>
-          <p:cNvSpPr>
-            <a:spLocks noGrp="1"/>
-          </p:cNvSpPr>
-          <p:nvPr>
-            <p:ph type="title"/>
-          </p:nvPr>
-        </p:nvSpPr>
-        <p:spPr/>
-        <p:txBody>
-          <a:bodyPr/>
-          <a:lstStyle/>
-          <a:p>
-            <a:r>
-              <a:rPr lang="en-US" dirty="0"/>
-              <a:t>Analysis Methods</a:t>
-            </a:r>
-          </a:p>
-        </p:txBody>
-      </p:sp>
-      <p:sp>
-        <p:nvSpPr>
-          <p:cNvPr id="3" name="Content Placeholder 2">
-            <a:extLst>
-              <a:ext uri="{FF2B5EF4-FFF2-40B4-BE49-F238E27FC236}">
-                <a16:creationId xmlns:a16="http://schemas.microsoft.com/office/drawing/2014/main" id="{8150B3B9-A2CD-564D-1DE3-F0A9722F9629}"/>
-              </a:ext>
-            </a:extLst>
-          </p:cNvPr>
-          <p:cNvSpPr>
-            <a:spLocks noGrp="1"/>
-          </p:cNvSpPr>
-          <p:nvPr>
-            <p:ph idx="1"/>
-          </p:nvPr>
-        </p:nvSpPr>
-        <p:spPr/>
-        <p:txBody>
-          <a:bodyPr/>
-          <a:lstStyle/>
-          <a:p>
-            <a:r>
-              <a:rPr lang="en-US" dirty="0"/>
-              <a:t>The analysis process can be broken into two broad phases: (1) exploration and cleanup, and (2) analysis.</a:t>
-            </a:r>
-          </a:p>
-          <a:p>
-            <a:endParaRPr lang="en-US" dirty="0"/>
-          </a:p>
-          <a:p>
-            <a:r>
-              <a:rPr lang="en-US" dirty="0"/>
-              <a:t>Describe here how we plan to answer the questions laid out in our Purpose section.</a:t>
-            </a:r>
-          </a:p>
-          <a:p>
-            <a:pPr lvl="1"/>
-            <a:r>
-              <a:rPr lang="en-US" dirty="0"/>
-              <a:t>Ex) Summarize first, then narrow scope. </a:t>
-            </a:r>
-          </a:p>
-          <a:p>
-            <a:pPr lvl="1"/>
-            <a:r>
-              <a:rPr lang="en-US" dirty="0"/>
-              <a:t>“We recommend focusing your analysis on multiple techniques, such as aggregation, correlation, comparison, summary statistics, sentiment analysis, and time-series analysis.”</a:t>
-            </a:r>
-          </a:p>
-        </p:txBody>
-      </p:sp>
-    </p:spTree>
-    <p:extLst>
-      <p:ext uri="{BB962C8B-B14F-4D97-AF65-F5344CB8AC3E}">
-        <p14:creationId xmlns:p14="http://schemas.microsoft.com/office/powerpoint/2010/main" val="3055247817"/>
-      </p:ext>
-    </p:extLst>
-  </p:cSld>
-  <p:clrMapOvr>
-    <a:masterClrMapping/>
-  </p:clrMapOvr>
-</p:sld>
-</file>
-
-<file path=ppt/slides/slide5.xml><?xml version="1.0" encoding="utf-8"?>
-<p:sld xmlns:a="http://schemas.openxmlformats.org/drawingml/2006/main" xmlns:r="http://schemas.openxmlformats.org/officeDocument/2006/relationships" xmlns:p="http://schemas.openxmlformats.org/presentationml/2006/main">
-  <p:cSld>
-    <p:spTree>
-      <p:nvGrpSpPr>
-        <p:cNvPr id="1" name=""/>
-        <p:cNvGrpSpPr/>
-        <p:nvPr/>
-      </p:nvGrpSpPr>
-      <p:grpSpPr>
-        <a:xfrm>
-          <a:off x="0" y="0"/>
-          <a:ext cx="0" cy="0"/>
-          <a:chOff x="0" y="0"/>
-          <a:chExt cx="0" cy="0"/>
-        </a:xfrm>
-      </p:grpSpPr>
-      <p:sp>
-        <p:nvSpPr>
-          <p:cNvPr id="2" name="Title 1">
-            <a:extLst>
-              <a:ext uri="{FF2B5EF4-FFF2-40B4-BE49-F238E27FC236}">
-                <a16:creationId xmlns:a16="http://schemas.microsoft.com/office/drawing/2014/main" id="{94456D86-A2FB-D487-C5E7-F7D55A1C70AA}"/>
-              </a:ext>
-            </a:extLst>
-          </p:cNvPr>
-          <p:cNvSpPr>
-            <a:spLocks noGrp="1"/>
-          </p:cNvSpPr>
-          <p:nvPr>
-            <p:ph type="title"/>
-          </p:nvPr>
-        </p:nvSpPr>
-        <p:spPr/>
-        <p:txBody>
-          <a:bodyPr/>
-          <a:lstStyle/>
-          <a:p>
-            <a:r>
-              <a:rPr lang="en-US" dirty="0"/>
-              <a:t>Presentation</a:t>
-            </a:r>
-          </a:p>
-        </p:txBody>
-      </p:sp>
-      <p:sp>
-        <p:nvSpPr>
-          <p:cNvPr id="3" name="Content Placeholder 2">
-            <a:extLst>
-              <a:ext uri="{FF2B5EF4-FFF2-40B4-BE49-F238E27FC236}">
-                <a16:creationId xmlns:a16="http://schemas.microsoft.com/office/drawing/2014/main" id="{5E3E40F8-E566-7F42-1FBB-745782052EF2}"/>
-              </a:ext>
-            </a:extLst>
-          </p:cNvPr>
-          <p:cNvSpPr>
-            <a:spLocks noGrp="1"/>
-          </p:cNvSpPr>
-          <p:nvPr>
-            <p:ph idx="1"/>
-          </p:nvPr>
-        </p:nvSpPr>
-        <p:spPr/>
-        <p:txBody>
-          <a:bodyPr/>
-          <a:lstStyle/>
-          <a:p>
-            <a:r>
-              <a:rPr lang="en-US" dirty="0"/>
-              <a:t>Split presentation deck into 6 parts: each group member to speak during presentation</a:t>
-            </a:r>
-          </a:p>
-          <a:p>
-            <a:pPr lvl="1"/>
-            <a:r>
-              <a:rPr lang="en-US" dirty="0"/>
-              <a:t>Sarah: Data clean (data </a:t>
-            </a:r>
-            <a:r>
-              <a:rPr lang="en-US" dirty="0" err="1"/>
-              <a:t>engr</a:t>
-            </a:r>
-            <a:r>
-              <a:rPr lang="en-US" dirty="0"/>
-              <a:t>)</a:t>
-            </a:r>
-          </a:p>
-          <a:p>
-            <a:pPr lvl="1"/>
-            <a:r>
-              <a:rPr lang="en-US" dirty="0"/>
-              <a:t>Kendal: Visuals planning and execution</a:t>
-            </a:r>
-          </a:p>
-          <a:p>
-            <a:pPr lvl="1"/>
-            <a:r>
-              <a:rPr lang="en-US" dirty="0"/>
-              <a:t>Greg: Debug, technical issues, overall support, CDC API (based off questions to be answered)</a:t>
-            </a:r>
-          </a:p>
-          <a:p>
-            <a:pPr lvl="1"/>
-            <a:r>
-              <a:rPr lang="en-US" dirty="0"/>
-              <a:t>Aaliyah: overall support</a:t>
-            </a:r>
-          </a:p>
-          <a:p>
-            <a:pPr lvl="1"/>
-            <a:r>
-              <a:rPr lang="en-US" dirty="0"/>
-              <a:t>Evan: Data collection (CDC API bonus support), write pseudo-code</a:t>
-            </a:r>
-          </a:p>
-          <a:p>
-            <a:pPr lvl="1"/>
-            <a:r>
-              <a:rPr lang="en-US" dirty="0"/>
-              <a:t>Joanna: Visuals planning and execution</a:t>
-            </a:r>
-          </a:p>
-          <a:p>
-            <a:pPr lvl="1"/>
-            <a:endParaRPr lang="en-US" dirty="0"/>
-          </a:p>
-          <a:p>
-            <a:pPr lvl="1"/>
-            <a:endParaRPr lang="en-US" dirty="0"/>
-          </a:p>
-          <a:p>
-            <a:r>
-              <a:rPr lang="en-US" dirty="0"/>
-              <a:t>Keep slide deck clear and concise. Further detail is captured in the Analysis Readme.</a:t>
-            </a:r>
-          </a:p>
-          <a:p>
-            <a:pPr lvl="1"/>
-            <a:r>
-              <a:rPr lang="en-US" dirty="0"/>
-              <a:t>More visuals than bullet points</a:t>
-            </a:r>
-          </a:p>
-          <a:p>
-            <a:pPr lvl="1"/>
-            <a:endParaRPr lang="en-US" dirty="0"/>
-          </a:p>
-          <a:p>
-            <a:pPr lvl="1"/>
-            <a:endParaRPr lang="en-US" dirty="0"/>
-          </a:p>
-          <a:p>
-            <a:endParaRPr lang="en-US" dirty="0"/>
-          </a:p>
-        </p:txBody>
-      </p:sp>
-    </p:spTree>
-    <p:extLst>
-      <p:ext uri="{BB962C8B-B14F-4D97-AF65-F5344CB8AC3E}">
-        <p14:creationId xmlns:p14="http://schemas.microsoft.com/office/powerpoint/2010/main" val="3017000915"/>
-      </p:ext>
-    </p:extLst>
-  </p:cSld>
-  <p:clrMapOvr>
-    <a:masterClrMapping/>
-  </p:clrMapOvr>
-</p:sld>
-</file>
-
-<file path=ppt/slides/slide6.xml><?xml version="1.0" encoding="utf-8"?>
-<p:sld xmlns:a="http://schemas.openxmlformats.org/drawingml/2006/main" xmlns:r="http://schemas.openxmlformats.org/officeDocument/2006/relationships" xmlns:p="http://schemas.openxmlformats.org/presentationml/2006/main">
-  <p:cSld>
-    <p:spTree>
-      <p:nvGrpSpPr>
-        <p:cNvPr id="1" name=""/>
-        <p:cNvGrpSpPr/>
-        <p:nvPr/>
-      </p:nvGrpSpPr>
-      <p:grpSpPr>
-        <a:xfrm>
-          <a:off x="0" y="0"/>
-          <a:ext cx="0" cy="0"/>
-          <a:chOff x="0" y="0"/>
-          <a:chExt cx="0" cy="0"/>
-        </a:xfrm>
-      </p:grpSpPr>
-      <p:sp>
-        <p:nvSpPr>
-          <p:cNvPr id="2" name="Title 1">
-            <a:extLst>
-              <a:ext uri="{FF2B5EF4-FFF2-40B4-BE49-F238E27FC236}">
-                <a16:creationId xmlns:a16="http://schemas.microsoft.com/office/drawing/2014/main" id="{6A03C364-BD8D-E30B-C37E-136CB4BDCA73}"/>
-              </a:ext>
-            </a:extLst>
-          </p:cNvPr>
-          <p:cNvSpPr>
-            <a:spLocks noGrp="1"/>
-          </p:cNvSpPr>
-          <p:nvPr>
-            <p:ph type="title"/>
-          </p:nvPr>
-        </p:nvSpPr>
-        <p:spPr/>
-        <p:txBody>
-          <a:bodyPr/>
-          <a:lstStyle/>
-          <a:p>
-            <a:r>
-              <a:rPr lang="en-US" dirty="0" err="1"/>
-              <a:t>Github</a:t>
-            </a:r>
-            <a:r>
-              <a:rPr lang="en-US" dirty="0"/>
-              <a:t> Repo</a:t>
-            </a:r>
-          </a:p>
-        </p:txBody>
-      </p:sp>
-      <p:sp>
-        <p:nvSpPr>
-          <p:cNvPr id="3" name="Content Placeholder 2">
-            <a:extLst>
-              <a:ext uri="{FF2B5EF4-FFF2-40B4-BE49-F238E27FC236}">
-                <a16:creationId xmlns:a16="http://schemas.microsoft.com/office/drawing/2014/main" id="{47B18CE2-894E-BAE1-C77A-13E6D8B29A21}"/>
-              </a:ext>
-            </a:extLst>
-          </p:cNvPr>
-          <p:cNvSpPr>
-            <a:spLocks noGrp="1"/>
-          </p:cNvSpPr>
-          <p:nvPr>
-            <p:ph idx="1"/>
-          </p:nvPr>
-        </p:nvSpPr>
-        <p:spPr/>
-        <p:txBody>
-          <a:bodyPr/>
-          <a:lstStyle/>
-          <a:p>
-            <a:r>
-              <a:rPr lang="en-US" dirty="0"/>
-              <a:t>One person to own the repo (Evan volunteers)</a:t>
-            </a:r>
-          </a:p>
-          <a:p>
-            <a:r>
-              <a:rPr lang="en-US" dirty="0"/>
-              <a:t>Make sure local repos are always up-to-date with the github.com repo</a:t>
-            </a:r>
-          </a:p>
-          <a:p>
-            <a:pPr lvl="1"/>
-            <a:r>
-              <a:rPr lang="en-US" dirty="0"/>
-              <a:t>Pull each time you work on your portion</a:t>
-            </a:r>
-          </a:p>
-          <a:p>
-            <a:pPr lvl="1"/>
-            <a:r>
-              <a:rPr lang="en-US" dirty="0"/>
-              <a:t>Commit all local changes and push to </a:t>
-            </a:r>
-            <a:r>
-              <a:rPr lang="en-US" dirty="0" err="1"/>
-              <a:t>github</a:t>
-            </a:r>
-            <a:r>
-              <a:rPr lang="en-US" dirty="0"/>
-              <a:t> repo when done working</a:t>
-            </a:r>
-          </a:p>
-          <a:p>
-            <a:pPr lvl="1"/>
-            <a:r>
-              <a:rPr lang="en-US" dirty="0"/>
-              <a:t>Tip from William: Use a single .</a:t>
-            </a:r>
-            <a:r>
-              <a:rPr lang="en-US" dirty="0" err="1"/>
-              <a:t>ipynb</a:t>
-            </a:r>
-            <a:r>
-              <a:rPr lang="en-US" dirty="0"/>
-              <a:t> file for the project. Each person will pull that into their local repo.</a:t>
-            </a:r>
-          </a:p>
-          <a:p>
-            <a:pPr lvl="2"/>
-            <a:r>
-              <a:rPr lang="en-US" dirty="0"/>
-              <a:t>Section off your code section with blocks #--------------------------- so that you have clear areas of work to prevent merge issues per line.</a:t>
-            </a:r>
-          </a:p>
-          <a:p>
-            <a:pPr lvl="1"/>
-            <a:endParaRPr lang="en-US" dirty="0"/>
-          </a:p>
-          <a:p>
-            <a:pPr marL="201168" lvl="1" indent="0">
-              <a:buNone/>
-            </a:pPr>
-            <a:r>
-              <a:rPr lang="en-US" dirty="0"/>
-              <a:t>See </a:t>
-            </a:r>
-            <a:r>
-              <a:rPr lang="en-US" dirty="0">
-                <a:hlinkClick r:id="rId2"/>
-              </a:rPr>
-              <a:t>https://docs.github.com/en/issues/organizing-your-work-with-project-boards/managing-project-boards</a:t>
-            </a:r>
-            <a:endParaRPr lang="en-US" dirty="0"/>
-          </a:p>
-          <a:p>
-            <a:pPr marL="201168" lvl="1" indent="0">
-              <a:buNone/>
-            </a:pPr>
-            <a:endParaRPr lang="en-US" dirty="0"/>
-          </a:p>
-          <a:p>
-            <a:pPr marL="201168" lvl="1" indent="0">
-              <a:buNone/>
-            </a:pPr>
-            <a:endParaRPr lang="en-US" dirty="0"/>
-          </a:p>
-        </p:txBody>
-      </p:sp>
-    </p:spTree>
-    <p:extLst>
-      <p:ext uri="{BB962C8B-B14F-4D97-AF65-F5344CB8AC3E}">
-        <p14:creationId xmlns:p14="http://schemas.microsoft.com/office/powerpoint/2010/main" val="1873696182"/>
+        <p14:creationId xmlns:p14="http://schemas.microsoft.com/office/powerpoint/2010/main" val="2614040401"/>
       </p:ext>
     </p:extLst>
   </p:cSld>
@@ -6216,16 +5959,8 @@
             </a:pPr>
             <a:r>
               <a:rPr lang="en-US" dirty="0"/>
-              <a:t> Questions that you found interesting and what motivated you to answer them</a:t>
-            </a:r>
-          </a:p>
-          <a:p>
-            <a:pPr marL="544068" lvl="1" indent="-342900">
-              <a:buClrTx/>
-              <a:buFont typeface="+mj-lt"/>
-              <a:buAutoNum type="arabicPeriod"/>
-            </a:pPr>
-            <a:endParaRPr lang="en-US" dirty="0"/>
+              <a:t>Use Pandas to clean and format your dataset or datasets.</a:t>
+            </a:r>
           </a:p>
           <a:p>
             <a:pPr>
@@ -6235,16 +5970,8 @@
             </a:pPr>
             <a:r>
               <a:rPr lang="en-US" dirty="0"/>
-              <a:t> Where and how you found the data you used to answer these questions</a:t>
-            </a:r>
-          </a:p>
-          <a:p>
-            <a:pPr marL="544068" lvl="1" indent="-342900">
-              <a:buClrTx/>
-              <a:buFont typeface="+mj-lt"/>
-              <a:buAutoNum type="arabicPeriod"/>
-            </a:pPr>
-            <a:endParaRPr lang="en-US" dirty="0"/>
+              <a:t>Create a Jupyter notebook describing the data exploration and cleanup process.</a:t>
+            </a:r>
           </a:p>
           <a:p>
             <a:pPr>
@@ -6254,24 +5981,8 @@
             </a:pPr>
             <a:r>
               <a:rPr lang="en-US" dirty="0"/>
-              <a:t> The data exploration and cleanup process (accompanied by your </a:t>
-            </a:r>
-            <a:r>
-              <a:rPr lang="en-US" dirty="0" err="1"/>
-              <a:t>Jupyter</a:t>
-            </a:r>
-            <a:r>
-              <a:rPr lang="en-US" dirty="0"/>
-              <a:t> notebook)</a:t>
-            </a:r>
-          </a:p>
-          <a:p>
-            <a:pPr marL="544068" lvl="1" indent="-342900">
-              <a:buClrTx/>
-              <a:buFont typeface="+mj-lt"/>
-              <a:buAutoNum type="arabicPeriod"/>
-            </a:pPr>
-            <a:endParaRPr lang="en-US" dirty="0"/>
+              <a:t>Create a Jupyter notebook illustrating the final data analysis.</a:t>
+            </a:r>
           </a:p>
           <a:p>
             <a:pPr>
@@ -6281,24 +5992,8 @@
             </a:pPr>
             <a:r>
               <a:rPr lang="en-US" dirty="0"/>
-              <a:t> The analysis process (accompanied by your </a:t>
-            </a:r>
-            <a:r>
-              <a:rPr lang="en-US" dirty="0" err="1"/>
-              <a:t>Jupyter</a:t>
-            </a:r>
-            <a:r>
-              <a:rPr lang="en-US" dirty="0"/>
-              <a:t> notebook)</a:t>
-            </a:r>
-          </a:p>
-          <a:p>
-            <a:pPr marL="544068" lvl="1" indent="-342900">
-              <a:buClrTx/>
-              <a:buFont typeface="+mj-lt"/>
-              <a:buAutoNum type="arabicPeriod"/>
-            </a:pPr>
-            <a:endParaRPr lang="en-US" dirty="0"/>
+              <a:t>Use Matplotlib to create 6 to 8 visualizations of your data</a:t>
+            </a:r>
           </a:p>
           <a:p>
             <a:pPr>
@@ -6308,16 +6003,8 @@
             </a:pPr>
             <a:r>
               <a:rPr lang="en-US" dirty="0"/>
-              <a:t> Your conclusions, including a numerical summary and visualizations of the summary</a:t>
-            </a:r>
-          </a:p>
-          <a:p>
-            <a:pPr marL="544068" lvl="1" indent="-342900">
-              <a:buClrTx/>
-              <a:buFont typeface="+mj-lt"/>
-              <a:buAutoNum type="arabicPeriod"/>
-            </a:pPr>
-            <a:endParaRPr lang="en-US" dirty="0"/>
+              <a:t>(ideally, at least 2 visualizations per “question” that you ask your data).</a:t>
+            </a:r>
           </a:p>
           <a:p>
             <a:pPr>
@@ -6327,16 +6014,52 @@
             </a:pPr>
             <a:r>
               <a:rPr lang="en-US" dirty="0"/>
-              <a:t> The implications of your findings: what do your findings mean?</a:t>
-            </a:r>
-          </a:p>
-          <a:p>
-            <a:pPr marL="544068" lvl="1" indent="-342900">
+              <a:t>Save PNG images of your visualizations to distribute to the class and instructional team—and for</a:t>
+            </a:r>
+          </a:p>
+          <a:p>
+            <a:pPr>
               <a:buClrTx/>
-              <a:buFont typeface="+mj-lt"/>
-              <a:buAutoNum type="arabicPeriod"/>
+              <a:buFont typeface="Arial" panose="020B0604020202020204" pitchFamily="34" charset="0"/>
+              <a:buChar char="•"/>
             </a:pPr>
-            <a:endParaRPr lang="en-US" dirty="0"/>
+            <a:r>
+              <a:rPr lang="en-US" dirty="0"/>
+              <a:t>inclusion in your presentation.</a:t>
+            </a:r>
+          </a:p>
+          <a:p>
+            <a:pPr>
+              <a:buClrTx/>
+              <a:buFont typeface="Arial" panose="020B0604020202020204" pitchFamily="34" charset="0"/>
+              <a:buChar char="•"/>
+            </a:pPr>
+            <a:r>
+              <a:rPr lang="en-US" dirty="0"/>
+              <a:t>Create a write-up summarizing your major findings. This should include a heading for each “question”</a:t>
+            </a:r>
+          </a:p>
+          <a:p>
+            <a:pPr>
+              <a:buClrTx/>
+              <a:buFont typeface="Arial" panose="020B0604020202020204" pitchFamily="34" charset="0"/>
+              <a:buChar char="•"/>
+            </a:pPr>
+            <a:r>
+              <a:rPr lang="en-US" dirty="0"/>
+              <a:t>that you asked your data as well as a short description of your findings and any relevant plots.</a:t>
+            </a:r>
+          </a:p>
+          <a:p>
+            <a:pPr>
+              <a:buClrTx/>
+              <a:buFont typeface="Arial" panose="020B0604020202020204" pitchFamily="34" charset="0"/>
+              <a:buChar char="•"/>
+            </a:pPr>
+            <a:r>
+              <a:rPr lang="en-US" dirty="0"/>
+              <a:t>Bonus Use at least one API—if you can find one with data pertinent to your primary research questions.</a:t>
+            </a:r>
           </a:p>
         </p:txBody>
       </p:sp>
@@ -6392,7 +6115,7 @@
           <a:p>
             <a:r>
               <a:rPr lang="en-US" dirty="0"/>
-              <a:t>Presentation Requirements</a:t>
+              <a:t>Development Requirements</a:t>
             </a:r>
           </a:p>
         </p:txBody>
@@ -6400,7 +6123,7 @@
     </p:spTree>
     <p:extLst>
       <p:ext uri="{BB962C8B-B14F-4D97-AF65-F5344CB8AC3E}">
-        <p14:creationId xmlns:p14="http://schemas.microsoft.com/office/powerpoint/2010/main" val="2614040401"/>
+        <p14:creationId xmlns:p14="http://schemas.microsoft.com/office/powerpoint/2010/main" val="908844552"/>
       </p:ext>
     </p:extLst>
   </p:cSld>
@@ -6443,8 +6166,8 @@
         </p:nvSpPr>
         <p:spPr>
           <a:xfrm>
-            <a:off x="101600" y="815976"/>
-            <a:ext cx="12090400" cy="5746749"/>
+            <a:off x="101600" y="641350"/>
+            <a:ext cx="12090400" cy="6216650"/>
           </a:xfrm>
           <a:prstGeom prst="rect">
             <a:avLst/>
@@ -6705,8 +6428,22 @@
               <a:buChar char="•"/>
             </a:pPr>
             <a:r>
-              <a:rPr lang="en-US" dirty="0"/>
-              <a:t>Use Pandas to clean and format your dataset or datasets.</a:t>
+              <a:rPr lang="en-US" sz="1800" dirty="0"/>
+              <a:t> </a:t>
+            </a:r>
+            <a:r>
+              <a:rPr lang="en-US" sz="1600" dirty="0"/>
+              <a:t>Project Title</a:t>
+            </a:r>
+          </a:p>
+          <a:p>
+            <a:pPr marL="201168" lvl="1" indent="0">
+              <a:buClrTx/>
+              <a:buNone/>
+            </a:pPr>
+            <a:r>
+              <a:rPr lang="en-US" sz="1600" dirty="0"/>
+              <a:t>Covid-19 Vaccination Rates by State Federal Funds Usage</a:t>
             </a:r>
           </a:p>
           <a:p>
@@ -6716,16 +6453,18 @@
               <a:buChar char="•"/>
             </a:pPr>
             <a:r>
-              <a:rPr lang="en-US" dirty="0"/>
-              <a:t>Create a </a:t>
-            </a:r>
-            <a:r>
-              <a:rPr lang="en-US" dirty="0" err="1"/>
-              <a:t>Jupyter</a:t>
-            </a:r>
-            <a:r>
-              <a:rPr lang="en-US" dirty="0"/>
-              <a:t> notebook describing the data exploration and cleanup process.</a:t>
+              <a:rPr lang="en-US" sz="1600" dirty="0"/>
+              <a:t> Team Members</a:t>
+            </a:r>
+          </a:p>
+          <a:p>
+            <a:pPr marL="201168" lvl="1" indent="0">
+              <a:buClrTx/>
+              <a:buNone/>
+            </a:pPr>
+            <a:r>
+              <a:rPr lang="en-US" sz="1600" dirty="0"/>
+              <a:t>Group 7</a:t>
             </a:r>
           </a:p>
           <a:p>
@@ -6735,16 +6474,60 @@
               <a:buChar char="•"/>
             </a:pPr>
             <a:r>
-              <a:rPr lang="en-US" dirty="0"/>
-              <a:t>Create a </a:t>
-            </a:r>
-            <a:r>
-              <a:rPr lang="en-US" dirty="0" err="1"/>
-              <a:t>Jupyter</a:t>
-            </a:r>
-            <a:r>
-              <a:rPr lang="en-US" dirty="0"/>
-              <a:t> notebook illustrating the final data analysis.</a:t>
+              <a:rPr lang="en-US" sz="1600" dirty="0"/>
+              <a:t>Project Description/Outline</a:t>
+            </a:r>
+          </a:p>
+          <a:p>
+            <a:pPr marL="201168" lvl="1" indent="0">
+              <a:buClrTx/>
+              <a:buNone/>
+            </a:pPr>
+            <a:r>
+              <a:rPr lang="en-US" sz="1600" dirty="0"/>
+              <a:t>Analyze dataset of all projects reported as of December 2022 that used the State and Local Fiscal Recovery Funds (SLFRF) that were allocated for state and local governments under the American Rescue Plan Act of 2021 (ARPA) to support governments during the COVID-19 pandemic.</a:t>
+            </a:r>
+          </a:p>
+          <a:p>
+            <a:pPr marL="201168" lvl="1" indent="0">
+              <a:buClrTx/>
+              <a:buNone/>
+            </a:pPr>
+            <a:r>
+              <a:rPr lang="en-US" sz="1600" dirty="0"/>
+              <a:t>Some states have committed and/or spent almost all of their money, while other states have committed and spent almost no money.</a:t>
+            </a:r>
+          </a:p>
+          <a:p>
+            <a:pPr marL="201168" lvl="1" indent="0">
+              <a:buClrTx/>
+              <a:buNone/>
+            </a:pPr>
+            <a:r>
+              <a:rPr lang="en-US" sz="1600" dirty="0"/>
+              <a:t>This project will look specifically at which states (and local governments in those states) used SLFRF funds for vaccination programs, and compare overall COVID-19 vaccination rates as of December 2022 in those states to vaccination rates in states that did not do so. Research Questions to Answer</a:t>
+            </a:r>
+          </a:p>
+          <a:p>
+            <a:pPr marL="544068" lvl="1" indent="-342900">
+              <a:buClrTx/>
+              <a:buFont typeface="+mj-lt"/>
+              <a:buAutoNum type="arabicPeriod"/>
+            </a:pPr>
+            <a:r>
+              <a:rPr lang="en-US" sz="1600" dirty="0"/>
+              <a:t>Which states spent ARPA money on vaccination programs, and how much/how many programs?</a:t>
+            </a:r>
+          </a:p>
+          <a:p>
+            <a:pPr marL="544068" lvl="1" indent="-342900">
+              <a:buClrTx/>
+              <a:buFont typeface="+mj-lt"/>
+              <a:buAutoNum type="arabicPeriod"/>
+            </a:pPr>
+            <a:r>
+              <a:rPr lang="en-US" sz="1600" dirty="0"/>
+              <a:t>Compare vaccination grant spending to vaccination rates in each state.</a:t>
             </a:r>
           </a:p>
           <a:p>
@@ -6754,75 +6537,41 @@
               <a:buChar char="•"/>
             </a:pPr>
             <a:r>
-              <a:rPr lang="en-US" dirty="0"/>
-              <a:t>Use Matplotlib to create 6 to 8 visualizations of your data</a:t>
-            </a:r>
-          </a:p>
-          <a:p>
-            <a:pPr>
+              <a:rPr lang="en-US" sz="1600" dirty="0"/>
+              <a:t>Datasets to Be Used</a:t>
+            </a:r>
+          </a:p>
+          <a:p>
+            <a:pPr marL="544068" lvl="1" indent="-342900">
               <a:buClrTx/>
-              <a:buFont typeface="Arial" panose="020B0604020202020204" pitchFamily="34" charset="0"/>
-              <a:buChar char="•"/>
+              <a:buFont typeface="+mj-lt"/>
+              <a:buAutoNum type="arabicPeriod"/>
             </a:pPr>
             <a:r>
-              <a:rPr lang="en-US" dirty="0"/>
-              <a:t>(ideally, at least 2 visualizations per “question” that you ask your data).</a:t>
-            </a:r>
-          </a:p>
-          <a:p>
-            <a:pPr>
+              <a:rPr lang="en-US" sz="1600" dirty="0"/>
+              <a:t>EARN SLFRF Workbook, Q4 2022 (ref </a:t>
+            </a:r>
+            <a:r>
+              <a:rPr lang="en-US" sz="1600" dirty="0">
+                <a:hlinkClick r:id="rId3"/>
+              </a:rPr>
+              <a:t>https://www.epi.org/resources/budget/)</a:t>
+            </a:r>
+            <a:endParaRPr lang="en-US" sz="1600" dirty="0"/>
+          </a:p>
+          <a:p>
+            <a:pPr marL="544068" lvl="1" indent="-342900">
               <a:buClrTx/>
-              <a:buFont typeface="Arial" panose="020B0604020202020204" pitchFamily="34" charset="0"/>
-              <a:buChar char="•"/>
+              <a:buFont typeface="+mj-lt"/>
+              <a:buAutoNum type="arabicPeriod"/>
             </a:pPr>
             <a:r>
-              <a:rPr lang="en-US" dirty="0"/>
-              <a:t>Save PNG images of your visualizations to distribute to the class and instructional team—and for</a:t>
-            </a:r>
-          </a:p>
-          <a:p>
-            <a:pPr>
-              <a:buClrTx/>
-              <a:buFont typeface="Arial" panose="020B0604020202020204" pitchFamily="34" charset="0"/>
-              <a:buChar char="•"/>
-            </a:pPr>
-            <a:r>
-              <a:rPr lang="en-US" dirty="0"/>
-              <a:t>inclusion in your presentation.</a:t>
-            </a:r>
-          </a:p>
-          <a:p>
-            <a:pPr>
-              <a:buClrTx/>
-              <a:buFont typeface="Arial" panose="020B0604020202020204" pitchFamily="34" charset="0"/>
-              <a:buChar char="•"/>
-            </a:pPr>
-            <a:r>
-              <a:rPr lang="en-US" dirty="0"/>
-              <a:t>Create a write-up summarizing your major findings. This should include a heading for each “question”</a:t>
-            </a:r>
-          </a:p>
-          <a:p>
-            <a:pPr>
-              <a:buClrTx/>
-              <a:buFont typeface="Arial" panose="020B0604020202020204" pitchFamily="34" charset="0"/>
-              <a:buChar char="•"/>
-            </a:pPr>
-            <a:r>
-              <a:rPr lang="en-US" dirty="0"/>
-              <a:t>that you asked your data as well as a short description of your findings and any relevant plots.</a:t>
-            </a:r>
-          </a:p>
-          <a:p>
-            <a:pPr>
-              <a:buClrTx/>
-              <a:buFont typeface="Arial" panose="020B0604020202020204" pitchFamily="34" charset="0"/>
-              <a:buChar char="•"/>
-            </a:pPr>
-            <a:r>
-              <a:rPr lang="en-US" dirty="0"/>
-              <a:t>Bonus Use at least one API—if you can find one with data pertinent to your primary research questions.</a:t>
-            </a:r>
+              <a:rPr lang="en-US" sz="1600" dirty="0">
+                <a:hlinkClick r:id="rId4"/>
+              </a:rPr>
+              <a:t>https://health.google.com/covid-19/open-data/</a:t>
+            </a:r>
+            <a:endParaRPr lang="en-US" sz="1600" dirty="0"/>
           </a:p>
         </p:txBody>
       </p:sp>
@@ -6878,7 +6627,7 @@
           <a:p>
             <a:r>
               <a:rPr lang="en-US" dirty="0"/>
-              <a:t>Development Requirements</a:t>
+              <a:t>Project Proposal</a:t>
             </a:r>
           </a:p>
         </p:txBody>
@@ -6886,7 +6635,7 @@
     </p:spTree>
     <p:extLst>
       <p:ext uri="{BB962C8B-B14F-4D97-AF65-F5344CB8AC3E}">
-        <p14:creationId xmlns:p14="http://schemas.microsoft.com/office/powerpoint/2010/main" val="908844552"/>
+        <p14:creationId xmlns:p14="http://schemas.microsoft.com/office/powerpoint/2010/main" val="331821678"/>
       </p:ext>
     </p:extLst>
   </p:cSld>
@@ -6915,483 +6664,137 @@
       </p:grpSpPr>
       <p:sp>
         <p:nvSpPr>
-          <p:cNvPr id="2" name="Content Placeholder 2">
+          <p:cNvPr id="2" name="Title 1">
             <a:extLst>
               <a:ext uri="{FF2B5EF4-FFF2-40B4-BE49-F238E27FC236}">
-                <a16:creationId xmlns:a16="http://schemas.microsoft.com/office/drawing/2014/main" id="{10068C32-8F59-D5F4-3644-514FE45C30EA}"/>
+                <a16:creationId xmlns:a16="http://schemas.microsoft.com/office/drawing/2014/main" id="{94456D86-A2FB-D487-C5E7-F7D55A1C70AA}"/>
               </a:ext>
             </a:extLst>
           </p:cNvPr>
-          <p:cNvSpPr txBox="1">
-            <a:spLocks/>
-          </p:cNvSpPr>
-          <p:nvPr/>
+          <p:cNvSpPr>
+            <a:spLocks noGrp="1"/>
+          </p:cNvSpPr>
+          <p:nvPr>
+            <p:ph type="title"/>
+          </p:nvPr>
         </p:nvSpPr>
         <p:spPr>
           <a:xfrm>
-            <a:off x="101600" y="815976"/>
-            <a:ext cx="12090400" cy="6042024"/>
+            <a:off x="1097280" y="286603"/>
+            <a:ext cx="10058400" cy="1002447"/>
           </a:xfrm>
-          <a:prstGeom prst="rect">
-            <a:avLst/>
-          </a:prstGeom>
         </p:spPr>
         <p:txBody>
           <a:bodyPr/>
-          <a:lstStyle>
-            <a:lvl1pPr marL="91440" indent="-91440" algn="l" defTabSz="914400" rtl="0" eaLnBrk="1" latinLnBrk="0" hangingPunct="1">
-              <a:lnSpc>
-                <a:spcPct val="90000"/>
-              </a:lnSpc>
-              <a:spcBef>
-                <a:spcPts val="1200"/>
-              </a:spcBef>
-              <a:spcAft>
-                <a:spcPts val="200"/>
-              </a:spcAft>
-              <a:buClr>
-                <a:schemeClr val="accent1"/>
-              </a:buClr>
-              <a:buSzPct val="100000"/>
-              <a:buFont typeface="Calibri" panose="020F0502020204030204" pitchFamily="34" charset="0"/>
-              <a:buChar char=" "/>
-              <a:defRPr sz="2000" kern="1200">
-                <a:solidFill>
-                  <a:schemeClr val="tx1">
-                    <a:lumMod val="75000"/>
-                    <a:lumOff val="25000"/>
-                  </a:schemeClr>
-                </a:solidFill>
-                <a:latin typeface="+mn-lt"/>
-                <a:ea typeface="+mn-ea"/>
-                <a:cs typeface="+mn-cs"/>
-              </a:defRPr>
-            </a:lvl1pPr>
-            <a:lvl2pPr marL="384048" indent="-182880" algn="l" defTabSz="914400" rtl="0" eaLnBrk="1" latinLnBrk="0" hangingPunct="1">
-              <a:lnSpc>
-                <a:spcPct val="90000"/>
-              </a:lnSpc>
-              <a:spcBef>
-                <a:spcPts val="200"/>
-              </a:spcBef>
-              <a:spcAft>
-                <a:spcPts val="400"/>
-              </a:spcAft>
-              <a:buClr>
-                <a:schemeClr val="accent1"/>
-              </a:buClr>
-              <a:buFont typeface="Calibri" pitchFamily="34" charset="0"/>
-              <a:buChar char="◦"/>
-              <a:defRPr sz="1800" kern="1200">
-                <a:solidFill>
-                  <a:schemeClr val="tx1">
-                    <a:lumMod val="75000"/>
-                    <a:lumOff val="25000"/>
-                  </a:schemeClr>
-                </a:solidFill>
-                <a:latin typeface="+mn-lt"/>
-                <a:ea typeface="+mn-ea"/>
-                <a:cs typeface="+mn-cs"/>
-              </a:defRPr>
-            </a:lvl2pPr>
-            <a:lvl3pPr marL="566928" indent="-182880" algn="l" defTabSz="914400" rtl="0" eaLnBrk="1" latinLnBrk="0" hangingPunct="1">
-              <a:lnSpc>
-                <a:spcPct val="90000"/>
-              </a:lnSpc>
-              <a:spcBef>
-                <a:spcPts val="200"/>
-              </a:spcBef>
-              <a:spcAft>
-                <a:spcPts val="400"/>
-              </a:spcAft>
-              <a:buClr>
-                <a:schemeClr val="accent1"/>
-              </a:buClr>
-              <a:buFont typeface="Calibri" pitchFamily="34" charset="0"/>
-              <a:buChar char="◦"/>
-              <a:defRPr sz="1400" kern="1200">
-                <a:solidFill>
-                  <a:schemeClr val="tx1">
-                    <a:lumMod val="75000"/>
-                    <a:lumOff val="25000"/>
-                  </a:schemeClr>
-                </a:solidFill>
-                <a:latin typeface="+mn-lt"/>
-                <a:ea typeface="+mn-ea"/>
-                <a:cs typeface="+mn-cs"/>
-              </a:defRPr>
-            </a:lvl3pPr>
-            <a:lvl4pPr marL="749808" indent="-182880" algn="l" defTabSz="914400" rtl="0" eaLnBrk="1" latinLnBrk="0" hangingPunct="1">
-              <a:lnSpc>
-                <a:spcPct val="90000"/>
-              </a:lnSpc>
-              <a:spcBef>
-                <a:spcPts val="200"/>
-              </a:spcBef>
-              <a:spcAft>
-                <a:spcPts val="400"/>
-              </a:spcAft>
-              <a:buClr>
-                <a:schemeClr val="accent1"/>
-              </a:buClr>
-              <a:buFont typeface="Calibri" pitchFamily="34" charset="0"/>
-              <a:buChar char="◦"/>
-              <a:defRPr sz="1400" kern="1200">
-                <a:solidFill>
-                  <a:schemeClr val="tx1">
-                    <a:lumMod val="75000"/>
-                    <a:lumOff val="25000"/>
-                  </a:schemeClr>
-                </a:solidFill>
-                <a:latin typeface="+mn-lt"/>
-                <a:ea typeface="+mn-ea"/>
-                <a:cs typeface="+mn-cs"/>
-              </a:defRPr>
-            </a:lvl4pPr>
-            <a:lvl5pPr marL="932688" indent="-182880" algn="l" defTabSz="914400" rtl="0" eaLnBrk="1" latinLnBrk="0" hangingPunct="1">
-              <a:lnSpc>
-                <a:spcPct val="90000"/>
-              </a:lnSpc>
-              <a:spcBef>
-                <a:spcPts val="200"/>
-              </a:spcBef>
-              <a:spcAft>
-                <a:spcPts val="400"/>
-              </a:spcAft>
-              <a:buClr>
-                <a:schemeClr val="accent1"/>
-              </a:buClr>
-              <a:buFont typeface="Calibri" pitchFamily="34" charset="0"/>
-              <a:buChar char="◦"/>
-              <a:defRPr sz="1400" kern="1200">
-                <a:solidFill>
-                  <a:schemeClr val="tx1">
-                    <a:lumMod val="75000"/>
-                    <a:lumOff val="25000"/>
-                  </a:schemeClr>
-                </a:solidFill>
-                <a:latin typeface="+mn-lt"/>
-                <a:ea typeface="+mn-ea"/>
-                <a:cs typeface="+mn-cs"/>
-              </a:defRPr>
-            </a:lvl5pPr>
-            <a:lvl6pPr marL="1100000" indent="-228600" algn="l" defTabSz="914400" rtl="0" eaLnBrk="1" latinLnBrk="0" hangingPunct="1">
-              <a:lnSpc>
-                <a:spcPct val="90000"/>
-              </a:lnSpc>
-              <a:spcBef>
-                <a:spcPts val="200"/>
-              </a:spcBef>
-              <a:spcAft>
-                <a:spcPts val="400"/>
-              </a:spcAft>
-              <a:buClr>
-                <a:schemeClr val="accent1"/>
-              </a:buClr>
-              <a:buFont typeface="Calibri" pitchFamily="34" charset="0"/>
-              <a:buChar char="◦"/>
-              <a:defRPr sz="1400" kern="1200">
-                <a:solidFill>
-                  <a:schemeClr val="tx1">
-                    <a:lumMod val="75000"/>
-                    <a:lumOff val="25000"/>
-                  </a:schemeClr>
-                </a:solidFill>
-                <a:latin typeface="+mn-lt"/>
-                <a:ea typeface="+mn-ea"/>
-                <a:cs typeface="+mn-cs"/>
-              </a:defRPr>
-            </a:lvl6pPr>
-            <a:lvl7pPr marL="1300000" indent="-228600" algn="l" defTabSz="914400" rtl="0" eaLnBrk="1" latinLnBrk="0" hangingPunct="1">
-              <a:lnSpc>
-                <a:spcPct val="90000"/>
-              </a:lnSpc>
-              <a:spcBef>
-                <a:spcPts val="200"/>
-              </a:spcBef>
-              <a:spcAft>
-                <a:spcPts val="400"/>
-              </a:spcAft>
-              <a:buClr>
-                <a:schemeClr val="accent1"/>
-              </a:buClr>
-              <a:buFont typeface="Calibri" pitchFamily="34" charset="0"/>
-              <a:buChar char="◦"/>
-              <a:defRPr sz="1400" kern="1200">
-                <a:solidFill>
-                  <a:schemeClr val="tx1">
-                    <a:lumMod val="75000"/>
-                    <a:lumOff val="25000"/>
-                  </a:schemeClr>
-                </a:solidFill>
-                <a:latin typeface="+mn-lt"/>
-                <a:ea typeface="+mn-ea"/>
-                <a:cs typeface="+mn-cs"/>
-              </a:defRPr>
-            </a:lvl7pPr>
-            <a:lvl8pPr marL="1500000" indent="-228600" algn="l" defTabSz="914400" rtl="0" eaLnBrk="1" latinLnBrk="0" hangingPunct="1">
-              <a:lnSpc>
-                <a:spcPct val="90000"/>
-              </a:lnSpc>
-              <a:spcBef>
-                <a:spcPts val="200"/>
-              </a:spcBef>
-              <a:spcAft>
-                <a:spcPts val="400"/>
-              </a:spcAft>
-              <a:buClr>
-                <a:schemeClr val="accent1"/>
-              </a:buClr>
-              <a:buFont typeface="Calibri" pitchFamily="34" charset="0"/>
-              <a:buChar char="◦"/>
-              <a:defRPr sz="1400" kern="1200">
-                <a:solidFill>
-                  <a:schemeClr val="tx1">
-                    <a:lumMod val="75000"/>
-                    <a:lumOff val="25000"/>
-                  </a:schemeClr>
-                </a:solidFill>
-                <a:latin typeface="+mn-lt"/>
-                <a:ea typeface="+mn-ea"/>
-                <a:cs typeface="+mn-cs"/>
-              </a:defRPr>
-            </a:lvl8pPr>
-            <a:lvl9pPr marL="1700000" indent="-228600" algn="l" defTabSz="914400" rtl="0" eaLnBrk="1" latinLnBrk="0" hangingPunct="1">
-              <a:lnSpc>
-                <a:spcPct val="90000"/>
-              </a:lnSpc>
-              <a:spcBef>
-                <a:spcPts val="200"/>
-              </a:spcBef>
-              <a:spcAft>
-                <a:spcPts val="400"/>
-              </a:spcAft>
-              <a:buClr>
-                <a:schemeClr val="accent1"/>
-              </a:buClr>
-              <a:buFont typeface="Calibri" pitchFamily="34" charset="0"/>
-              <a:buChar char="◦"/>
-              <a:defRPr sz="1400" kern="1200">
-                <a:solidFill>
-                  <a:schemeClr val="tx1">
-                    <a:lumMod val="75000"/>
-                    <a:lumOff val="25000"/>
-                  </a:schemeClr>
-                </a:solidFill>
-                <a:latin typeface="+mn-lt"/>
-                <a:ea typeface="+mn-ea"/>
-                <a:cs typeface="+mn-cs"/>
-              </a:defRPr>
-            </a:lvl9pPr>
-          </a:lstStyle>
-          <a:p>
-            <a:pPr>
-              <a:buClrTx/>
-              <a:buFont typeface="Arial" panose="020B0604020202020204" pitchFamily="34" charset="0"/>
-              <a:buChar char="•"/>
-            </a:pPr>
+          <a:lstStyle/>
+          <a:p>
             <a:r>
               <a:rPr lang="en-US" dirty="0"/>
-              <a:t>Project Title</a:t>
-            </a:r>
-          </a:p>
-          <a:p>
-            <a:pPr marL="201168" lvl="1" indent="0">
-              <a:buClrTx/>
-              <a:buNone/>
-            </a:pPr>
-            <a:r>
-              <a:rPr lang="en-US" dirty="0"/>
-              <a:t>Covid-19 Vaccination Rates by State Federal Funds Usage</a:t>
-            </a:r>
-          </a:p>
-          <a:p>
-            <a:pPr>
-              <a:buClrTx/>
-              <a:buFont typeface="Arial" panose="020B0604020202020204" pitchFamily="34" charset="0"/>
-              <a:buChar char="•"/>
-            </a:pPr>
-            <a:r>
-              <a:rPr lang="en-US" dirty="0"/>
-              <a:t>Team Members (see slack channel)</a:t>
-            </a:r>
-          </a:p>
-          <a:p>
-            <a:pPr>
-              <a:buClrTx/>
-              <a:buFont typeface="Arial" panose="020B0604020202020204" pitchFamily="34" charset="0"/>
-              <a:buChar char="•"/>
-            </a:pPr>
-            <a:r>
-              <a:rPr lang="en-US" dirty="0"/>
-              <a:t>Project Description/Outline</a:t>
-            </a:r>
-          </a:p>
-          <a:p>
-            <a:pPr lvl="1">
-              <a:buClrTx/>
-              <a:buFont typeface="Wingdings" panose="05000000000000000000" pitchFamily="2" charset="2"/>
-              <a:buChar char="§"/>
-            </a:pPr>
-            <a:r>
-              <a:rPr lang="en-US" dirty="0"/>
-              <a:t>Analyze state by state federal funding usage for Covid-19 and compare to vaccination rates per state.</a:t>
-            </a:r>
-          </a:p>
-          <a:p>
-            <a:pPr>
-              <a:buClrTx/>
-              <a:buFont typeface="Arial" panose="020B0604020202020204" pitchFamily="34" charset="0"/>
-              <a:buChar char="•"/>
-            </a:pPr>
-            <a:r>
-              <a:rPr lang="en-US" dirty="0"/>
-              <a:t>Research Questions to Answer</a:t>
-            </a:r>
-          </a:p>
-          <a:p>
-            <a:pPr marL="544068" lvl="1" indent="-342900">
-              <a:buClrTx/>
-              <a:buFont typeface="+mj-lt"/>
-              <a:buAutoNum type="arabicPeriod"/>
-            </a:pPr>
-            <a:r>
-              <a:rPr lang="en-US" dirty="0"/>
-              <a:t>Which states spent ARPA money on vaccination programs, and how much/how many programs?</a:t>
-            </a:r>
-          </a:p>
-          <a:p>
-            <a:pPr marL="544068" lvl="1" indent="-342900">
-              <a:buClrTx/>
-              <a:buFont typeface="+mj-lt"/>
-              <a:buAutoNum type="arabicPeriod"/>
-            </a:pPr>
-            <a:r>
-              <a:rPr lang="en-US" dirty="0"/>
-              <a:t>Compare vaccination grant spending to vaccination rates in each state.</a:t>
-            </a:r>
-          </a:p>
-          <a:p>
-            <a:pPr marL="544068" lvl="1" indent="-342900">
-              <a:buClrTx/>
-              <a:buFont typeface="+mj-lt"/>
-              <a:buAutoNum type="arabicPeriod"/>
-            </a:pPr>
-            <a:endParaRPr lang="en-US" dirty="0"/>
-          </a:p>
-          <a:p>
-            <a:pPr marL="201168" lvl="1" indent="0">
-              <a:buClrTx/>
-              <a:buNone/>
-            </a:pPr>
-            <a:endParaRPr lang="en-US" dirty="0"/>
-          </a:p>
-          <a:p>
-            <a:pPr>
-              <a:buClrTx/>
-              <a:buFont typeface="Arial" panose="020B0604020202020204" pitchFamily="34" charset="0"/>
-              <a:buChar char="•"/>
-            </a:pPr>
-            <a:r>
-              <a:rPr lang="en-US" dirty="0"/>
-              <a:t>Datasets to Be Used</a:t>
-            </a:r>
-          </a:p>
-          <a:p>
-            <a:pPr marL="544068" lvl="1" indent="-342900">
-              <a:buClrTx/>
-              <a:buFont typeface="+mj-lt"/>
-              <a:buAutoNum type="arabicPeriod"/>
-            </a:pPr>
-            <a:r>
-              <a:rPr lang="en-US" dirty="0"/>
-              <a:t>EARN SLFRF Workbook, Q4 2022 (ref </a:t>
-            </a:r>
-            <a:r>
-              <a:rPr lang="en-US" dirty="0">
-                <a:hlinkClick r:id="rId2"/>
-              </a:rPr>
-              <a:t>https://www.epi.org/resources/budget/)</a:t>
-            </a:r>
-            <a:endParaRPr lang="en-US" dirty="0"/>
-          </a:p>
-          <a:p>
-            <a:pPr marL="544068" lvl="1" indent="-342900">
-              <a:buClrTx/>
-              <a:buFont typeface="+mj-lt"/>
-              <a:buAutoNum type="arabicPeriod"/>
-            </a:pPr>
-            <a:r>
-              <a:rPr lang="en-US" dirty="0">
-                <a:hlinkClick r:id="rId3"/>
-              </a:rPr>
-              <a:t>https://health.google.com/covid-19/open-data/</a:t>
-            </a:r>
-            <a:endParaRPr lang="en-US" dirty="0"/>
-          </a:p>
-        </p:txBody>
-      </p:sp>
-      <p:sp>
-        <p:nvSpPr>
-          <p:cNvPr id="3" name="Title 1">
+              <a:t>Breakdown of Tasks</a:t>
+            </a:r>
+          </a:p>
+        </p:txBody>
+      </p:sp>
+      <p:sp>
+        <p:nvSpPr>
+          <p:cNvPr id="3" name="Content Placeholder 2">
             <a:extLst>
               <a:ext uri="{FF2B5EF4-FFF2-40B4-BE49-F238E27FC236}">
-                <a16:creationId xmlns:a16="http://schemas.microsoft.com/office/drawing/2014/main" id="{A88B47C8-6D82-3329-21EC-05C92318D31E}"/>
+                <a16:creationId xmlns:a16="http://schemas.microsoft.com/office/drawing/2014/main" id="{5E3E40F8-E566-7F42-1FBB-745782052EF2}"/>
               </a:ext>
             </a:extLst>
           </p:cNvPr>
-          <p:cNvSpPr txBox="1">
-            <a:spLocks/>
-          </p:cNvSpPr>
-          <p:nvPr/>
+          <p:cNvSpPr>
+            <a:spLocks noGrp="1"/>
+          </p:cNvSpPr>
+          <p:nvPr>
+            <p:ph idx="1"/>
+          </p:nvPr>
         </p:nvSpPr>
         <p:spPr>
           <a:xfrm>
-            <a:off x="1066800" y="77053"/>
-            <a:ext cx="10058400" cy="702303"/>
+            <a:off x="1097280" y="1845734"/>
+            <a:ext cx="10058400" cy="4256616"/>
           </a:xfrm>
-          <a:prstGeom prst="rect">
-            <a:avLst/>
-          </a:prstGeom>
         </p:spPr>
         <p:txBody>
-          <a:bodyPr>
-            <a:normAutofit fontScale="97500" lnSpcReduction="10000"/>
-          </a:bodyPr>
-          <a:lstStyle>
-            <a:lvl1pPr algn="l" defTabSz="914400" rtl="0" eaLnBrk="1" latinLnBrk="0" hangingPunct="1">
-              <a:lnSpc>
-                <a:spcPct val="85000"/>
-              </a:lnSpc>
-              <a:spcBef>
-                <a:spcPct val="0"/>
-              </a:spcBef>
-              <a:buNone/>
-              <a:defRPr sz="4800" kern="1200" spc="-50" baseline="0">
-                <a:solidFill>
-                  <a:schemeClr val="tx1">
-                    <a:lumMod val="75000"/>
-                    <a:lumOff val="25000"/>
-                  </a:schemeClr>
-                </a:solidFill>
-                <a:latin typeface="+mj-lt"/>
-                <a:ea typeface="+mj-ea"/>
-                <a:cs typeface="+mj-cs"/>
-              </a:defRPr>
-            </a:lvl1pPr>
-          </a:lstStyle>
+          <a:bodyPr/>
+          <a:lstStyle/>
           <a:p>
             <a:r>
               <a:rPr lang="en-US" dirty="0"/>
-              <a:t>Project Proposal</a:t>
-            </a:r>
+              <a:t>Split presentation deck into 6 parts: each group member to speak during presentation</a:t>
+            </a:r>
+          </a:p>
+          <a:p>
+            <a:pPr lvl="1"/>
+            <a:r>
+              <a:rPr lang="en-US" dirty="0"/>
+              <a:t>Sarah: Data clean (data </a:t>
+            </a:r>
+            <a:r>
+              <a:rPr lang="en-US" dirty="0" err="1"/>
+              <a:t>engr</a:t>
+            </a:r>
+            <a:r>
+              <a:rPr lang="en-US" dirty="0"/>
+              <a:t>)</a:t>
+            </a:r>
+          </a:p>
+          <a:p>
+            <a:pPr lvl="1"/>
+            <a:r>
+              <a:rPr lang="en-US" dirty="0"/>
+              <a:t>Kendal: Visuals planning and execution</a:t>
+            </a:r>
+          </a:p>
+          <a:p>
+            <a:pPr lvl="1"/>
+            <a:r>
+              <a:rPr lang="en-US" dirty="0"/>
+              <a:t>Greg: Debug, technical issues, overall support, CDC API (based off questions to be answered)</a:t>
+            </a:r>
+          </a:p>
+          <a:p>
+            <a:pPr lvl="1"/>
+            <a:r>
+              <a:rPr lang="en-US" dirty="0"/>
+              <a:t>Aaliyah: overall support</a:t>
+            </a:r>
+          </a:p>
+          <a:p>
+            <a:pPr lvl="1"/>
+            <a:r>
+              <a:rPr lang="en-US" dirty="0"/>
+              <a:t>Evan: Data collection (CDC API bonus support), write pseudo-code where needed</a:t>
+            </a:r>
+          </a:p>
+          <a:p>
+            <a:pPr lvl="1"/>
+            <a:r>
+              <a:rPr lang="en-US" dirty="0"/>
+              <a:t>Joanna: Visuals planning and execution</a:t>
+            </a:r>
+          </a:p>
+          <a:p>
+            <a:pPr marL="201168" lvl="1" indent="0">
+              <a:buNone/>
+            </a:pPr>
+            <a:endParaRPr lang="en-US" dirty="0"/>
+          </a:p>
+          <a:p>
+            <a:pPr lvl="1"/>
+            <a:endParaRPr lang="en-US" dirty="0"/>
+          </a:p>
+          <a:p>
+            <a:endParaRPr lang="en-US" dirty="0"/>
           </a:p>
         </p:txBody>
       </p:sp>
     </p:spTree>
     <p:extLst>
       <p:ext uri="{BB962C8B-B14F-4D97-AF65-F5344CB8AC3E}">
-        <p14:creationId xmlns:p14="http://schemas.microsoft.com/office/powerpoint/2010/main" val="331821678"/>
+        <p14:creationId xmlns:p14="http://schemas.microsoft.com/office/powerpoint/2010/main" val="63745696"/>
       </p:ext>
     </p:extLst>
   </p:cSld>

</xml_diff>

<commit_message>
5/10/2023: Updated README. Added Resources folder containing EARN workbook and single csv file from workbook sheet. Added .ipynb file for project work. Started initial data import of EARN_all_states.csv file.
</commit_message>
<xml_diff>
--- a/Project notes.pptx
+++ b/Project notes.pptx
@@ -205,7 +205,7 @@
           <a:p>
             <a:fld id="{C17E1E4B-2B0B-4F18-825C-E1CF4409D9D0}" type="datetimeFigureOut">
               <a:rPr lang="en-US" smtClean="0"/>
-              <a:t>5/9/2023</a:t>
+              <a:t>5/10/2023</a:t>
             </a:fld>
             <a:endParaRPr lang="en-US"/>
           </a:p>
@@ -980,7 +980,7 @@
           <a:p>
             <a:fld id="{925EA6E8-F76E-44A9-9BED-4361634B60BD}" type="datetimeFigureOut">
               <a:rPr lang="en-US" smtClean="0"/>
-              <a:t>5/9/2023</a:t>
+              <a:t>5/10/2023</a:t>
             </a:fld>
             <a:endParaRPr lang="en-US"/>
           </a:p>
@@ -1188,7 +1188,7 @@
           <a:p>
             <a:fld id="{925EA6E8-F76E-44A9-9BED-4361634B60BD}" type="datetimeFigureOut">
               <a:rPr lang="en-US" smtClean="0"/>
-              <a:t>5/9/2023</a:t>
+              <a:t>5/10/2023</a:t>
             </a:fld>
             <a:endParaRPr lang="en-US"/>
           </a:p>
@@ -1444,7 +1444,7 @@
           <a:p>
             <a:fld id="{925EA6E8-F76E-44A9-9BED-4361634B60BD}" type="datetimeFigureOut">
               <a:rPr lang="en-US" smtClean="0"/>
-              <a:t>5/9/2023</a:t>
+              <a:t>5/10/2023</a:t>
             </a:fld>
             <a:endParaRPr lang="en-US"/>
           </a:p>
@@ -1618,7 +1618,7 @@
           <a:p>
             <a:fld id="{925EA6E8-F76E-44A9-9BED-4361634B60BD}" type="datetimeFigureOut">
               <a:rPr lang="en-US" smtClean="0"/>
-              <a:t>5/9/2023</a:t>
+              <a:t>5/10/2023</a:t>
             </a:fld>
             <a:endParaRPr lang="en-US"/>
           </a:p>
@@ -1961,7 +1961,7 @@
           <a:p>
             <a:fld id="{925EA6E8-F76E-44A9-9BED-4361634B60BD}" type="datetimeFigureOut">
               <a:rPr lang="en-US" smtClean="0"/>
-              <a:t>5/9/2023</a:t>
+              <a:t>5/10/2023</a:t>
             </a:fld>
             <a:endParaRPr lang="en-US"/>
           </a:p>
@@ -2236,7 +2236,7 @@
           <a:p>
             <a:fld id="{925EA6E8-F76E-44A9-9BED-4361634B60BD}" type="datetimeFigureOut">
               <a:rPr lang="en-US" smtClean="0"/>
-              <a:t>5/9/2023</a:t>
+              <a:t>5/10/2023</a:t>
             </a:fld>
             <a:endParaRPr lang="en-US"/>
           </a:p>
@@ -2615,7 +2615,7 @@
           <a:p>
             <a:fld id="{925EA6E8-F76E-44A9-9BED-4361634B60BD}" type="datetimeFigureOut">
               <a:rPr lang="en-US" smtClean="0"/>
-              <a:t>5/9/2023</a:t>
+              <a:t>5/10/2023</a:t>
             </a:fld>
             <a:endParaRPr lang="en-US"/>
           </a:p>
@@ -2733,7 +2733,7 @@
           <a:p>
             <a:fld id="{925EA6E8-F76E-44A9-9BED-4361634B60BD}" type="datetimeFigureOut">
               <a:rPr lang="en-US" smtClean="0"/>
-              <a:t>5/9/2023</a:t>
+              <a:t>5/10/2023</a:t>
             </a:fld>
             <a:endParaRPr lang="en-US"/>
           </a:p>
@@ -2904,7 +2904,7 @@
           <a:p>
             <a:fld id="{925EA6E8-F76E-44A9-9BED-4361634B60BD}" type="datetimeFigureOut">
               <a:rPr lang="en-US" smtClean="0"/>
-              <a:t>5/9/2023</a:t>
+              <a:t>5/10/2023</a:t>
             </a:fld>
             <a:endParaRPr lang="en-US"/>
           </a:p>
@@ -3258,7 +3258,7 @@
           <a:p>
             <a:fld id="{925EA6E8-F76E-44A9-9BED-4361634B60BD}" type="datetimeFigureOut">
               <a:rPr lang="en-US" smtClean="0"/>
-              <a:t>5/9/2023</a:t>
+              <a:t>5/10/2023</a:t>
             </a:fld>
             <a:endParaRPr lang="en-US"/>
           </a:p>
@@ -3640,7 +3640,7 @@
           <a:p>
             <a:fld id="{925EA6E8-F76E-44A9-9BED-4361634B60BD}" type="datetimeFigureOut">
               <a:rPr lang="en-US" smtClean="0"/>
-              <a:t>5/9/2023</a:t>
+              <a:t>5/10/2023</a:t>
             </a:fld>
             <a:endParaRPr lang="en-US"/>
           </a:p>
@@ -3927,7 +3927,7 @@
           <a:p>
             <a:fld id="{925EA6E8-F76E-44A9-9BED-4361634B60BD}" type="datetimeFigureOut">
               <a:rPr lang="en-US" smtClean="0"/>
-              <a:t>5/9/2023</a:t>
+              <a:t>5/10/2023</a:t>
             </a:fld>
             <a:endParaRPr lang="en-US"/>
           </a:p>
@@ -4607,6 +4607,22 @@
             </a:r>
           </a:p>
           <a:p>
+            <a:pPr lvl="1">
+              <a:buClrTx/>
+              <a:buFont typeface="Wingdings" panose="05000000000000000000" pitchFamily="2" charset="2"/>
+              <a:buChar char="§"/>
+            </a:pPr>
+            <a:r>
+              <a:rPr lang="en-US" dirty="0"/>
+              <a:t>Healthcare, specifically Covid-19 data</a:t>
+            </a:r>
+          </a:p>
+          <a:p>
+            <a:pPr lvl="1">
+              <a:buClrTx/>
+              <a:buFont typeface="Wingdings" panose="05000000000000000000" pitchFamily="2" charset="2"/>
+              <a:buChar char="§"/>
+            </a:pPr>
             <a:endParaRPr lang="en-US" dirty="0"/>
           </a:p>
           <a:p>
@@ -4616,7 +4632,26 @@
             </a:r>
           </a:p>
           <a:p>
-            <a:endParaRPr lang="en-US" dirty="0"/>
+            <a:pPr>
+              <a:buClrTx/>
+              <a:buFont typeface="Wingdings" panose="05000000000000000000" pitchFamily="2" charset="2"/>
+              <a:buChar char="§"/>
+            </a:pPr>
+            <a:r>
+              <a:rPr lang="en-US" sz="1800" dirty="0"/>
+              <a:t>Which states spent ARPA money on vaccination programs, and how much/how many programs?</a:t>
+            </a:r>
+          </a:p>
+          <a:p>
+            <a:pPr>
+              <a:buClrTx/>
+              <a:buFont typeface="Wingdings" panose="05000000000000000000" pitchFamily="2" charset="2"/>
+              <a:buChar char="§"/>
+            </a:pPr>
+            <a:r>
+              <a:rPr lang="en-US" sz="1800" dirty="0"/>
+              <a:t>How does vaccination grant spending compare to vaccination rates in each state?</a:t>
+            </a:r>
           </a:p>
           <a:p>
             <a:endParaRPr lang="en-US" dirty="0"/>
@@ -4625,6 +4660,28 @@
             <a:r>
               <a:rPr lang="en-US" dirty="0"/>
               <a:t>Possible source for the data</a:t>
+            </a:r>
+          </a:p>
+          <a:p>
+            <a:pPr>
+              <a:buClrTx/>
+              <a:buFont typeface="Wingdings" panose="05000000000000000000" pitchFamily="2" charset="2"/>
+              <a:buChar char="§"/>
+            </a:pPr>
+            <a:r>
+              <a:rPr lang="en-US" sz="1800" dirty="0"/>
+              <a:t>EARN SLFRF Workbook, Q4 2022 (ref https://www.epi.org/resources/budget/)</a:t>
+            </a:r>
+          </a:p>
+          <a:p>
+            <a:pPr>
+              <a:buClrTx/>
+              <a:buFont typeface="Wingdings" panose="05000000000000000000" pitchFamily="2" charset="2"/>
+              <a:buChar char="§"/>
+            </a:pPr>
+            <a:r>
+              <a:rPr lang="en-US" sz="1800" dirty="0"/>
+              <a:t>https://health.google.com/covid-19/open-data/</a:t>
             </a:r>
           </a:p>
           <a:p>
@@ -4688,7 +4745,26 @@
             </a:pPr>
             <a:r>
               <a:rPr lang="en-US" dirty="0"/>
-              <a:t>All US states, narrow to top 3 and bottom 3 in analysis (can change)</a:t>
+              <a:t>All US states for spending summary. Then narrow to top 3 and bottom 3 in analysis (can change depending on time needed for analysis)</a:t>
+            </a:r>
+          </a:p>
+          <a:p>
+            <a:pPr marL="201168" lvl="1" indent="0">
+              <a:buClrTx/>
+              <a:buNone/>
+            </a:pPr>
+            <a:endParaRPr lang="en-US" dirty="0"/>
+          </a:p>
+          <a:p>
+            <a:pPr marL="0" indent="0">
+              <a:buNone/>
+            </a:pPr>
+            <a:endParaRPr lang="en-US" dirty="0"/>
+          </a:p>
+          <a:p>
+            <a:r>
+              <a:rPr lang="en-US" dirty="0"/>
+              <a:t>What this project is not</a:t>
             </a:r>
           </a:p>
           <a:p>
@@ -4697,27 +4773,10 @@
               <a:buFont typeface="Wingdings" panose="05000000000000000000" pitchFamily="2" charset="2"/>
               <a:buChar char="§"/>
             </a:pPr>
-            <a:endParaRPr lang="en-US" dirty="0"/>
-          </a:p>
-          <a:p>
-            <a:pPr lvl="1">
-              <a:buClrTx/>
-              <a:buFont typeface="Wingdings" panose="05000000000000000000" pitchFamily="2" charset="2"/>
-              <a:buChar char="§"/>
-            </a:pPr>
-            <a:endParaRPr lang="en-US" dirty="0"/>
-          </a:p>
-          <a:p>
-            <a:endParaRPr lang="en-US" dirty="0"/>
-          </a:p>
-          <a:p>
             <a:r>
               <a:rPr lang="en-US" dirty="0"/>
-              <a:t>What this project is not</a:t>
-            </a:r>
-          </a:p>
-          <a:p>
-            <a:endParaRPr lang="en-US" dirty="0"/>
+              <a:t>(Reference data constraints and assumptions list)</a:t>
+            </a:r>
           </a:p>
           <a:p>
             <a:endParaRPr lang="en-US" dirty="0"/>
@@ -4729,6 +4788,28 @@
             <a:r>
               <a:rPr lang="en-US" dirty="0"/>
               <a:t>Data source constraints and assumptions</a:t>
+            </a:r>
+          </a:p>
+          <a:p>
+            <a:pPr>
+              <a:buClrTx/>
+              <a:buFont typeface="Arial" panose="020B0604020202020204" pitchFamily="34" charset="0"/>
+              <a:buChar char="•"/>
+            </a:pPr>
+            <a:r>
+              <a:rPr lang="en-US" sz="1800" dirty="0"/>
+              <a:t>State size/population not taken into account</a:t>
+            </a:r>
+          </a:p>
+          <a:p>
+            <a:pPr>
+              <a:buClrTx/>
+              <a:buFont typeface="Arial" panose="020B0604020202020204" pitchFamily="34" charset="0"/>
+              <a:buChar char="•"/>
+            </a:pPr>
+            <a:r>
+              <a:rPr lang="en-US" sz="1800" dirty="0"/>
+              <a:t>Different qualification criteria per state</a:t>
             </a:r>
           </a:p>
           <a:p>
@@ -4738,25 +4819,8 @@
             </a:pPr>
             <a:r>
               <a:rPr lang="en-US" sz="1600" dirty="0"/>
-              <a:t>State size/population not taken into account</a:t>
-            </a:r>
-          </a:p>
-          <a:p>
-            <a:pPr>
-              <a:buFont typeface="Arial" panose="020B0604020202020204" pitchFamily="34" charset="0"/>
-              <a:buChar char="•"/>
-            </a:pPr>
-            <a:r>
-              <a:rPr lang="en-US" sz="1600" dirty="0"/>
-              <a:t>Different qualification criteria per state</a:t>
-            </a:r>
-          </a:p>
-          <a:p>
-            <a:pPr>
-              <a:buFont typeface="Arial" panose="020B0604020202020204" pitchFamily="34" charset="0"/>
-              <a:buChar char="•"/>
-            </a:pPr>
-            <a:endParaRPr lang="en-US" sz="1600" dirty="0"/>
+              <a:t>…</a:t>
+            </a:r>
           </a:p>
         </p:txBody>
       </p:sp>
@@ -5139,7 +5203,7 @@
             <a:pPr lvl="2"/>
             <a:r>
               <a:rPr lang="en-US" dirty="0"/>
-              <a:t>Section off your code section with blocks #--------------------------- so that you have clear areas of work to prevent merge issues per line.</a:t>
+              <a:t>Section off your code section with blocks #--------------------------- so that you have clear areas of work to prevent merge issues per line of code.</a:t>
             </a:r>
           </a:p>
           <a:p>
@@ -6723,22 +6787,43 @@
           <a:p>
             <a:r>
               <a:rPr lang="en-US" dirty="0"/>
-              <a:t>Split presentation deck into 6 parts: each group member to speak during presentation</a:t>
+              <a:t>Split presentation deck into six parts: each group member to speak during presentation</a:t>
             </a:r>
           </a:p>
           <a:p>
             <a:pPr lvl="1"/>
             <a:r>
               <a:rPr lang="en-US" dirty="0"/>
-              <a:t>Sarah: Data clean (data </a:t>
+              <a:t>Evan: Data collection, API bonus work, write pseudo-code for .</a:t>
             </a:r>
             <a:r>
               <a:rPr lang="en-US" dirty="0" err="1"/>
-              <a:t>engr</a:t>
+              <a:t>ipynb</a:t>
             </a:r>
             <a:r>
               <a:rPr lang="en-US" dirty="0"/>
-              <a:t>)</a:t>
+              <a:t> file</a:t>
+            </a:r>
+          </a:p>
+          <a:p>
+            <a:pPr lvl="1"/>
+            <a:r>
+              <a:rPr lang="en-US" dirty="0"/>
+              <a:t>Sarah: Data clean</a:t>
+            </a:r>
+          </a:p>
+          <a:p>
+            <a:pPr lvl="1"/>
+            <a:r>
+              <a:rPr lang="en-US" dirty="0"/>
+              <a:t>Greg: Debug, technical issues, overall support, CDC API (where able/if has time to set up)</a:t>
+            </a:r>
+          </a:p>
+          <a:p>
+            <a:pPr lvl="1"/>
+            <a:r>
+              <a:rPr lang="en-US" dirty="0"/>
+              <a:t>Aaliyah: overall support</a:t>
             </a:r>
           </a:p>
           <a:p>
@@ -6746,27 +6831,6 @@
             <a:r>
               <a:rPr lang="en-US" dirty="0"/>
               <a:t>Kendal: Visuals planning and execution</a:t>
-            </a:r>
-          </a:p>
-          <a:p>
-            <a:pPr lvl="1"/>
-            <a:r>
-              <a:rPr lang="en-US" dirty="0"/>
-              <a:t>Greg: Debug, technical issues, overall support, CDC API (based off questions to be answered)</a:t>
-            </a:r>
-          </a:p>
-          <a:p>
-            <a:pPr lvl="1"/>
-            <a:r>
-              <a:rPr lang="en-US" dirty="0"/>
-              <a:t>Aaliyah: overall support</a:t>
-            </a:r>
-          </a:p>
-          <a:p>
-            <a:pPr lvl="1"/>
-            <a:r>
-              <a:rPr lang="en-US" dirty="0"/>
-              <a:t>Evan: Data collection (CDC API bonus support), write pseudo-code where needed</a:t>
             </a:r>
           </a:p>
           <a:p>

</xml_diff>

<commit_message>
5/11/2023: Update project notes with 'due by Monday' actions. Split group into two teams for these actions.
</commit_message>
<xml_diff>
--- a/Project notes.pptx
+++ b/Project notes.pptx
@@ -5,7 +5,7 @@
     <p:sldMasterId id="2147483696" r:id="rId1"/>
   </p:sldMasterIdLst>
   <p:notesMasterIdLst>
-    <p:notesMasterId r:id="rId11"/>
+    <p:notesMasterId r:id="rId13"/>
   </p:notesMasterIdLst>
   <p:sldIdLst>
     <p:sldId id="256" r:id="rId2"/>
@@ -17,6 +17,8 @@
     <p:sldId id="264" r:id="rId8"/>
     <p:sldId id="265" r:id="rId9"/>
     <p:sldId id="266" r:id="rId10"/>
+    <p:sldId id="268" r:id="rId11"/>
+    <p:sldId id="267" r:id="rId12"/>
   </p:sldIdLst>
   <p:sldSz cx="12192000" cy="6858000"/>
   <p:notesSz cx="6858000" cy="9144000"/>
@@ -205,7 +207,7 @@
           <a:p>
             <a:fld id="{C17E1E4B-2B0B-4F18-825C-E1CF4409D9D0}" type="datetimeFigureOut">
               <a:rPr lang="en-US" smtClean="0"/>
-              <a:t>5/10/2023</a:t>
+              <a:t>5/11/2023</a:t>
             </a:fld>
             <a:endParaRPr lang="en-US"/>
           </a:p>
@@ -980,7 +982,7 @@
           <a:p>
             <a:fld id="{925EA6E8-F76E-44A9-9BED-4361634B60BD}" type="datetimeFigureOut">
               <a:rPr lang="en-US" smtClean="0"/>
-              <a:t>5/10/2023</a:t>
+              <a:t>5/11/2023</a:t>
             </a:fld>
             <a:endParaRPr lang="en-US"/>
           </a:p>
@@ -1188,7 +1190,7 @@
           <a:p>
             <a:fld id="{925EA6E8-F76E-44A9-9BED-4361634B60BD}" type="datetimeFigureOut">
               <a:rPr lang="en-US" smtClean="0"/>
-              <a:t>5/10/2023</a:t>
+              <a:t>5/11/2023</a:t>
             </a:fld>
             <a:endParaRPr lang="en-US"/>
           </a:p>
@@ -1444,7 +1446,7 @@
           <a:p>
             <a:fld id="{925EA6E8-F76E-44A9-9BED-4361634B60BD}" type="datetimeFigureOut">
               <a:rPr lang="en-US" smtClean="0"/>
-              <a:t>5/10/2023</a:t>
+              <a:t>5/11/2023</a:t>
             </a:fld>
             <a:endParaRPr lang="en-US"/>
           </a:p>
@@ -1618,7 +1620,7 @@
           <a:p>
             <a:fld id="{925EA6E8-F76E-44A9-9BED-4361634B60BD}" type="datetimeFigureOut">
               <a:rPr lang="en-US" smtClean="0"/>
-              <a:t>5/10/2023</a:t>
+              <a:t>5/11/2023</a:t>
             </a:fld>
             <a:endParaRPr lang="en-US"/>
           </a:p>
@@ -1961,7 +1963,7 @@
           <a:p>
             <a:fld id="{925EA6E8-F76E-44A9-9BED-4361634B60BD}" type="datetimeFigureOut">
               <a:rPr lang="en-US" smtClean="0"/>
-              <a:t>5/10/2023</a:t>
+              <a:t>5/11/2023</a:t>
             </a:fld>
             <a:endParaRPr lang="en-US"/>
           </a:p>
@@ -2236,7 +2238,7 @@
           <a:p>
             <a:fld id="{925EA6E8-F76E-44A9-9BED-4361634B60BD}" type="datetimeFigureOut">
               <a:rPr lang="en-US" smtClean="0"/>
-              <a:t>5/10/2023</a:t>
+              <a:t>5/11/2023</a:t>
             </a:fld>
             <a:endParaRPr lang="en-US"/>
           </a:p>
@@ -2615,7 +2617,7 @@
           <a:p>
             <a:fld id="{925EA6E8-F76E-44A9-9BED-4361634B60BD}" type="datetimeFigureOut">
               <a:rPr lang="en-US" smtClean="0"/>
-              <a:t>5/10/2023</a:t>
+              <a:t>5/11/2023</a:t>
             </a:fld>
             <a:endParaRPr lang="en-US"/>
           </a:p>
@@ -2733,7 +2735,7 @@
           <a:p>
             <a:fld id="{925EA6E8-F76E-44A9-9BED-4361634B60BD}" type="datetimeFigureOut">
               <a:rPr lang="en-US" smtClean="0"/>
-              <a:t>5/10/2023</a:t>
+              <a:t>5/11/2023</a:t>
             </a:fld>
             <a:endParaRPr lang="en-US"/>
           </a:p>
@@ -2904,7 +2906,7 @@
           <a:p>
             <a:fld id="{925EA6E8-F76E-44A9-9BED-4361634B60BD}" type="datetimeFigureOut">
               <a:rPr lang="en-US" smtClean="0"/>
-              <a:t>5/10/2023</a:t>
+              <a:t>5/11/2023</a:t>
             </a:fld>
             <a:endParaRPr lang="en-US"/>
           </a:p>
@@ -3258,7 +3260,7 @@
           <a:p>
             <a:fld id="{925EA6E8-F76E-44A9-9BED-4361634B60BD}" type="datetimeFigureOut">
               <a:rPr lang="en-US" smtClean="0"/>
-              <a:t>5/10/2023</a:t>
+              <a:t>5/11/2023</a:t>
             </a:fld>
             <a:endParaRPr lang="en-US"/>
           </a:p>
@@ -3640,7 +3642,7 @@
           <a:p>
             <a:fld id="{925EA6E8-F76E-44A9-9BED-4361634B60BD}" type="datetimeFigureOut">
               <a:rPr lang="en-US" smtClean="0"/>
-              <a:t>5/10/2023</a:t>
+              <a:t>5/11/2023</a:t>
             </a:fld>
             <a:endParaRPr lang="en-US"/>
           </a:p>
@@ -3927,7 +3929,7 @@
           <a:p>
             <a:fld id="{925EA6E8-F76E-44A9-9BED-4361634B60BD}" type="datetimeFigureOut">
               <a:rPr lang="en-US" smtClean="0"/>
-              <a:t>5/10/2023</a:t>
+              <a:t>5/11/2023</a:t>
             </a:fld>
             <a:endParaRPr lang="en-US"/>
           </a:p>
@@ -4526,6 +4528,325 @@
 </p:sld>
 </file>
 
+<file path=ppt/slides/slide10.xml><?xml version="1.0" encoding="utf-8"?>
+<p:sld xmlns:a="http://schemas.openxmlformats.org/drawingml/2006/main" xmlns:r="http://schemas.openxmlformats.org/officeDocument/2006/relationships" xmlns:p="http://schemas.openxmlformats.org/presentationml/2006/main">
+  <p:cSld>
+    <p:spTree>
+      <p:nvGrpSpPr>
+        <p:cNvPr id="1" name=""/>
+        <p:cNvGrpSpPr/>
+        <p:nvPr/>
+      </p:nvGrpSpPr>
+      <p:grpSpPr>
+        <a:xfrm>
+          <a:off x="0" y="0"/>
+          <a:ext cx="0" cy="0"/>
+          <a:chOff x="0" y="0"/>
+          <a:chExt cx="0" cy="0"/>
+        </a:xfrm>
+      </p:grpSpPr>
+      <p:sp>
+        <p:nvSpPr>
+          <p:cNvPr id="2" name="Title 1">
+            <a:extLst>
+              <a:ext uri="{FF2B5EF4-FFF2-40B4-BE49-F238E27FC236}">
+                <a16:creationId xmlns:a16="http://schemas.microsoft.com/office/drawing/2014/main" id="{94456D86-A2FB-D487-C5E7-F7D55A1C70AA}"/>
+              </a:ext>
+            </a:extLst>
+          </p:cNvPr>
+          <p:cNvSpPr>
+            <a:spLocks noGrp="1"/>
+          </p:cNvSpPr>
+          <p:nvPr>
+            <p:ph type="title"/>
+          </p:nvPr>
+        </p:nvSpPr>
+        <p:spPr>
+          <a:xfrm>
+            <a:off x="1097280" y="286603"/>
+            <a:ext cx="10058400" cy="1002447"/>
+          </a:xfrm>
+        </p:spPr>
+        <p:txBody>
+          <a:bodyPr/>
+          <a:lstStyle/>
+          <a:p>
+            <a:r>
+              <a:rPr lang="en-US" dirty="0"/>
+              <a:t>Tasks due by EOD Monday</a:t>
+            </a:r>
+          </a:p>
+        </p:txBody>
+      </p:sp>
+      <p:sp>
+        <p:nvSpPr>
+          <p:cNvPr id="3" name="Content Placeholder 2">
+            <a:extLst>
+              <a:ext uri="{FF2B5EF4-FFF2-40B4-BE49-F238E27FC236}">
+                <a16:creationId xmlns:a16="http://schemas.microsoft.com/office/drawing/2014/main" id="{5E3E40F8-E566-7F42-1FBB-745782052EF2}"/>
+              </a:ext>
+            </a:extLst>
+          </p:cNvPr>
+          <p:cNvSpPr>
+            <a:spLocks noGrp="1"/>
+          </p:cNvSpPr>
+          <p:nvPr>
+            <p:ph idx="1"/>
+          </p:nvPr>
+        </p:nvSpPr>
+        <p:spPr>
+          <a:xfrm>
+            <a:off x="1097280" y="1845734"/>
+            <a:ext cx="10058400" cy="4256616"/>
+          </a:xfrm>
+        </p:spPr>
+        <p:txBody>
+          <a:bodyPr>
+            <a:normAutofit fontScale="92500" lnSpcReduction="10000"/>
+          </a:bodyPr>
+          <a:lstStyle/>
+          <a:p>
+            <a:r>
+              <a:rPr lang="en-US" dirty="0"/>
+              <a:t>Split presentation deck into six parts: each group member to speak during presentation</a:t>
+            </a:r>
+          </a:p>
+          <a:p>
+            <a:pPr lvl="1"/>
+            <a:r>
+              <a:rPr lang="en-US" dirty="0"/>
+              <a:t>Kendal and Joanna (visuals team): Review Greg’s dataset, plan all output visuals, request data needed from the data collection/clean team.</a:t>
+            </a:r>
+          </a:p>
+          <a:p>
+            <a:pPr lvl="1"/>
+            <a:endParaRPr lang="en-US" dirty="0"/>
+          </a:p>
+          <a:p>
+            <a:pPr lvl="1"/>
+            <a:r>
+              <a:rPr lang="en-US" dirty="0"/>
+              <a:t>Aaliyah/Sarah/Evan (data team): Import and clean data from the EARN workbook. Provide output </a:t>
+            </a:r>
+            <a:r>
+              <a:rPr lang="en-US" dirty="0" err="1"/>
+              <a:t>dataframe</a:t>
+            </a:r>
+            <a:r>
+              <a:rPr lang="en-US" dirty="0"/>
+              <a:t> that will be able to compare % federal funding used per state.</a:t>
+            </a:r>
+          </a:p>
+          <a:p>
+            <a:pPr lvl="1"/>
+            <a:endParaRPr lang="en-US" dirty="0"/>
+          </a:p>
+          <a:p>
+            <a:pPr lvl="1"/>
+            <a:r>
+              <a:rPr lang="en-US" dirty="0"/>
+              <a:t>Evan: Merge Greg’s branch and confirm his worked captured. More pseudo code </a:t>
+            </a:r>
+          </a:p>
+          <a:p>
+            <a:pPr lvl="1"/>
+            <a:endParaRPr lang="en-US" dirty="0"/>
+          </a:p>
+          <a:p>
+            <a:pPr lvl="1"/>
+            <a:r>
+              <a:rPr lang="en-US" dirty="0"/>
+              <a:t>Greg: </a:t>
+            </a:r>
+            <a:r>
+              <a:rPr lang="en-US" sz="1800" dirty="0"/>
+              <a:t>Add comments into your codework. Source where applicable, otherwise succinct explanations for each cell where ambiguous. Support others as available.</a:t>
+            </a:r>
+          </a:p>
+          <a:p>
+            <a:pPr lvl="1"/>
+            <a:endParaRPr lang="en-US" dirty="0"/>
+          </a:p>
+          <a:p>
+            <a:pPr lvl="1"/>
+            <a:r>
+              <a:rPr lang="en-US" dirty="0"/>
+              <a:t>Aaliyah: Create slide that briefly explains our measured inputs (% federal funding per state) and measured outputs (% population vaccinated per state and any other outputs built by data viz team). </a:t>
+            </a:r>
+          </a:p>
+          <a:p>
+            <a:pPr lvl="2"/>
+            <a:r>
+              <a:rPr lang="en-US" dirty="0"/>
+              <a:t>Include a few sentences describing scope of data, data constraints and any assumptions made during analysis. This is more of a team effort due to each person working on their chunks.</a:t>
+            </a:r>
+          </a:p>
+          <a:p>
+            <a:pPr lvl="1"/>
+            <a:endParaRPr lang="en-US" dirty="0"/>
+          </a:p>
+          <a:p>
+            <a:pPr lvl="1"/>
+            <a:endParaRPr lang="en-US" dirty="0"/>
+          </a:p>
+          <a:p>
+            <a:endParaRPr lang="en-US" dirty="0"/>
+          </a:p>
+        </p:txBody>
+      </p:sp>
+    </p:spTree>
+    <p:extLst>
+      <p:ext uri="{BB962C8B-B14F-4D97-AF65-F5344CB8AC3E}">
+        <p14:creationId xmlns:p14="http://schemas.microsoft.com/office/powerpoint/2010/main" val="2340939891"/>
+      </p:ext>
+    </p:extLst>
+  </p:cSld>
+  <p:clrMapOvr>
+    <a:masterClrMapping/>
+  </p:clrMapOvr>
+</p:sld>
+</file>
+
+<file path=ppt/slides/slide11.xml><?xml version="1.0" encoding="utf-8"?>
+<p:sld xmlns:a="http://schemas.openxmlformats.org/drawingml/2006/main" xmlns:r="http://schemas.openxmlformats.org/officeDocument/2006/relationships" xmlns:p="http://schemas.openxmlformats.org/presentationml/2006/main">
+  <p:cSld>
+    <p:spTree>
+      <p:nvGrpSpPr>
+        <p:cNvPr id="1" name=""/>
+        <p:cNvGrpSpPr/>
+        <p:nvPr/>
+      </p:nvGrpSpPr>
+      <p:grpSpPr>
+        <a:xfrm>
+          <a:off x="0" y="0"/>
+          <a:ext cx="0" cy="0"/>
+          <a:chOff x="0" y="0"/>
+          <a:chExt cx="0" cy="0"/>
+        </a:xfrm>
+      </p:grpSpPr>
+      <p:sp>
+        <p:nvSpPr>
+          <p:cNvPr id="2" name="Title 1">
+            <a:extLst>
+              <a:ext uri="{FF2B5EF4-FFF2-40B4-BE49-F238E27FC236}">
+                <a16:creationId xmlns:a16="http://schemas.microsoft.com/office/drawing/2014/main" id="{0F76BC68-59BA-7245-56F2-03583BE957DA}"/>
+              </a:ext>
+            </a:extLst>
+          </p:cNvPr>
+          <p:cNvSpPr>
+            <a:spLocks noGrp="1"/>
+          </p:cNvSpPr>
+          <p:nvPr>
+            <p:ph type="title"/>
+          </p:nvPr>
+        </p:nvSpPr>
+        <p:spPr/>
+        <p:txBody>
+          <a:bodyPr/>
+          <a:lstStyle/>
+          <a:p>
+            <a:r>
+              <a:rPr lang="en-US" dirty="0"/>
+              <a:t>Hypothesis testing notes</a:t>
+            </a:r>
+          </a:p>
+        </p:txBody>
+      </p:sp>
+      <p:sp>
+        <p:nvSpPr>
+          <p:cNvPr id="3" name="Content Placeholder 2">
+            <a:extLst>
+              <a:ext uri="{FF2B5EF4-FFF2-40B4-BE49-F238E27FC236}">
+                <a16:creationId xmlns:a16="http://schemas.microsoft.com/office/drawing/2014/main" id="{55FB0969-E072-711B-3A37-B7BD4E0752D3}"/>
+              </a:ext>
+            </a:extLst>
+          </p:cNvPr>
+          <p:cNvSpPr>
+            <a:spLocks noGrp="1"/>
+          </p:cNvSpPr>
+          <p:nvPr>
+            <p:ph idx="1"/>
+          </p:nvPr>
+        </p:nvSpPr>
+        <p:spPr/>
+        <p:txBody>
+          <a:bodyPr/>
+          <a:lstStyle/>
+          <a:p>
+            <a:r>
+              <a:rPr lang="en-US" dirty="0"/>
+              <a:t>- Can we statistically test grant spending input vs. vaccine distribution rate output?</a:t>
+            </a:r>
+          </a:p>
+          <a:p>
+            <a:pPr lvl="1"/>
+            <a:r>
+              <a:rPr lang="en-US" dirty="0"/>
+              <a:t>If so, how? T-test? ANOVA? How would you even test normality?</a:t>
+            </a:r>
+          </a:p>
+          <a:p>
+            <a:pPr lvl="1"/>
+            <a:endParaRPr lang="en-US" dirty="0"/>
+          </a:p>
+          <a:p>
+            <a:pPr lvl="1"/>
+            <a:r>
+              <a:rPr lang="en-US" dirty="0"/>
+              <a:t>Output will need to be SUM of vaccines distributed at the end of our time range, per state.</a:t>
+            </a:r>
+          </a:p>
+          <a:p>
+            <a:pPr lvl="1"/>
+            <a:r>
+              <a:rPr lang="en-US" dirty="0"/>
+              <a:t>Variable input is % of federal funding used (at end of time range). And Amount of $ spend and Count of projects (both per state). </a:t>
+            </a:r>
+          </a:p>
+          <a:p>
+            <a:pPr lvl="1"/>
+            <a:r>
+              <a:rPr lang="en-US" dirty="0"/>
+              <a:t>Measured output is % of population vaccinated (1</a:t>
+            </a:r>
+            <a:r>
+              <a:rPr lang="en-US" baseline="30000" dirty="0"/>
+              <a:t>st</a:t>
+            </a:r>
+            <a:r>
+              <a:rPr lang="en-US" dirty="0"/>
+              <a:t> dose) at end of time range, per state.</a:t>
+            </a:r>
+          </a:p>
+          <a:p>
+            <a:pPr lvl="2"/>
+            <a:r>
+              <a:rPr lang="en-US" dirty="0"/>
+              <a:t>Constraints and assumptions for dataset: distance any given vaccine has to travel to get to end site. Method of transportation and how that may or may not affect vaccination rate. Political leanings! Do people think the vaccine carries 5g robots in the given state? Etc. etc. We can’t measure these variables on this scope and so our data analysis is HIGH LEVEL only. We need to showcase the methods we have learned in the class thus far.</a:t>
+            </a:r>
+          </a:p>
+          <a:p>
+            <a:pPr lvl="2"/>
+            <a:r>
+              <a:rPr lang="en-US" dirty="0"/>
+              <a:t>Line correlation if able.</a:t>
+            </a:r>
+          </a:p>
+        </p:txBody>
+      </p:sp>
+    </p:spTree>
+    <p:extLst>
+      <p:ext uri="{BB962C8B-B14F-4D97-AF65-F5344CB8AC3E}">
+        <p14:creationId xmlns:p14="http://schemas.microsoft.com/office/powerpoint/2010/main" val="3570840541"/>
+      </p:ext>
+    </p:extLst>
+  </p:cSld>
+  <p:clrMapOvr>
+    <a:masterClrMapping/>
+  </p:clrMapOvr>
+</p:sld>
+</file>
+
 <file path=ppt/slides/slide2.xml><?xml version="1.0" encoding="utf-8"?>
 <p:sld xmlns:a="http://schemas.openxmlformats.org/drawingml/2006/main" xmlns:r="http://schemas.openxmlformats.org/officeDocument/2006/relationships" xmlns:p="http://schemas.openxmlformats.org/presentationml/2006/main">
   <p:cSld>
@@ -5761,11 +6082,14 @@
         <p:spPr>
           <a:xfrm>
             <a:off x="101600" y="815976"/>
-            <a:ext cx="12090400" cy="5746749"/>
+            <a:ext cx="12090400" cy="6042024"/>
           </a:xfrm>
           <a:prstGeom prst="rect">
             <a:avLst/>
           </a:prstGeom>
+          <a:solidFill>
+            <a:schemeClr val="bg1"/>
+          </a:solidFill>
         </p:spPr>
         <p:txBody>
           <a:bodyPr/>
@@ -6022,8 +6346,30 @@
               <a:buChar char="•"/>
             </a:pPr>
             <a:r>
-              <a:rPr lang="en-US" dirty="0"/>
+              <a:rPr lang="en-US" sz="1800" dirty="0"/>
               <a:t>Use Pandas to clean and format your dataset or datasets.</a:t>
+            </a:r>
+          </a:p>
+          <a:p>
+            <a:pPr lvl="1">
+              <a:buClrTx/>
+              <a:buFont typeface="Arial" panose="020B0604020202020204" pitchFamily="34" charset="0"/>
+              <a:buChar char="•"/>
+            </a:pPr>
+            <a:r>
+              <a:rPr lang="en-US" sz="1600" dirty="0"/>
+              <a:t>Greg did this in his Google_vac_data. </a:t>
+            </a:r>
+          </a:p>
+          <a:p>
+            <a:pPr lvl="1">
+              <a:buClrTx/>
+              <a:buFont typeface="Arial" panose="020B0604020202020204" pitchFamily="34" charset="0"/>
+              <a:buChar char="•"/>
+            </a:pPr>
+            <a:r>
+              <a:rPr lang="en-US" sz="1600" dirty="0"/>
+              <a:t>#TODO: Use similar methods in the EARN data.</a:t>
             </a:r>
           </a:p>
           <a:p>
@@ -6033,8 +6379,19 @@
               <a:buChar char="•"/>
             </a:pPr>
             <a:r>
-              <a:rPr lang="en-US" dirty="0"/>
+              <a:rPr lang="en-US" sz="1800" dirty="0"/>
               <a:t>Create a Jupyter notebook describing the data exploration and cleanup process.</a:t>
+            </a:r>
+          </a:p>
+          <a:p>
+            <a:pPr lvl="1">
+              <a:buClrTx/>
+              <a:buFont typeface="Arial" panose="020B0604020202020204" pitchFamily="34" charset="0"/>
+              <a:buChar char="•"/>
+            </a:pPr>
+            <a:r>
+              <a:rPr lang="en-US" sz="1600" dirty="0"/>
+              <a:t>#TODO: Add comments into Greg’s code. Source where applicable, otherwise succinct explanations for each cell where ambiguous.</a:t>
             </a:r>
           </a:p>
           <a:p>
@@ -6044,8 +6401,19 @@
               <a:buChar char="•"/>
             </a:pPr>
             <a:r>
-              <a:rPr lang="en-US" dirty="0"/>
+              <a:rPr lang="en-US" sz="1800" dirty="0"/>
               <a:t>Create a Jupyter notebook illustrating the final data analysis.</a:t>
+            </a:r>
+          </a:p>
+          <a:p>
+            <a:pPr lvl="1">
+              <a:buClrTx/>
+              <a:buFont typeface="Arial" panose="020B0604020202020204" pitchFamily="34" charset="0"/>
+              <a:buChar char="•"/>
+            </a:pPr>
+            <a:r>
+              <a:rPr lang="en-US" sz="1600" dirty="0"/>
+              <a:t>#TODO: Kendal and Joanna</a:t>
             </a:r>
           </a:p>
           <a:p>
@@ -6055,8 +6423,19 @@
               <a:buChar char="•"/>
             </a:pPr>
             <a:r>
-              <a:rPr lang="en-US" dirty="0"/>
+              <a:rPr lang="en-US" sz="1800" dirty="0"/>
               <a:t>Use Matplotlib to create 6 to 8 visualizations of your data</a:t>
+            </a:r>
+          </a:p>
+          <a:p>
+            <a:pPr lvl="1">
+              <a:buClrTx/>
+              <a:buFont typeface="Arial" panose="020B0604020202020204" pitchFamily="34" charset="0"/>
+              <a:buChar char="•"/>
+            </a:pPr>
+            <a:r>
+              <a:rPr lang="en-US" sz="1600" dirty="0"/>
+              <a:t>#TODO: Team/Kendal and Joanna</a:t>
             </a:r>
           </a:p>
           <a:p>
@@ -6066,8 +6445,19 @@
               <a:buChar char="•"/>
             </a:pPr>
             <a:r>
-              <a:rPr lang="en-US" dirty="0"/>
+              <a:rPr lang="en-US" sz="1800" dirty="0"/>
               <a:t>(ideally, at least 2 visualizations per “question” that you ask your data).</a:t>
+            </a:r>
+          </a:p>
+          <a:p>
+            <a:pPr lvl="1">
+              <a:buClrTx/>
+              <a:buFont typeface="Arial" panose="020B0604020202020204" pitchFamily="34" charset="0"/>
+              <a:buChar char="•"/>
+            </a:pPr>
+            <a:r>
+              <a:rPr lang="en-US" sz="1600" dirty="0"/>
+              <a:t>...</a:t>
             </a:r>
           </a:p>
           <a:p>
@@ -6077,8 +6467,19 @@
               <a:buChar char="•"/>
             </a:pPr>
             <a:r>
-              <a:rPr lang="en-US" dirty="0"/>
-              <a:t>Save PNG images of your visualizations to distribute to the class and instructional team—and for</a:t>
+              <a:rPr lang="en-US" sz="1800" dirty="0"/>
+              <a:t>Save PNG images of your visualizations to distribute to the class and instructional team—and for inclusion in your presentation.</a:t>
+            </a:r>
+          </a:p>
+          <a:p>
+            <a:pPr lvl="1">
+              <a:buClrTx/>
+              <a:buFont typeface="Arial" panose="020B0604020202020204" pitchFamily="34" charset="0"/>
+              <a:buChar char="•"/>
+            </a:pPr>
+            <a:r>
+              <a:rPr lang="en-US" sz="1600" dirty="0"/>
+              <a:t>Save plots as variables and save into “Resources” folder.</a:t>
             </a:r>
           </a:p>
           <a:p>
@@ -6088,8 +6489,8 @@
               <a:buChar char="•"/>
             </a:pPr>
             <a:r>
-              <a:rPr lang="en-US" dirty="0"/>
-              <a:t>inclusion in your presentation.</a:t>
+              <a:rPr lang="en-US" sz="1800" dirty="0"/>
+              <a:t>Create a write-up summarizing your major findings. This should include a heading for each “question” that you asked your data as well as a short description of your findings and any relevant plots.</a:t>
             </a:r>
           </a:p>
           <a:p>
@@ -6099,30 +6500,20 @@
               <a:buChar char="•"/>
             </a:pPr>
             <a:r>
-              <a:rPr lang="en-US" dirty="0"/>
-              <a:t>Create a write-up summarizing your major findings. This should include a heading for each “question”</a:t>
-            </a:r>
-          </a:p>
-          <a:p>
-            <a:pPr>
+              <a:rPr lang="en-US" sz="1800" dirty="0"/>
+              <a:t>Bonus Use at least one API—if you can find one with data pertinent to your primary research questions.</a:t>
+            </a:r>
+            <a:endParaRPr lang="en-US" sz="1600" dirty="0"/>
+          </a:p>
+          <a:p>
+            <a:pPr lvl="1">
               <a:buClrTx/>
               <a:buFont typeface="Arial" panose="020B0604020202020204" pitchFamily="34" charset="0"/>
               <a:buChar char="•"/>
             </a:pPr>
             <a:r>
-              <a:rPr lang="en-US" dirty="0"/>
-              <a:t>that you asked your data as well as a short description of your findings and any relevant plots.</a:t>
-            </a:r>
-          </a:p>
-          <a:p>
-            <a:pPr>
-              <a:buClrTx/>
-              <a:buFont typeface="Arial" panose="020B0604020202020204" pitchFamily="34" charset="0"/>
-              <a:buChar char="•"/>
-            </a:pPr>
-            <a:r>
-              <a:rPr lang="en-US" dirty="0"/>
-              <a:t>Bonus Use at least one API—if you can find one with data pertinent to your primary research questions.</a:t>
+              <a:rPr lang="en-US" sz="1600" dirty="0"/>
+              <a:t>#TODO: Take a csv table or columns and do the same using an API.</a:t>
             </a:r>
           </a:p>
         </p:txBody>
@@ -6816,7 +7207,7 @@
             <a:pPr lvl="1"/>
             <a:r>
               <a:rPr lang="en-US" dirty="0"/>
-              <a:t>Greg: Debug, technical issues, overall support, CDC API (where able/if has time to set up)</a:t>
+              <a:t>Greg: Google data collection and cleaning, Debug, technical issues, overall support, CDC API (where able/if has time to set up)</a:t>
             </a:r>
           </a:p>
           <a:p>

</xml_diff>

<commit_message>
5/15/2023: Added slides to be populated for the group presentation based on the ruberic provided by the edX team.
</commit_message>
<xml_diff>
--- a/Project notes.pptx
+++ b/Project notes.pptx
@@ -5,7 +5,7 @@
     <p:sldMasterId id="2147483696" r:id="rId1"/>
   </p:sldMasterIdLst>
   <p:notesMasterIdLst>
-    <p:notesMasterId r:id="rId13"/>
+    <p:notesMasterId r:id="rId20"/>
   </p:notesMasterIdLst>
   <p:sldIdLst>
     <p:sldId id="256" r:id="rId2"/>
@@ -13,12 +13,19 @@
     <p:sldId id="257" r:id="rId4"/>
     <p:sldId id="259" r:id="rId5"/>
     <p:sldId id="261" r:id="rId6"/>
-    <p:sldId id="263" r:id="rId7"/>
-    <p:sldId id="264" r:id="rId8"/>
-    <p:sldId id="265" r:id="rId9"/>
-    <p:sldId id="266" r:id="rId10"/>
-    <p:sldId id="268" r:id="rId11"/>
-    <p:sldId id="267" r:id="rId12"/>
+    <p:sldId id="265" r:id="rId7"/>
+    <p:sldId id="266" r:id="rId8"/>
+    <p:sldId id="268" r:id="rId9"/>
+    <p:sldId id="267" r:id="rId10"/>
+    <p:sldId id="264" r:id="rId11"/>
+    <p:sldId id="270" r:id="rId12"/>
+    <p:sldId id="263" r:id="rId13"/>
+    <p:sldId id="269" r:id="rId14"/>
+    <p:sldId id="271" r:id="rId15"/>
+    <p:sldId id="272" r:id="rId16"/>
+    <p:sldId id="273" r:id="rId17"/>
+    <p:sldId id="274" r:id="rId18"/>
+    <p:sldId id="275" r:id="rId19"/>
   </p:sldIdLst>
   <p:sldSz cx="12192000" cy="6858000"/>
   <p:notesSz cx="6858000" cy="9144000"/>
@@ -207,7 +214,7 @@
           <a:p>
             <a:fld id="{C17E1E4B-2B0B-4F18-825C-E1CF4409D9D0}" type="datetimeFigureOut">
               <a:rPr lang="en-US" smtClean="0"/>
-              <a:t>5/11/2023</a:t>
+              <a:t>5/15/2023</a:t>
             </a:fld>
             <a:endParaRPr lang="en-US"/>
           </a:p>
@@ -737,7 +744,7 @@
           <a:p>
             <a:fld id="{F1D59B1D-B0BC-4C10-A0E9-E068C37A006F}" type="slidenum">
               <a:rPr lang="en-US" smtClean="0"/>
-              <a:t>8</a:t>
+              <a:t>6</a:t>
             </a:fld>
             <a:endParaRPr lang="en-US"/>
           </a:p>
@@ -982,7 +989,7 @@
           <a:p>
             <a:fld id="{925EA6E8-F76E-44A9-9BED-4361634B60BD}" type="datetimeFigureOut">
               <a:rPr lang="en-US" smtClean="0"/>
-              <a:t>5/11/2023</a:t>
+              <a:t>5/15/2023</a:t>
             </a:fld>
             <a:endParaRPr lang="en-US"/>
           </a:p>
@@ -1190,7 +1197,7 @@
           <a:p>
             <a:fld id="{925EA6E8-F76E-44A9-9BED-4361634B60BD}" type="datetimeFigureOut">
               <a:rPr lang="en-US" smtClean="0"/>
-              <a:t>5/11/2023</a:t>
+              <a:t>5/15/2023</a:t>
             </a:fld>
             <a:endParaRPr lang="en-US"/>
           </a:p>
@@ -1446,7 +1453,7 @@
           <a:p>
             <a:fld id="{925EA6E8-F76E-44A9-9BED-4361634B60BD}" type="datetimeFigureOut">
               <a:rPr lang="en-US" smtClean="0"/>
-              <a:t>5/11/2023</a:t>
+              <a:t>5/15/2023</a:t>
             </a:fld>
             <a:endParaRPr lang="en-US"/>
           </a:p>
@@ -1620,7 +1627,7 @@
           <a:p>
             <a:fld id="{925EA6E8-F76E-44A9-9BED-4361634B60BD}" type="datetimeFigureOut">
               <a:rPr lang="en-US" smtClean="0"/>
-              <a:t>5/11/2023</a:t>
+              <a:t>5/15/2023</a:t>
             </a:fld>
             <a:endParaRPr lang="en-US"/>
           </a:p>
@@ -1963,7 +1970,7 @@
           <a:p>
             <a:fld id="{925EA6E8-F76E-44A9-9BED-4361634B60BD}" type="datetimeFigureOut">
               <a:rPr lang="en-US" smtClean="0"/>
-              <a:t>5/11/2023</a:t>
+              <a:t>5/15/2023</a:t>
             </a:fld>
             <a:endParaRPr lang="en-US"/>
           </a:p>
@@ -2238,7 +2245,7 @@
           <a:p>
             <a:fld id="{925EA6E8-F76E-44A9-9BED-4361634B60BD}" type="datetimeFigureOut">
               <a:rPr lang="en-US" smtClean="0"/>
-              <a:t>5/11/2023</a:t>
+              <a:t>5/15/2023</a:t>
             </a:fld>
             <a:endParaRPr lang="en-US"/>
           </a:p>
@@ -2617,7 +2624,7 @@
           <a:p>
             <a:fld id="{925EA6E8-F76E-44A9-9BED-4361634B60BD}" type="datetimeFigureOut">
               <a:rPr lang="en-US" smtClean="0"/>
-              <a:t>5/11/2023</a:t>
+              <a:t>5/15/2023</a:t>
             </a:fld>
             <a:endParaRPr lang="en-US"/>
           </a:p>
@@ -2735,7 +2742,7 @@
           <a:p>
             <a:fld id="{925EA6E8-F76E-44A9-9BED-4361634B60BD}" type="datetimeFigureOut">
               <a:rPr lang="en-US" smtClean="0"/>
-              <a:t>5/11/2023</a:t>
+              <a:t>5/15/2023</a:t>
             </a:fld>
             <a:endParaRPr lang="en-US"/>
           </a:p>
@@ -2906,7 +2913,7 @@
           <a:p>
             <a:fld id="{925EA6E8-F76E-44A9-9BED-4361634B60BD}" type="datetimeFigureOut">
               <a:rPr lang="en-US" smtClean="0"/>
-              <a:t>5/11/2023</a:t>
+              <a:t>5/15/2023</a:t>
             </a:fld>
             <a:endParaRPr lang="en-US"/>
           </a:p>
@@ -3260,7 +3267,7 @@
           <a:p>
             <a:fld id="{925EA6E8-F76E-44A9-9BED-4361634B60BD}" type="datetimeFigureOut">
               <a:rPr lang="en-US" smtClean="0"/>
-              <a:t>5/11/2023</a:t>
+              <a:t>5/15/2023</a:t>
             </a:fld>
             <a:endParaRPr lang="en-US"/>
           </a:p>
@@ -3642,7 +3649,7 @@
           <a:p>
             <a:fld id="{925EA6E8-F76E-44A9-9BED-4361634B60BD}" type="datetimeFigureOut">
               <a:rPr lang="en-US" smtClean="0"/>
-              <a:t>5/11/2023</a:t>
+              <a:t>5/15/2023</a:t>
             </a:fld>
             <a:endParaRPr lang="en-US"/>
           </a:p>
@@ -3929,7 +3936,7 @@
           <a:p>
             <a:fld id="{925EA6E8-F76E-44A9-9BED-4361634B60BD}" type="datetimeFigureOut">
               <a:rPr lang="en-US" smtClean="0"/>
-              <a:t>5/11/2023</a:t>
+              <a:t>5/15/2023</a:t>
             </a:fld>
             <a:endParaRPr lang="en-US"/>
           </a:p>
@@ -4547,1052 +4554,6 @@
       </p:grpSpPr>
       <p:sp>
         <p:nvSpPr>
-          <p:cNvPr id="2" name="Title 1">
-            <a:extLst>
-              <a:ext uri="{FF2B5EF4-FFF2-40B4-BE49-F238E27FC236}">
-                <a16:creationId xmlns:a16="http://schemas.microsoft.com/office/drawing/2014/main" id="{94456D86-A2FB-D487-C5E7-F7D55A1C70AA}"/>
-              </a:ext>
-            </a:extLst>
-          </p:cNvPr>
-          <p:cNvSpPr>
-            <a:spLocks noGrp="1"/>
-          </p:cNvSpPr>
-          <p:nvPr>
-            <p:ph type="title"/>
-          </p:nvPr>
-        </p:nvSpPr>
-        <p:spPr>
-          <a:xfrm>
-            <a:off x="1097280" y="286603"/>
-            <a:ext cx="10058400" cy="1002447"/>
-          </a:xfrm>
-        </p:spPr>
-        <p:txBody>
-          <a:bodyPr/>
-          <a:lstStyle/>
-          <a:p>
-            <a:r>
-              <a:rPr lang="en-US" dirty="0"/>
-              <a:t>Tasks due by EOD Monday</a:t>
-            </a:r>
-          </a:p>
-        </p:txBody>
-      </p:sp>
-      <p:sp>
-        <p:nvSpPr>
-          <p:cNvPr id="3" name="Content Placeholder 2">
-            <a:extLst>
-              <a:ext uri="{FF2B5EF4-FFF2-40B4-BE49-F238E27FC236}">
-                <a16:creationId xmlns:a16="http://schemas.microsoft.com/office/drawing/2014/main" id="{5E3E40F8-E566-7F42-1FBB-745782052EF2}"/>
-              </a:ext>
-            </a:extLst>
-          </p:cNvPr>
-          <p:cNvSpPr>
-            <a:spLocks noGrp="1"/>
-          </p:cNvSpPr>
-          <p:nvPr>
-            <p:ph idx="1"/>
-          </p:nvPr>
-        </p:nvSpPr>
-        <p:spPr>
-          <a:xfrm>
-            <a:off x="1097280" y="1845734"/>
-            <a:ext cx="10058400" cy="4256616"/>
-          </a:xfrm>
-        </p:spPr>
-        <p:txBody>
-          <a:bodyPr>
-            <a:normAutofit fontScale="92500" lnSpcReduction="10000"/>
-          </a:bodyPr>
-          <a:lstStyle/>
-          <a:p>
-            <a:r>
-              <a:rPr lang="en-US" dirty="0"/>
-              <a:t>Split presentation deck into six parts: each group member to speak during presentation</a:t>
-            </a:r>
-          </a:p>
-          <a:p>
-            <a:pPr lvl="1"/>
-            <a:r>
-              <a:rPr lang="en-US" dirty="0"/>
-              <a:t>Kendal and Joanna (visuals team): Review Greg’s dataset, plan all output visuals, request data needed from the data collection/clean team.</a:t>
-            </a:r>
-          </a:p>
-          <a:p>
-            <a:pPr lvl="1"/>
-            <a:endParaRPr lang="en-US" dirty="0"/>
-          </a:p>
-          <a:p>
-            <a:pPr lvl="1"/>
-            <a:r>
-              <a:rPr lang="en-US" dirty="0"/>
-              <a:t>Aaliyah/Sarah/Evan (data team): Import and clean data from the EARN workbook. Provide output </a:t>
-            </a:r>
-            <a:r>
-              <a:rPr lang="en-US" dirty="0" err="1"/>
-              <a:t>dataframe</a:t>
-            </a:r>
-            <a:r>
-              <a:rPr lang="en-US" dirty="0"/>
-              <a:t> that will be able to compare % federal funding used per state.</a:t>
-            </a:r>
-          </a:p>
-          <a:p>
-            <a:pPr lvl="1"/>
-            <a:endParaRPr lang="en-US" dirty="0"/>
-          </a:p>
-          <a:p>
-            <a:pPr lvl="1"/>
-            <a:r>
-              <a:rPr lang="en-US" dirty="0"/>
-              <a:t>Evan: Merge Greg’s branch and confirm his worked captured. More pseudo code </a:t>
-            </a:r>
-          </a:p>
-          <a:p>
-            <a:pPr lvl="1"/>
-            <a:endParaRPr lang="en-US" dirty="0"/>
-          </a:p>
-          <a:p>
-            <a:pPr lvl="1"/>
-            <a:r>
-              <a:rPr lang="en-US" dirty="0"/>
-              <a:t>Greg: </a:t>
-            </a:r>
-            <a:r>
-              <a:rPr lang="en-US" sz="1800" dirty="0"/>
-              <a:t>Add comments into your codework. Source where applicable, otherwise succinct explanations for each cell where ambiguous. Support others as available.</a:t>
-            </a:r>
-          </a:p>
-          <a:p>
-            <a:pPr lvl="1"/>
-            <a:endParaRPr lang="en-US" dirty="0"/>
-          </a:p>
-          <a:p>
-            <a:pPr lvl="1"/>
-            <a:r>
-              <a:rPr lang="en-US" dirty="0"/>
-              <a:t>Aaliyah: Create slide that briefly explains our measured inputs (% federal funding per state) and measured outputs (% population vaccinated per state and any other outputs built by data viz team). </a:t>
-            </a:r>
-          </a:p>
-          <a:p>
-            <a:pPr lvl="2"/>
-            <a:r>
-              <a:rPr lang="en-US" dirty="0"/>
-              <a:t>Include a few sentences describing scope of data, data constraints and any assumptions made during analysis. This is more of a team effort due to each person working on their chunks.</a:t>
-            </a:r>
-          </a:p>
-          <a:p>
-            <a:pPr lvl="1"/>
-            <a:endParaRPr lang="en-US" dirty="0"/>
-          </a:p>
-          <a:p>
-            <a:pPr lvl="1"/>
-            <a:endParaRPr lang="en-US" dirty="0"/>
-          </a:p>
-          <a:p>
-            <a:endParaRPr lang="en-US" dirty="0"/>
-          </a:p>
-        </p:txBody>
-      </p:sp>
-    </p:spTree>
-    <p:extLst>
-      <p:ext uri="{BB962C8B-B14F-4D97-AF65-F5344CB8AC3E}">
-        <p14:creationId xmlns:p14="http://schemas.microsoft.com/office/powerpoint/2010/main" val="2340939891"/>
-      </p:ext>
-    </p:extLst>
-  </p:cSld>
-  <p:clrMapOvr>
-    <a:masterClrMapping/>
-  </p:clrMapOvr>
-</p:sld>
-</file>
-
-<file path=ppt/slides/slide11.xml><?xml version="1.0" encoding="utf-8"?>
-<p:sld xmlns:a="http://schemas.openxmlformats.org/drawingml/2006/main" xmlns:r="http://schemas.openxmlformats.org/officeDocument/2006/relationships" xmlns:p="http://schemas.openxmlformats.org/presentationml/2006/main">
-  <p:cSld>
-    <p:spTree>
-      <p:nvGrpSpPr>
-        <p:cNvPr id="1" name=""/>
-        <p:cNvGrpSpPr/>
-        <p:nvPr/>
-      </p:nvGrpSpPr>
-      <p:grpSpPr>
-        <a:xfrm>
-          <a:off x="0" y="0"/>
-          <a:ext cx="0" cy="0"/>
-          <a:chOff x="0" y="0"/>
-          <a:chExt cx="0" cy="0"/>
-        </a:xfrm>
-      </p:grpSpPr>
-      <p:sp>
-        <p:nvSpPr>
-          <p:cNvPr id="2" name="Title 1">
-            <a:extLst>
-              <a:ext uri="{FF2B5EF4-FFF2-40B4-BE49-F238E27FC236}">
-                <a16:creationId xmlns:a16="http://schemas.microsoft.com/office/drawing/2014/main" id="{0F76BC68-59BA-7245-56F2-03583BE957DA}"/>
-              </a:ext>
-            </a:extLst>
-          </p:cNvPr>
-          <p:cNvSpPr>
-            <a:spLocks noGrp="1"/>
-          </p:cNvSpPr>
-          <p:nvPr>
-            <p:ph type="title"/>
-          </p:nvPr>
-        </p:nvSpPr>
-        <p:spPr/>
-        <p:txBody>
-          <a:bodyPr/>
-          <a:lstStyle/>
-          <a:p>
-            <a:r>
-              <a:rPr lang="en-US" dirty="0"/>
-              <a:t>Hypothesis testing notes</a:t>
-            </a:r>
-          </a:p>
-        </p:txBody>
-      </p:sp>
-      <p:sp>
-        <p:nvSpPr>
-          <p:cNvPr id="3" name="Content Placeholder 2">
-            <a:extLst>
-              <a:ext uri="{FF2B5EF4-FFF2-40B4-BE49-F238E27FC236}">
-                <a16:creationId xmlns:a16="http://schemas.microsoft.com/office/drawing/2014/main" id="{55FB0969-E072-711B-3A37-B7BD4E0752D3}"/>
-              </a:ext>
-            </a:extLst>
-          </p:cNvPr>
-          <p:cNvSpPr>
-            <a:spLocks noGrp="1"/>
-          </p:cNvSpPr>
-          <p:nvPr>
-            <p:ph idx="1"/>
-          </p:nvPr>
-        </p:nvSpPr>
-        <p:spPr/>
-        <p:txBody>
-          <a:bodyPr/>
-          <a:lstStyle/>
-          <a:p>
-            <a:r>
-              <a:rPr lang="en-US" dirty="0"/>
-              <a:t>- Can we statistically test grant spending input vs. vaccine distribution rate output?</a:t>
-            </a:r>
-          </a:p>
-          <a:p>
-            <a:pPr lvl="1"/>
-            <a:r>
-              <a:rPr lang="en-US" dirty="0"/>
-              <a:t>If so, how? T-test? ANOVA? How would you even test normality?</a:t>
-            </a:r>
-          </a:p>
-          <a:p>
-            <a:pPr lvl="1"/>
-            <a:endParaRPr lang="en-US" dirty="0"/>
-          </a:p>
-          <a:p>
-            <a:pPr lvl="1"/>
-            <a:r>
-              <a:rPr lang="en-US" dirty="0"/>
-              <a:t>Output will need to be SUM of vaccines distributed at the end of our time range, per state.</a:t>
-            </a:r>
-          </a:p>
-          <a:p>
-            <a:pPr lvl="1"/>
-            <a:r>
-              <a:rPr lang="en-US" dirty="0"/>
-              <a:t>Variable input is % of federal funding used (at end of time range). And Amount of $ spend and Count of projects (both per state). </a:t>
-            </a:r>
-          </a:p>
-          <a:p>
-            <a:pPr lvl="1"/>
-            <a:r>
-              <a:rPr lang="en-US" dirty="0"/>
-              <a:t>Measured output is % of population vaccinated (1</a:t>
-            </a:r>
-            <a:r>
-              <a:rPr lang="en-US" baseline="30000" dirty="0"/>
-              <a:t>st</a:t>
-            </a:r>
-            <a:r>
-              <a:rPr lang="en-US" dirty="0"/>
-              <a:t> dose) at end of time range, per state.</a:t>
-            </a:r>
-          </a:p>
-          <a:p>
-            <a:pPr lvl="2"/>
-            <a:r>
-              <a:rPr lang="en-US" dirty="0"/>
-              <a:t>Constraints and assumptions for dataset: distance any given vaccine has to travel to get to end site. Method of transportation and how that may or may not affect vaccination rate. Political leanings! Do people think the vaccine carries 5g robots in the given state? Etc. etc. We can’t measure these variables on this scope and so our data analysis is HIGH LEVEL only. We need to showcase the methods we have learned in the class thus far.</a:t>
-            </a:r>
-          </a:p>
-          <a:p>
-            <a:pPr lvl="2"/>
-            <a:r>
-              <a:rPr lang="en-US" dirty="0"/>
-              <a:t>Line correlation if able.</a:t>
-            </a:r>
-          </a:p>
-        </p:txBody>
-      </p:sp>
-    </p:spTree>
-    <p:extLst>
-      <p:ext uri="{BB962C8B-B14F-4D97-AF65-F5344CB8AC3E}">
-        <p14:creationId xmlns:p14="http://schemas.microsoft.com/office/powerpoint/2010/main" val="3570840541"/>
-      </p:ext>
-    </p:extLst>
-  </p:cSld>
-  <p:clrMapOvr>
-    <a:masterClrMapping/>
-  </p:clrMapOvr>
-</p:sld>
-</file>
-
-<file path=ppt/slides/slide2.xml><?xml version="1.0" encoding="utf-8"?>
-<p:sld xmlns:a="http://schemas.openxmlformats.org/drawingml/2006/main" xmlns:r="http://schemas.openxmlformats.org/officeDocument/2006/relationships" xmlns:p="http://schemas.openxmlformats.org/presentationml/2006/main">
-  <p:cSld>
-    <p:spTree>
-      <p:nvGrpSpPr>
-        <p:cNvPr id="1" name=""/>
-        <p:cNvGrpSpPr/>
-        <p:nvPr/>
-      </p:nvGrpSpPr>
-      <p:grpSpPr>
-        <a:xfrm>
-          <a:off x="0" y="0"/>
-          <a:ext cx="0" cy="0"/>
-          <a:chOff x="0" y="0"/>
-          <a:chExt cx="0" cy="0"/>
-        </a:xfrm>
-      </p:grpSpPr>
-      <p:sp>
-        <p:nvSpPr>
-          <p:cNvPr id="2" name="Title 1">
-            <a:extLst>
-              <a:ext uri="{FF2B5EF4-FFF2-40B4-BE49-F238E27FC236}">
-                <a16:creationId xmlns:a16="http://schemas.microsoft.com/office/drawing/2014/main" id="{203531D7-F961-0363-14A1-DC3CC04F8BEF}"/>
-              </a:ext>
-            </a:extLst>
-          </p:cNvPr>
-          <p:cNvSpPr>
-            <a:spLocks noGrp="1"/>
-          </p:cNvSpPr>
-          <p:nvPr>
-            <p:ph type="title"/>
-          </p:nvPr>
-        </p:nvSpPr>
-        <p:spPr/>
-        <p:txBody>
-          <a:bodyPr/>
-          <a:lstStyle/>
-          <a:p>
-            <a:pPr algn="ctr"/>
-            <a:r>
-              <a:rPr lang="en-US" dirty="0"/>
-              <a:t>Purpose and Scope</a:t>
-            </a:r>
-          </a:p>
-        </p:txBody>
-      </p:sp>
-      <p:sp>
-        <p:nvSpPr>
-          <p:cNvPr id="3" name="Content Placeholder 2">
-            <a:extLst>
-              <a:ext uri="{FF2B5EF4-FFF2-40B4-BE49-F238E27FC236}">
-                <a16:creationId xmlns:a16="http://schemas.microsoft.com/office/drawing/2014/main" id="{C2ECC505-913C-7EFF-4818-930E44C5DC49}"/>
-              </a:ext>
-            </a:extLst>
-          </p:cNvPr>
-          <p:cNvSpPr>
-            <a:spLocks noGrp="1"/>
-          </p:cNvSpPr>
-          <p:nvPr>
-            <p:ph sz="half" idx="1"/>
-          </p:nvPr>
-        </p:nvSpPr>
-        <p:spPr>
-          <a:ln>
-            <a:solidFill>
-              <a:schemeClr val="tx1"/>
-            </a:solidFill>
-          </a:ln>
-        </p:spPr>
-        <p:txBody>
-          <a:bodyPr>
-            <a:normAutofit fontScale="85000" lnSpcReduction="20000"/>
-          </a:bodyPr>
-          <a:lstStyle/>
-          <a:p>
-            <a:r>
-              <a:rPr lang="en-US" dirty="0"/>
-              <a:t>The kind of data you’d like to work with and the field you’re interested in (finance, healthcare surveys, etc.)</a:t>
-            </a:r>
-          </a:p>
-          <a:p>
-            <a:pPr lvl="1">
-              <a:buClrTx/>
-              <a:buFont typeface="Wingdings" panose="05000000000000000000" pitchFamily="2" charset="2"/>
-              <a:buChar char="§"/>
-            </a:pPr>
-            <a:r>
-              <a:rPr lang="en-US" dirty="0"/>
-              <a:t>Healthcare, specifically Covid-19 data</a:t>
-            </a:r>
-          </a:p>
-          <a:p>
-            <a:pPr lvl="1">
-              <a:buClrTx/>
-              <a:buFont typeface="Wingdings" panose="05000000000000000000" pitchFamily="2" charset="2"/>
-              <a:buChar char="§"/>
-            </a:pPr>
-            <a:endParaRPr lang="en-US" dirty="0"/>
-          </a:p>
-          <a:p>
-            <a:r>
-              <a:rPr lang="en-US" dirty="0"/>
-              <a:t>The questions you’ll ask of the data</a:t>
-            </a:r>
-          </a:p>
-          <a:p>
-            <a:pPr>
-              <a:buClrTx/>
-              <a:buFont typeface="Wingdings" panose="05000000000000000000" pitchFamily="2" charset="2"/>
-              <a:buChar char="§"/>
-            </a:pPr>
-            <a:r>
-              <a:rPr lang="en-US" sz="1800" dirty="0"/>
-              <a:t>Which states spent ARPA money on vaccination programs, and how much/how many programs?</a:t>
-            </a:r>
-          </a:p>
-          <a:p>
-            <a:pPr>
-              <a:buClrTx/>
-              <a:buFont typeface="Wingdings" panose="05000000000000000000" pitchFamily="2" charset="2"/>
-              <a:buChar char="§"/>
-            </a:pPr>
-            <a:r>
-              <a:rPr lang="en-US" sz="1800" dirty="0"/>
-              <a:t>How does vaccination grant spending compare to vaccination rates in each state?</a:t>
-            </a:r>
-          </a:p>
-          <a:p>
-            <a:endParaRPr lang="en-US" dirty="0"/>
-          </a:p>
-          <a:p>
-            <a:r>
-              <a:rPr lang="en-US" dirty="0"/>
-              <a:t>Possible source for the data</a:t>
-            </a:r>
-          </a:p>
-          <a:p>
-            <a:pPr>
-              <a:buClrTx/>
-              <a:buFont typeface="Wingdings" panose="05000000000000000000" pitchFamily="2" charset="2"/>
-              <a:buChar char="§"/>
-            </a:pPr>
-            <a:r>
-              <a:rPr lang="en-US" sz="1800" dirty="0"/>
-              <a:t>EARN SLFRF Workbook, Q4 2022 (ref https://www.epi.org/resources/budget/)</a:t>
-            </a:r>
-          </a:p>
-          <a:p>
-            <a:pPr>
-              <a:buClrTx/>
-              <a:buFont typeface="Wingdings" panose="05000000000000000000" pitchFamily="2" charset="2"/>
-              <a:buChar char="§"/>
-            </a:pPr>
-            <a:r>
-              <a:rPr lang="en-US" sz="1800" dirty="0"/>
-              <a:t>https://health.google.com/covid-19/open-data/</a:t>
-            </a:r>
-          </a:p>
-          <a:p>
-            <a:endParaRPr lang="en-US" dirty="0"/>
-          </a:p>
-          <a:p>
-            <a:endParaRPr lang="en-US" dirty="0"/>
-          </a:p>
-        </p:txBody>
-      </p:sp>
-      <p:sp>
-        <p:nvSpPr>
-          <p:cNvPr id="4" name="Content Placeholder 3">
-            <a:extLst>
-              <a:ext uri="{FF2B5EF4-FFF2-40B4-BE49-F238E27FC236}">
-                <a16:creationId xmlns:a16="http://schemas.microsoft.com/office/drawing/2014/main" id="{CA9972A8-3C16-4FAC-9278-D90F135356E0}"/>
-              </a:ext>
-            </a:extLst>
-          </p:cNvPr>
-          <p:cNvSpPr>
-            <a:spLocks noGrp="1"/>
-          </p:cNvSpPr>
-          <p:nvPr>
-            <p:ph sz="half" idx="2"/>
-          </p:nvPr>
-        </p:nvSpPr>
-        <p:spPr>
-          <a:ln>
-            <a:solidFill>
-              <a:schemeClr val="tx1"/>
-            </a:solidFill>
-          </a:ln>
-        </p:spPr>
-        <p:txBody>
-          <a:bodyPr>
-            <a:normAutofit fontScale="85000" lnSpcReduction="20000"/>
-          </a:bodyPr>
-          <a:lstStyle/>
-          <a:p>
-            <a:r>
-              <a:rPr lang="en-US" dirty="0"/>
-              <a:t>What this project is</a:t>
-            </a:r>
-          </a:p>
-          <a:p>
-            <a:pPr lvl="1">
-              <a:buClrTx/>
-              <a:buFont typeface="Wingdings" panose="05000000000000000000" pitchFamily="2" charset="2"/>
-              <a:buChar char="§"/>
-            </a:pPr>
-            <a:r>
-              <a:rPr lang="en-US" dirty="0"/>
-              <a:t>Timeframe: post March 11, 2021 – end of 2022</a:t>
-            </a:r>
-          </a:p>
-          <a:p>
-            <a:pPr lvl="1">
-              <a:buClrTx/>
-              <a:buFont typeface="Wingdings" panose="05000000000000000000" pitchFamily="2" charset="2"/>
-              <a:buChar char="§"/>
-            </a:pPr>
-            <a:r>
-              <a:rPr lang="en-US" dirty="0"/>
-              <a:t>All US states for spending summary. Then narrow to top 3 and bottom 3 in analysis (can change depending on time needed for analysis)</a:t>
-            </a:r>
-          </a:p>
-          <a:p>
-            <a:pPr marL="201168" lvl="1" indent="0">
-              <a:buClrTx/>
-              <a:buNone/>
-            </a:pPr>
-            <a:endParaRPr lang="en-US" dirty="0"/>
-          </a:p>
-          <a:p>
-            <a:pPr marL="0" indent="0">
-              <a:buNone/>
-            </a:pPr>
-            <a:endParaRPr lang="en-US" dirty="0"/>
-          </a:p>
-          <a:p>
-            <a:r>
-              <a:rPr lang="en-US" dirty="0"/>
-              <a:t>What this project is not</a:t>
-            </a:r>
-          </a:p>
-          <a:p>
-            <a:pPr lvl="1">
-              <a:buClrTx/>
-              <a:buFont typeface="Wingdings" panose="05000000000000000000" pitchFamily="2" charset="2"/>
-              <a:buChar char="§"/>
-            </a:pPr>
-            <a:r>
-              <a:rPr lang="en-US" dirty="0"/>
-              <a:t>(Reference data constraints and assumptions list)</a:t>
-            </a:r>
-          </a:p>
-          <a:p>
-            <a:endParaRPr lang="en-US" dirty="0"/>
-          </a:p>
-          <a:p>
-            <a:pPr marL="0" indent="0">
-              <a:buNone/>
-            </a:pPr>
-            <a:r>
-              <a:rPr lang="en-US" dirty="0"/>
-              <a:t>Data source constraints and assumptions</a:t>
-            </a:r>
-          </a:p>
-          <a:p>
-            <a:pPr>
-              <a:buClrTx/>
-              <a:buFont typeface="Arial" panose="020B0604020202020204" pitchFamily="34" charset="0"/>
-              <a:buChar char="•"/>
-            </a:pPr>
-            <a:r>
-              <a:rPr lang="en-US" sz="1800" dirty="0"/>
-              <a:t>State size/population not taken into account</a:t>
-            </a:r>
-          </a:p>
-          <a:p>
-            <a:pPr>
-              <a:buClrTx/>
-              <a:buFont typeface="Arial" panose="020B0604020202020204" pitchFamily="34" charset="0"/>
-              <a:buChar char="•"/>
-            </a:pPr>
-            <a:r>
-              <a:rPr lang="en-US" sz="1800" dirty="0"/>
-              <a:t>Different qualification criteria per state</a:t>
-            </a:r>
-          </a:p>
-          <a:p>
-            <a:pPr>
-              <a:buFont typeface="Arial" panose="020B0604020202020204" pitchFamily="34" charset="0"/>
-              <a:buChar char="•"/>
-            </a:pPr>
-            <a:r>
-              <a:rPr lang="en-US" sz="1600" dirty="0"/>
-              <a:t>…</a:t>
-            </a:r>
-          </a:p>
-        </p:txBody>
-      </p:sp>
-    </p:spTree>
-    <p:extLst>
-      <p:ext uri="{BB962C8B-B14F-4D97-AF65-F5344CB8AC3E}">
-        <p14:creationId xmlns:p14="http://schemas.microsoft.com/office/powerpoint/2010/main" val="3699768426"/>
-      </p:ext>
-    </p:extLst>
-  </p:cSld>
-  <p:clrMapOvr>
-    <a:masterClrMapping/>
-  </p:clrMapOvr>
-</p:sld>
-</file>
-
-<file path=ppt/slides/slide3.xml><?xml version="1.0" encoding="utf-8"?>
-<p:sld xmlns:a="http://schemas.openxmlformats.org/drawingml/2006/main" xmlns:r="http://schemas.openxmlformats.org/officeDocument/2006/relationships" xmlns:p="http://schemas.openxmlformats.org/presentationml/2006/main">
-  <p:cSld>
-    <p:spTree>
-      <p:nvGrpSpPr>
-        <p:cNvPr id="1" name=""/>
-        <p:cNvGrpSpPr/>
-        <p:nvPr/>
-      </p:nvGrpSpPr>
-      <p:grpSpPr>
-        <a:xfrm>
-          <a:off x="0" y="0"/>
-          <a:ext cx="0" cy="0"/>
-          <a:chOff x="0" y="0"/>
-          <a:chExt cx="0" cy="0"/>
-        </a:xfrm>
-      </p:grpSpPr>
-      <p:sp>
-        <p:nvSpPr>
-          <p:cNvPr id="2" name="Title 1">
-            <a:extLst>
-              <a:ext uri="{FF2B5EF4-FFF2-40B4-BE49-F238E27FC236}">
-                <a16:creationId xmlns:a16="http://schemas.microsoft.com/office/drawing/2014/main" id="{ADDD956C-F39F-0B1F-680C-BCC4B1596D4C}"/>
-              </a:ext>
-            </a:extLst>
-          </p:cNvPr>
-          <p:cNvSpPr>
-            <a:spLocks noGrp="1"/>
-          </p:cNvSpPr>
-          <p:nvPr>
-            <p:ph type="title"/>
-          </p:nvPr>
-        </p:nvSpPr>
-        <p:spPr/>
-        <p:txBody>
-          <a:bodyPr/>
-          <a:lstStyle/>
-          <a:p>
-            <a:r>
-              <a:rPr lang="en-US" dirty="0"/>
-              <a:t>Data Source(s)</a:t>
-            </a:r>
-          </a:p>
-        </p:txBody>
-      </p:sp>
-      <p:sp>
-        <p:nvSpPr>
-          <p:cNvPr id="3" name="Content Placeholder 2">
-            <a:extLst>
-              <a:ext uri="{FF2B5EF4-FFF2-40B4-BE49-F238E27FC236}">
-                <a16:creationId xmlns:a16="http://schemas.microsoft.com/office/drawing/2014/main" id="{B21C263D-C578-C11E-2FD8-4C82039826FD}"/>
-              </a:ext>
-            </a:extLst>
-          </p:cNvPr>
-          <p:cNvSpPr>
-            <a:spLocks noGrp="1"/>
-          </p:cNvSpPr>
-          <p:nvPr>
-            <p:ph idx="1"/>
-          </p:nvPr>
-        </p:nvSpPr>
-        <p:spPr/>
-        <p:txBody>
-          <a:bodyPr>
-            <a:normAutofit/>
-          </a:bodyPr>
-          <a:lstStyle/>
-          <a:p>
-            <a:r>
-              <a:rPr lang="en-US" dirty="0"/>
-              <a:t>Describe the data source here. Include hyperlinks where relevant</a:t>
-            </a:r>
-          </a:p>
-          <a:p>
-            <a:endParaRPr lang="en-US" dirty="0"/>
-          </a:p>
-          <a:p>
-            <a:pPr marL="914400" lvl="1" indent="-457200">
-              <a:buFont typeface="+mj-lt"/>
-              <a:buAutoNum type="arabicPeriod"/>
-            </a:pPr>
-            <a:r>
-              <a:rPr lang="en-US" dirty="0"/>
-              <a:t>Check for copyright protections, and make sure that the way you plan to use this dataset is within the bounds of fair use.</a:t>
-            </a:r>
-          </a:p>
-          <a:p>
-            <a:pPr marL="914400" lvl="1" indent="-457200">
-              <a:buFont typeface="+mj-lt"/>
-              <a:buAutoNum type="arabicPeriod"/>
-            </a:pPr>
-            <a:endParaRPr lang="en-US" dirty="0"/>
-          </a:p>
-          <a:p>
-            <a:pPr marL="914400" lvl="1" indent="-457200">
-              <a:buFont typeface="+mj-lt"/>
-              <a:buAutoNum type="arabicPeriod"/>
-            </a:pPr>
-            <a:r>
-              <a:rPr lang="en-US" dirty="0"/>
-              <a:t>Document how you intend to use this dataset now and in the future. Find any licenses or terms of use associated with the dataset, and review them to confirm that your intended use is in compliance.</a:t>
-            </a:r>
-          </a:p>
-          <a:p>
-            <a:pPr marL="914400" lvl="1" indent="-457200">
-              <a:buFont typeface="+mj-lt"/>
-              <a:buAutoNum type="arabicPeriod"/>
-            </a:pPr>
-            <a:endParaRPr lang="en-US" dirty="0"/>
-          </a:p>
-          <a:p>
-            <a:pPr marL="914400" lvl="1" indent="-457200">
-              <a:buFont typeface="+mj-lt"/>
-              <a:buAutoNum type="arabicPeriod"/>
-            </a:pPr>
-            <a:r>
-              <a:rPr lang="en-US" dirty="0"/>
-              <a:t>Investigate how the dataset was collected. Identify any indicators that the data was obtained from a source that the compilers were not authorized to access.</a:t>
-            </a:r>
-          </a:p>
-        </p:txBody>
-      </p:sp>
-    </p:spTree>
-    <p:extLst>
-      <p:ext uri="{BB962C8B-B14F-4D97-AF65-F5344CB8AC3E}">
-        <p14:creationId xmlns:p14="http://schemas.microsoft.com/office/powerpoint/2010/main" val="808098577"/>
-      </p:ext>
-    </p:extLst>
-  </p:cSld>
-  <p:clrMapOvr>
-    <a:masterClrMapping/>
-  </p:clrMapOvr>
-</p:sld>
-</file>
-
-<file path=ppt/slides/slide4.xml><?xml version="1.0" encoding="utf-8"?>
-<p:sld xmlns:a="http://schemas.openxmlformats.org/drawingml/2006/main" xmlns:r="http://schemas.openxmlformats.org/officeDocument/2006/relationships" xmlns:p="http://schemas.openxmlformats.org/presentationml/2006/main">
-  <p:cSld>
-    <p:spTree>
-      <p:nvGrpSpPr>
-        <p:cNvPr id="1" name=""/>
-        <p:cNvGrpSpPr/>
-        <p:nvPr/>
-      </p:nvGrpSpPr>
-      <p:grpSpPr>
-        <a:xfrm>
-          <a:off x="0" y="0"/>
-          <a:ext cx="0" cy="0"/>
-          <a:chOff x="0" y="0"/>
-          <a:chExt cx="0" cy="0"/>
-        </a:xfrm>
-      </p:grpSpPr>
-      <p:sp>
-        <p:nvSpPr>
-          <p:cNvPr id="2" name="Title 1">
-            <a:extLst>
-              <a:ext uri="{FF2B5EF4-FFF2-40B4-BE49-F238E27FC236}">
-                <a16:creationId xmlns:a16="http://schemas.microsoft.com/office/drawing/2014/main" id="{B312BC9A-7B15-E9B0-96DF-05AA5E13C113}"/>
-              </a:ext>
-            </a:extLst>
-          </p:cNvPr>
-          <p:cNvSpPr>
-            <a:spLocks noGrp="1"/>
-          </p:cNvSpPr>
-          <p:nvPr>
-            <p:ph type="title"/>
-          </p:nvPr>
-        </p:nvSpPr>
-        <p:spPr/>
-        <p:txBody>
-          <a:bodyPr/>
-          <a:lstStyle/>
-          <a:p>
-            <a:r>
-              <a:rPr lang="en-US" dirty="0"/>
-              <a:t>Analysis Methods</a:t>
-            </a:r>
-          </a:p>
-        </p:txBody>
-      </p:sp>
-      <p:sp>
-        <p:nvSpPr>
-          <p:cNvPr id="3" name="Content Placeholder 2">
-            <a:extLst>
-              <a:ext uri="{FF2B5EF4-FFF2-40B4-BE49-F238E27FC236}">
-                <a16:creationId xmlns:a16="http://schemas.microsoft.com/office/drawing/2014/main" id="{8150B3B9-A2CD-564D-1DE3-F0A9722F9629}"/>
-              </a:ext>
-            </a:extLst>
-          </p:cNvPr>
-          <p:cNvSpPr>
-            <a:spLocks noGrp="1"/>
-          </p:cNvSpPr>
-          <p:nvPr>
-            <p:ph idx="1"/>
-          </p:nvPr>
-        </p:nvSpPr>
-        <p:spPr/>
-        <p:txBody>
-          <a:bodyPr/>
-          <a:lstStyle/>
-          <a:p>
-            <a:r>
-              <a:rPr lang="en-US" dirty="0"/>
-              <a:t>The analysis process can be broken into two broad phases: (1) exploration and cleanup, and (2) analysis.</a:t>
-            </a:r>
-          </a:p>
-          <a:p>
-            <a:endParaRPr lang="en-US" dirty="0"/>
-          </a:p>
-          <a:p>
-            <a:r>
-              <a:rPr lang="en-US" dirty="0"/>
-              <a:t>Describe here how we plan to answer the questions laid out in our Purpose section.</a:t>
-            </a:r>
-          </a:p>
-          <a:p>
-            <a:pPr lvl="1"/>
-            <a:r>
-              <a:rPr lang="en-US" dirty="0"/>
-              <a:t>Ex) Summarize first, then narrow scope. </a:t>
-            </a:r>
-          </a:p>
-          <a:p>
-            <a:pPr lvl="1"/>
-            <a:r>
-              <a:rPr lang="en-US" dirty="0"/>
-              <a:t>“We recommend focusing your analysis on multiple techniques, such as aggregation, correlation, comparison, summary statistics, sentiment analysis, and time-series analysis.”</a:t>
-            </a:r>
-          </a:p>
-        </p:txBody>
-      </p:sp>
-    </p:spTree>
-    <p:extLst>
-      <p:ext uri="{BB962C8B-B14F-4D97-AF65-F5344CB8AC3E}">
-        <p14:creationId xmlns:p14="http://schemas.microsoft.com/office/powerpoint/2010/main" val="3055247817"/>
-      </p:ext>
-    </p:extLst>
-  </p:cSld>
-  <p:clrMapOvr>
-    <a:masterClrMapping/>
-  </p:clrMapOvr>
-</p:sld>
-</file>
-
-<file path=ppt/slides/slide5.xml><?xml version="1.0" encoding="utf-8"?>
-<p:sld xmlns:a="http://schemas.openxmlformats.org/drawingml/2006/main" xmlns:r="http://schemas.openxmlformats.org/officeDocument/2006/relationships" xmlns:p="http://schemas.openxmlformats.org/presentationml/2006/main">
-  <p:cSld>
-    <p:spTree>
-      <p:nvGrpSpPr>
-        <p:cNvPr id="1" name=""/>
-        <p:cNvGrpSpPr/>
-        <p:nvPr/>
-      </p:nvGrpSpPr>
-      <p:grpSpPr>
-        <a:xfrm>
-          <a:off x="0" y="0"/>
-          <a:ext cx="0" cy="0"/>
-          <a:chOff x="0" y="0"/>
-          <a:chExt cx="0" cy="0"/>
-        </a:xfrm>
-      </p:grpSpPr>
-      <p:sp>
-        <p:nvSpPr>
-          <p:cNvPr id="2" name="Title 1">
-            <a:extLst>
-              <a:ext uri="{FF2B5EF4-FFF2-40B4-BE49-F238E27FC236}">
-                <a16:creationId xmlns:a16="http://schemas.microsoft.com/office/drawing/2014/main" id="{6A03C364-BD8D-E30B-C37E-136CB4BDCA73}"/>
-              </a:ext>
-            </a:extLst>
-          </p:cNvPr>
-          <p:cNvSpPr>
-            <a:spLocks noGrp="1"/>
-          </p:cNvSpPr>
-          <p:nvPr>
-            <p:ph type="title"/>
-          </p:nvPr>
-        </p:nvSpPr>
-        <p:spPr/>
-        <p:txBody>
-          <a:bodyPr/>
-          <a:lstStyle/>
-          <a:p>
-            <a:r>
-              <a:rPr lang="en-US" dirty="0" err="1"/>
-              <a:t>Github</a:t>
-            </a:r>
-            <a:r>
-              <a:rPr lang="en-US" dirty="0"/>
-              <a:t> Repo</a:t>
-            </a:r>
-          </a:p>
-        </p:txBody>
-      </p:sp>
-      <p:sp>
-        <p:nvSpPr>
-          <p:cNvPr id="3" name="Content Placeholder 2">
-            <a:extLst>
-              <a:ext uri="{FF2B5EF4-FFF2-40B4-BE49-F238E27FC236}">
-                <a16:creationId xmlns:a16="http://schemas.microsoft.com/office/drawing/2014/main" id="{47B18CE2-894E-BAE1-C77A-13E6D8B29A21}"/>
-              </a:ext>
-            </a:extLst>
-          </p:cNvPr>
-          <p:cNvSpPr>
-            <a:spLocks noGrp="1"/>
-          </p:cNvSpPr>
-          <p:nvPr>
-            <p:ph idx="1"/>
-          </p:nvPr>
-        </p:nvSpPr>
-        <p:spPr/>
-        <p:txBody>
-          <a:bodyPr/>
-          <a:lstStyle/>
-          <a:p>
-            <a:r>
-              <a:rPr lang="en-US" dirty="0"/>
-              <a:t>One person to own the repo (Evan volunteers)</a:t>
-            </a:r>
-          </a:p>
-          <a:p>
-            <a:r>
-              <a:rPr lang="en-US" dirty="0"/>
-              <a:t>Make sure local repos are always up-to-date with the github.com repo</a:t>
-            </a:r>
-          </a:p>
-          <a:p>
-            <a:pPr lvl="1"/>
-            <a:r>
-              <a:rPr lang="en-US" dirty="0"/>
-              <a:t>Pull each time you work on your portion</a:t>
-            </a:r>
-          </a:p>
-          <a:p>
-            <a:pPr lvl="1"/>
-            <a:r>
-              <a:rPr lang="en-US" dirty="0"/>
-              <a:t>Commit all local changes and push to </a:t>
-            </a:r>
-            <a:r>
-              <a:rPr lang="en-US" dirty="0" err="1"/>
-              <a:t>github</a:t>
-            </a:r>
-            <a:r>
-              <a:rPr lang="en-US" dirty="0"/>
-              <a:t> repo when done working</a:t>
-            </a:r>
-          </a:p>
-          <a:p>
-            <a:pPr lvl="1"/>
-            <a:r>
-              <a:rPr lang="en-US" dirty="0"/>
-              <a:t>Tip from William: Use a single .</a:t>
-            </a:r>
-            <a:r>
-              <a:rPr lang="en-US" dirty="0" err="1"/>
-              <a:t>ipynb</a:t>
-            </a:r>
-            <a:r>
-              <a:rPr lang="en-US" dirty="0"/>
-              <a:t> file for the project. Each person will pull that into their local repo.</a:t>
-            </a:r>
-          </a:p>
-          <a:p>
-            <a:pPr lvl="2"/>
-            <a:r>
-              <a:rPr lang="en-US" dirty="0"/>
-              <a:t>Section off your code section with blocks #--------------------------- so that you have clear areas of work to prevent merge issues per line of code.</a:t>
-            </a:r>
-          </a:p>
-          <a:p>
-            <a:pPr lvl="1"/>
-            <a:endParaRPr lang="en-US" dirty="0"/>
-          </a:p>
-          <a:p>
-            <a:pPr marL="201168" lvl="1" indent="0">
-              <a:buNone/>
-            </a:pPr>
-            <a:r>
-              <a:rPr lang="en-US" dirty="0"/>
-              <a:t>See </a:t>
-            </a:r>
-            <a:r>
-              <a:rPr lang="en-US" dirty="0">
-                <a:hlinkClick r:id="rId2"/>
-              </a:rPr>
-              <a:t>https://docs.github.com/en/issues/organizing-your-work-with-project-boards/managing-project-boards</a:t>
-            </a:r>
-            <a:endParaRPr lang="en-US" dirty="0"/>
-          </a:p>
-          <a:p>
-            <a:pPr marL="201168" lvl="1" indent="0">
-              <a:buNone/>
-            </a:pPr>
-            <a:endParaRPr lang="en-US" dirty="0"/>
-          </a:p>
-          <a:p>
-            <a:pPr marL="201168" lvl="1" indent="0">
-              <a:buNone/>
-            </a:pPr>
-            <a:endParaRPr lang="en-US" dirty="0"/>
-          </a:p>
-        </p:txBody>
-      </p:sp>
-    </p:spTree>
-    <p:extLst>
-      <p:ext uri="{BB962C8B-B14F-4D97-AF65-F5344CB8AC3E}">
-        <p14:creationId xmlns:p14="http://schemas.microsoft.com/office/powerpoint/2010/main" val="1873696182"/>
-      </p:ext>
-    </p:extLst>
-  </p:cSld>
-  <p:clrMapOvr>
-    <a:masterClrMapping/>
-  </p:clrMapOvr>
-</p:sld>
-</file>
-
-<file path=ppt/slides/slide6.xml><?xml version="1.0" encoding="utf-8"?>
-<p:sld xmlns:a="http://schemas.openxmlformats.org/drawingml/2006/main" xmlns:r="http://schemas.openxmlformats.org/officeDocument/2006/relationships" xmlns:p="http://schemas.openxmlformats.org/presentationml/2006/main">
-  <p:cSld>
-    <p:spTree>
-      <p:nvGrpSpPr>
-        <p:cNvPr id="1" name=""/>
-        <p:cNvGrpSpPr/>
-        <p:nvPr/>
-      </p:nvGrpSpPr>
-      <p:grpSpPr>
-        <a:xfrm>
-          <a:off x="0" y="0"/>
-          <a:ext cx="0" cy="0"/>
-          <a:chOff x="0" y="0"/>
-          <a:chExt cx="0" cy="0"/>
-        </a:xfrm>
-      </p:grpSpPr>
-      <p:sp>
-        <p:nvSpPr>
           <p:cNvPr id="2" name="Content Placeholder 2">
             <a:extLst>
               <a:ext uri="{FF2B5EF4-FFF2-40B4-BE49-F238E27FC236}">
@@ -5608,11 +4569,14 @@
         <p:spPr>
           <a:xfrm>
             <a:off x="101600" y="815976"/>
-            <a:ext cx="12090400" cy="5746749"/>
+            <a:ext cx="12090400" cy="6042024"/>
           </a:xfrm>
           <a:prstGeom prst="rect">
             <a:avLst/>
           </a:prstGeom>
+          <a:solidFill>
+            <a:schemeClr val="bg1"/>
+          </a:solidFill>
         </p:spPr>
         <p:txBody>
           <a:bodyPr/>
@@ -5869,17 +4833,31 @@
               <a:buChar char="•"/>
             </a:pPr>
             <a:r>
-              <a:rPr lang="en-US" dirty="0"/>
-              <a:t> Questions that you found interesting and what motivated you to answer them</a:t>
-            </a:r>
-          </a:p>
-          <a:p>
-            <a:pPr marL="544068" lvl="1" indent="-342900">
+              <a:rPr lang="en-US" sz="1800" dirty="0"/>
+              <a:t>Use Pandas to clean and format your dataset or datasets.</a:t>
+            </a:r>
+          </a:p>
+          <a:p>
+            <a:pPr lvl="1">
               <a:buClrTx/>
-              <a:buFont typeface="+mj-lt"/>
-              <a:buAutoNum type="arabicPeriod"/>
-            </a:pPr>
-            <a:endParaRPr lang="en-US" dirty="0"/>
+              <a:buFont typeface="Arial" panose="020B0604020202020204" pitchFamily="34" charset="0"/>
+              <a:buChar char="•"/>
+            </a:pPr>
+            <a:r>
+              <a:rPr lang="en-US" sz="1600" dirty="0"/>
+              <a:t>Greg did this in his Google_vac_data. </a:t>
+            </a:r>
+          </a:p>
+          <a:p>
+            <a:pPr lvl="1">
+              <a:buClrTx/>
+              <a:buFont typeface="Arial" panose="020B0604020202020204" pitchFamily="34" charset="0"/>
+              <a:buChar char="•"/>
+            </a:pPr>
+            <a:r>
+              <a:rPr lang="en-US" sz="1600" dirty="0"/>
+              <a:t>#TODO: Use similar methods in the EARN data.</a:t>
+            </a:r>
           </a:p>
           <a:p>
             <a:pPr>
@@ -5888,17 +4866,20 @@
               <a:buChar char="•"/>
             </a:pPr>
             <a:r>
-              <a:rPr lang="en-US" dirty="0"/>
-              <a:t> Where and how you found the data you used to answer these questions</a:t>
-            </a:r>
-          </a:p>
-          <a:p>
-            <a:pPr marL="544068" lvl="1" indent="-342900">
+              <a:rPr lang="en-US" sz="1800" dirty="0"/>
+              <a:t>Create a Jupyter notebook describing the data exploration and cleanup process.</a:t>
+            </a:r>
+          </a:p>
+          <a:p>
+            <a:pPr lvl="1">
               <a:buClrTx/>
-              <a:buFont typeface="+mj-lt"/>
-              <a:buAutoNum type="arabicPeriod"/>
-            </a:pPr>
-            <a:endParaRPr lang="en-US" dirty="0"/>
+              <a:buFont typeface="Arial" panose="020B0604020202020204" pitchFamily="34" charset="0"/>
+              <a:buChar char="•"/>
+            </a:pPr>
+            <a:r>
+              <a:rPr lang="en-US" sz="1600" dirty="0"/>
+              <a:t>#TODO: Add comments into Greg’s code. Source where applicable, otherwise succinct explanations for each cell where ambiguous.</a:t>
+            </a:r>
           </a:p>
           <a:p>
             <a:pPr>
@@ -5907,17 +4888,20 @@
               <a:buChar char="•"/>
             </a:pPr>
             <a:r>
-              <a:rPr lang="en-US" dirty="0"/>
-              <a:t> The data exploration and cleanup process (accompanied by your Jupyter notebook)</a:t>
-            </a:r>
-          </a:p>
-          <a:p>
-            <a:pPr marL="544068" lvl="1" indent="-342900">
+              <a:rPr lang="en-US" sz="1800" dirty="0"/>
+              <a:t>Create a Jupyter notebook illustrating the final data analysis.</a:t>
+            </a:r>
+          </a:p>
+          <a:p>
+            <a:pPr lvl="1">
               <a:buClrTx/>
-              <a:buFont typeface="+mj-lt"/>
-              <a:buAutoNum type="arabicPeriod"/>
-            </a:pPr>
-            <a:endParaRPr lang="en-US" dirty="0"/>
+              <a:buFont typeface="Arial" panose="020B0604020202020204" pitchFamily="34" charset="0"/>
+              <a:buChar char="•"/>
+            </a:pPr>
+            <a:r>
+              <a:rPr lang="en-US" sz="1600" dirty="0"/>
+              <a:t>#TODO: Kendal and Joanna</a:t>
+            </a:r>
           </a:p>
           <a:p>
             <a:pPr>
@@ -5926,17 +4910,20 @@
               <a:buChar char="•"/>
             </a:pPr>
             <a:r>
-              <a:rPr lang="en-US" dirty="0"/>
-              <a:t> The analysis process (accompanied by your Jupyter notebook)</a:t>
-            </a:r>
-          </a:p>
-          <a:p>
-            <a:pPr marL="544068" lvl="1" indent="-342900">
+              <a:rPr lang="en-US" sz="1800" dirty="0"/>
+              <a:t>Use Matplotlib to create 6 to 8 visualizations of your data</a:t>
+            </a:r>
+          </a:p>
+          <a:p>
+            <a:pPr lvl="1">
               <a:buClrTx/>
-              <a:buFont typeface="+mj-lt"/>
-              <a:buAutoNum type="arabicPeriod"/>
-            </a:pPr>
-            <a:endParaRPr lang="en-US" dirty="0"/>
+              <a:buFont typeface="Arial" panose="020B0604020202020204" pitchFamily="34" charset="0"/>
+              <a:buChar char="•"/>
+            </a:pPr>
+            <a:r>
+              <a:rPr lang="en-US" sz="1600" dirty="0"/>
+              <a:t>#TODO: Team/Kendal and Joanna</a:t>
+            </a:r>
           </a:p>
           <a:p>
             <a:pPr>
@@ -5945,17 +4932,20 @@
               <a:buChar char="•"/>
             </a:pPr>
             <a:r>
-              <a:rPr lang="en-US" dirty="0"/>
-              <a:t> Your conclusions, including a numerical summary and visualizations of the summary</a:t>
-            </a:r>
-          </a:p>
-          <a:p>
-            <a:pPr marL="544068" lvl="1" indent="-342900">
+              <a:rPr lang="en-US" sz="1800" dirty="0"/>
+              <a:t>(ideally, at least 2 visualizations per “question” that you ask your data).</a:t>
+            </a:r>
+          </a:p>
+          <a:p>
+            <a:pPr lvl="1">
               <a:buClrTx/>
-              <a:buFont typeface="+mj-lt"/>
-              <a:buAutoNum type="arabicPeriod"/>
-            </a:pPr>
-            <a:endParaRPr lang="en-US" dirty="0"/>
+              <a:buFont typeface="Arial" panose="020B0604020202020204" pitchFamily="34" charset="0"/>
+              <a:buChar char="•"/>
+            </a:pPr>
+            <a:r>
+              <a:rPr lang="en-US" sz="1600" dirty="0"/>
+              <a:t>...</a:t>
+            </a:r>
           </a:p>
           <a:p>
             <a:pPr>
@@ -5964,17 +4954,54 @@
               <a:buChar char="•"/>
             </a:pPr>
             <a:r>
-              <a:rPr lang="en-US" dirty="0"/>
-              <a:t> The implications of your findings: what do your findings mean?</a:t>
-            </a:r>
-          </a:p>
-          <a:p>
-            <a:pPr marL="544068" lvl="1" indent="-342900">
+              <a:rPr lang="en-US" sz="1800" dirty="0"/>
+              <a:t>Save PNG images of your visualizations to distribute to the class and instructional team—and for inclusion in your presentation.</a:t>
+            </a:r>
+          </a:p>
+          <a:p>
+            <a:pPr lvl="1">
               <a:buClrTx/>
-              <a:buFont typeface="+mj-lt"/>
-              <a:buAutoNum type="arabicPeriod"/>
-            </a:pPr>
-            <a:endParaRPr lang="en-US" dirty="0"/>
+              <a:buFont typeface="Arial" panose="020B0604020202020204" pitchFamily="34" charset="0"/>
+              <a:buChar char="•"/>
+            </a:pPr>
+            <a:r>
+              <a:rPr lang="en-US" sz="1600" dirty="0"/>
+              <a:t>Save plots as variables and save into “Resources” folder.</a:t>
+            </a:r>
+          </a:p>
+          <a:p>
+            <a:pPr>
+              <a:buClrTx/>
+              <a:buFont typeface="Arial" panose="020B0604020202020204" pitchFamily="34" charset="0"/>
+              <a:buChar char="•"/>
+            </a:pPr>
+            <a:r>
+              <a:rPr lang="en-US" sz="1800" dirty="0"/>
+              <a:t>Create a write-up summarizing your major findings. This should include a heading for each “question” that you asked your data as well as a short description of your findings and any relevant plots.</a:t>
+            </a:r>
+          </a:p>
+          <a:p>
+            <a:pPr>
+              <a:buClrTx/>
+              <a:buFont typeface="Arial" panose="020B0604020202020204" pitchFamily="34" charset="0"/>
+              <a:buChar char="•"/>
+            </a:pPr>
+            <a:r>
+              <a:rPr lang="en-US" sz="1800" dirty="0"/>
+              <a:t>Bonus Use at least one API—if you can find one with data pertinent to your primary research questions.</a:t>
+            </a:r>
+            <a:endParaRPr lang="en-US" sz="1600" dirty="0"/>
+          </a:p>
+          <a:p>
+            <a:pPr lvl="1">
+              <a:buClrTx/>
+              <a:buFont typeface="Arial" panose="020B0604020202020204" pitchFamily="34" charset="0"/>
+              <a:buChar char="•"/>
+            </a:pPr>
+            <a:r>
+              <a:rPr lang="en-US" sz="1600" dirty="0"/>
+              <a:t>#TODO: Take a csv table or columns and do the same using an API.</a:t>
+            </a:r>
           </a:p>
         </p:txBody>
       </p:sp>
@@ -6030,7 +5057,7 @@
           <a:p>
             <a:r>
               <a:rPr lang="en-US" dirty="0"/>
-              <a:t>Presentation Requirements</a:t>
+              <a:t>Development Requirements</a:t>
             </a:r>
           </a:p>
         </p:txBody>
@@ -6038,7 +5065,7 @@
     </p:spTree>
     <p:extLst>
       <p:ext uri="{BB962C8B-B14F-4D97-AF65-F5344CB8AC3E}">
-        <p14:creationId xmlns:p14="http://schemas.microsoft.com/office/powerpoint/2010/main" val="2614040401"/>
+        <p14:creationId xmlns:p14="http://schemas.microsoft.com/office/powerpoint/2010/main" val="908844552"/>
       </p:ext>
     </p:extLst>
   </p:cSld>
@@ -6048,7 +5075,7 @@
 </p:sld>
 </file>
 
-<file path=ppt/slides/slide7.xml><?xml version="1.0" encoding="utf-8"?>
+<file path=ppt/slides/slide11.xml><?xml version="1.0" encoding="utf-8"?>
 <p:sld xmlns:a="http://schemas.openxmlformats.org/drawingml/2006/main" xmlns:r="http://schemas.openxmlformats.org/officeDocument/2006/relationships" xmlns:p="http://schemas.openxmlformats.org/presentationml/2006/main">
   <p:cSld>
     <p:spTree>
@@ -6067,6 +5094,208 @@
       </p:grpSpPr>
       <p:sp>
         <p:nvSpPr>
+          <p:cNvPr id="2" name="Title 1">
+            <a:extLst>
+              <a:ext uri="{FF2B5EF4-FFF2-40B4-BE49-F238E27FC236}">
+                <a16:creationId xmlns:a16="http://schemas.microsoft.com/office/drawing/2014/main" id="{94456D86-A2FB-D487-C5E7-F7D55A1C70AA}"/>
+              </a:ext>
+            </a:extLst>
+          </p:cNvPr>
+          <p:cNvSpPr>
+            <a:spLocks noGrp="1"/>
+          </p:cNvSpPr>
+          <p:nvPr>
+            <p:ph type="title"/>
+          </p:nvPr>
+        </p:nvSpPr>
+        <p:spPr>
+          <a:xfrm>
+            <a:off x="1097280" y="286603"/>
+            <a:ext cx="10058400" cy="1002447"/>
+          </a:xfrm>
+        </p:spPr>
+        <p:txBody>
+          <a:bodyPr/>
+          <a:lstStyle/>
+          <a:p>
+            <a:r>
+              <a:rPr lang="en-US" b="1" dirty="0">
+                <a:solidFill>
+                  <a:srgbClr val="FF0000"/>
+                </a:solidFill>
+              </a:rPr>
+              <a:t>Tasks due by EOD Tues 5/16</a:t>
+            </a:r>
+          </a:p>
+        </p:txBody>
+      </p:sp>
+      <p:sp>
+        <p:nvSpPr>
+          <p:cNvPr id="3" name="Content Placeholder 2">
+            <a:extLst>
+              <a:ext uri="{FF2B5EF4-FFF2-40B4-BE49-F238E27FC236}">
+                <a16:creationId xmlns:a16="http://schemas.microsoft.com/office/drawing/2014/main" id="{5E3E40F8-E566-7F42-1FBB-745782052EF2}"/>
+              </a:ext>
+            </a:extLst>
+          </p:cNvPr>
+          <p:cNvSpPr>
+            <a:spLocks noGrp="1"/>
+          </p:cNvSpPr>
+          <p:nvPr>
+            <p:ph idx="1"/>
+          </p:nvPr>
+        </p:nvSpPr>
+        <p:spPr>
+          <a:xfrm>
+            <a:off x="1097280" y="1845734"/>
+            <a:ext cx="10058400" cy="4256616"/>
+          </a:xfrm>
+        </p:spPr>
+        <p:txBody>
+          <a:bodyPr>
+            <a:normAutofit fontScale="92500" lnSpcReduction="10000"/>
+          </a:bodyPr>
+          <a:lstStyle/>
+          <a:p>
+            <a:r>
+              <a:rPr lang="en-US" dirty="0"/>
+              <a:t>Split presentation deck into six parts: each group member to speak during presentation</a:t>
+            </a:r>
+          </a:p>
+          <a:p>
+            <a:pPr lvl="1"/>
+            <a:r>
+              <a:rPr lang="en-US" dirty="0"/>
+              <a:t>Do combination bar/line chart for EARN workbook (to give us an idea of $ volume vs. %spend per state)</a:t>
+            </a:r>
+          </a:p>
+          <a:p>
+            <a:pPr lvl="1"/>
+            <a:r>
+              <a:rPr lang="en-US" dirty="0"/>
+              <a:t>Evan: from Kendal’s </a:t>
+            </a:r>
+            <a:r>
+              <a:rPr lang="en-US" dirty="0" err="1"/>
+              <a:t>dataframes</a:t>
+            </a:r>
+            <a:r>
+              <a:rPr lang="en-US" dirty="0"/>
+              <a:t>, look at the top 3 or 4 states for which states had the highest vaccination </a:t>
+            </a:r>
+            <a:r>
+              <a:rPr lang="en-US" b="1" dirty="0"/>
+              <a:t>rate</a:t>
+            </a:r>
+            <a:r>
+              <a:rPr lang="en-US" dirty="0"/>
+              <a:t>. Then, from the EARN </a:t>
+            </a:r>
+            <a:r>
+              <a:rPr lang="en-US" dirty="0" err="1"/>
+              <a:t>dataframe</a:t>
+            </a:r>
+            <a:r>
+              <a:rPr lang="en-US" dirty="0"/>
+              <a:t> do grouped bar charts which show count of </a:t>
+            </a:r>
+            <a:r>
+              <a:rPr lang="en-US" b="1" dirty="0"/>
+              <a:t>covid</a:t>
+            </a:r>
+            <a:r>
+              <a:rPr lang="en-US" dirty="0"/>
+              <a:t> project types for those 3 or 4 states. Limit to top 4 project categories per state to keep clean visual. Or by dollar value spend per category. This will follow the slide on % </a:t>
+            </a:r>
+          </a:p>
+          <a:p>
+            <a:pPr lvl="1"/>
+            <a:endParaRPr lang="en-US" dirty="0"/>
+          </a:p>
+          <a:p>
+            <a:pPr lvl="1"/>
+            <a:r>
+              <a:rPr lang="en-US" dirty="0"/>
+              <a:t>Aaliyah: finish summary </a:t>
+            </a:r>
+            <a:r>
+              <a:rPr lang="en-US" dirty="0" err="1"/>
+              <a:t>dataframe</a:t>
+            </a:r>
+            <a:r>
+              <a:rPr lang="en-US" dirty="0"/>
+              <a:t> per slack message item (1) requested by Joanna.</a:t>
+            </a:r>
+          </a:p>
+          <a:p>
+            <a:pPr marL="201168" lvl="1" indent="0">
+              <a:buNone/>
+            </a:pPr>
+            <a:endParaRPr lang="en-US" dirty="0"/>
+          </a:p>
+          <a:p>
+            <a:pPr lvl="1"/>
+            <a:r>
+              <a:rPr lang="en-US" dirty="0"/>
+              <a:t>Greg: (needs Aaliyah’s dataset to finish correlation/regression plots)</a:t>
+            </a:r>
+          </a:p>
+          <a:p>
+            <a:pPr lvl="1"/>
+            <a:endParaRPr lang="en-US" dirty="0"/>
+          </a:p>
+          <a:p>
+            <a:pPr lvl="1"/>
+            <a:r>
+              <a:rPr lang="en-US" dirty="0"/>
+              <a:t>Joanna: </a:t>
+            </a:r>
+          </a:p>
+          <a:p>
+            <a:pPr lvl="1"/>
+            <a:endParaRPr lang="en-US" dirty="0"/>
+          </a:p>
+          <a:p>
+            <a:pPr lvl="1"/>
+            <a:r>
+              <a:rPr lang="en-US" dirty="0"/>
+              <a:t>All: Align on slide deck and presentation. Run through slide deck as group to make sure we hit all the project requirements, 10 min limit.</a:t>
+            </a:r>
+          </a:p>
+        </p:txBody>
+      </p:sp>
+    </p:spTree>
+    <p:extLst>
+      <p:ext uri="{BB962C8B-B14F-4D97-AF65-F5344CB8AC3E}">
+        <p14:creationId xmlns:p14="http://schemas.microsoft.com/office/powerpoint/2010/main" val="4041187333"/>
+      </p:ext>
+    </p:extLst>
+  </p:cSld>
+  <p:clrMapOvr>
+    <a:masterClrMapping/>
+  </p:clrMapOvr>
+</p:sld>
+</file>
+
+<file path=ppt/slides/slide12.xml><?xml version="1.0" encoding="utf-8"?>
+<p:sld xmlns:a="http://schemas.openxmlformats.org/drawingml/2006/main" xmlns:r="http://schemas.openxmlformats.org/officeDocument/2006/relationships" xmlns:p="http://schemas.openxmlformats.org/presentationml/2006/main">
+  <p:cSld>
+    <p:spTree>
+      <p:nvGrpSpPr>
+        <p:cNvPr id="1" name=""/>
+        <p:cNvGrpSpPr/>
+        <p:nvPr/>
+      </p:nvGrpSpPr>
+      <p:grpSpPr>
+        <a:xfrm>
+          <a:off x="0" y="0"/>
+          <a:ext cx="0" cy="0"/>
+          <a:chOff x="0" y="0"/>
+          <a:chExt cx="0" cy="0"/>
+        </a:xfrm>
+      </p:grpSpPr>
+      <p:sp>
+        <p:nvSpPr>
           <p:cNvPr id="2" name="Content Placeholder 2">
             <a:extLst>
               <a:ext uri="{FF2B5EF4-FFF2-40B4-BE49-F238E27FC236}">
@@ -6082,14 +5311,11 @@
         <p:spPr>
           <a:xfrm>
             <a:off x="101600" y="815976"/>
-            <a:ext cx="12090400" cy="6042024"/>
+            <a:ext cx="12090400" cy="5746749"/>
           </a:xfrm>
           <a:prstGeom prst="rect">
             <a:avLst/>
           </a:prstGeom>
-          <a:solidFill>
-            <a:schemeClr val="bg1"/>
-          </a:solidFill>
         </p:spPr>
         <p:txBody>
           <a:bodyPr/>
@@ -6346,31 +5572,16 @@
               <a:buChar char="•"/>
             </a:pPr>
             <a:r>
-              <a:rPr lang="en-US" sz="1800" dirty="0"/>
-              <a:t>Use Pandas to clean and format your dataset or datasets.</a:t>
-            </a:r>
-          </a:p>
-          <a:p>
-            <a:pPr lvl="1">
+              <a:rPr lang="en-US" dirty="0"/>
+              <a:t> Questions that you found interesting and what motivated you to answer them</a:t>
+            </a:r>
+          </a:p>
+          <a:p>
+            <a:pPr marL="201168" lvl="1" indent="0">
               <a:buClrTx/>
-              <a:buFont typeface="Arial" panose="020B0604020202020204" pitchFamily="34" charset="0"/>
-              <a:buChar char="•"/>
-            </a:pPr>
-            <a:r>
-              <a:rPr lang="en-US" sz="1600" dirty="0"/>
-              <a:t>Greg did this in his Google_vac_data. </a:t>
-            </a:r>
-          </a:p>
-          <a:p>
-            <a:pPr lvl="1">
-              <a:buClrTx/>
-              <a:buFont typeface="Arial" panose="020B0604020202020204" pitchFamily="34" charset="0"/>
-              <a:buChar char="•"/>
-            </a:pPr>
-            <a:r>
-              <a:rPr lang="en-US" sz="1600" dirty="0"/>
-              <a:t>#TODO: Use similar methods in the EARN data.</a:t>
-            </a:r>
+              <a:buNone/>
+            </a:pPr>
+            <a:endParaRPr lang="en-US" dirty="0"/>
           </a:p>
           <a:p>
             <a:pPr>
@@ -6379,20 +5590,17 @@
               <a:buChar char="•"/>
             </a:pPr>
             <a:r>
-              <a:rPr lang="en-US" sz="1800" dirty="0"/>
-              <a:t>Create a Jupyter notebook describing the data exploration and cleanup process.</a:t>
-            </a:r>
-          </a:p>
-          <a:p>
-            <a:pPr lvl="1">
+              <a:rPr lang="en-US" dirty="0"/>
+              <a:t> Where and how you found the data you used to answer these questions</a:t>
+            </a:r>
+          </a:p>
+          <a:p>
+            <a:pPr marL="544068" lvl="1" indent="-342900">
               <a:buClrTx/>
-              <a:buFont typeface="Arial" panose="020B0604020202020204" pitchFamily="34" charset="0"/>
-              <a:buChar char="•"/>
-            </a:pPr>
-            <a:r>
-              <a:rPr lang="en-US" sz="1600" dirty="0"/>
-              <a:t>#TODO: Add comments into Greg’s code. Source where applicable, otherwise succinct explanations for each cell where ambiguous.</a:t>
-            </a:r>
+              <a:buFont typeface="+mj-lt"/>
+              <a:buAutoNum type="arabicPeriod"/>
+            </a:pPr>
+            <a:endParaRPr lang="en-US" dirty="0"/>
           </a:p>
           <a:p>
             <a:pPr>
@@ -6401,20 +5609,17 @@
               <a:buChar char="•"/>
             </a:pPr>
             <a:r>
-              <a:rPr lang="en-US" sz="1800" dirty="0"/>
-              <a:t>Create a Jupyter notebook illustrating the final data analysis.</a:t>
-            </a:r>
-          </a:p>
-          <a:p>
-            <a:pPr lvl="1">
+              <a:rPr lang="en-US" dirty="0"/>
+              <a:t> The data exploration and cleanup process (accompanied by your Jupyter notebook)</a:t>
+            </a:r>
+          </a:p>
+          <a:p>
+            <a:pPr marL="544068" lvl="1" indent="-342900">
               <a:buClrTx/>
-              <a:buFont typeface="Arial" panose="020B0604020202020204" pitchFamily="34" charset="0"/>
-              <a:buChar char="•"/>
-            </a:pPr>
-            <a:r>
-              <a:rPr lang="en-US" sz="1600" dirty="0"/>
-              <a:t>#TODO: Kendal and Joanna</a:t>
-            </a:r>
+              <a:buFont typeface="+mj-lt"/>
+              <a:buAutoNum type="arabicPeriod"/>
+            </a:pPr>
+            <a:endParaRPr lang="en-US" dirty="0"/>
           </a:p>
           <a:p>
             <a:pPr>
@@ -6423,20 +5628,17 @@
               <a:buChar char="•"/>
             </a:pPr>
             <a:r>
-              <a:rPr lang="en-US" sz="1800" dirty="0"/>
-              <a:t>Use Matplotlib to create 6 to 8 visualizations of your data</a:t>
-            </a:r>
-          </a:p>
-          <a:p>
-            <a:pPr lvl="1">
+              <a:rPr lang="en-US" dirty="0"/>
+              <a:t> The analysis process (accompanied by your Jupyter notebook)</a:t>
+            </a:r>
+          </a:p>
+          <a:p>
+            <a:pPr marL="544068" lvl="1" indent="-342900">
               <a:buClrTx/>
-              <a:buFont typeface="Arial" panose="020B0604020202020204" pitchFamily="34" charset="0"/>
-              <a:buChar char="•"/>
-            </a:pPr>
-            <a:r>
-              <a:rPr lang="en-US" sz="1600" dirty="0"/>
-              <a:t>#TODO: Team/Kendal and Joanna</a:t>
-            </a:r>
+              <a:buFont typeface="+mj-lt"/>
+              <a:buAutoNum type="arabicPeriod"/>
+            </a:pPr>
+            <a:endParaRPr lang="en-US" dirty="0"/>
           </a:p>
           <a:p>
             <a:pPr>
@@ -6445,20 +5647,17 @@
               <a:buChar char="•"/>
             </a:pPr>
             <a:r>
-              <a:rPr lang="en-US" sz="1800" dirty="0"/>
-              <a:t>(ideally, at least 2 visualizations per “question” that you ask your data).</a:t>
-            </a:r>
-          </a:p>
-          <a:p>
-            <a:pPr lvl="1">
+              <a:rPr lang="en-US" dirty="0"/>
+              <a:t> Your conclusions, including a numerical summary and visualizations of the summary</a:t>
+            </a:r>
+          </a:p>
+          <a:p>
+            <a:pPr marL="544068" lvl="1" indent="-342900">
               <a:buClrTx/>
-              <a:buFont typeface="Arial" panose="020B0604020202020204" pitchFamily="34" charset="0"/>
-              <a:buChar char="•"/>
-            </a:pPr>
-            <a:r>
-              <a:rPr lang="en-US" sz="1600" dirty="0"/>
-              <a:t>...</a:t>
-            </a:r>
+              <a:buFont typeface="+mj-lt"/>
+              <a:buAutoNum type="arabicPeriod"/>
+            </a:pPr>
+            <a:endParaRPr lang="en-US" dirty="0"/>
           </a:p>
           <a:p>
             <a:pPr>
@@ -6467,54 +5666,17 @@
               <a:buChar char="•"/>
             </a:pPr>
             <a:r>
-              <a:rPr lang="en-US" sz="1800" dirty="0"/>
-              <a:t>Save PNG images of your visualizations to distribute to the class and instructional team—and for inclusion in your presentation.</a:t>
-            </a:r>
-          </a:p>
-          <a:p>
-            <a:pPr lvl="1">
+              <a:rPr lang="en-US" dirty="0"/>
+              <a:t> The implications of your findings: what do your findings mean?</a:t>
+            </a:r>
+          </a:p>
+          <a:p>
+            <a:pPr marL="544068" lvl="1" indent="-342900">
               <a:buClrTx/>
-              <a:buFont typeface="Arial" panose="020B0604020202020204" pitchFamily="34" charset="0"/>
-              <a:buChar char="•"/>
-            </a:pPr>
-            <a:r>
-              <a:rPr lang="en-US" sz="1600" dirty="0"/>
-              <a:t>Save plots as variables and save into “Resources” folder.</a:t>
-            </a:r>
-          </a:p>
-          <a:p>
-            <a:pPr>
-              <a:buClrTx/>
-              <a:buFont typeface="Arial" panose="020B0604020202020204" pitchFamily="34" charset="0"/>
-              <a:buChar char="•"/>
-            </a:pPr>
-            <a:r>
-              <a:rPr lang="en-US" sz="1800" dirty="0"/>
-              <a:t>Create a write-up summarizing your major findings. This should include a heading for each “question” that you asked your data as well as a short description of your findings and any relevant plots.</a:t>
-            </a:r>
-          </a:p>
-          <a:p>
-            <a:pPr>
-              <a:buClrTx/>
-              <a:buFont typeface="Arial" panose="020B0604020202020204" pitchFamily="34" charset="0"/>
-              <a:buChar char="•"/>
-            </a:pPr>
-            <a:r>
-              <a:rPr lang="en-US" sz="1800" dirty="0"/>
-              <a:t>Bonus Use at least one API—if you can find one with data pertinent to your primary research questions.</a:t>
-            </a:r>
-            <a:endParaRPr lang="en-US" sz="1600" dirty="0"/>
-          </a:p>
-          <a:p>
-            <a:pPr lvl="1">
-              <a:buClrTx/>
-              <a:buFont typeface="Arial" panose="020B0604020202020204" pitchFamily="34" charset="0"/>
-              <a:buChar char="•"/>
-            </a:pPr>
-            <a:r>
-              <a:rPr lang="en-US" sz="1600" dirty="0"/>
-              <a:t>#TODO: Take a csv table or columns and do the same using an API.</a:t>
-            </a:r>
+              <a:buFont typeface="+mj-lt"/>
+              <a:buAutoNum type="arabicPeriod"/>
+            </a:pPr>
+            <a:endParaRPr lang="en-US" dirty="0"/>
           </a:p>
         </p:txBody>
       </p:sp>
@@ -6570,7 +5732,7 @@
           <a:p>
             <a:r>
               <a:rPr lang="en-US" dirty="0"/>
-              <a:t>Development Requirements</a:t>
+              <a:t>Presentation Requirements</a:t>
             </a:r>
           </a:p>
         </p:txBody>
@@ -6578,7 +5740,7 @@
     </p:spTree>
     <p:extLst>
       <p:ext uri="{BB962C8B-B14F-4D97-AF65-F5344CB8AC3E}">
-        <p14:creationId xmlns:p14="http://schemas.microsoft.com/office/powerpoint/2010/main" val="908844552"/>
+        <p14:creationId xmlns:p14="http://schemas.microsoft.com/office/powerpoint/2010/main" val="2614040401"/>
       </p:ext>
     </p:extLst>
   </p:cSld>
@@ -6588,7 +5750,1612 @@
 </p:sld>
 </file>
 
-<file path=ppt/slides/slide8.xml><?xml version="1.0" encoding="utf-8"?>
+<file path=ppt/slides/slide13.xml><?xml version="1.0" encoding="utf-8"?>
+<p:sld xmlns:a="http://schemas.openxmlformats.org/drawingml/2006/main" xmlns:r="http://schemas.openxmlformats.org/officeDocument/2006/relationships" xmlns:p="http://schemas.openxmlformats.org/presentationml/2006/main">
+  <p:cSld>
+    <p:spTree>
+      <p:nvGrpSpPr>
+        <p:cNvPr id="1" name=""/>
+        <p:cNvGrpSpPr/>
+        <p:nvPr/>
+      </p:nvGrpSpPr>
+      <p:grpSpPr>
+        <a:xfrm>
+          <a:off x="0" y="0"/>
+          <a:ext cx="0" cy="0"/>
+          <a:chOff x="0" y="0"/>
+          <a:chExt cx="0" cy="0"/>
+        </a:xfrm>
+      </p:grpSpPr>
+      <p:sp>
+        <p:nvSpPr>
+          <p:cNvPr id="2" name="Title 1">
+            <a:extLst>
+              <a:ext uri="{FF2B5EF4-FFF2-40B4-BE49-F238E27FC236}">
+                <a16:creationId xmlns:a16="http://schemas.microsoft.com/office/drawing/2014/main" id="{516AA0E4-679C-98A1-AAD2-B79F27E86F2D}"/>
+              </a:ext>
+            </a:extLst>
+          </p:cNvPr>
+          <p:cNvSpPr>
+            <a:spLocks noGrp="1"/>
+          </p:cNvSpPr>
+          <p:nvPr>
+            <p:ph type="title"/>
+          </p:nvPr>
+        </p:nvSpPr>
+        <p:spPr/>
+        <p:txBody>
+          <a:bodyPr>
+            <a:normAutofit/>
+          </a:bodyPr>
+          <a:lstStyle/>
+          <a:p>
+            <a:r>
+              <a:rPr lang="en-US" dirty="0"/>
+              <a:t>Questions that you found interesting and what motivated you to answer them</a:t>
+            </a:r>
+          </a:p>
+        </p:txBody>
+      </p:sp>
+      <p:sp>
+        <p:nvSpPr>
+          <p:cNvPr id="3" name="Content Placeholder 2">
+            <a:extLst>
+              <a:ext uri="{FF2B5EF4-FFF2-40B4-BE49-F238E27FC236}">
+                <a16:creationId xmlns:a16="http://schemas.microsoft.com/office/drawing/2014/main" id="{264C10B3-8E95-F7CC-08C1-580CF9EEFDD4}"/>
+              </a:ext>
+            </a:extLst>
+          </p:cNvPr>
+          <p:cNvSpPr>
+            <a:spLocks noGrp="1"/>
+          </p:cNvSpPr>
+          <p:nvPr>
+            <p:ph idx="1"/>
+          </p:nvPr>
+        </p:nvSpPr>
+        <p:spPr/>
+        <p:txBody>
+          <a:bodyPr>
+            <a:normAutofit fontScale="92500" lnSpcReduction="10000"/>
+          </a:bodyPr>
+          <a:lstStyle/>
+          <a:p>
+            <a:r>
+              <a:rPr lang="en-US" sz="2400" dirty="0"/>
+              <a:t>Questions</a:t>
+            </a:r>
+            <a:r>
+              <a:rPr lang="en-US" dirty="0"/>
+              <a:t>:</a:t>
+            </a:r>
+          </a:p>
+          <a:p>
+            <a:pPr>
+              <a:buFont typeface="Wingdings" panose="05000000000000000000" pitchFamily="2" charset="2"/>
+              <a:buChar char="§"/>
+            </a:pPr>
+            <a:r>
+              <a:rPr lang="en-US" dirty="0"/>
+              <a:t> (Help me here group)</a:t>
+            </a:r>
+          </a:p>
+          <a:p>
+            <a:pPr>
+              <a:buFont typeface="Wingdings" panose="05000000000000000000" pitchFamily="2" charset="2"/>
+              <a:buChar char="§"/>
+            </a:pPr>
+            <a:r>
+              <a:rPr lang="en-US" dirty="0"/>
+              <a:t> Did states that spent a higher percentage of their federally-granted budget have higher rates of vaccination?</a:t>
+            </a:r>
+          </a:p>
+          <a:p>
+            <a:pPr>
+              <a:buFont typeface="Wingdings" panose="05000000000000000000" pitchFamily="2" charset="2"/>
+              <a:buChar char="§"/>
+            </a:pPr>
+            <a:r>
+              <a:rPr lang="en-US" dirty="0"/>
+              <a:t> What Covid project categories did higher vaccination rate states initiate? (top 4 per state)</a:t>
+            </a:r>
+          </a:p>
+          <a:p>
+            <a:pPr lvl="1">
+              <a:buFont typeface="Wingdings" panose="05000000000000000000" pitchFamily="2" charset="2"/>
+              <a:buChar char="§"/>
+            </a:pPr>
+            <a:r>
+              <a:rPr lang="en-US" dirty="0"/>
+              <a:t>Were there similarities in project categories between these high vaccination states?</a:t>
+            </a:r>
+          </a:p>
+          <a:p>
+            <a:endParaRPr lang="en-US" dirty="0"/>
+          </a:p>
+          <a:p>
+            <a:r>
+              <a:rPr lang="en-US" sz="2400" dirty="0"/>
+              <a:t>Motivation</a:t>
+            </a:r>
+            <a:r>
+              <a:rPr lang="en-US" dirty="0"/>
+              <a:t>:</a:t>
+            </a:r>
+          </a:p>
+          <a:p>
+            <a:pPr>
+              <a:buFont typeface="Wingdings" panose="05000000000000000000" pitchFamily="2" charset="2"/>
+              <a:buChar char="§"/>
+            </a:pPr>
+            <a:r>
+              <a:rPr lang="en-US" dirty="0"/>
+              <a:t> EARN workbook provided project funding per state/local gov’t during Covid-19 pandemic.</a:t>
+            </a:r>
+          </a:p>
+          <a:p>
+            <a:pPr>
+              <a:buFont typeface="Wingdings" panose="05000000000000000000" pitchFamily="2" charset="2"/>
+              <a:buChar char="§"/>
+            </a:pPr>
+            <a:r>
+              <a:rPr lang="en-US" dirty="0"/>
+              <a:t> This unique dataset allowed us to target states for deeper review based on their percentage spend of federal funds allocated.</a:t>
+            </a:r>
+          </a:p>
+        </p:txBody>
+      </p:sp>
+    </p:spTree>
+    <p:extLst>
+      <p:ext uri="{BB962C8B-B14F-4D97-AF65-F5344CB8AC3E}">
+        <p14:creationId xmlns:p14="http://schemas.microsoft.com/office/powerpoint/2010/main" val="1149720348"/>
+      </p:ext>
+    </p:extLst>
+  </p:cSld>
+  <p:clrMapOvr>
+    <a:masterClrMapping/>
+  </p:clrMapOvr>
+</p:sld>
+</file>
+
+<file path=ppt/slides/slide14.xml><?xml version="1.0" encoding="utf-8"?>
+<p:sld xmlns:a="http://schemas.openxmlformats.org/drawingml/2006/main" xmlns:r="http://schemas.openxmlformats.org/officeDocument/2006/relationships" xmlns:p="http://schemas.openxmlformats.org/presentationml/2006/main">
+  <p:cSld>
+    <p:spTree>
+      <p:nvGrpSpPr>
+        <p:cNvPr id="1" name=""/>
+        <p:cNvGrpSpPr/>
+        <p:nvPr/>
+      </p:nvGrpSpPr>
+      <p:grpSpPr>
+        <a:xfrm>
+          <a:off x="0" y="0"/>
+          <a:ext cx="0" cy="0"/>
+          <a:chOff x="0" y="0"/>
+          <a:chExt cx="0" cy="0"/>
+        </a:xfrm>
+      </p:grpSpPr>
+      <p:sp>
+        <p:nvSpPr>
+          <p:cNvPr id="2" name="Title 1">
+            <a:extLst>
+              <a:ext uri="{FF2B5EF4-FFF2-40B4-BE49-F238E27FC236}">
+                <a16:creationId xmlns:a16="http://schemas.microsoft.com/office/drawing/2014/main" id="{2A6CE34C-694C-5B1E-AAD6-FE38E3DD970A}"/>
+              </a:ext>
+            </a:extLst>
+          </p:cNvPr>
+          <p:cNvSpPr>
+            <a:spLocks noGrp="1"/>
+          </p:cNvSpPr>
+          <p:nvPr>
+            <p:ph type="title"/>
+          </p:nvPr>
+        </p:nvSpPr>
+        <p:spPr/>
+        <p:txBody>
+          <a:bodyPr>
+            <a:normAutofit/>
+          </a:bodyPr>
+          <a:lstStyle/>
+          <a:p>
+            <a:r>
+              <a:rPr lang="en-US" dirty="0"/>
+              <a:t>Where and how you found the data you used to answer these questions</a:t>
+            </a:r>
+          </a:p>
+        </p:txBody>
+      </p:sp>
+      <p:sp>
+        <p:nvSpPr>
+          <p:cNvPr id="3" name="Content Placeholder 2">
+            <a:extLst>
+              <a:ext uri="{FF2B5EF4-FFF2-40B4-BE49-F238E27FC236}">
+                <a16:creationId xmlns:a16="http://schemas.microsoft.com/office/drawing/2014/main" id="{9F4F8889-1A28-EF6B-8EAB-A732EFA19B5F}"/>
+              </a:ext>
+            </a:extLst>
+          </p:cNvPr>
+          <p:cNvSpPr>
+            <a:spLocks noGrp="1"/>
+          </p:cNvSpPr>
+          <p:nvPr>
+            <p:ph idx="1"/>
+          </p:nvPr>
+        </p:nvSpPr>
+        <p:spPr>
+          <a:xfrm>
+            <a:off x="1097280" y="1737359"/>
+            <a:ext cx="10058400" cy="4551473"/>
+          </a:xfrm>
+        </p:spPr>
+        <p:txBody>
+          <a:bodyPr/>
+          <a:lstStyle/>
+          <a:p>
+            <a:pPr>
+              <a:buFont typeface="Wingdings" panose="05000000000000000000" pitchFamily="2" charset="2"/>
+              <a:buChar char="§"/>
+            </a:pPr>
+            <a:r>
+              <a:rPr lang="en-US" dirty="0"/>
+              <a:t> EARN Workbook (Joanna can you make this sentence </a:t>
+            </a:r>
+            <a:r>
+              <a:rPr lang="en-US" dirty="0" err="1"/>
+              <a:t>gooder</a:t>
+            </a:r>
+            <a:r>
+              <a:rPr lang="en-US" dirty="0"/>
+              <a:t>?)</a:t>
+            </a:r>
+          </a:p>
+          <a:p>
+            <a:pPr>
+              <a:buFont typeface="Wingdings" panose="05000000000000000000" pitchFamily="2" charset="2"/>
+              <a:buChar char="§"/>
+            </a:pPr>
+            <a:endParaRPr lang="en-US" dirty="0"/>
+          </a:p>
+          <a:p>
+            <a:pPr>
+              <a:buFont typeface="Wingdings" panose="05000000000000000000" pitchFamily="2" charset="2"/>
+              <a:buChar char="§"/>
+            </a:pPr>
+            <a:r>
+              <a:rPr lang="en-US" dirty="0"/>
+              <a:t> Covid-19 dataset provided by the CDC collected (include source link or snip from the webpage)</a:t>
+            </a:r>
+          </a:p>
+          <a:p>
+            <a:pPr marL="0" indent="0">
+              <a:buNone/>
+            </a:pPr>
+            <a:endParaRPr lang="en-US" dirty="0"/>
+          </a:p>
+        </p:txBody>
+      </p:sp>
+    </p:spTree>
+    <p:extLst>
+      <p:ext uri="{BB962C8B-B14F-4D97-AF65-F5344CB8AC3E}">
+        <p14:creationId xmlns:p14="http://schemas.microsoft.com/office/powerpoint/2010/main" val="1472211333"/>
+      </p:ext>
+    </p:extLst>
+  </p:cSld>
+  <p:clrMapOvr>
+    <a:masterClrMapping/>
+  </p:clrMapOvr>
+</p:sld>
+</file>
+
+<file path=ppt/slides/slide15.xml><?xml version="1.0" encoding="utf-8"?>
+<p:sld xmlns:a="http://schemas.openxmlformats.org/drawingml/2006/main" xmlns:r="http://schemas.openxmlformats.org/officeDocument/2006/relationships" xmlns:p="http://schemas.openxmlformats.org/presentationml/2006/main">
+  <p:cSld>
+    <p:spTree>
+      <p:nvGrpSpPr>
+        <p:cNvPr id="1" name=""/>
+        <p:cNvGrpSpPr/>
+        <p:nvPr/>
+      </p:nvGrpSpPr>
+      <p:grpSpPr>
+        <a:xfrm>
+          <a:off x="0" y="0"/>
+          <a:ext cx="0" cy="0"/>
+          <a:chOff x="0" y="0"/>
+          <a:chExt cx="0" cy="0"/>
+        </a:xfrm>
+      </p:grpSpPr>
+      <p:sp>
+        <p:nvSpPr>
+          <p:cNvPr id="2" name="Title 1">
+            <a:extLst>
+              <a:ext uri="{FF2B5EF4-FFF2-40B4-BE49-F238E27FC236}">
+                <a16:creationId xmlns:a16="http://schemas.microsoft.com/office/drawing/2014/main" id="{6F0C3EBF-4145-5908-C88F-05F806A8F190}"/>
+              </a:ext>
+            </a:extLst>
+          </p:cNvPr>
+          <p:cNvSpPr>
+            <a:spLocks noGrp="1"/>
+          </p:cNvSpPr>
+          <p:nvPr>
+            <p:ph type="title"/>
+          </p:nvPr>
+        </p:nvSpPr>
+        <p:spPr/>
+        <p:txBody>
+          <a:bodyPr>
+            <a:normAutofit fontScale="90000"/>
+          </a:bodyPr>
+          <a:lstStyle/>
+          <a:p>
+            <a:r>
+              <a:rPr lang="en-US" dirty="0"/>
+              <a:t> The data exploration and cleanup process (accompanied by your Jupyter notebook)</a:t>
+            </a:r>
+          </a:p>
+        </p:txBody>
+      </p:sp>
+      <p:sp>
+        <p:nvSpPr>
+          <p:cNvPr id="3" name="Content Placeholder 2">
+            <a:extLst>
+              <a:ext uri="{FF2B5EF4-FFF2-40B4-BE49-F238E27FC236}">
+                <a16:creationId xmlns:a16="http://schemas.microsoft.com/office/drawing/2014/main" id="{F99B99BC-6593-564A-6627-E07C1249922C}"/>
+              </a:ext>
+            </a:extLst>
+          </p:cNvPr>
+          <p:cNvSpPr>
+            <a:spLocks noGrp="1"/>
+          </p:cNvSpPr>
+          <p:nvPr>
+            <p:ph idx="1"/>
+          </p:nvPr>
+        </p:nvSpPr>
+        <p:spPr/>
+        <p:txBody>
+          <a:bodyPr/>
+          <a:lstStyle/>
+          <a:p>
+            <a:pPr>
+              <a:buFont typeface="Wingdings" panose="05000000000000000000" pitchFamily="2" charset="2"/>
+              <a:buChar char="§"/>
+            </a:pPr>
+            <a:r>
+              <a:rPr lang="en-US" dirty="0"/>
+              <a:t> Imported EARN workbook sheets as CSV files. </a:t>
+            </a:r>
+          </a:p>
+          <a:p>
+            <a:pPr lvl="1">
+              <a:buFont typeface="Wingdings" panose="05000000000000000000" pitchFamily="2" charset="2"/>
+              <a:buChar char="§"/>
+            </a:pPr>
+            <a:r>
+              <a:rPr lang="en-US" dirty="0"/>
+              <a:t>Cleaned </a:t>
+            </a:r>
+            <a:r>
+              <a:rPr lang="en-US" dirty="0" err="1"/>
+              <a:t>DataFrames</a:t>
+            </a:r>
+            <a:r>
+              <a:rPr lang="en-US" dirty="0"/>
+              <a:t> by converting string number columns to numeric.</a:t>
+            </a:r>
+          </a:p>
+          <a:p>
+            <a:pPr>
+              <a:buFont typeface="Wingdings" panose="05000000000000000000" pitchFamily="2" charset="2"/>
+              <a:buChar char="§"/>
+            </a:pPr>
+            <a:r>
+              <a:rPr lang="en-US" dirty="0"/>
+              <a:t> Used </a:t>
+            </a:r>
+            <a:r>
+              <a:rPr lang="en-US" dirty="0" err="1"/>
+              <a:t>groupby</a:t>
+            </a:r>
+            <a:r>
+              <a:rPr lang="en-US" dirty="0"/>
+              <a:t> functions to sum numerical values.</a:t>
+            </a:r>
+          </a:p>
+          <a:p>
+            <a:pPr>
+              <a:buFont typeface="Wingdings" panose="05000000000000000000" pitchFamily="2" charset="2"/>
+              <a:buChar char="§"/>
+            </a:pPr>
+            <a:r>
+              <a:rPr lang="en-US" dirty="0"/>
+              <a:t> Used </a:t>
+            </a:r>
+            <a:r>
+              <a:rPr lang="en-US" dirty="0" err="1"/>
+              <a:t>groupby</a:t>
+            </a:r>
+            <a:r>
+              <a:rPr lang="en-US" dirty="0"/>
+              <a:t> functions to sum count of project types.</a:t>
+            </a:r>
+          </a:p>
+          <a:p>
+            <a:pPr>
+              <a:buFont typeface="Wingdings" panose="05000000000000000000" pitchFamily="2" charset="2"/>
+              <a:buChar char="§"/>
+            </a:pPr>
+            <a:r>
+              <a:rPr lang="en-US" dirty="0"/>
+              <a:t> Created calculated percentage columns within relevant </a:t>
+            </a:r>
+            <a:r>
+              <a:rPr lang="en-US" dirty="0" err="1"/>
+              <a:t>DataFrames</a:t>
+            </a:r>
+            <a:r>
+              <a:rPr lang="en-US" dirty="0"/>
+              <a:t>.</a:t>
+            </a:r>
+          </a:p>
+          <a:p>
+            <a:pPr>
+              <a:buFont typeface="Wingdings" panose="05000000000000000000" pitchFamily="2" charset="2"/>
+              <a:buChar char="§"/>
+            </a:pPr>
+            <a:endParaRPr lang="en-US" dirty="0"/>
+          </a:p>
+          <a:p>
+            <a:pPr>
+              <a:buFont typeface="Wingdings" panose="05000000000000000000" pitchFamily="2" charset="2"/>
+              <a:buChar char="§"/>
+            </a:pPr>
+            <a:endParaRPr lang="en-US" dirty="0"/>
+          </a:p>
+          <a:p>
+            <a:pPr marL="0" indent="0">
+              <a:buNone/>
+            </a:pPr>
+            <a:r>
+              <a:rPr lang="en-US" dirty="0"/>
+              <a:t>(Try to make this explanation align directly with the skills we’ve learned in this class, </a:t>
+            </a:r>
+            <a:r>
+              <a:rPr lang="en-US" dirty="0" err="1"/>
+              <a:t>ie</a:t>
+            </a:r>
+            <a:r>
+              <a:rPr lang="en-US" dirty="0"/>
+              <a:t>) “Used Pandas </a:t>
+            </a:r>
+            <a:r>
+              <a:rPr lang="en-US" dirty="0" err="1"/>
+              <a:t>xyz</a:t>
+            </a:r>
+            <a:r>
+              <a:rPr lang="en-US" dirty="0"/>
+              <a:t> functions. Used Python .replace to drop string characters preventing casting as numeric)</a:t>
+            </a:r>
+          </a:p>
+        </p:txBody>
+      </p:sp>
+    </p:spTree>
+    <p:extLst>
+      <p:ext uri="{BB962C8B-B14F-4D97-AF65-F5344CB8AC3E}">
+        <p14:creationId xmlns:p14="http://schemas.microsoft.com/office/powerpoint/2010/main" val="3791972924"/>
+      </p:ext>
+    </p:extLst>
+  </p:cSld>
+  <p:clrMapOvr>
+    <a:masterClrMapping/>
+  </p:clrMapOvr>
+</p:sld>
+</file>
+
+<file path=ppt/slides/slide16.xml><?xml version="1.0" encoding="utf-8"?>
+<p:sld xmlns:a="http://schemas.openxmlformats.org/drawingml/2006/main" xmlns:r="http://schemas.openxmlformats.org/officeDocument/2006/relationships" xmlns:p="http://schemas.openxmlformats.org/presentationml/2006/main">
+  <p:cSld>
+    <p:spTree>
+      <p:nvGrpSpPr>
+        <p:cNvPr id="1" name=""/>
+        <p:cNvGrpSpPr/>
+        <p:nvPr/>
+      </p:nvGrpSpPr>
+      <p:grpSpPr>
+        <a:xfrm>
+          <a:off x="0" y="0"/>
+          <a:ext cx="0" cy="0"/>
+          <a:chOff x="0" y="0"/>
+          <a:chExt cx="0" cy="0"/>
+        </a:xfrm>
+      </p:grpSpPr>
+      <p:sp>
+        <p:nvSpPr>
+          <p:cNvPr id="2" name="Title 1">
+            <a:extLst>
+              <a:ext uri="{FF2B5EF4-FFF2-40B4-BE49-F238E27FC236}">
+                <a16:creationId xmlns:a16="http://schemas.microsoft.com/office/drawing/2014/main" id="{8D762A82-5C67-55DD-9A6F-0C7827E11DE6}"/>
+              </a:ext>
+            </a:extLst>
+          </p:cNvPr>
+          <p:cNvSpPr>
+            <a:spLocks noGrp="1"/>
+          </p:cNvSpPr>
+          <p:nvPr>
+            <p:ph type="title"/>
+          </p:nvPr>
+        </p:nvSpPr>
+        <p:spPr/>
+        <p:txBody>
+          <a:bodyPr>
+            <a:normAutofit/>
+          </a:bodyPr>
+          <a:lstStyle/>
+          <a:p>
+            <a:r>
+              <a:rPr lang="en-US" dirty="0"/>
+              <a:t>The analysis process (accompanied by your Jupyter notebook)</a:t>
+            </a:r>
+          </a:p>
+        </p:txBody>
+      </p:sp>
+      <p:sp>
+        <p:nvSpPr>
+          <p:cNvPr id="3" name="Content Placeholder 2">
+            <a:extLst>
+              <a:ext uri="{FF2B5EF4-FFF2-40B4-BE49-F238E27FC236}">
+                <a16:creationId xmlns:a16="http://schemas.microsoft.com/office/drawing/2014/main" id="{AF3F6DD1-CDA7-163A-9A93-EF1AD6EE2659}"/>
+              </a:ext>
+            </a:extLst>
+          </p:cNvPr>
+          <p:cNvSpPr>
+            <a:spLocks noGrp="1"/>
+          </p:cNvSpPr>
+          <p:nvPr>
+            <p:ph idx="1"/>
+          </p:nvPr>
+        </p:nvSpPr>
+        <p:spPr/>
+        <p:txBody>
+          <a:bodyPr>
+            <a:normAutofit lnSpcReduction="10000"/>
+          </a:bodyPr>
+          <a:lstStyle/>
+          <a:p>
+            <a:pPr marL="0" indent="0">
+              <a:buNone/>
+            </a:pPr>
+            <a:r>
+              <a:rPr lang="en-US" dirty="0"/>
+              <a:t>Here’s where we show, don’t tell:</a:t>
+            </a:r>
+          </a:p>
+          <a:p>
+            <a:pPr>
+              <a:buFont typeface="Wingdings" panose="05000000000000000000" pitchFamily="2" charset="2"/>
+              <a:buChar char="§"/>
+            </a:pPr>
+            <a:r>
+              <a:rPr lang="en-US" dirty="0"/>
+              <a:t> Start with EARN combination bar/line graph. </a:t>
+            </a:r>
+            <a:r>
+              <a:rPr lang="en-US" sz="1800" dirty="0"/>
+              <a:t>No real conclusions or further analysis on this one. It just summarizes the EARN workbook data which helped answer our questions.</a:t>
+            </a:r>
+          </a:p>
+          <a:p>
+            <a:pPr>
+              <a:buFont typeface="Wingdings" panose="05000000000000000000" pitchFamily="2" charset="2"/>
+              <a:buChar char="§"/>
+            </a:pPr>
+            <a:endParaRPr lang="en-US" dirty="0"/>
+          </a:p>
+          <a:p>
+            <a:pPr>
+              <a:buFont typeface="Wingdings" panose="05000000000000000000" pitchFamily="2" charset="2"/>
+              <a:buChar char="§"/>
+            </a:pPr>
+            <a:r>
+              <a:rPr lang="en-US" dirty="0"/>
+              <a:t> Then slides showing state heatmaps.</a:t>
+            </a:r>
+          </a:p>
+          <a:p>
+            <a:pPr>
+              <a:buFont typeface="Wingdings" panose="05000000000000000000" pitchFamily="2" charset="2"/>
+              <a:buChar char="§"/>
+            </a:pPr>
+            <a:endParaRPr lang="en-US" dirty="0"/>
+          </a:p>
+          <a:p>
+            <a:pPr>
+              <a:buFont typeface="Wingdings" panose="05000000000000000000" pitchFamily="2" charset="2"/>
+              <a:buChar char="§"/>
+            </a:pPr>
+            <a:r>
+              <a:rPr lang="en-US" dirty="0"/>
+              <a:t> Then bar charts for categories by state (spending or count of charts for top 3 or 4 vaccinator states).</a:t>
+            </a:r>
+          </a:p>
+          <a:p>
+            <a:pPr>
+              <a:buFont typeface="Wingdings" panose="05000000000000000000" pitchFamily="2" charset="2"/>
+              <a:buChar char="§"/>
+            </a:pPr>
+            <a:endParaRPr lang="en-US" dirty="0"/>
+          </a:p>
+          <a:p>
+            <a:pPr>
+              <a:buFont typeface="Wingdings" panose="05000000000000000000" pitchFamily="2" charset="2"/>
+              <a:buChar char="§"/>
+            </a:pPr>
+            <a:r>
+              <a:rPr lang="en-US" dirty="0"/>
+              <a:t> Then what?? At least 1 correlation/regression plot? Would be moreso to showcase our ability to use the method.</a:t>
+            </a:r>
+          </a:p>
+        </p:txBody>
+      </p:sp>
+    </p:spTree>
+    <p:extLst>
+      <p:ext uri="{BB962C8B-B14F-4D97-AF65-F5344CB8AC3E}">
+        <p14:creationId xmlns:p14="http://schemas.microsoft.com/office/powerpoint/2010/main" val="1611749723"/>
+      </p:ext>
+    </p:extLst>
+  </p:cSld>
+  <p:clrMapOvr>
+    <a:masterClrMapping/>
+  </p:clrMapOvr>
+</p:sld>
+</file>
+
+<file path=ppt/slides/slide17.xml><?xml version="1.0" encoding="utf-8"?>
+<p:sld xmlns:a="http://schemas.openxmlformats.org/drawingml/2006/main" xmlns:r="http://schemas.openxmlformats.org/officeDocument/2006/relationships" xmlns:p="http://schemas.openxmlformats.org/presentationml/2006/main">
+  <p:cSld>
+    <p:spTree>
+      <p:nvGrpSpPr>
+        <p:cNvPr id="1" name=""/>
+        <p:cNvGrpSpPr/>
+        <p:nvPr/>
+      </p:nvGrpSpPr>
+      <p:grpSpPr>
+        <a:xfrm>
+          <a:off x="0" y="0"/>
+          <a:ext cx="0" cy="0"/>
+          <a:chOff x="0" y="0"/>
+          <a:chExt cx="0" cy="0"/>
+        </a:xfrm>
+      </p:grpSpPr>
+      <p:sp>
+        <p:nvSpPr>
+          <p:cNvPr id="2" name="Title 1">
+            <a:extLst>
+              <a:ext uri="{FF2B5EF4-FFF2-40B4-BE49-F238E27FC236}">
+                <a16:creationId xmlns:a16="http://schemas.microsoft.com/office/drawing/2014/main" id="{7AC685D8-ABCA-82A7-6E46-417501C13A61}"/>
+              </a:ext>
+            </a:extLst>
+          </p:cNvPr>
+          <p:cNvSpPr>
+            <a:spLocks noGrp="1"/>
+          </p:cNvSpPr>
+          <p:nvPr>
+            <p:ph type="title"/>
+          </p:nvPr>
+        </p:nvSpPr>
+        <p:spPr/>
+        <p:txBody>
+          <a:bodyPr>
+            <a:normAutofit fontScale="90000"/>
+          </a:bodyPr>
+          <a:lstStyle/>
+          <a:p>
+            <a:r>
+              <a:rPr lang="en-US" dirty="0"/>
+              <a:t>Your conclusions, including a numerical summary and visualizations of the summary</a:t>
+            </a:r>
+          </a:p>
+        </p:txBody>
+      </p:sp>
+      <p:sp>
+        <p:nvSpPr>
+          <p:cNvPr id="3" name="Content Placeholder 2">
+            <a:extLst>
+              <a:ext uri="{FF2B5EF4-FFF2-40B4-BE49-F238E27FC236}">
+                <a16:creationId xmlns:a16="http://schemas.microsoft.com/office/drawing/2014/main" id="{E7539BA8-7A3E-BB62-6976-0B3BC18A11F4}"/>
+              </a:ext>
+            </a:extLst>
+          </p:cNvPr>
+          <p:cNvSpPr>
+            <a:spLocks noGrp="1"/>
+          </p:cNvSpPr>
+          <p:nvPr>
+            <p:ph idx="1"/>
+          </p:nvPr>
+        </p:nvSpPr>
+        <p:spPr/>
+        <p:txBody>
+          <a:bodyPr/>
+          <a:lstStyle/>
+          <a:p>
+            <a:pPr>
+              <a:buFont typeface="Wingdings" panose="05000000000000000000" pitchFamily="2" charset="2"/>
+              <a:buChar char="§"/>
+            </a:pPr>
+            <a:r>
+              <a:rPr lang="en-US" dirty="0"/>
+              <a:t> Start high level in conclusion bullet points if applicable.</a:t>
+            </a:r>
+          </a:p>
+          <a:p>
+            <a:pPr>
+              <a:buFont typeface="Wingdings" panose="05000000000000000000" pitchFamily="2" charset="2"/>
+              <a:buChar char="§"/>
+            </a:pPr>
+            <a:r>
+              <a:rPr lang="en-US" dirty="0"/>
+              <a:t> Insert repeated copy of the most significant graphs from our analysis to bring the audience back to what was stated earlier in presentation.</a:t>
+            </a:r>
+          </a:p>
+          <a:p>
+            <a:pPr>
+              <a:buFont typeface="Wingdings" panose="05000000000000000000" pitchFamily="2" charset="2"/>
+              <a:buChar char="§"/>
+            </a:pPr>
+            <a:endParaRPr lang="en-US" dirty="0"/>
+          </a:p>
+        </p:txBody>
+      </p:sp>
+    </p:spTree>
+    <p:extLst>
+      <p:ext uri="{BB962C8B-B14F-4D97-AF65-F5344CB8AC3E}">
+        <p14:creationId xmlns:p14="http://schemas.microsoft.com/office/powerpoint/2010/main" val="671781281"/>
+      </p:ext>
+    </p:extLst>
+  </p:cSld>
+  <p:clrMapOvr>
+    <a:masterClrMapping/>
+  </p:clrMapOvr>
+</p:sld>
+</file>
+
+<file path=ppt/slides/slide18.xml><?xml version="1.0" encoding="utf-8"?>
+<p:sld xmlns:a="http://schemas.openxmlformats.org/drawingml/2006/main" xmlns:r="http://schemas.openxmlformats.org/officeDocument/2006/relationships" xmlns:p="http://schemas.openxmlformats.org/presentationml/2006/main">
+  <p:cSld>
+    <p:spTree>
+      <p:nvGrpSpPr>
+        <p:cNvPr id="1" name=""/>
+        <p:cNvGrpSpPr/>
+        <p:nvPr/>
+      </p:nvGrpSpPr>
+      <p:grpSpPr>
+        <a:xfrm>
+          <a:off x="0" y="0"/>
+          <a:ext cx="0" cy="0"/>
+          <a:chOff x="0" y="0"/>
+          <a:chExt cx="0" cy="0"/>
+        </a:xfrm>
+      </p:grpSpPr>
+      <p:sp>
+        <p:nvSpPr>
+          <p:cNvPr id="2" name="Title 1">
+            <a:extLst>
+              <a:ext uri="{FF2B5EF4-FFF2-40B4-BE49-F238E27FC236}">
+                <a16:creationId xmlns:a16="http://schemas.microsoft.com/office/drawing/2014/main" id="{DDB2557C-9949-3B6C-7B73-1B10F2EB142A}"/>
+              </a:ext>
+            </a:extLst>
+          </p:cNvPr>
+          <p:cNvSpPr>
+            <a:spLocks noGrp="1"/>
+          </p:cNvSpPr>
+          <p:nvPr>
+            <p:ph type="title"/>
+          </p:nvPr>
+        </p:nvSpPr>
+        <p:spPr/>
+        <p:txBody>
+          <a:bodyPr>
+            <a:normAutofit/>
+          </a:bodyPr>
+          <a:lstStyle/>
+          <a:p>
+            <a:r>
+              <a:rPr lang="en-US" dirty="0"/>
+              <a:t>The implications of your findings: what do your findings mean?</a:t>
+            </a:r>
+          </a:p>
+        </p:txBody>
+      </p:sp>
+      <p:sp>
+        <p:nvSpPr>
+          <p:cNvPr id="3" name="Content Placeholder 2">
+            <a:extLst>
+              <a:ext uri="{FF2B5EF4-FFF2-40B4-BE49-F238E27FC236}">
+                <a16:creationId xmlns:a16="http://schemas.microsoft.com/office/drawing/2014/main" id="{C48AB4A4-A926-573B-950A-9061BE172B6A}"/>
+              </a:ext>
+            </a:extLst>
+          </p:cNvPr>
+          <p:cNvSpPr>
+            <a:spLocks noGrp="1"/>
+          </p:cNvSpPr>
+          <p:nvPr>
+            <p:ph idx="1"/>
+          </p:nvPr>
+        </p:nvSpPr>
+        <p:spPr/>
+        <p:txBody>
+          <a:bodyPr/>
+          <a:lstStyle/>
+          <a:p>
+            <a:pPr>
+              <a:buFont typeface="Wingdings" panose="05000000000000000000" pitchFamily="2" charset="2"/>
+              <a:buChar char="§"/>
+            </a:pPr>
+            <a:r>
+              <a:rPr lang="en-US" dirty="0"/>
+              <a:t> (We should put our slide deck together before filling this out because this will need to align with the outcome of our analysis and analysis conclusion presented).</a:t>
+            </a:r>
+          </a:p>
+        </p:txBody>
+      </p:sp>
+    </p:spTree>
+    <p:extLst>
+      <p:ext uri="{BB962C8B-B14F-4D97-AF65-F5344CB8AC3E}">
+        <p14:creationId xmlns:p14="http://schemas.microsoft.com/office/powerpoint/2010/main" val="3187080855"/>
+      </p:ext>
+    </p:extLst>
+  </p:cSld>
+  <p:clrMapOvr>
+    <a:masterClrMapping/>
+  </p:clrMapOvr>
+</p:sld>
+</file>
+
+<file path=ppt/slides/slide2.xml><?xml version="1.0" encoding="utf-8"?>
+<p:sld xmlns:a="http://schemas.openxmlformats.org/drawingml/2006/main" xmlns:r="http://schemas.openxmlformats.org/officeDocument/2006/relationships" xmlns:p="http://schemas.openxmlformats.org/presentationml/2006/main">
+  <p:cSld>
+    <p:spTree>
+      <p:nvGrpSpPr>
+        <p:cNvPr id="1" name=""/>
+        <p:cNvGrpSpPr/>
+        <p:nvPr/>
+      </p:nvGrpSpPr>
+      <p:grpSpPr>
+        <a:xfrm>
+          <a:off x="0" y="0"/>
+          <a:ext cx="0" cy="0"/>
+          <a:chOff x="0" y="0"/>
+          <a:chExt cx="0" cy="0"/>
+        </a:xfrm>
+      </p:grpSpPr>
+      <p:sp>
+        <p:nvSpPr>
+          <p:cNvPr id="2" name="Title 1">
+            <a:extLst>
+              <a:ext uri="{FF2B5EF4-FFF2-40B4-BE49-F238E27FC236}">
+                <a16:creationId xmlns:a16="http://schemas.microsoft.com/office/drawing/2014/main" id="{203531D7-F961-0363-14A1-DC3CC04F8BEF}"/>
+              </a:ext>
+            </a:extLst>
+          </p:cNvPr>
+          <p:cNvSpPr>
+            <a:spLocks noGrp="1"/>
+          </p:cNvSpPr>
+          <p:nvPr>
+            <p:ph type="title"/>
+          </p:nvPr>
+        </p:nvSpPr>
+        <p:spPr/>
+        <p:txBody>
+          <a:bodyPr/>
+          <a:lstStyle/>
+          <a:p>
+            <a:pPr algn="ctr"/>
+            <a:r>
+              <a:rPr lang="en-US" dirty="0"/>
+              <a:t>Purpose and Scope</a:t>
+            </a:r>
+          </a:p>
+        </p:txBody>
+      </p:sp>
+      <p:sp>
+        <p:nvSpPr>
+          <p:cNvPr id="3" name="Content Placeholder 2">
+            <a:extLst>
+              <a:ext uri="{FF2B5EF4-FFF2-40B4-BE49-F238E27FC236}">
+                <a16:creationId xmlns:a16="http://schemas.microsoft.com/office/drawing/2014/main" id="{C2ECC505-913C-7EFF-4818-930E44C5DC49}"/>
+              </a:ext>
+            </a:extLst>
+          </p:cNvPr>
+          <p:cNvSpPr>
+            <a:spLocks noGrp="1"/>
+          </p:cNvSpPr>
+          <p:nvPr>
+            <p:ph sz="half" idx="1"/>
+          </p:nvPr>
+        </p:nvSpPr>
+        <p:spPr>
+          <a:ln>
+            <a:solidFill>
+              <a:schemeClr val="tx1"/>
+            </a:solidFill>
+          </a:ln>
+        </p:spPr>
+        <p:txBody>
+          <a:bodyPr>
+            <a:normAutofit fontScale="77500" lnSpcReduction="20000"/>
+          </a:bodyPr>
+          <a:lstStyle/>
+          <a:p>
+            <a:r>
+              <a:rPr lang="en-US" dirty="0"/>
+              <a:t>The kind of data you’d like to work with and the field you’re interested in (finance, healthcare surveys, etc.)</a:t>
+            </a:r>
+          </a:p>
+          <a:p>
+            <a:pPr lvl="1">
+              <a:buClrTx/>
+              <a:buFont typeface="Wingdings" panose="05000000000000000000" pitchFamily="2" charset="2"/>
+              <a:buChar char="§"/>
+            </a:pPr>
+            <a:r>
+              <a:rPr lang="en-US" dirty="0"/>
+              <a:t>Healthcare, specifically Covid-19 data</a:t>
+            </a:r>
+          </a:p>
+          <a:p>
+            <a:pPr lvl="1">
+              <a:buClrTx/>
+              <a:buFont typeface="Wingdings" panose="05000000000000000000" pitchFamily="2" charset="2"/>
+              <a:buChar char="§"/>
+            </a:pPr>
+            <a:endParaRPr lang="en-US" dirty="0"/>
+          </a:p>
+          <a:p>
+            <a:r>
+              <a:rPr lang="en-US" dirty="0"/>
+              <a:t>The questions you’ll ask of the data</a:t>
+            </a:r>
+          </a:p>
+          <a:p>
+            <a:pPr>
+              <a:buClrTx/>
+              <a:buFont typeface="Wingdings" panose="05000000000000000000" pitchFamily="2" charset="2"/>
+              <a:buChar char="§"/>
+            </a:pPr>
+            <a:r>
+              <a:rPr lang="en-US" sz="1800" dirty="0"/>
+              <a:t>Which states spent ARPA money on vaccination programs, and how much/how many programs?</a:t>
+            </a:r>
+          </a:p>
+          <a:p>
+            <a:pPr>
+              <a:buClrTx/>
+              <a:buFont typeface="Wingdings" panose="05000000000000000000" pitchFamily="2" charset="2"/>
+              <a:buChar char="§"/>
+            </a:pPr>
+            <a:r>
+              <a:rPr lang="en-US" sz="1800" dirty="0"/>
+              <a:t>How does vaccination grant spending compare to vaccination rates in each state?</a:t>
+            </a:r>
+          </a:p>
+          <a:p>
+            <a:endParaRPr lang="en-US" dirty="0"/>
+          </a:p>
+          <a:p>
+            <a:r>
+              <a:rPr lang="en-US" dirty="0"/>
+              <a:t>Source for the data</a:t>
+            </a:r>
+          </a:p>
+          <a:p>
+            <a:pPr>
+              <a:buClrTx/>
+              <a:buFont typeface="Wingdings" panose="05000000000000000000" pitchFamily="2" charset="2"/>
+              <a:buChar char="§"/>
+            </a:pPr>
+            <a:r>
+              <a:rPr lang="en-US" sz="1800" dirty="0"/>
+              <a:t>EARN SLFRF Workbook, Q4 2022 (ref </a:t>
+            </a:r>
+            <a:r>
+              <a:rPr lang="en-US" sz="1800" dirty="0">
+                <a:hlinkClick r:id="rId3"/>
+              </a:rPr>
+              <a:t>https://www.epi.org/resources/budget/</a:t>
+            </a:r>
+            <a:r>
+              <a:rPr lang="en-US" sz="1800" dirty="0"/>
+              <a:t>)</a:t>
+            </a:r>
+          </a:p>
+          <a:p>
+            <a:pPr>
+              <a:buClrTx/>
+              <a:buFont typeface="Wingdings" panose="05000000000000000000" pitchFamily="2" charset="2"/>
+              <a:buChar char="§"/>
+            </a:pPr>
+            <a:r>
+              <a:rPr lang="en-US" sz="1800" dirty="0"/>
+              <a:t>CDC Covid-19 Data:</a:t>
+            </a:r>
+          </a:p>
+          <a:p>
+            <a:pPr lvl="1">
+              <a:buClrTx/>
+              <a:buFont typeface="Wingdings" panose="05000000000000000000" pitchFamily="2" charset="2"/>
+              <a:buChar char="§"/>
+            </a:pPr>
+            <a:r>
+              <a:rPr lang="en-US" sz="1600" dirty="0"/>
+              <a:t>https://health.google.com/covid-19/open-data/</a:t>
+            </a:r>
+          </a:p>
+          <a:p>
+            <a:endParaRPr lang="en-US" dirty="0"/>
+          </a:p>
+          <a:p>
+            <a:endParaRPr lang="en-US" dirty="0"/>
+          </a:p>
+        </p:txBody>
+      </p:sp>
+      <p:sp>
+        <p:nvSpPr>
+          <p:cNvPr id="4" name="Content Placeholder 3">
+            <a:extLst>
+              <a:ext uri="{FF2B5EF4-FFF2-40B4-BE49-F238E27FC236}">
+                <a16:creationId xmlns:a16="http://schemas.microsoft.com/office/drawing/2014/main" id="{CA9972A8-3C16-4FAC-9278-D90F135356E0}"/>
+              </a:ext>
+            </a:extLst>
+          </p:cNvPr>
+          <p:cNvSpPr>
+            <a:spLocks noGrp="1"/>
+          </p:cNvSpPr>
+          <p:nvPr>
+            <p:ph sz="half" idx="2"/>
+          </p:nvPr>
+        </p:nvSpPr>
+        <p:spPr>
+          <a:ln>
+            <a:solidFill>
+              <a:schemeClr val="tx1"/>
+            </a:solidFill>
+          </a:ln>
+        </p:spPr>
+        <p:txBody>
+          <a:bodyPr>
+            <a:normAutofit fontScale="77500" lnSpcReduction="20000"/>
+          </a:bodyPr>
+          <a:lstStyle/>
+          <a:p>
+            <a:r>
+              <a:rPr lang="en-US" dirty="0"/>
+              <a:t>What this project is</a:t>
+            </a:r>
+          </a:p>
+          <a:p>
+            <a:pPr lvl="1">
+              <a:buClrTx/>
+              <a:buFont typeface="Wingdings" panose="05000000000000000000" pitchFamily="2" charset="2"/>
+              <a:buChar char="§"/>
+            </a:pPr>
+            <a:r>
+              <a:rPr lang="en-US" dirty="0"/>
+              <a:t>Timeframe: post March 11, 2021 – end of 2022</a:t>
+            </a:r>
+          </a:p>
+          <a:p>
+            <a:pPr lvl="1">
+              <a:buClrTx/>
+              <a:buFont typeface="Wingdings" panose="05000000000000000000" pitchFamily="2" charset="2"/>
+              <a:buChar char="§"/>
+            </a:pPr>
+            <a:r>
+              <a:rPr lang="en-US" dirty="0"/>
+              <a:t>All US states for spending summary. Then narrow to top 3 and bottom 3 in analysis (can change depending on time needed for analysis)</a:t>
+            </a:r>
+          </a:p>
+          <a:p>
+            <a:pPr marL="201168" lvl="1" indent="0">
+              <a:buClrTx/>
+              <a:buNone/>
+            </a:pPr>
+            <a:endParaRPr lang="en-US" dirty="0"/>
+          </a:p>
+          <a:p>
+            <a:pPr marL="0" indent="0">
+              <a:buNone/>
+            </a:pPr>
+            <a:endParaRPr lang="en-US" dirty="0"/>
+          </a:p>
+          <a:p>
+            <a:r>
+              <a:rPr lang="en-US" dirty="0"/>
+              <a:t>What this project is not</a:t>
+            </a:r>
+          </a:p>
+          <a:p>
+            <a:pPr lvl="1">
+              <a:buClrTx/>
+              <a:buFont typeface="Wingdings" panose="05000000000000000000" pitchFamily="2" charset="2"/>
+              <a:buChar char="§"/>
+            </a:pPr>
+            <a:r>
+              <a:rPr lang="en-US" dirty="0"/>
+              <a:t>(Reference data constraints and assumptions list)</a:t>
+            </a:r>
+          </a:p>
+          <a:p>
+            <a:endParaRPr lang="en-US" dirty="0"/>
+          </a:p>
+          <a:p>
+            <a:pPr marL="0" indent="0">
+              <a:buNone/>
+            </a:pPr>
+            <a:r>
+              <a:rPr lang="en-US" dirty="0"/>
+              <a:t>Data source constraints and assumptions</a:t>
+            </a:r>
+          </a:p>
+          <a:p>
+            <a:pPr>
+              <a:buClrTx/>
+              <a:buFont typeface="Arial" panose="020B0604020202020204" pitchFamily="34" charset="0"/>
+              <a:buChar char="•"/>
+            </a:pPr>
+            <a:r>
+              <a:rPr lang="en-US" sz="1800" dirty="0"/>
+              <a:t>State size/population not taken into account</a:t>
+            </a:r>
+          </a:p>
+          <a:p>
+            <a:pPr>
+              <a:buClrTx/>
+              <a:buFont typeface="Arial" panose="020B0604020202020204" pitchFamily="34" charset="0"/>
+              <a:buChar char="•"/>
+            </a:pPr>
+            <a:r>
+              <a:rPr lang="en-US" sz="1800" dirty="0"/>
+              <a:t>Different qualification criteria per state</a:t>
+            </a:r>
+          </a:p>
+          <a:p>
+            <a:pPr>
+              <a:buFont typeface="Arial" panose="020B0604020202020204" pitchFamily="34" charset="0"/>
+              <a:buChar char="•"/>
+            </a:pPr>
+            <a:r>
+              <a:rPr lang="en-US" sz="1600" dirty="0"/>
+              <a:t>…</a:t>
+            </a:r>
+          </a:p>
+        </p:txBody>
+      </p:sp>
+    </p:spTree>
+    <p:extLst>
+      <p:ext uri="{BB962C8B-B14F-4D97-AF65-F5344CB8AC3E}">
+        <p14:creationId xmlns:p14="http://schemas.microsoft.com/office/powerpoint/2010/main" val="3699768426"/>
+      </p:ext>
+    </p:extLst>
+  </p:cSld>
+  <p:clrMapOvr>
+    <a:masterClrMapping/>
+  </p:clrMapOvr>
+</p:sld>
+</file>
+
+<file path=ppt/slides/slide3.xml><?xml version="1.0" encoding="utf-8"?>
+<p:sld xmlns:a="http://schemas.openxmlformats.org/drawingml/2006/main" xmlns:r="http://schemas.openxmlformats.org/officeDocument/2006/relationships" xmlns:p="http://schemas.openxmlformats.org/presentationml/2006/main">
+  <p:cSld>
+    <p:spTree>
+      <p:nvGrpSpPr>
+        <p:cNvPr id="1" name=""/>
+        <p:cNvGrpSpPr/>
+        <p:nvPr/>
+      </p:nvGrpSpPr>
+      <p:grpSpPr>
+        <a:xfrm>
+          <a:off x="0" y="0"/>
+          <a:ext cx="0" cy="0"/>
+          <a:chOff x="0" y="0"/>
+          <a:chExt cx="0" cy="0"/>
+        </a:xfrm>
+      </p:grpSpPr>
+      <p:sp>
+        <p:nvSpPr>
+          <p:cNvPr id="2" name="Title 1">
+            <a:extLst>
+              <a:ext uri="{FF2B5EF4-FFF2-40B4-BE49-F238E27FC236}">
+                <a16:creationId xmlns:a16="http://schemas.microsoft.com/office/drawing/2014/main" id="{ADDD956C-F39F-0B1F-680C-BCC4B1596D4C}"/>
+              </a:ext>
+            </a:extLst>
+          </p:cNvPr>
+          <p:cNvSpPr>
+            <a:spLocks noGrp="1"/>
+          </p:cNvSpPr>
+          <p:nvPr>
+            <p:ph type="title"/>
+          </p:nvPr>
+        </p:nvSpPr>
+        <p:spPr/>
+        <p:txBody>
+          <a:bodyPr/>
+          <a:lstStyle/>
+          <a:p>
+            <a:r>
+              <a:rPr lang="en-US" dirty="0"/>
+              <a:t>Data Source(s)</a:t>
+            </a:r>
+          </a:p>
+        </p:txBody>
+      </p:sp>
+      <p:sp>
+        <p:nvSpPr>
+          <p:cNvPr id="3" name="Content Placeholder 2">
+            <a:extLst>
+              <a:ext uri="{FF2B5EF4-FFF2-40B4-BE49-F238E27FC236}">
+                <a16:creationId xmlns:a16="http://schemas.microsoft.com/office/drawing/2014/main" id="{B21C263D-C578-C11E-2FD8-4C82039826FD}"/>
+              </a:ext>
+            </a:extLst>
+          </p:cNvPr>
+          <p:cNvSpPr>
+            <a:spLocks noGrp="1"/>
+          </p:cNvSpPr>
+          <p:nvPr>
+            <p:ph idx="1"/>
+          </p:nvPr>
+        </p:nvSpPr>
+        <p:spPr/>
+        <p:txBody>
+          <a:bodyPr>
+            <a:normAutofit/>
+          </a:bodyPr>
+          <a:lstStyle/>
+          <a:p>
+            <a:r>
+              <a:rPr lang="en-US" dirty="0"/>
+              <a:t>Describe the data source here. Include hyperlinks where relevant</a:t>
+            </a:r>
+          </a:p>
+          <a:p>
+            <a:endParaRPr lang="en-US" dirty="0"/>
+          </a:p>
+          <a:p>
+            <a:pPr marL="914400" lvl="1" indent="-457200">
+              <a:buFont typeface="+mj-lt"/>
+              <a:buAutoNum type="arabicPeriod"/>
+            </a:pPr>
+            <a:r>
+              <a:rPr lang="en-US" dirty="0"/>
+              <a:t>Check for copyright protections, and make sure that the way you plan to use this dataset is within the bounds of fair use.</a:t>
+            </a:r>
+          </a:p>
+          <a:p>
+            <a:pPr marL="914400" lvl="1" indent="-457200">
+              <a:buFont typeface="+mj-lt"/>
+              <a:buAutoNum type="arabicPeriod"/>
+            </a:pPr>
+            <a:endParaRPr lang="en-US" dirty="0"/>
+          </a:p>
+          <a:p>
+            <a:pPr marL="914400" lvl="1" indent="-457200">
+              <a:buFont typeface="+mj-lt"/>
+              <a:buAutoNum type="arabicPeriod"/>
+            </a:pPr>
+            <a:r>
+              <a:rPr lang="en-US" dirty="0"/>
+              <a:t>Document how you intend to use this dataset now and in the future. Find any licenses or terms of use associated with the dataset, and review them to confirm that your intended use is in compliance.</a:t>
+            </a:r>
+          </a:p>
+          <a:p>
+            <a:pPr marL="914400" lvl="1" indent="-457200">
+              <a:buFont typeface="+mj-lt"/>
+              <a:buAutoNum type="arabicPeriod"/>
+            </a:pPr>
+            <a:endParaRPr lang="en-US" dirty="0"/>
+          </a:p>
+          <a:p>
+            <a:pPr marL="914400" lvl="1" indent="-457200">
+              <a:buFont typeface="+mj-lt"/>
+              <a:buAutoNum type="arabicPeriod"/>
+            </a:pPr>
+            <a:r>
+              <a:rPr lang="en-US" dirty="0"/>
+              <a:t>Investigate how the dataset was collected. Identify any indicators that the data was obtained from a source that the compilers were not authorized to access.</a:t>
+            </a:r>
+          </a:p>
+        </p:txBody>
+      </p:sp>
+    </p:spTree>
+    <p:extLst>
+      <p:ext uri="{BB962C8B-B14F-4D97-AF65-F5344CB8AC3E}">
+        <p14:creationId xmlns:p14="http://schemas.microsoft.com/office/powerpoint/2010/main" val="808098577"/>
+      </p:ext>
+    </p:extLst>
+  </p:cSld>
+  <p:clrMapOvr>
+    <a:masterClrMapping/>
+  </p:clrMapOvr>
+</p:sld>
+</file>
+
+<file path=ppt/slides/slide4.xml><?xml version="1.0" encoding="utf-8"?>
+<p:sld xmlns:a="http://schemas.openxmlformats.org/drawingml/2006/main" xmlns:r="http://schemas.openxmlformats.org/officeDocument/2006/relationships" xmlns:p="http://schemas.openxmlformats.org/presentationml/2006/main">
+  <p:cSld>
+    <p:spTree>
+      <p:nvGrpSpPr>
+        <p:cNvPr id="1" name=""/>
+        <p:cNvGrpSpPr/>
+        <p:nvPr/>
+      </p:nvGrpSpPr>
+      <p:grpSpPr>
+        <a:xfrm>
+          <a:off x="0" y="0"/>
+          <a:ext cx="0" cy="0"/>
+          <a:chOff x="0" y="0"/>
+          <a:chExt cx="0" cy="0"/>
+        </a:xfrm>
+      </p:grpSpPr>
+      <p:sp>
+        <p:nvSpPr>
+          <p:cNvPr id="2" name="Title 1">
+            <a:extLst>
+              <a:ext uri="{FF2B5EF4-FFF2-40B4-BE49-F238E27FC236}">
+                <a16:creationId xmlns:a16="http://schemas.microsoft.com/office/drawing/2014/main" id="{B312BC9A-7B15-E9B0-96DF-05AA5E13C113}"/>
+              </a:ext>
+            </a:extLst>
+          </p:cNvPr>
+          <p:cNvSpPr>
+            <a:spLocks noGrp="1"/>
+          </p:cNvSpPr>
+          <p:nvPr>
+            <p:ph type="title"/>
+          </p:nvPr>
+        </p:nvSpPr>
+        <p:spPr/>
+        <p:txBody>
+          <a:bodyPr/>
+          <a:lstStyle/>
+          <a:p>
+            <a:r>
+              <a:rPr lang="en-US" dirty="0"/>
+              <a:t>Analysis Methods</a:t>
+            </a:r>
+          </a:p>
+        </p:txBody>
+      </p:sp>
+      <p:sp>
+        <p:nvSpPr>
+          <p:cNvPr id="3" name="Content Placeholder 2">
+            <a:extLst>
+              <a:ext uri="{FF2B5EF4-FFF2-40B4-BE49-F238E27FC236}">
+                <a16:creationId xmlns:a16="http://schemas.microsoft.com/office/drawing/2014/main" id="{8150B3B9-A2CD-564D-1DE3-F0A9722F9629}"/>
+              </a:ext>
+            </a:extLst>
+          </p:cNvPr>
+          <p:cNvSpPr>
+            <a:spLocks noGrp="1"/>
+          </p:cNvSpPr>
+          <p:nvPr>
+            <p:ph idx="1"/>
+          </p:nvPr>
+        </p:nvSpPr>
+        <p:spPr/>
+        <p:txBody>
+          <a:bodyPr/>
+          <a:lstStyle/>
+          <a:p>
+            <a:r>
+              <a:rPr lang="en-US" dirty="0"/>
+              <a:t>The analysis process can be broken into two broad phases: (1) exploration and cleanup, and (2) analysis.</a:t>
+            </a:r>
+          </a:p>
+          <a:p>
+            <a:endParaRPr lang="en-US" dirty="0"/>
+          </a:p>
+          <a:p>
+            <a:r>
+              <a:rPr lang="en-US" dirty="0"/>
+              <a:t>Describe here how we plan to answer the questions laid out in our Purpose section.</a:t>
+            </a:r>
+          </a:p>
+          <a:p>
+            <a:pPr lvl="1"/>
+            <a:r>
+              <a:rPr lang="en-US" dirty="0"/>
+              <a:t>Ex) Summarize first, then narrow scope. </a:t>
+            </a:r>
+          </a:p>
+          <a:p>
+            <a:pPr lvl="1"/>
+            <a:r>
+              <a:rPr lang="en-US" dirty="0"/>
+              <a:t>“We recommend focusing your analysis on multiple techniques, such as aggregation, correlation, comparison, summary statistics, sentiment analysis, and time-series analysis.”</a:t>
+            </a:r>
+          </a:p>
+        </p:txBody>
+      </p:sp>
+    </p:spTree>
+    <p:extLst>
+      <p:ext uri="{BB962C8B-B14F-4D97-AF65-F5344CB8AC3E}">
+        <p14:creationId xmlns:p14="http://schemas.microsoft.com/office/powerpoint/2010/main" val="3055247817"/>
+      </p:ext>
+    </p:extLst>
+  </p:cSld>
+  <p:clrMapOvr>
+    <a:masterClrMapping/>
+  </p:clrMapOvr>
+</p:sld>
+</file>
+
+<file path=ppt/slides/slide5.xml><?xml version="1.0" encoding="utf-8"?>
+<p:sld xmlns:a="http://schemas.openxmlformats.org/drawingml/2006/main" xmlns:r="http://schemas.openxmlformats.org/officeDocument/2006/relationships" xmlns:p="http://schemas.openxmlformats.org/presentationml/2006/main">
+  <p:cSld>
+    <p:spTree>
+      <p:nvGrpSpPr>
+        <p:cNvPr id="1" name=""/>
+        <p:cNvGrpSpPr/>
+        <p:nvPr/>
+      </p:nvGrpSpPr>
+      <p:grpSpPr>
+        <a:xfrm>
+          <a:off x="0" y="0"/>
+          <a:ext cx="0" cy="0"/>
+          <a:chOff x="0" y="0"/>
+          <a:chExt cx="0" cy="0"/>
+        </a:xfrm>
+      </p:grpSpPr>
+      <p:sp>
+        <p:nvSpPr>
+          <p:cNvPr id="2" name="Title 1">
+            <a:extLst>
+              <a:ext uri="{FF2B5EF4-FFF2-40B4-BE49-F238E27FC236}">
+                <a16:creationId xmlns:a16="http://schemas.microsoft.com/office/drawing/2014/main" id="{6A03C364-BD8D-E30B-C37E-136CB4BDCA73}"/>
+              </a:ext>
+            </a:extLst>
+          </p:cNvPr>
+          <p:cNvSpPr>
+            <a:spLocks noGrp="1"/>
+          </p:cNvSpPr>
+          <p:nvPr>
+            <p:ph type="title"/>
+          </p:nvPr>
+        </p:nvSpPr>
+        <p:spPr/>
+        <p:txBody>
+          <a:bodyPr/>
+          <a:lstStyle/>
+          <a:p>
+            <a:r>
+              <a:rPr lang="en-US" dirty="0" err="1"/>
+              <a:t>Github</a:t>
+            </a:r>
+            <a:r>
+              <a:rPr lang="en-US" dirty="0"/>
+              <a:t> Repo</a:t>
+            </a:r>
+          </a:p>
+        </p:txBody>
+      </p:sp>
+      <p:sp>
+        <p:nvSpPr>
+          <p:cNvPr id="3" name="Content Placeholder 2">
+            <a:extLst>
+              <a:ext uri="{FF2B5EF4-FFF2-40B4-BE49-F238E27FC236}">
+                <a16:creationId xmlns:a16="http://schemas.microsoft.com/office/drawing/2014/main" id="{47B18CE2-894E-BAE1-C77A-13E6D8B29A21}"/>
+              </a:ext>
+            </a:extLst>
+          </p:cNvPr>
+          <p:cNvSpPr>
+            <a:spLocks noGrp="1"/>
+          </p:cNvSpPr>
+          <p:nvPr>
+            <p:ph idx="1"/>
+          </p:nvPr>
+        </p:nvSpPr>
+        <p:spPr/>
+        <p:txBody>
+          <a:bodyPr/>
+          <a:lstStyle/>
+          <a:p>
+            <a:r>
+              <a:rPr lang="en-US" dirty="0"/>
+              <a:t>One person to own the repo (Evan volunteers)</a:t>
+            </a:r>
+          </a:p>
+          <a:p>
+            <a:r>
+              <a:rPr lang="en-US" dirty="0"/>
+              <a:t>Make sure local repos are always up-to-date with the github.com repo</a:t>
+            </a:r>
+          </a:p>
+          <a:p>
+            <a:pPr lvl="1"/>
+            <a:r>
+              <a:rPr lang="en-US" dirty="0"/>
+              <a:t>Pull each time you work on your portion</a:t>
+            </a:r>
+          </a:p>
+          <a:p>
+            <a:pPr lvl="1"/>
+            <a:r>
+              <a:rPr lang="en-US" dirty="0"/>
+              <a:t>Commit all local changes and push to </a:t>
+            </a:r>
+            <a:r>
+              <a:rPr lang="en-US" dirty="0" err="1"/>
+              <a:t>github</a:t>
+            </a:r>
+            <a:r>
+              <a:rPr lang="en-US" dirty="0"/>
+              <a:t> repo when done working</a:t>
+            </a:r>
+          </a:p>
+          <a:p>
+            <a:pPr lvl="1"/>
+            <a:r>
+              <a:rPr lang="en-US" dirty="0"/>
+              <a:t>Tip from William: Use a single .</a:t>
+            </a:r>
+            <a:r>
+              <a:rPr lang="en-US" dirty="0" err="1"/>
+              <a:t>ipynb</a:t>
+            </a:r>
+            <a:r>
+              <a:rPr lang="en-US" dirty="0"/>
+              <a:t> file for the project. Each person will pull that into their local repo.</a:t>
+            </a:r>
+          </a:p>
+          <a:p>
+            <a:pPr lvl="2"/>
+            <a:r>
+              <a:rPr lang="en-US" dirty="0"/>
+              <a:t>Section off your code section with blocks #--------------------------- so that you have clear areas of work to prevent merge issues per line of code.</a:t>
+            </a:r>
+          </a:p>
+          <a:p>
+            <a:pPr lvl="1"/>
+            <a:endParaRPr lang="en-US" dirty="0"/>
+          </a:p>
+          <a:p>
+            <a:pPr marL="201168" lvl="1" indent="0">
+              <a:buNone/>
+            </a:pPr>
+            <a:r>
+              <a:rPr lang="en-US" dirty="0"/>
+              <a:t>See </a:t>
+            </a:r>
+            <a:r>
+              <a:rPr lang="en-US" dirty="0">
+                <a:hlinkClick r:id="rId2"/>
+              </a:rPr>
+              <a:t>https://docs.github.com/en/issues/organizing-your-work-with-project-boards/managing-project-boards</a:t>
+            </a:r>
+            <a:endParaRPr lang="en-US" dirty="0"/>
+          </a:p>
+          <a:p>
+            <a:pPr marL="201168" lvl="1" indent="0">
+              <a:buNone/>
+            </a:pPr>
+            <a:endParaRPr lang="en-US" dirty="0"/>
+          </a:p>
+          <a:p>
+            <a:pPr marL="201168" lvl="1" indent="0">
+              <a:buNone/>
+            </a:pPr>
+            <a:endParaRPr lang="en-US" dirty="0"/>
+          </a:p>
+        </p:txBody>
+      </p:sp>
+    </p:spTree>
+    <p:extLst>
+      <p:ext uri="{BB962C8B-B14F-4D97-AF65-F5344CB8AC3E}">
+        <p14:creationId xmlns:p14="http://schemas.microsoft.com/office/powerpoint/2010/main" val="1873696182"/>
+      </p:ext>
+    </p:extLst>
+  </p:cSld>
+  <p:clrMapOvr>
+    <a:masterClrMapping/>
+  </p:clrMapOvr>
+</p:sld>
+</file>
+
+<file path=ppt/slides/slide6.xml><?xml version="1.0" encoding="utf-8"?>
 <p:sld xmlns:a="http://schemas.openxmlformats.org/drawingml/2006/main" xmlns:r="http://schemas.openxmlformats.org/officeDocument/2006/relationships" xmlns:p="http://schemas.openxmlformats.org/presentationml/2006/main">
   <p:cSld>
     <p:spTree>
@@ -7100,6 +7867,344 @@
 </p:sld>
 </file>
 
+<file path=ppt/slides/slide7.xml><?xml version="1.0" encoding="utf-8"?>
+<p:sld xmlns:a="http://schemas.openxmlformats.org/drawingml/2006/main" xmlns:r="http://schemas.openxmlformats.org/officeDocument/2006/relationships" xmlns:p="http://schemas.openxmlformats.org/presentationml/2006/main">
+  <p:cSld>
+    <p:spTree>
+      <p:nvGrpSpPr>
+        <p:cNvPr id="1" name=""/>
+        <p:cNvGrpSpPr/>
+        <p:nvPr/>
+      </p:nvGrpSpPr>
+      <p:grpSpPr>
+        <a:xfrm>
+          <a:off x="0" y="0"/>
+          <a:ext cx="0" cy="0"/>
+          <a:chOff x="0" y="0"/>
+          <a:chExt cx="0" cy="0"/>
+        </a:xfrm>
+      </p:grpSpPr>
+      <p:sp>
+        <p:nvSpPr>
+          <p:cNvPr id="2" name="Title 1">
+            <a:extLst>
+              <a:ext uri="{FF2B5EF4-FFF2-40B4-BE49-F238E27FC236}">
+                <a16:creationId xmlns:a16="http://schemas.microsoft.com/office/drawing/2014/main" id="{94456D86-A2FB-D487-C5E7-F7D55A1C70AA}"/>
+              </a:ext>
+            </a:extLst>
+          </p:cNvPr>
+          <p:cNvSpPr>
+            <a:spLocks noGrp="1"/>
+          </p:cNvSpPr>
+          <p:nvPr>
+            <p:ph type="title"/>
+          </p:nvPr>
+        </p:nvSpPr>
+        <p:spPr>
+          <a:xfrm>
+            <a:off x="1097280" y="286603"/>
+            <a:ext cx="10058400" cy="1002447"/>
+          </a:xfrm>
+        </p:spPr>
+        <p:txBody>
+          <a:bodyPr/>
+          <a:lstStyle/>
+          <a:p>
+            <a:r>
+              <a:rPr lang="en-US" dirty="0"/>
+              <a:t>Breakdown of Tasks</a:t>
+            </a:r>
+          </a:p>
+        </p:txBody>
+      </p:sp>
+      <p:sp>
+        <p:nvSpPr>
+          <p:cNvPr id="3" name="Content Placeholder 2">
+            <a:extLst>
+              <a:ext uri="{FF2B5EF4-FFF2-40B4-BE49-F238E27FC236}">
+                <a16:creationId xmlns:a16="http://schemas.microsoft.com/office/drawing/2014/main" id="{5E3E40F8-E566-7F42-1FBB-745782052EF2}"/>
+              </a:ext>
+            </a:extLst>
+          </p:cNvPr>
+          <p:cNvSpPr>
+            <a:spLocks noGrp="1"/>
+          </p:cNvSpPr>
+          <p:nvPr>
+            <p:ph idx="1"/>
+          </p:nvPr>
+        </p:nvSpPr>
+        <p:spPr>
+          <a:xfrm>
+            <a:off x="1097280" y="1845734"/>
+            <a:ext cx="10058400" cy="4256616"/>
+          </a:xfrm>
+        </p:spPr>
+        <p:txBody>
+          <a:bodyPr/>
+          <a:lstStyle/>
+          <a:p>
+            <a:r>
+              <a:rPr lang="en-US" dirty="0"/>
+              <a:t>Split presentation deck into six parts: each group member to speak during presentation</a:t>
+            </a:r>
+          </a:p>
+          <a:p>
+            <a:pPr lvl="1"/>
+            <a:r>
+              <a:rPr lang="en-US" dirty="0"/>
+              <a:t>Evan: Data collection, write pseudo-code for .</a:t>
+            </a:r>
+            <a:r>
+              <a:rPr lang="en-US" dirty="0" err="1"/>
+              <a:t>ipynb</a:t>
+            </a:r>
+            <a:r>
+              <a:rPr lang="en-US" dirty="0"/>
+              <a:t> file, API bonus work</a:t>
+            </a:r>
+          </a:p>
+          <a:p>
+            <a:pPr lvl="1"/>
+            <a:r>
+              <a:rPr lang="en-US" strike="sngStrike" dirty="0"/>
+              <a:t>Sarah: Data clean</a:t>
+            </a:r>
+          </a:p>
+          <a:p>
+            <a:pPr lvl="1"/>
+            <a:r>
+              <a:rPr lang="en-US" dirty="0"/>
+              <a:t>Greg: Google data collection and cleaning, Debug, technical issues, overall support, CDC API (where able/if has time to set up)</a:t>
+            </a:r>
+          </a:p>
+          <a:p>
+            <a:pPr lvl="1"/>
+            <a:r>
+              <a:rPr lang="en-US" dirty="0"/>
+              <a:t>Aaliyah: overall support, Data collection from EARN workbook. Combination bar/line graph.</a:t>
+            </a:r>
+          </a:p>
+          <a:p>
+            <a:pPr lvl="1"/>
+            <a:r>
+              <a:rPr lang="en-US" dirty="0"/>
+              <a:t>Kendal: Visuals planning and execution</a:t>
+            </a:r>
+          </a:p>
+          <a:p>
+            <a:pPr lvl="1"/>
+            <a:r>
+              <a:rPr lang="en-US" dirty="0"/>
+              <a:t>Joanna: Visuals planning and execution, data interpret for EARN workbook.</a:t>
+            </a:r>
+          </a:p>
+          <a:p>
+            <a:pPr marL="201168" lvl="1" indent="0">
+              <a:buNone/>
+            </a:pPr>
+            <a:endParaRPr lang="en-US" dirty="0"/>
+          </a:p>
+          <a:p>
+            <a:pPr lvl="1"/>
+            <a:endParaRPr lang="en-US" dirty="0"/>
+          </a:p>
+          <a:p>
+            <a:endParaRPr lang="en-US" dirty="0"/>
+          </a:p>
+        </p:txBody>
+      </p:sp>
+    </p:spTree>
+    <p:extLst>
+      <p:ext uri="{BB962C8B-B14F-4D97-AF65-F5344CB8AC3E}">
+        <p14:creationId xmlns:p14="http://schemas.microsoft.com/office/powerpoint/2010/main" val="63745696"/>
+      </p:ext>
+    </p:extLst>
+  </p:cSld>
+  <p:clrMapOvr>
+    <a:masterClrMapping/>
+  </p:clrMapOvr>
+</p:sld>
+</file>
+
+<file path=ppt/slides/slide8.xml><?xml version="1.0" encoding="utf-8"?>
+<p:sld xmlns:a="http://schemas.openxmlformats.org/drawingml/2006/main" xmlns:r="http://schemas.openxmlformats.org/officeDocument/2006/relationships" xmlns:p="http://schemas.openxmlformats.org/presentationml/2006/main">
+  <p:cSld>
+    <p:spTree>
+      <p:nvGrpSpPr>
+        <p:cNvPr id="1" name=""/>
+        <p:cNvGrpSpPr/>
+        <p:nvPr/>
+      </p:nvGrpSpPr>
+      <p:grpSpPr>
+        <a:xfrm>
+          <a:off x="0" y="0"/>
+          <a:ext cx="0" cy="0"/>
+          <a:chOff x="0" y="0"/>
+          <a:chExt cx="0" cy="0"/>
+        </a:xfrm>
+      </p:grpSpPr>
+      <p:sp>
+        <p:nvSpPr>
+          <p:cNvPr id="2" name="Title 1">
+            <a:extLst>
+              <a:ext uri="{FF2B5EF4-FFF2-40B4-BE49-F238E27FC236}">
+                <a16:creationId xmlns:a16="http://schemas.microsoft.com/office/drawing/2014/main" id="{94456D86-A2FB-D487-C5E7-F7D55A1C70AA}"/>
+              </a:ext>
+            </a:extLst>
+          </p:cNvPr>
+          <p:cNvSpPr>
+            <a:spLocks noGrp="1"/>
+          </p:cNvSpPr>
+          <p:nvPr>
+            <p:ph type="title"/>
+          </p:nvPr>
+        </p:nvSpPr>
+        <p:spPr>
+          <a:xfrm>
+            <a:off x="1097280" y="286603"/>
+            <a:ext cx="10058400" cy="1002447"/>
+          </a:xfrm>
+        </p:spPr>
+        <p:txBody>
+          <a:bodyPr/>
+          <a:lstStyle/>
+          <a:p>
+            <a:r>
+              <a:rPr lang="en-US" dirty="0"/>
+              <a:t>Tasks due by EOD Monday</a:t>
+            </a:r>
+          </a:p>
+        </p:txBody>
+      </p:sp>
+      <p:sp>
+        <p:nvSpPr>
+          <p:cNvPr id="3" name="Content Placeholder 2">
+            <a:extLst>
+              <a:ext uri="{FF2B5EF4-FFF2-40B4-BE49-F238E27FC236}">
+                <a16:creationId xmlns:a16="http://schemas.microsoft.com/office/drawing/2014/main" id="{5E3E40F8-E566-7F42-1FBB-745782052EF2}"/>
+              </a:ext>
+            </a:extLst>
+          </p:cNvPr>
+          <p:cNvSpPr>
+            <a:spLocks noGrp="1"/>
+          </p:cNvSpPr>
+          <p:nvPr>
+            <p:ph idx="1"/>
+          </p:nvPr>
+        </p:nvSpPr>
+        <p:spPr>
+          <a:xfrm>
+            <a:off x="1097280" y="1845734"/>
+            <a:ext cx="10058400" cy="4256616"/>
+          </a:xfrm>
+        </p:spPr>
+        <p:txBody>
+          <a:bodyPr>
+            <a:normAutofit fontScale="92500" lnSpcReduction="10000"/>
+          </a:bodyPr>
+          <a:lstStyle/>
+          <a:p>
+            <a:r>
+              <a:rPr lang="en-US" dirty="0"/>
+              <a:t>Split presentation deck into six parts: each group member to speak during presentation</a:t>
+            </a:r>
+          </a:p>
+          <a:p>
+            <a:pPr lvl="1"/>
+            <a:r>
+              <a:rPr lang="en-US" dirty="0"/>
+              <a:t>Kendal and Joanna (visuals team): Review Greg’s dataset, plan all output visuals, request data needed from the data collection/clean team.</a:t>
+            </a:r>
+          </a:p>
+          <a:p>
+            <a:pPr lvl="1"/>
+            <a:endParaRPr lang="en-US" dirty="0"/>
+          </a:p>
+          <a:p>
+            <a:pPr lvl="1"/>
+            <a:r>
+              <a:rPr lang="en-US" dirty="0"/>
+              <a:t>Aaliyah/Sarah/Evan (data team): Import and clean data from the EARN workbook. Provide output </a:t>
+            </a:r>
+            <a:r>
+              <a:rPr lang="en-US" dirty="0" err="1"/>
+              <a:t>dataframe</a:t>
+            </a:r>
+            <a:r>
+              <a:rPr lang="en-US" dirty="0"/>
+              <a:t> that will be able to compare % federal funding used per state.</a:t>
+            </a:r>
+          </a:p>
+          <a:p>
+            <a:pPr lvl="1"/>
+            <a:endParaRPr lang="en-US" dirty="0"/>
+          </a:p>
+          <a:p>
+            <a:pPr lvl="1"/>
+            <a:r>
+              <a:rPr lang="en-US" dirty="0"/>
+              <a:t>Evan: Merge Greg’s branch and confirm his worked captured. More pseudo code.</a:t>
+            </a:r>
+          </a:p>
+          <a:p>
+            <a:pPr lvl="1"/>
+            <a:endParaRPr lang="en-US" dirty="0"/>
+          </a:p>
+          <a:p>
+            <a:pPr lvl="1"/>
+            <a:r>
+              <a:rPr lang="en-US" dirty="0"/>
+              <a:t>Greg: </a:t>
+            </a:r>
+            <a:r>
+              <a:rPr lang="en-US" sz="1800" dirty="0"/>
+              <a:t>Add comments into your codework. Source where applicable, otherwise succinct explanations for each cell where ambiguous. Support others as available.</a:t>
+            </a:r>
+          </a:p>
+          <a:p>
+            <a:pPr lvl="1"/>
+            <a:endParaRPr lang="en-US" dirty="0"/>
+          </a:p>
+          <a:p>
+            <a:pPr lvl="1"/>
+            <a:r>
+              <a:rPr lang="en-US" dirty="0"/>
+              <a:t>Aaliyah: Create slide that briefly explains our measured inputs (% federal funding per state) and measured outputs (% population vaccinated per state and any other outputs built by data viz team). </a:t>
+            </a:r>
+          </a:p>
+          <a:p>
+            <a:pPr lvl="2"/>
+            <a:r>
+              <a:rPr lang="en-US" dirty="0"/>
+              <a:t>Include a few sentences describing scope of data, data constraints and any assumptions made during analysis. This is more of a team effort due to each person working on their chunks.</a:t>
+            </a:r>
+          </a:p>
+          <a:p>
+            <a:pPr lvl="1"/>
+            <a:endParaRPr lang="en-US" dirty="0"/>
+          </a:p>
+          <a:p>
+            <a:pPr lvl="1"/>
+            <a:endParaRPr lang="en-US" dirty="0"/>
+          </a:p>
+          <a:p>
+            <a:endParaRPr lang="en-US" dirty="0"/>
+          </a:p>
+        </p:txBody>
+      </p:sp>
+    </p:spTree>
+    <p:extLst>
+      <p:ext uri="{BB962C8B-B14F-4D97-AF65-F5344CB8AC3E}">
+        <p14:creationId xmlns:p14="http://schemas.microsoft.com/office/powerpoint/2010/main" val="2340939891"/>
+      </p:ext>
+    </p:extLst>
+  </p:cSld>
+  <p:clrMapOvr>
+    <a:masterClrMapping/>
+  </p:clrMapOvr>
+</p:sld>
+</file>
+
 <file path=ppt/slides/slide9.xml><?xml version="1.0" encoding="utf-8"?>
 <p:sld xmlns:a="http://schemas.openxmlformats.org/drawingml/2006/main" xmlns:r="http://schemas.openxmlformats.org/officeDocument/2006/relationships" xmlns:p="http://schemas.openxmlformats.org/presentationml/2006/main">
   <p:cSld>
@@ -7122,7 +8227,7 @@
           <p:cNvPr id="2" name="Title 1">
             <a:extLst>
               <a:ext uri="{FF2B5EF4-FFF2-40B4-BE49-F238E27FC236}">
-                <a16:creationId xmlns:a16="http://schemas.microsoft.com/office/drawing/2014/main" id="{94456D86-A2FB-D487-C5E7-F7D55A1C70AA}"/>
+                <a16:creationId xmlns:a16="http://schemas.microsoft.com/office/drawing/2014/main" id="{0F76BC68-59BA-7245-56F2-03583BE957DA}"/>
               </a:ext>
             </a:extLst>
           </p:cNvPr>
@@ -7133,19 +8238,14 @@
             <p:ph type="title"/>
           </p:nvPr>
         </p:nvSpPr>
-        <p:spPr>
-          <a:xfrm>
-            <a:off x="1097280" y="286603"/>
-            <a:ext cx="10058400" cy="1002447"/>
-          </a:xfrm>
-        </p:spPr>
+        <p:spPr/>
         <p:txBody>
           <a:bodyPr/>
           <a:lstStyle/>
           <a:p>
             <a:r>
               <a:rPr lang="en-US" dirty="0"/>
-              <a:t>Breakdown of Tasks</a:t>
+              <a:t>Hypothesis testing notes</a:t>
             </a:r>
           </a:p>
         </p:txBody>
@@ -7155,7 +8255,7 @@
           <p:cNvPr id="3" name="Content Placeholder 2">
             <a:extLst>
               <a:ext uri="{FF2B5EF4-FFF2-40B4-BE49-F238E27FC236}">
-                <a16:creationId xmlns:a16="http://schemas.microsoft.com/office/drawing/2014/main" id="{5E3E40F8-E566-7F42-1FBB-745782052EF2}"/>
+                <a16:creationId xmlns:a16="http://schemas.microsoft.com/office/drawing/2014/main" id="{55FB0969-E072-711B-3A37-B7BD4E0752D3}"/>
               </a:ext>
             </a:extLst>
           </p:cNvPr>
@@ -7166,90 +8266,76 @@
             <p:ph idx="1"/>
           </p:nvPr>
         </p:nvSpPr>
-        <p:spPr>
-          <a:xfrm>
-            <a:off x="1097280" y="1845734"/>
-            <a:ext cx="10058400" cy="4256616"/>
-          </a:xfrm>
-        </p:spPr>
+        <p:spPr/>
         <p:txBody>
           <a:bodyPr/>
           <a:lstStyle/>
           <a:p>
             <a:r>
               <a:rPr lang="en-US" dirty="0"/>
-              <a:t>Split presentation deck into six parts: each group member to speak during presentation</a:t>
+              <a:t>- Can we statistically test grant spending input vs. vaccine distribution rate output?</a:t>
             </a:r>
           </a:p>
           <a:p>
             <a:pPr lvl="1"/>
             <a:r>
               <a:rPr lang="en-US" dirty="0"/>
-              <a:t>Evan: Data collection, API bonus work, write pseudo-code for .</a:t>
-            </a:r>
-            <a:r>
-              <a:rPr lang="en-US" dirty="0" err="1"/>
-              <a:t>ipynb</a:t>
-            </a:r>
-            <a:r>
-              <a:rPr lang="en-US" dirty="0"/>
-              <a:t> file</a:t>
-            </a:r>
-          </a:p>
-          <a:p>
-            <a:pPr lvl="1"/>
-            <a:r>
-              <a:rPr lang="en-US" dirty="0"/>
-              <a:t>Sarah: Data clean</a:t>
-            </a:r>
-          </a:p>
-          <a:p>
-            <a:pPr lvl="1"/>
-            <a:r>
-              <a:rPr lang="en-US" dirty="0"/>
-              <a:t>Greg: Google data collection and cleaning, Debug, technical issues, overall support, CDC API (where able/if has time to set up)</a:t>
-            </a:r>
-          </a:p>
-          <a:p>
-            <a:pPr lvl="1"/>
-            <a:r>
-              <a:rPr lang="en-US" dirty="0"/>
-              <a:t>Aaliyah: overall support</a:t>
-            </a:r>
-          </a:p>
-          <a:p>
-            <a:pPr lvl="1"/>
-            <a:r>
-              <a:rPr lang="en-US" dirty="0"/>
-              <a:t>Kendal: Visuals planning and execution</a:t>
-            </a:r>
-          </a:p>
-          <a:p>
-            <a:pPr lvl="1"/>
-            <a:r>
-              <a:rPr lang="en-US" dirty="0"/>
-              <a:t>Joanna: Visuals planning and execution</a:t>
-            </a:r>
-          </a:p>
-          <a:p>
-            <a:pPr marL="201168" lvl="1" indent="0">
-              <a:buNone/>
-            </a:pPr>
-            <a:endParaRPr lang="en-US" dirty="0"/>
+              <a:t>If so, how? T-test? ANOVA? How would you even test normality?</a:t>
+            </a:r>
           </a:p>
           <a:p>
             <a:pPr lvl="1"/>
             <a:endParaRPr lang="en-US" dirty="0"/>
           </a:p>
           <a:p>
-            <a:endParaRPr lang="en-US" dirty="0"/>
+            <a:pPr lvl="1"/>
+            <a:r>
+              <a:rPr lang="en-US" dirty="0"/>
+              <a:t>Output will need to be SUM of vaccines distributed at the end of our time range, per state.</a:t>
+            </a:r>
+          </a:p>
+          <a:p>
+            <a:pPr lvl="1"/>
+            <a:r>
+              <a:rPr lang="en-US" dirty="0"/>
+              <a:t>Variable input is % of federal funding used (at end of time range). And Amount of $ spend and Count of projects (both per state). </a:t>
+            </a:r>
+          </a:p>
+          <a:p>
+            <a:pPr lvl="1"/>
+            <a:r>
+              <a:rPr lang="en-US" dirty="0"/>
+              <a:t>Measured output is % of population vaccinated (1</a:t>
+            </a:r>
+            <a:r>
+              <a:rPr lang="en-US" baseline="30000" dirty="0"/>
+              <a:t>st</a:t>
+            </a:r>
+            <a:r>
+              <a:rPr lang="en-US" dirty="0"/>
+              <a:t> dose) at end of time range, per state.</a:t>
+            </a:r>
+          </a:p>
+          <a:p>
+            <a:pPr lvl="2"/>
+            <a:r>
+              <a:rPr lang="en-US" dirty="0"/>
+              <a:t>Constraints and assumptions for dataset: distance any given vaccine has to travel to get to end site. Method of transportation and how that may or may not affect vaccination rate. Political leanings! Do people think the vaccine carries 5g robots in the given state? Etc. etc. We can’t measure these variables on this scope and so our data analysis is HIGH LEVEL only. We need to showcase the methods we have learned in the class thus far.</a:t>
+            </a:r>
+          </a:p>
+          <a:p>
+            <a:pPr lvl="2"/>
+            <a:r>
+              <a:rPr lang="en-US" dirty="0"/>
+              <a:t>Line correlation if able.</a:t>
+            </a:r>
           </a:p>
         </p:txBody>
       </p:sp>
     </p:spTree>
     <p:extLst>
       <p:ext uri="{BB962C8B-B14F-4D97-AF65-F5344CB8AC3E}">
-        <p14:creationId xmlns:p14="http://schemas.microsoft.com/office/powerpoint/2010/main" val="63745696"/>
+        <p14:creationId xmlns:p14="http://schemas.microsoft.com/office/powerpoint/2010/main" val="3570840541"/>
       </p:ext>
     </p:extLst>
   </p:cSld>

</xml_diff>

<commit_message>
5/15/2023: Added final TODO items for each person due prior to EOD Tues 5/15/2023. Updated draft presentation bullet points. Added clarifying information to the EARN workbook for refence during pandas work.
</commit_message>
<xml_diff>
--- a/Project notes.pptx
+++ b/Project notes.pptx
@@ -5,7 +5,7 @@
     <p:sldMasterId id="2147483696" r:id="rId1"/>
   </p:sldMasterIdLst>
   <p:notesMasterIdLst>
-    <p:notesMasterId r:id="rId20"/>
+    <p:notesMasterId r:id="rId21"/>
   </p:notesMasterIdLst>
   <p:sldIdLst>
     <p:sldId id="256" r:id="rId2"/>
@@ -20,12 +20,13 @@
     <p:sldId id="264" r:id="rId11"/>
     <p:sldId id="270" r:id="rId12"/>
     <p:sldId id="263" r:id="rId13"/>
-    <p:sldId id="269" r:id="rId14"/>
-    <p:sldId id="271" r:id="rId15"/>
-    <p:sldId id="272" r:id="rId16"/>
-    <p:sldId id="273" r:id="rId17"/>
-    <p:sldId id="274" r:id="rId18"/>
-    <p:sldId id="275" r:id="rId19"/>
+    <p:sldId id="276" r:id="rId14"/>
+    <p:sldId id="269" r:id="rId15"/>
+    <p:sldId id="271" r:id="rId16"/>
+    <p:sldId id="272" r:id="rId17"/>
+    <p:sldId id="273" r:id="rId18"/>
+    <p:sldId id="274" r:id="rId19"/>
+    <p:sldId id="275" r:id="rId20"/>
   </p:sldIdLst>
   <p:sldSz cx="12192000" cy="6858000"/>
   <p:notesSz cx="6858000" cy="9144000"/>
@@ -5153,7 +5154,7 @@
         </p:spPr>
         <p:txBody>
           <a:bodyPr>
-            <a:normAutofit fontScale="92500" lnSpcReduction="10000"/>
+            <a:normAutofit fontScale="85000" lnSpcReduction="10000"/>
           </a:bodyPr>
           <a:lstStyle/>
           <a:p>
@@ -5166,7 +5167,7 @@
             <a:pPr lvl="1"/>
             <a:r>
               <a:rPr lang="en-US" dirty="0"/>
-              <a:t>Do combination bar/line chart for EARN workbook (to give us an idea of $ volume vs. %spend per state)</a:t>
+              <a:t>Evan/Aaliyah: Do combination bar/line chart for EARN workbook (to give us an idea of $ volume vs. %spend per state)</a:t>
             </a:r>
           </a:p>
           <a:p>
@@ -5197,15 +5198,15 @@
             </a:r>
             <a:r>
               <a:rPr lang="en-US" dirty="0"/>
-              <a:t> do grouped bar charts which show count of </a:t>
+              <a:t> do grouped bar charts which show </a:t>
             </a:r>
             <a:r>
               <a:rPr lang="en-US" b="1" dirty="0"/>
-              <a:t>covid</a:t>
-            </a:r>
-            <a:r>
-              <a:rPr lang="en-US" dirty="0"/>
-              <a:t> project types for those 3 or 4 states. Limit to top 4 project categories per state to keep clean visual. Or by dollar value spend per category. This will follow the slide on % </a:t>
+              <a:t>count of covid </a:t>
+            </a:r>
+            <a:r>
+              <a:rPr lang="en-US" dirty="0"/>
+              <a:t>project types for those 3 or 4 states. Limit to top 4 project categories per state to keep clean visual. Or by dollar value spend per category. This will follow the slide on % </a:t>
             </a:r>
           </a:p>
           <a:p>
@@ -5216,6 +5217,17 @@
             <a:pPr lvl="1"/>
             <a:r>
               <a:rPr lang="en-US" dirty="0"/>
+              <a:t>Kendal: Start moving plots into the presentation slide deck. Help organize the analysis showcase section.</a:t>
+            </a:r>
+          </a:p>
+          <a:p>
+            <a:pPr lvl="1"/>
+            <a:endParaRPr lang="en-US" dirty="0"/>
+          </a:p>
+          <a:p>
+            <a:pPr lvl="1"/>
+            <a:r>
+              <a:rPr lang="en-US" dirty="0"/>
               <a:t>Aaliyah: finish summary </a:t>
             </a:r>
             <a:r>
@@ -5237,7 +5249,7 @@
             <a:pPr lvl="1"/>
             <a:r>
               <a:rPr lang="en-US" dirty="0"/>
-              <a:t>Greg: (needs Aaliyah’s dataset to finish correlation/regression plots)</a:t>
+              <a:t>Greg: needs Aaliyah’s dataset to finish correlation/regression plots.</a:t>
             </a:r>
           </a:p>
           <a:p>
@@ -5248,7 +5260,7 @@
             <a:pPr lvl="1"/>
             <a:r>
               <a:rPr lang="en-US" dirty="0"/>
-              <a:t>Joanna: </a:t>
+              <a:t>Joanna: Help fill out this presentation slide deck- pull figures or help with the bullet points.</a:t>
             </a:r>
           </a:p>
           <a:p>
@@ -5772,7 +5784,7 @@
           <p:cNvPr id="2" name="Title 1">
             <a:extLst>
               <a:ext uri="{FF2B5EF4-FFF2-40B4-BE49-F238E27FC236}">
-                <a16:creationId xmlns:a16="http://schemas.microsoft.com/office/drawing/2014/main" id="{516AA0E4-679C-98A1-AAD2-B79F27E86F2D}"/>
+                <a16:creationId xmlns:a16="http://schemas.microsoft.com/office/drawing/2014/main" id="{C5F1274F-4DAD-5A60-689D-910FA4C88A32}"/>
               </a:ext>
             </a:extLst>
           </p:cNvPr>
@@ -5780,29 +5792,27 @@
             <a:spLocks noGrp="1"/>
           </p:cNvSpPr>
           <p:nvPr>
-            <p:ph type="title"/>
+            <p:ph type="ctrTitle"/>
           </p:nvPr>
         </p:nvSpPr>
         <p:spPr/>
         <p:txBody>
-          <a:bodyPr>
-            <a:normAutofit/>
-          </a:bodyPr>
+          <a:bodyPr/>
           <a:lstStyle/>
           <a:p>
             <a:r>
               <a:rPr lang="en-US" dirty="0"/>
-              <a:t>Questions that you found interesting and what motivated you to answer them</a:t>
-            </a:r>
-          </a:p>
-        </p:txBody>
-      </p:sp>
-      <p:sp>
-        <p:nvSpPr>
-          <p:cNvPr id="3" name="Content Placeholder 2">
+              <a:t>Covid-19 Spending vs. Vaccination Rates</a:t>
+            </a:r>
+          </a:p>
+        </p:txBody>
+      </p:sp>
+      <p:sp>
+        <p:nvSpPr>
+          <p:cNvPr id="3" name="Subtitle 2">
             <a:extLst>
               <a:ext uri="{FF2B5EF4-FFF2-40B4-BE49-F238E27FC236}">
-                <a16:creationId xmlns:a16="http://schemas.microsoft.com/office/drawing/2014/main" id="{264C10B3-8E95-F7CC-08C1-580CF9EEFDD4}"/>
+                <a16:creationId xmlns:a16="http://schemas.microsoft.com/office/drawing/2014/main" id="{16EAF2CC-0863-A164-C9FC-875C83ACAE1D}"/>
               </a:ext>
             </a:extLst>
           </p:cNvPr>
@@ -5810,96 +5820,73 @@
             <a:spLocks noGrp="1"/>
           </p:cNvSpPr>
           <p:nvPr>
-            <p:ph idx="1"/>
+            <p:ph type="subTitle" idx="1"/>
           </p:nvPr>
         </p:nvSpPr>
         <p:spPr/>
         <p:txBody>
-          <a:bodyPr>
-            <a:normAutofit fontScale="92500" lnSpcReduction="10000"/>
+          <a:bodyPr/>
+          <a:lstStyle/>
+          <a:p>
+            <a:r>
+              <a:rPr lang="en-US" dirty="0"/>
+              <a:t>Group 7:</a:t>
+            </a:r>
+          </a:p>
+          <a:p>
+            <a:r>
+              <a:rPr lang="en-US" dirty="0">
+                <a:solidFill>
+                  <a:srgbClr val="FF0000"/>
+                </a:solidFill>
+              </a:rPr>
+              <a:t>(names in alphabetical order here)</a:t>
+            </a:r>
+          </a:p>
+        </p:txBody>
+      </p:sp>
+      <p:sp>
+        <p:nvSpPr>
+          <p:cNvPr id="4" name="TextBox 3">
+            <a:extLst>
+              <a:ext uri="{FF2B5EF4-FFF2-40B4-BE49-F238E27FC236}">
+                <a16:creationId xmlns:a16="http://schemas.microsoft.com/office/drawing/2014/main" id="{D783EAED-E150-990D-16D7-5F2761305BAA}"/>
+              </a:ext>
+            </a:extLst>
+          </p:cNvPr>
+          <p:cNvSpPr txBox="1"/>
+          <p:nvPr/>
+        </p:nvSpPr>
+        <p:spPr>
+          <a:xfrm rot="201553">
+            <a:off x="1039782" y="1074714"/>
+            <a:ext cx="8565502" cy="369332"/>
+          </a:xfrm>
+          <a:prstGeom prst="rect">
+            <a:avLst/>
+          </a:prstGeom>
+          <a:solidFill>
+            <a:schemeClr val="bg1"/>
+          </a:solidFill>
+          <a:ln>
+            <a:solidFill>
+              <a:schemeClr val="tx1"/>
+            </a:solidFill>
+          </a:ln>
+        </p:spPr>
+        <p:txBody>
+          <a:bodyPr wrap="square" rtlCol="0">
+            <a:spAutoFit/>
           </a:bodyPr>
           <a:lstStyle/>
           <a:p>
             <a:r>
-              <a:rPr lang="en-US" sz="2400" dirty="0"/>
-              <a:t>Questions</a:t>
-            </a:r>
-            <a:r>
-              <a:rPr lang="en-US" dirty="0"/>
-              <a:t>:</a:t>
-            </a:r>
-          </a:p>
-          <a:p>
-            <a:pPr>
-              <a:buFont typeface="Wingdings" panose="05000000000000000000" pitchFamily="2" charset="2"/>
-              <a:buChar char="§"/>
-            </a:pPr>
-            <a:r>
-              <a:rPr lang="en-US" dirty="0"/>
-              <a:t> (Help me here group)</a:t>
-            </a:r>
-          </a:p>
-          <a:p>
-            <a:pPr>
-              <a:buFont typeface="Wingdings" panose="05000000000000000000" pitchFamily="2" charset="2"/>
-              <a:buChar char="§"/>
-            </a:pPr>
-            <a:r>
-              <a:rPr lang="en-US" dirty="0"/>
-              <a:t> Did states that spent a higher percentage of their federally-granted budget have higher rates of vaccination?</a:t>
-            </a:r>
-          </a:p>
-          <a:p>
-            <a:pPr>
-              <a:buFont typeface="Wingdings" panose="05000000000000000000" pitchFamily="2" charset="2"/>
-              <a:buChar char="§"/>
-            </a:pPr>
-            <a:r>
-              <a:rPr lang="en-US" dirty="0"/>
-              <a:t> What Covid project categories did higher vaccination rate states initiate? (top 4 per state)</a:t>
-            </a:r>
-          </a:p>
-          <a:p>
-            <a:pPr lvl="1">
-              <a:buFont typeface="Wingdings" panose="05000000000000000000" pitchFamily="2" charset="2"/>
-              <a:buChar char="§"/>
-            </a:pPr>
-            <a:r>
-              <a:rPr lang="en-US" dirty="0"/>
-              <a:t>Were there similarities in project categories between these high vaccination states?</a:t>
-            </a:r>
-          </a:p>
-          <a:p>
-            <a:endParaRPr lang="en-US" dirty="0"/>
-          </a:p>
-          <a:p>
-            <a:r>
-              <a:rPr lang="en-US" sz="2400" dirty="0"/>
-              <a:t>Motivation</a:t>
-            </a:r>
-            <a:r>
-              <a:rPr lang="en-US" dirty="0"/>
-              <a:t>:</a:t>
-            </a:r>
-          </a:p>
-          <a:p>
-            <a:pPr>
-              <a:buFont typeface="Wingdings" panose="05000000000000000000" pitchFamily="2" charset="2"/>
-              <a:buChar char="§"/>
-            </a:pPr>
-            <a:r>
-              <a:rPr lang="en-US" dirty="0"/>
-              <a:t> EARN workbook provided project funding per state/local gov’t during Covid-19 pandemic.</a:t>
-            </a:r>
-          </a:p>
-          <a:p>
-            <a:pPr>
-              <a:buFont typeface="Wingdings" panose="05000000000000000000" pitchFamily="2" charset="2"/>
-              <a:buChar char="§"/>
-            </a:pPr>
-            <a:r>
-              <a:rPr lang="en-US" dirty="0"/>
-              <a:t> This unique dataset allowed us to target states for deeper review based on their percentage spend of federal funds allocated.</a:t>
+              <a:rPr lang="en-US" b="1" dirty="0">
+                <a:solidFill>
+                  <a:srgbClr val="FF0000"/>
+                </a:solidFill>
+              </a:rPr>
+              <a:t>Change this title if you can think of something better or if our analysis changes…</a:t>
             </a:r>
           </a:p>
         </p:txBody>
@@ -5907,7 +5894,7 @@
     </p:spTree>
     <p:extLst>
       <p:ext uri="{BB962C8B-B14F-4D97-AF65-F5344CB8AC3E}">
-        <p14:creationId xmlns:p14="http://schemas.microsoft.com/office/powerpoint/2010/main" val="1149720348"/>
+        <p14:creationId xmlns:p14="http://schemas.microsoft.com/office/powerpoint/2010/main" val="4092171855"/>
       </p:ext>
     </p:extLst>
   </p:cSld>
@@ -5939,7 +5926,7 @@
           <p:cNvPr id="2" name="Title 1">
             <a:extLst>
               <a:ext uri="{FF2B5EF4-FFF2-40B4-BE49-F238E27FC236}">
-                <a16:creationId xmlns:a16="http://schemas.microsoft.com/office/drawing/2014/main" id="{2A6CE34C-694C-5B1E-AAD6-FE38E3DD970A}"/>
+                <a16:creationId xmlns:a16="http://schemas.microsoft.com/office/drawing/2014/main" id="{516AA0E4-679C-98A1-AAD2-B79F27E86F2D}"/>
               </a:ext>
             </a:extLst>
           </p:cNvPr>
@@ -5959,7 +5946,7 @@
           <a:p>
             <a:r>
               <a:rPr lang="en-US" dirty="0"/>
-              <a:t>Where and how you found the data you used to answer these questions</a:t>
+              <a:t>Questions that you found interesting and what motivated you to answer them</a:t>
             </a:r>
           </a:p>
         </p:txBody>
@@ -5969,7 +5956,7 @@
           <p:cNvPr id="3" name="Content Placeholder 2">
             <a:extLst>
               <a:ext uri="{FF2B5EF4-FFF2-40B4-BE49-F238E27FC236}">
-                <a16:creationId xmlns:a16="http://schemas.microsoft.com/office/drawing/2014/main" id="{9F4F8889-1A28-EF6B-8EAB-A732EFA19B5F}"/>
+                <a16:creationId xmlns:a16="http://schemas.microsoft.com/office/drawing/2014/main" id="{264C10B3-8E95-F7CC-08C1-580CF9EEFDD4}"/>
               </a:ext>
             </a:extLst>
           </p:cNvPr>
@@ -5980,15 +5967,22 @@
             <p:ph idx="1"/>
           </p:nvPr>
         </p:nvSpPr>
-        <p:spPr>
-          <a:xfrm>
-            <a:off x="1097280" y="1737359"/>
-            <a:ext cx="10058400" cy="4551473"/>
-          </a:xfrm>
-        </p:spPr>
-        <p:txBody>
-          <a:bodyPr/>
+        <p:spPr/>
+        <p:txBody>
+          <a:bodyPr>
+            <a:normAutofit fontScale="85000" lnSpcReduction="20000"/>
+          </a:bodyPr>
           <a:lstStyle/>
+          <a:p>
+            <a:r>
+              <a:rPr lang="en-US" sz="2400" dirty="0"/>
+              <a:t>Questions</a:t>
+            </a:r>
+            <a:r>
+              <a:rPr lang="en-US" dirty="0"/>
+              <a:t>:</a:t>
+            </a:r>
+          </a:p>
           <a:p>
             <a:pPr>
               <a:buFont typeface="Wingdings" panose="05000000000000000000" pitchFamily="2" charset="2"/>
@@ -5996,15 +5990,7 @@
             </a:pPr>
             <a:r>
               <a:rPr lang="en-US" dirty="0"/>
-              <a:t> EARN Workbook (Joanna can you make this sentence </a:t>
-            </a:r>
-            <a:r>
-              <a:rPr lang="en-US" dirty="0" err="1"/>
-              <a:t>gooder</a:t>
-            </a:r>
-            <a:r>
-              <a:rPr lang="en-US" dirty="0"/>
-              <a:t>?)</a:t>
+              <a:t> Did states that spent a higher percentage of their federally-granted budget have higher rates of vaccination?</a:t>
             </a:r>
           </a:p>
           <a:p>
@@ -6012,7 +5998,18 @@
               <a:buFont typeface="Wingdings" panose="05000000000000000000" pitchFamily="2" charset="2"/>
               <a:buChar char="§"/>
             </a:pPr>
-            <a:endParaRPr lang="en-US" dirty="0"/>
+            <a:r>
+              <a:rPr lang="en-US" dirty="0"/>
+              <a:t> Did states that spent a higher total $ amount of fed budget on </a:t>
+            </a:r>
+            <a:r>
+              <a:rPr lang="en-US" b="1" dirty="0"/>
+              <a:t>COVID</a:t>
+            </a:r>
+            <a:r>
+              <a:rPr lang="en-US" dirty="0"/>
+              <a:t> projects have higher rates of vaccination?</a:t>
+            </a:r>
           </a:p>
           <a:p>
             <a:pPr>
@@ -6021,7 +6018,27 @@
             </a:pPr>
             <a:r>
               <a:rPr lang="en-US" dirty="0"/>
-              <a:t> Covid-19 dataset provided by the CDC collected (include source link or snip from the webpage)</a:t>
+              <a:t> Did states that had more vaccine-related projects (count) funded by fed have higher rates of vaccination?</a:t>
+            </a:r>
+          </a:p>
+          <a:p>
+            <a:pPr>
+              <a:buFont typeface="Wingdings" panose="05000000000000000000" pitchFamily="2" charset="2"/>
+              <a:buChar char="§"/>
+            </a:pPr>
+            <a:r>
+              <a:rPr lang="en-US" dirty="0"/>
+              <a:t> What Covid project categories did higher vaccination rate states initiate? (top 4 per state)</a:t>
+            </a:r>
+          </a:p>
+          <a:p>
+            <a:pPr lvl="1">
+              <a:buFont typeface="Wingdings" panose="05000000000000000000" pitchFamily="2" charset="2"/>
+              <a:buChar char="§"/>
+            </a:pPr>
+            <a:r>
+              <a:rPr lang="en-US" dirty="0"/>
+              <a:t>Were there similarities in project categories between these high vaccination states?</a:t>
             </a:r>
           </a:p>
           <a:p>
@@ -6029,13 +6046,53 @@
               <a:buNone/>
             </a:pPr>
             <a:endParaRPr lang="en-US" dirty="0"/>
+          </a:p>
+          <a:p>
+            <a:r>
+              <a:rPr lang="en-US" sz="2400" dirty="0"/>
+              <a:t>Motivation</a:t>
+            </a:r>
+            <a:r>
+              <a:rPr lang="en-US" dirty="0"/>
+              <a:t>:</a:t>
+            </a:r>
+          </a:p>
+          <a:p>
+            <a:pPr>
+              <a:buFont typeface="Wingdings" panose="05000000000000000000" pitchFamily="2" charset="2"/>
+              <a:buChar char="§"/>
+            </a:pPr>
+            <a:r>
+              <a:rPr lang="en-US" dirty="0"/>
+              <a:t> EARN workbook provided project funding per state/local gov’t during Covid-19 pandemic. (list date range here)</a:t>
+            </a:r>
+          </a:p>
+          <a:p>
+            <a:pPr>
+              <a:buFont typeface="Wingdings" panose="05000000000000000000" pitchFamily="2" charset="2"/>
+              <a:buChar char="§"/>
+            </a:pPr>
+            <a:r>
+              <a:rPr lang="en-US" dirty="0"/>
+              <a:t> Some states spent almost all of their federally allocated budgets where others spent next to none.</a:t>
+            </a:r>
+          </a:p>
+          <a:p>
+            <a:pPr>
+              <a:buFont typeface="Wingdings" panose="05000000000000000000" pitchFamily="2" charset="2"/>
+              <a:buChar char="§"/>
+            </a:pPr>
+            <a:r>
+              <a:rPr lang="en-US" dirty="0"/>
+              <a:t> This unique dataset allowed us to target states for deeper review based on their percentage spend of federal funds allocated. (mention pulling CDC data here?)</a:t>
+            </a:r>
           </a:p>
         </p:txBody>
       </p:sp>
     </p:spTree>
     <p:extLst>
       <p:ext uri="{BB962C8B-B14F-4D97-AF65-F5344CB8AC3E}">
-        <p14:creationId xmlns:p14="http://schemas.microsoft.com/office/powerpoint/2010/main" val="1472211333"/>
+        <p14:creationId xmlns:p14="http://schemas.microsoft.com/office/powerpoint/2010/main" val="1149720348"/>
       </p:ext>
     </p:extLst>
   </p:cSld>
@@ -6067,7 +6124,7 @@
           <p:cNvPr id="2" name="Title 1">
             <a:extLst>
               <a:ext uri="{FF2B5EF4-FFF2-40B4-BE49-F238E27FC236}">
-                <a16:creationId xmlns:a16="http://schemas.microsoft.com/office/drawing/2014/main" id="{6F0C3EBF-4145-5908-C88F-05F806A8F190}"/>
+                <a16:creationId xmlns:a16="http://schemas.microsoft.com/office/drawing/2014/main" id="{2A6CE34C-694C-5B1E-AAD6-FE38E3DD970A}"/>
               </a:ext>
             </a:extLst>
           </p:cNvPr>
@@ -6081,13 +6138,13 @@
         <p:spPr/>
         <p:txBody>
           <a:bodyPr>
-            <a:normAutofit fontScale="90000"/>
+            <a:normAutofit/>
           </a:bodyPr>
           <a:lstStyle/>
           <a:p>
             <a:r>
               <a:rPr lang="en-US" dirty="0"/>
-              <a:t> The data exploration and cleanup process (accompanied by your Jupyter notebook)</a:t>
+              <a:t>Where and how you found the data you used to answer these questions</a:t>
             </a:r>
           </a:p>
         </p:txBody>
@@ -6097,7 +6154,7 @@
           <p:cNvPr id="3" name="Content Placeholder 2">
             <a:extLst>
               <a:ext uri="{FF2B5EF4-FFF2-40B4-BE49-F238E27FC236}">
-                <a16:creationId xmlns:a16="http://schemas.microsoft.com/office/drawing/2014/main" id="{F99B99BC-6593-564A-6627-E07C1249922C}"/>
+                <a16:creationId xmlns:a16="http://schemas.microsoft.com/office/drawing/2014/main" id="{9F4F8889-1A28-EF6B-8EAB-A732EFA19B5F}"/>
               </a:ext>
             </a:extLst>
           </p:cNvPr>
@@ -6108,7 +6165,12 @@
             <p:ph idx="1"/>
           </p:nvPr>
         </p:nvSpPr>
-        <p:spPr/>
+        <p:spPr>
+          <a:xfrm>
+            <a:off x="1097280" y="1737359"/>
+            <a:ext cx="10058400" cy="4551473"/>
+          </a:xfrm>
+        </p:spPr>
         <p:txBody>
           <a:bodyPr/>
           <a:lstStyle/>
@@ -6119,7 +6181,15 @@
             </a:pPr>
             <a:r>
               <a:rPr lang="en-US" dirty="0"/>
-              <a:t> Imported EARN workbook sheets as CSV files. </a:t>
+              <a:t> EARN Workbook (Joanna can you make this sentence </a:t>
+            </a:r>
+            <a:r>
+              <a:rPr lang="en-US" dirty="0" err="1"/>
+              <a:t>gooder</a:t>
+            </a:r>
+            <a:r>
+              <a:rPr lang="en-US" dirty="0"/>
+              <a:t>?)</a:t>
             </a:r>
           </a:p>
           <a:p>
@@ -6129,15 +6199,7 @@
             </a:pPr>
             <a:r>
               <a:rPr lang="en-US" dirty="0"/>
-              <a:t>Cleaned </a:t>
-            </a:r>
-            <a:r>
-              <a:rPr lang="en-US" dirty="0" err="1"/>
-              <a:t>DataFrames</a:t>
-            </a:r>
-            <a:r>
-              <a:rPr lang="en-US" dirty="0"/>
-              <a:t> by converting string number columns to numeric.</a:t>
+              <a:t>If the group that owns the EARN workbook has a symbol or company name, snip that picture here.</a:t>
             </a:r>
           </a:p>
           <a:p>
@@ -6145,18 +6207,7 @@
               <a:buFont typeface="Wingdings" panose="05000000000000000000" pitchFamily="2" charset="2"/>
               <a:buChar char="§"/>
             </a:pPr>
-            <a:r>
-              <a:rPr lang="en-US" dirty="0"/>
-              <a:t> Used </a:t>
-            </a:r>
-            <a:r>
-              <a:rPr lang="en-US" dirty="0" err="1"/>
-              <a:t>groupby</a:t>
-            </a:r>
-            <a:r>
-              <a:rPr lang="en-US" dirty="0"/>
-              <a:t> functions to sum numerical values.</a:t>
-            </a:r>
+            <a:endParaRPr lang="en-US" dirty="0"/>
           </a:p>
           <a:p>
             <a:pPr>
@@ -6165,80 +6216,31 @@
             </a:pPr>
             <a:r>
               <a:rPr lang="en-US" dirty="0"/>
-              <a:t> Used </a:t>
-            </a:r>
-            <a:r>
-              <a:rPr lang="en-US" dirty="0" err="1"/>
-              <a:t>groupby</a:t>
-            </a:r>
-            <a:r>
-              <a:rPr lang="en-US" dirty="0"/>
-              <a:t> functions to sum count of project types.</a:t>
-            </a:r>
-          </a:p>
-          <a:p>
-            <a:pPr>
+              <a:t> Covid-19 dataset provided by the CDC (include source link or snip from the webpage)</a:t>
+            </a:r>
+          </a:p>
+          <a:p>
+            <a:pPr lvl="1">
               <a:buFont typeface="Wingdings" panose="05000000000000000000" pitchFamily="2" charset="2"/>
               <a:buChar char="§"/>
             </a:pPr>
             <a:r>
               <a:rPr lang="en-US" dirty="0"/>
-              <a:t> Created calculated percentage columns within relevant </a:t>
-            </a:r>
-            <a:r>
-              <a:rPr lang="en-US" dirty="0" err="1"/>
-              <a:t>DataFrames</a:t>
-            </a:r>
-            <a:r>
-              <a:rPr lang="en-US" dirty="0"/>
-              <a:t>.</a:t>
-            </a:r>
-          </a:p>
-          <a:p>
-            <a:pPr>
-              <a:buFont typeface="Wingdings" panose="05000000000000000000" pitchFamily="2" charset="2"/>
-              <a:buChar char="§"/>
-            </a:pPr>
-            <a:endParaRPr lang="en-US" dirty="0"/>
-          </a:p>
-          <a:p>
-            <a:pPr>
-              <a:buFont typeface="Wingdings" panose="05000000000000000000" pitchFamily="2" charset="2"/>
-              <a:buChar char="§"/>
-            </a:pPr>
-            <a:endParaRPr lang="en-US" dirty="0"/>
+              <a:t>Include a snip of the CDC badge or something.</a:t>
+            </a:r>
           </a:p>
           <a:p>
             <a:pPr marL="0" indent="0">
               <a:buNone/>
             </a:pPr>
-            <a:r>
-              <a:rPr lang="en-US" dirty="0"/>
-              <a:t>(Try to make this explanation align directly with the skills we’ve learned in this class, </a:t>
-            </a:r>
-            <a:r>
-              <a:rPr lang="en-US" dirty="0" err="1"/>
-              <a:t>ie</a:t>
-            </a:r>
-            <a:r>
-              <a:rPr lang="en-US" dirty="0"/>
-              <a:t>) “Used Pandas </a:t>
-            </a:r>
-            <a:r>
-              <a:rPr lang="en-US" dirty="0" err="1"/>
-              <a:t>xyz</a:t>
-            </a:r>
-            <a:r>
-              <a:rPr lang="en-US" dirty="0"/>
-              <a:t> functions. Used Python .replace to drop string characters preventing casting as numeric)</a:t>
-            </a:r>
+            <a:endParaRPr lang="en-US" dirty="0"/>
           </a:p>
         </p:txBody>
       </p:sp>
     </p:spTree>
     <p:extLst>
       <p:ext uri="{BB962C8B-B14F-4D97-AF65-F5344CB8AC3E}">
-        <p14:creationId xmlns:p14="http://schemas.microsoft.com/office/powerpoint/2010/main" val="3791972924"/>
+        <p14:creationId xmlns:p14="http://schemas.microsoft.com/office/powerpoint/2010/main" val="1472211333"/>
       </p:ext>
     </p:extLst>
   </p:cSld>
@@ -6270,7 +6272,7 @@
           <p:cNvPr id="2" name="Title 1">
             <a:extLst>
               <a:ext uri="{FF2B5EF4-FFF2-40B4-BE49-F238E27FC236}">
-                <a16:creationId xmlns:a16="http://schemas.microsoft.com/office/drawing/2014/main" id="{8D762A82-5C67-55DD-9A6F-0C7827E11DE6}"/>
+                <a16:creationId xmlns:a16="http://schemas.microsoft.com/office/drawing/2014/main" id="{6F0C3EBF-4145-5908-C88F-05F806A8F190}"/>
               </a:ext>
             </a:extLst>
           </p:cNvPr>
@@ -6284,13 +6286,13 @@
         <p:spPr/>
         <p:txBody>
           <a:bodyPr>
-            <a:normAutofit/>
+            <a:normAutofit fontScale="90000"/>
           </a:bodyPr>
           <a:lstStyle/>
           <a:p>
             <a:r>
               <a:rPr lang="en-US" dirty="0"/>
-              <a:t>The analysis process (accompanied by your Jupyter notebook)</a:t>
+              <a:t> The data exploration and cleanup process (accompanied by your Jupyter notebook)</a:t>
             </a:r>
           </a:p>
         </p:txBody>
@@ -6300,7 +6302,7 @@
           <p:cNvPr id="3" name="Content Placeholder 2">
             <a:extLst>
               <a:ext uri="{FF2B5EF4-FFF2-40B4-BE49-F238E27FC236}">
-                <a16:creationId xmlns:a16="http://schemas.microsoft.com/office/drawing/2014/main" id="{AF3F6DD1-CDA7-163A-9A93-EF1AD6EE2659}"/>
+                <a16:creationId xmlns:a16="http://schemas.microsoft.com/office/drawing/2014/main" id="{F99B99BC-6593-564A-6627-E07C1249922C}"/>
               </a:ext>
             </a:extLst>
           </p:cNvPr>
@@ -6313,19 +6315,8 @@
         </p:nvSpPr>
         <p:spPr/>
         <p:txBody>
-          <a:bodyPr>
-            <a:normAutofit lnSpcReduction="10000"/>
-          </a:bodyPr>
+          <a:bodyPr/>
           <a:lstStyle/>
-          <a:p>
-            <a:pPr marL="0" indent="0">
-              <a:buNone/>
-            </a:pPr>
-            <a:r>
-              <a:rPr lang="en-US" dirty="0"/>
-              <a:t>Here’s where we show, don’t tell:</a:t>
-            </a:r>
-          </a:p>
           <a:p>
             <a:pPr>
               <a:buFont typeface="Wingdings" panose="05000000000000000000" pitchFamily="2" charset="2"/>
@@ -6333,11 +6324,25 @@
             </a:pPr>
             <a:r>
               <a:rPr lang="en-US" dirty="0"/>
-              <a:t> Start with EARN combination bar/line graph. </a:t>
-            </a:r>
-            <a:r>
-              <a:rPr lang="en-US" sz="1800" dirty="0"/>
-              <a:t>No real conclusions or further analysis on this one. It just summarizes the EARN workbook data which helped answer our questions.</a:t>
+              <a:t> Imported EARN workbook sheets as CSV files. </a:t>
+            </a:r>
+          </a:p>
+          <a:p>
+            <a:pPr lvl="1">
+              <a:buFont typeface="Wingdings" panose="05000000000000000000" pitchFamily="2" charset="2"/>
+              <a:buChar char="§"/>
+            </a:pPr>
+            <a:r>
+              <a:rPr lang="en-US" dirty="0"/>
+              <a:t>Cleaned </a:t>
+            </a:r>
+            <a:r>
+              <a:rPr lang="en-US" dirty="0" err="1"/>
+              <a:t>DataFrames</a:t>
+            </a:r>
+            <a:r>
+              <a:rPr lang="en-US" dirty="0"/>
+              <a:t> by converting string number columns to numeric.</a:t>
             </a:r>
           </a:p>
           <a:p>
@@ -6345,7 +6350,18 @@
               <a:buFont typeface="Wingdings" panose="05000000000000000000" pitchFamily="2" charset="2"/>
               <a:buChar char="§"/>
             </a:pPr>
-            <a:endParaRPr lang="en-US" dirty="0"/>
+            <a:r>
+              <a:rPr lang="en-US" dirty="0"/>
+              <a:t> Used </a:t>
+            </a:r>
+            <a:r>
+              <a:rPr lang="en-US" dirty="0" err="1"/>
+              <a:t>groupby</a:t>
+            </a:r>
+            <a:r>
+              <a:rPr lang="en-US" dirty="0"/>
+              <a:t> functions to sum numerical values.</a:t>
+            </a:r>
           </a:p>
           <a:p>
             <a:pPr>
@@ -6354,7 +6370,15 @@
             </a:pPr>
             <a:r>
               <a:rPr lang="en-US" dirty="0"/>
-              <a:t> Then slides showing state heatmaps.</a:t>
+              <a:t> Used </a:t>
+            </a:r>
+            <a:r>
+              <a:rPr lang="en-US" dirty="0" err="1"/>
+              <a:t>groupby</a:t>
+            </a:r>
+            <a:r>
+              <a:rPr lang="en-US" dirty="0"/>
+              <a:t> functions to sum count of project types.</a:t>
             </a:r>
           </a:p>
           <a:p>
@@ -6362,33 +6386,55 @@
               <a:buFont typeface="Wingdings" panose="05000000000000000000" pitchFamily="2" charset="2"/>
               <a:buChar char="§"/>
             </a:pPr>
-            <a:endParaRPr lang="en-US" dirty="0"/>
+            <a:r>
+              <a:rPr lang="en-US" dirty="0"/>
+              <a:t> Created calculated percentage columns within relevant </a:t>
+            </a:r>
+            <a:r>
+              <a:rPr lang="en-US" dirty="0" err="1"/>
+              <a:t>DataFrames</a:t>
+            </a:r>
+            <a:r>
+              <a:rPr lang="en-US" dirty="0"/>
+              <a:t>.</a:t>
+            </a:r>
           </a:p>
           <a:p>
             <a:pPr>
               <a:buFont typeface="Wingdings" panose="05000000000000000000" pitchFamily="2" charset="2"/>
               <a:buChar char="§"/>
             </a:pPr>
-            <a:r>
-              <a:rPr lang="en-US" dirty="0"/>
-              <a:t> Then bar charts for categories by state (spending or count of charts for top 3 or 4 vaccinator states).</a:t>
-            </a:r>
-          </a:p>
-          <a:p>
-            <a:pPr>
-              <a:buFont typeface="Wingdings" panose="05000000000000000000" pitchFamily="2" charset="2"/>
-              <a:buChar char="§"/>
-            </a:pPr>
             <a:endParaRPr lang="en-US" dirty="0"/>
           </a:p>
           <a:p>
-            <a:pPr>
-              <a:buFont typeface="Wingdings" panose="05000000000000000000" pitchFamily="2" charset="2"/>
-              <a:buChar char="§"/>
-            </a:pPr>
-            <a:r>
-              <a:rPr lang="en-US" dirty="0"/>
-              <a:t> Then what?? At least 1 correlation/regression plot? Would be moreso to showcase our ability to use the method.</a:t>
+            <a:pPr marL="0" indent="0">
+              <a:buNone/>
+            </a:pPr>
+            <a:endParaRPr lang="en-US" dirty="0"/>
+          </a:p>
+          <a:p>
+            <a:pPr marL="0" indent="0">
+              <a:buNone/>
+            </a:pPr>
+            <a:r>
+              <a:rPr lang="en-US" dirty="0"/>
+              <a:t>(Try to make this explanation align directly with the skills we’ve learned in this class, </a:t>
+            </a:r>
+            <a:r>
+              <a:rPr lang="en-US" dirty="0" err="1"/>
+              <a:t>ie</a:t>
+            </a:r>
+            <a:r>
+              <a:rPr lang="en-US" dirty="0"/>
+              <a:t>) “Used Pandas </a:t>
+            </a:r>
+            <a:r>
+              <a:rPr lang="en-US" dirty="0" err="1"/>
+              <a:t>xyz</a:t>
+            </a:r>
+            <a:r>
+              <a:rPr lang="en-US" dirty="0"/>
+              <a:t> functions. Used Python .replace to drop string characters preventing casting as numeric)</a:t>
             </a:r>
           </a:p>
         </p:txBody>
@@ -6396,7 +6442,7 @@
     </p:spTree>
     <p:extLst>
       <p:ext uri="{BB962C8B-B14F-4D97-AF65-F5344CB8AC3E}">
-        <p14:creationId xmlns:p14="http://schemas.microsoft.com/office/powerpoint/2010/main" val="1611749723"/>
+        <p14:creationId xmlns:p14="http://schemas.microsoft.com/office/powerpoint/2010/main" val="3791972924"/>
       </p:ext>
     </p:extLst>
   </p:cSld>
@@ -6428,6 +6474,164 @@
           <p:cNvPr id="2" name="Title 1">
             <a:extLst>
               <a:ext uri="{FF2B5EF4-FFF2-40B4-BE49-F238E27FC236}">
+                <a16:creationId xmlns:a16="http://schemas.microsoft.com/office/drawing/2014/main" id="{8D762A82-5C67-55DD-9A6F-0C7827E11DE6}"/>
+              </a:ext>
+            </a:extLst>
+          </p:cNvPr>
+          <p:cNvSpPr>
+            <a:spLocks noGrp="1"/>
+          </p:cNvSpPr>
+          <p:nvPr>
+            <p:ph type="title"/>
+          </p:nvPr>
+        </p:nvSpPr>
+        <p:spPr/>
+        <p:txBody>
+          <a:bodyPr>
+            <a:normAutofit/>
+          </a:bodyPr>
+          <a:lstStyle/>
+          <a:p>
+            <a:r>
+              <a:rPr lang="en-US" dirty="0"/>
+              <a:t>The analysis process (accompanied by your Jupyter notebook)</a:t>
+            </a:r>
+          </a:p>
+        </p:txBody>
+      </p:sp>
+      <p:sp>
+        <p:nvSpPr>
+          <p:cNvPr id="3" name="Content Placeholder 2">
+            <a:extLst>
+              <a:ext uri="{FF2B5EF4-FFF2-40B4-BE49-F238E27FC236}">
+                <a16:creationId xmlns:a16="http://schemas.microsoft.com/office/drawing/2014/main" id="{AF3F6DD1-CDA7-163A-9A93-EF1AD6EE2659}"/>
+              </a:ext>
+            </a:extLst>
+          </p:cNvPr>
+          <p:cNvSpPr>
+            <a:spLocks noGrp="1"/>
+          </p:cNvSpPr>
+          <p:nvPr>
+            <p:ph idx="1"/>
+          </p:nvPr>
+        </p:nvSpPr>
+        <p:spPr/>
+        <p:txBody>
+          <a:bodyPr>
+            <a:normAutofit lnSpcReduction="10000"/>
+          </a:bodyPr>
+          <a:lstStyle/>
+          <a:p>
+            <a:pPr marL="0" indent="0">
+              <a:buNone/>
+            </a:pPr>
+            <a:r>
+              <a:rPr lang="en-US" dirty="0"/>
+              <a:t>Here’s where we show, don’t tell:</a:t>
+            </a:r>
+          </a:p>
+          <a:p>
+            <a:pPr>
+              <a:buFont typeface="Wingdings" panose="05000000000000000000" pitchFamily="2" charset="2"/>
+              <a:buChar char="§"/>
+            </a:pPr>
+            <a:r>
+              <a:rPr lang="en-US" dirty="0"/>
+              <a:t> Start with EARN combination bar/line graph. </a:t>
+            </a:r>
+            <a:r>
+              <a:rPr lang="en-US" sz="1800" dirty="0"/>
+              <a:t>No real conclusions or further analysis on this one. It just summarizes the EARN workbook data which helped answer our questions.</a:t>
+            </a:r>
+          </a:p>
+          <a:p>
+            <a:pPr>
+              <a:buFont typeface="Wingdings" panose="05000000000000000000" pitchFamily="2" charset="2"/>
+              <a:buChar char="§"/>
+            </a:pPr>
+            <a:endParaRPr lang="en-US" dirty="0"/>
+          </a:p>
+          <a:p>
+            <a:pPr>
+              <a:buFont typeface="Wingdings" panose="05000000000000000000" pitchFamily="2" charset="2"/>
+              <a:buChar char="§"/>
+            </a:pPr>
+            <a:r>
+              <a:rPr lang="en-US" dirty="0"/>
+              <a:t> Then slides showing state heatmaps.</a:t>
+            </a:r>
+          </a:p>
+          <a:p>
+            <a:pPr>
+              <a:buFont typeface="Wingdings" panose="05000000000000000000" pitchFamily="2" charset="2"/>
+              <a:buChar char="§"/>
+            </a:pPr>
+            <a:endParaRPr lang="en-US" dirty="0"/>
+          </a:p>
+          <a:p>
+            <a:pPr>
+              <a:buFont typeface="Wingdings" panose="05000000000000000000" pitchFamily="2" charset="2"/>
+              <a:buChar char="§"/>
+            </a:pPr>
+            <a:r>
+              <a:rPr lang="en-US" dirty="0"/>
+              <a:t> Then bar charts for categories by state (spending or count of charts for top 3 or 4 vaccinator states).</a:t>
+            </a:r>
+          </a:p>
+          <a:p>
+            <a:pPr>
+              <a:buFont typeface="Wingdings" panose="05000000000000000000" pitchFamily="2" charset="2"/>
+              <a:buChar char="§"/>
+            </a:pPr>
+            <a:endParaRPr lang="en-US" dirty="0"/>
+          </a:p>
+          <a:p>
+            <a:pPr>
+              <a:buFont typeface="Wingdings" panose="05000000000000000000" pitchFamily="2" charset="2"/>
+              <a:buChar char="§"/>
+            </a:pPr>
+            <a:r>
+              <a:rPr lang="en-US" dirty="0"/>
+              <a:t> Then what?? At least 1 correlation/regression plot? Would be moreso to showcase our ability to use the method.</a:t>
+            </a:r>
+          </a:p>
+        </p:txBody>
+      </p:sp>
+    </p:spTree>
+    <p:extLst>
+      <p:ext uri="{BB962C8B-B14F-4D97-AF65-F5344CB8AC3E}">
+        <p14:creationId xmlns:p14="http://schemas.microsoft.com/office/powerpoint/2010/main" val="1611749723"/>
+      </p:ext>
+    </p:extLst>
+  </p:cSld>
+  <p:clrMapOvr>
+    <a:masterClrMapping/>
+  </p:clrMapOvr>
+</p:sld>
+</file>
+
+<file path=ppt/slides/slide18.xml><?xml version="1.0" encoding="utf-8"?>
+<p:sld xmlns:a="http://schemas.openxmlformats.org/drawingml/2006/main" xmlns:r="http://schemas.openxmlformats.org/officeDocument/2006/relationships" xmlns:p="http://schemas.openxmlformats.org/presentationml/2006/main">
+  <p:cSld>
+    <p:spTree>
+      <p:nvGrpSpPr>
+        <p:cNvPr id="1" name=""/>
+        <p:cNvGrpSpPr/>
+        <p:nvPr/>
+      </p:nvGrpSpPr>
+      <p:grpSpPr>
+        <a:xfrm>
+          <a:off x="0" y="0"/>
+          <a:ext cx="0" cy="0"/>
+          <a:chOff x="0" y="0"/>
+          <a:chExt cx="0" cy="0"/>
+        </a:xfrm>
+      </p:grpSpPr>
+      <p:sp>
+        <p:nvSpPr>
+          <p:cNvPr id="2" name="Title 1">
+            <a:extLst>
+              <a:ext uri="{FF2B5EF4-FFF2-40B4-BE49-F238E27FC236}">
                 <a16:creationId xmlns:a16="http://schemas.microsoft.com/office/drawing/2014/main" id="{7AC685D8-ABCA-82A7-6E46-417501C13A61}"/>
               </a:ext>
             </a:extLst>
@@ -6515,7 +6719,7 @@
 </p:sld>
 </file>
 
-<file path=ppt/slides/slide18.xml><?xml version="1.0" encoding="utf-8"?>
+<file path=ppt/slides/slide19.xml><?xml version="1.0" encoding="utf-8"?>
 <p:sld xmlns:a="http://schemas.openxmlformats.org/drawingml/2006/main" xmlns:r="http://schemas.openxmlformats.org/officeDocument/2006/relationships" xmlns:p="http://schemas.openxmlformats.org/presentationml/2006/main">
   <p:cSld>
     <p:spTree>

</xml_diff>

<commit_message>
5/16/2023: Updated Project_notes.pptx to mock up final presentation deck.
</commit_message>
<xml_diff>
--- a/Project notes.pptx
+++ b/Project notes.pptx
@@ -5,7 +5,7 @@
     <p:sldMasterId id="2147483696" r:id="rId1"/>
   </p:sldMasterIdLst>
   <p:notesMasterIdLst>
-    <p:notesMasterId r:id="rId23"/>
+    <p:notesMasterId r:id="rId27"/>
   </p:notesMasterIdLst>
   <p:sldIdLst>
     <p:sldId id="256" r:id="rId2"/>
@@ -21,14 +21,18 @@
     <p:sldId id="270" r:id="rId12"/>
     <p:sldId id="263" r:id="rId13"/>
     <p:sldId id="276" r:id="rId14"/>
-    <p:sldId id="271" r:id="rId15"/>
-    <p:sldId id="277" r:id="rId16"/>
-    <p:sldId id="269" r:id="rId17"/>
+    <p:sldId id="269" r:id="rId15"/>
+    <p:sldId id="271" r:id="rId16"/>
+    <p:sldId id="277" r:id="rId17"/>
     <p:sldId id="278" r:id="rId18"/>
     <p:sldId id="272" r:id="rId19"/>
     <p:sldId id="273" r:id="rId20"/>
-    <p:sldId id="274" r:id="rId21"/>
-    <p:sldId id="275" r:id="rId22"/>
+    <p:sldId id="279" r:id="rId21"/>
+    <p:sldId id="280" r:id="rId22"/>
+    <p:sldId id="281" r:id="rId23"/>
+    <p:sldId id="282" r:id="rId24"/>
+    <p:sldId id="274" r:id="rId25"/>
+    <p:sldId id="275" r:id="rId26"/>
   </p:sldIdLst>
   <p:sldSz cx="12192000" cy="6858000"/>
   <p:notesSz cx="6858000" cy="9144000"/>
@@ -4447,7 +4451,7 @@
 </file>
 
 <file path=ppt/slides/slide1.xml><?xml version="1.0" encoding="utf-8"?>
-<p:sld xmlns:a="http://schemas.openxmlformats.org/drawingml/2006/main" xmlns:r="http://schemas.openxmlformats.org/officeDocument/2006/relationships" xmlns:p="http://schemas.openxmlformats.org/presentationml/2006/main">
+<p:sld xmlns:a="http://schemas.openxmlformats.org/drawingml/2006/main" xmlns:r="http://schemas.openxmlformats.org/officeDocument/2006/relationships" xmlns:p="http://schemas.openxmlformats.org/presentationml/2006/main" show="0">
   <p:cSld>
     <p:spTree>
       <p:nvGrpSpPr>
@@ -4578,7 +4582,7 @@
 </file>
 
 <file path=ppt/slides/slide10.xml><?xml version="1.0" encoding="utf-8"?>
-<p:sld xmlns:a="http://schemas.openxmlformats.org/drawingml/2006/main" xmlns:r="http://schemas.openxmlformats.org/officeDocument/2006/relationships" xmlns:p="http://schemas.openxmlformats.org/presentationml/2006/main">
+<p:sld xmlns:a="http://schemas.openxmlformats.org/drawingml/2006/main" xmlns:r="http://schemas.openxmlformats.org/officeDocument/2006/relationships" xmlns:p="http://schemas.openxmlformats.org/presentationml/2006/main" show="0">
   <p:cSld>
     <p:spTree>
       <p:nvGrpSpPr>
@@ -5118,7 +5122,7 @@
 </file>
 
 <file path=ppt/slides/slide11.xml><?xml version="1.0" encoding="utf-8"?>
-<p:sld xmlns:a="http://schemas.openxmlformats.org/drawingml/2006/main" xmlns:r="http://schemas.openxmlformats.org/officeDocument/2006/relationships" xmlns:p="http://schemas.openxmlformats.org/presentationml/2006/main">
+<p:sld xmlns:a="http://schemas.openxmlformats.org/drawingml/2006/main" xmlns:r="http://schemas.openxmlformats.org/officeDocument/2006/relationships" xmlns:p="http://schemas.openxmlformats.org/presentationml/2006/main" show="0">
   <p:cSld>
     <p:spTree>
       <p:nvGrpSpPr>
@@ -5967,7 +5971,7 @@
           <p:cNvPr id="2" name="Title 1">
             <a:extLst>
               <a:ext uri="{FF2B5EF4-FFF2-40B4-BE49-F238E27FC236}">
-                <a16:creationId xmlns:a16="http://schemas.microsoft.com/office/drawing/2014/main" id="{2A6CE34C-694C-5B1E-AAD6-FE38E3DD970A}"/>
+                <a16:creationId xmlns:a16="http://schemas.microsoft.com/office/drawing/2014/main" id="{516AA0E4-679C-98A1-AAD2-B79F27E86F2D}"/>
               </a:ext>
             </a:extLst>
           </p:cNvPr>
@@ -5987,7 +5991,7 @@
           <a:p>
             <a:r>
               <a:rPr lang="en-US" dirty="0"/>
-              <a:t>Where and how you found the data you used to answer these questions</a:t>
+              <a:t>Questions that you found interesting and what motivated you to answer them</a:t>
             </a:r>
           </a:p>
         </p:txBody>
@@ -5997,7 +6001,7 @@
           <p:cNvPr id="3" name="Content Placeholder 2">
             <a:extLst>
               <a:ext uri="{FF2B5EF4-FFF2-40B4-BE49-F238E27FC236}">
-                <a16:creationId xmlns:a16="http://schemas.microsoft.com/office/drawing/2014/main" id="{9F4F8889-1A28-EF6B-8EAB-A732EFA19B5F}"/>
+                <a16:creationId xmlns:a16="http://schemas.microsoft.com/office/drawing/2014/main" id="{264C10B3-8E95-F7CC-08C1-580CF9EEFDD4}"/>
               </a:ext>
             </a:extLst>
           </p:cNvPr>
@@ -6008,168 +6012,54 @@
             <p:ph idx="1"/>
           </p:nvPr>
         </p:nvSpPr>
-        <p:spPr>
-          <a:xfrm>
-            <a:off x="1097280" y="1737359"/>
-            <a:ext cx="10058400" cy="4551473"/>
-          </a:xfrm>
-        </p:spPr>
+        <p:spPr/>
         <p:txBody>
           <a:bodyPr>
             <a:normAutofit/>
           </a:bodyPr>
           <a:lstStyle/>
           <a:p>
-            <a:pPr marL="0" indent="0" algn="l">
-              <a:buNone/>
+            <a:r>
+              <a:rPr lang="en-US" dirty="0"/>
+              <a:t>Did states that spent a higher percentage of their federally-granted budget have higher rates of vaccination?</a:t>
+            </a:r>
+          </a:p>
+          <a:p>
+            <a:pPr>
+              <a:buFont typeface="Wingdings" panose="05000000000000000000" pitchFamily="2" charset="2"/>
+              <a:buChar char="§"/>
             </a:pPr>
             <a:r>
-              <a:rPr lang="en-US" b="1" i="0" dirty="0">
-                <a:solidFill>
-                  <a:srgbClr val="000000"/>
-                </a:solidFill>
-                <a:effectLst/>
-                <a:latin typeface="Helvetica Neue"/>
-              </a:rPr>
-              <a:t>CDC</a:t>
-            </a:r>
-            <a:r>
-              <a:rPr lang="en-US" b="0" i="0" dirty="0">
-                <a:solidFill>
-                  <a:srgbClr val="000000"/>
-                </a:solidFill>
-                <a:effectLst/>
-                <a:latin typeface="Helvetica Neue"/>
-              </a:rPr>
-              <a:t> - "COVID-19 Vaccinations in the United States, Jurisdiction" </a:t>
-            </a:r>
-          </a:p>
-          <a:p>
-            <a:pPr lvl="1"/>
-            <a:r>
-              <a:rPr lang="en-US" b="0" i="0" u="sng" dirty="0">
-                <a:solidFill>
-                  <a:srgbClr val="296EAA"/>
-                </a:solidFill>
-                <a:effectLst/>
-                <a:latin typeface="Helvetica Neue"/>
-                <a:hlinkClick r:id="rId2"/>
-              </a:rPr>
-              <a:t>https://data.cdc.gov/Vaccinations/COVID-19-Vaccinations-in-the-United-States-Jurisdi/unsk-b7fc</a:t>
-            </a:r>
-            <a:endParaRPr lang="en-US" b="0" i="0" u="sng" dirty="0">
-              <a:solidFill>
-                <a:srgbClr val="296EAA"/>
-              </a:solidFill>
-              <a:effectLst/>
-              <a:latin typeface="Helvetica Neue"/>
-            </a:endParaRPr>
-          </a:p>
-          <a:p>
-            <a:pPr lvl="1"/>
-            <a:r>
-              <a:rPr lang="en-US" b="0" i="0" dirty="0">
-                <a:solidFill>
-                  <a:srgbClr val="000000"/>
-                </a:solidFill>
-                <a:effectLst/>
-                <a:latin typeface="Helvetica Neue"/>
-              </a:rPr>
-              <a:t>csv downloaded 5/11/23</a:t>
-            </a:r>
-          </a:p>
-          <a:p>
-            <a:pPr algn="l"/>
-            <a:endParaRPr lang="en-US" b="0" i="0" dirty="0">
-              <a:solidFill>
-                <a:srgbClr val="000000"/>
-              </a:solidFill>
-              <a:effectLst/>
-              <a:latin typeface="Helvetica Neue"/>
-            </a:endParaRPr>
-          </a:p>
-          <a:p>
-            <a:pPr algn="l"/>
-            <a:r>
-              <a:rPr lang="en-US" b="1" i="0" dirty="0">
-                <a:solidFill>
-                  <a:srgbClr val="000000"/>
-                </a:solidFill>
-                <a:effectLst/>
-                <a:latin typeface="Helvetica Neue"/>
-              </a:rPr>
-              <a:t>EARN/EPI </a:t>
-            </a:r>
-            <a:r>
-              <a:rPr lang="en-US" b="0" i="0" dirty="0">
-                <a:solidFill>
-                  <a:srgbClr val="000000"/>
-                </a:solidFill>
-                <a:effectLst/>
-                <a:latin typeface="Helvetica Neue"/>
-              </a:rPr>
-              <a:t>- "EARN SLFRF Workbook for Q4 2022" compiled by Dave </a:t>
-            </a:r>
-            <a:r>
-              <a:rPr lang="en-US" b="0" i="0" dirty="0" err="1">
-                <a:solidFill>
-                  <a:srgbClr val="000000"/>
-                </a:solidFill>
-                <a:effectLst/>
-                <a:latin typeface="Helvetica Neue"/>
-              </a:rPr>
-              <a:t>Kamper</a:t>
-            </a:r>
-            <a:r>
-              <a:rPr lang="en-US" b="0" i="0" dirty="0">
-                <a:solidFill>
-                  <a:srgbClr val="000000"/>
-                </a:solidFill>
-                <a:effectLst/>
-                <a:latin typeface="Helvetica Neue"/>
-              </a:rPr>
-              <a:t> of the Economic Policy Institute (</a:t>
-            </a:r>
-            <a:r>
-              <a:rPr lang="en-US" b="0" i="0" u="sng" dirty="0">
-                <a:solidFill>
-                  <a:srgbClr val="296EAA"/>
-                </a:solidFill>
-                <a:effectLst/>
-                <a:latin typeface="Helvetica Neue"/>
-                <a:hlinkClick r:id="rId3"/>
-              </a:rPr>
-              <a:t>dkamper@epi.org</a:t>
-            </a:r>
-            <a:r>
-              <a:rPr lang="en-US" b="0" i="0" dirty="0">
-                <a:solidFill>
-                  <a:srgbClr val="000000"/>
-                </a:solidFill>
-                <a:effectLst/>
-                <a:latin typeface="Helvetica Neue"/>
-              </a:rPr>
-              <a:t>) from Treasury reports by states and local </a:t>
-            </a:r>
-            <a:r>
-              <a:rPr lang="en-US" b="0" i="0" dirty="0" err="1">
-                <a:solidFill>
-                  <a:srgbClr val="000000"/>
-                </a:solidFill>
-                <a:effectLst/>
-                <a:latin typeface="Helvetica Neue"/>
-              </a:rPr>
-              <a:t>jurisidictions</a:t>
-            </a:r>
-            <a:r>
-              <a:rPr lang="en-US" b="0" i="0" dirty="0">
-                <a:solidFill>
-                  <a:srgbClr val="000000"/>
-                </a:solidFill>
-                <a:effectLst/>
-                <a:latin typeface="Helvetica Neue"/>
-              </a:rPr>
-              <a:t> who received funding, and other data sources as detailed in the workbook.</a:t>
+              <a:rPr lang="en-US" dirty="0"/>
+              <a:t> Did states that spent a higher total $ amount of fed budget on </a:t>
+            </a:r>
+            <a:r>
+              <a:rPr lang="en-US" b="1" dirty="0"/>
+              <a:t>COVID</a:t>
+            </a:r>
+            <a:r>
+              <a:rPr lang="en-US" dirty="0"/>
+              <a:t> projects have higher rates of vaccination?</a:t>
+            </a:r>
+          </a:p>
+          <a:p>
+            <a:pPr>
+              <a:buFont typeface="Wingdings" panose="05000000000000000000" pitchFamily="2" charset="2"/>
+              <a:buChar char="§"/>
+            </a:pPr>
+            <a:r>
+              <a:rPr lang="en-US" dirty="0"/>
+              <a:t> Did states that had more vaccine-related projects (count) funded by fed have higher rates of vaccination?</a:t>
+            </a:r>
+          </a:p>
+          <a:p>
+            <a:pPr>
+              <a:buFont typeface="Wingdings" panose="05000000000000000000" pitchFamily="2" charset="2"/>
+              <a:buChar char="§"/>
+            </a:pPr>
+            <a:r>
+              <a:rPr lang="en-US" dirty="0"/>
+              <a:t> What Covid project categories did higher vaccination rate states initiate? (top 4 per state)</a:t>
             </a:r>
           </a:p>
           <a:p>
@@ -6177,7 +6067,10 @@
               <a:buFont typeface="Wingdings" panose="05000000000000000000" pitchFamily="2" charset="2"/>
               <a:buChar char="§"/>
             </a:pPr>
-            <a:endParaRPr lang="en-US" dirty="0"/>
+            <a:r>
+              <a:rPr lang="en-US" dirty="0"/>
+              <a:t>Were there similarities in project categories between these high vaccination states?</a:t>
+            </a:r>
           </a:p>
           <a:p>
             <a:pPr marL="0" indent="0">
@@ -6190,7 +6083,7 @@
     </p:spTree>
     <p:extLst>
       <p:ext uri="{BB962C8B-B14F-4D97-AF65-F5344CB8AC3E}">
-        <p14:creationId xmlns:p14="http://schemas.microsoft.com/office/powerpoint/2010/main" val="1472211333"/>
+        <p14:creationId xmlns:p14="http://schemas.microsoft.com/office/powerpoint/2010/main" val="1149720348"/>
       </p:ext>
     </p:extLst>
   </p:cSld>
@@ -6222,7 +6115,7 @@
           <p:cNvPr id="2" name="Title 1">
             <a:extLst>
               <a:ext uri="{FF2B5EF4-FFF2-40B4-BE49-F238E27FC236}">
-                <a16:creationId xmlns:a16="http://schemas.microsoft.com/office/drawing/2014/main" id="{E4383614-BB37-AA0E-4DA1-3A6D573E1964}"/>
+                <a16:creationId xmlns:a16="http://schemas.microsoft.com/office/drawing/2014/main" id="{2A6CE34C-694C-5B1E-AAD6-FE38E3DD970A}"/>
               </a:ext>
             </a:extLst>
           </p:cNvPr>
@@ -6235,12 +6128,14 @@
         </p:nvSpPr>
         <p:spPr/>
         <p:txBody>
-          <a:bodyPr/>
+          <a:bodyPr>
+            <a:normAutofit/>
+          </a:bodyPr>
           <a:lstStyle/>
           <a:p>
             <a:r>
               <a:rPr lang="en-US" dirty="0"/>
-              <a:t>Introduce/explain ARPA/SLFRF</a:t>
+              <a:t>Where and how you found the data you used to answer these questions</a:t>
             </a:r>
           </a:p>
         </p:txBody>
@@ -6250,7 +6145,7 @@
           <p:cNvPr id="3" name="Content Placeholder 2">
             <a:extLst>
               <a:ext uri="{FF2B5EF4-FFF2-40B4-BE49-F238E27FC236}">
-                <a16:creationId xmlns:a16="http://schemas.microsoft.com/office/drawing/2014/main" id="{77B2AE05-E344-4737-67F2-BEB760057B8F}"/>
+                <a16:creationId xmlns:a16="http://schemas.microsoft.com/office/drawing/2014/main" id="{9F4F8889-1A28-EF6B-8EAB-A732EFA19B5F}"/>
               </a:ext>
             </a:extLst>
           </p:cNvPr>
@@ -6261,34 +6156,249 @@
             <p:ph idx="1"/>
           </p:nvPr>
         </p:nvSpPr>
-        <p:spPr/>
-        <p:txBody>
-          <a:bodyPr/>
+        <p:spPr>
+          <a:xfrm>
+            <a:off x="1097280" y="1737359"/>
+            <a:ext cx="10058400" cy="4551473"/>
+          </a:xfrm>
+        </p:spPr>
+        <p:txBody>
+          <a:bodyPr>
+            <a:normAutofit/>
+          </a:bodyPr>
           <a:lstStyle/>
           <a:p>
-            <a:r>
-              <a:rPr lang="en-US" dirty="0"/>
-              <a:t>Explanation of program</a:t>
-            </a:r>
-          </a:p>
-          <a:p>
-            <a:r>
-              <a:rPr lang="en-US" dirty="0"/>
-              <a:t>Some states spent almost all money, some spent almost none</a:t>
-            </a:r>
-          </a:p>
-          <a:p>
-            <a:r>
-              <a:rPr lang="en-US" dirty="0"/>
-              <a:t>Bar chart showing state % overall spending (all projects)</a:t>
-            </a:r>
-          </a:p>
-        </p:txBody>
-      </p:sp>
+            <a:pPr marL="0" indent="0" algn="l">
+              <a:buNone/>
+            </a:pPr>
+            <a:r>
+              <a:rPr lang="en-US" b="1" i="0" dirty="0">
+                <a:solidFill>
+                  <a:srgbClr val="000000"/>
+                </a:solidFill>
+                <a:effectLst/>
+                <a:latin typeface="Helvetica Neue"/>
+              </a:rPr>
+              <a:t>CDC</a:t>
+            </a:r>
+            <a:r>
+              <a:rPr lang="en-US" b="0" i="0" dirty="0">
+                <a:solidFill>
+                  <a:srgbClr val="000000"/>
+                </a:solidFill>
+                <a:effectLst/>
+                <a:latin typeface="Helvetica Neue"/>
+              </a:rPr>
+              <a:t> - "COVID-19 Vaccinations in the United States, Jurisdiction" </a:t>
+            </a:r>
+          </a:p>
+          <a:p>
+            <a:pPr lvl="1"/>
+            <a:r>
+              <a:rPr lang="en-US" b="0" i="0" u="sng" dirty="0">
+                <a:solidFill>
+                  <a:srgbClr val="296EAA"/>
+                </a:solidFill>
+                <a:effectLst/>
+                <a:latin typeface="Helvetica Neue"/>
+                <a:hlinkClick r:id="rId2"/>
+              </a:rPr>
+              <a:t>https://data.cdc.gov/Vaccinations/COVID-19-Vaccinations-in-the-United-States-Jurisdi/unsk-b7fc</a:t>
+            </a:r>
+            <a:endParaRPr lang="en-US" b="0" i="0" u="sng" dirty="0">
+              <a:solidFill>
+                <a:srgbClr val="296EAA"/>
+              </a:solidFill>
+              <a:effectLst/>
+              <a:latin typeface="Helvetica Neue"/>
+            </a:endParaRPr>
+          </a:p>
+          <a:p>
+            <a:pPr lvl="1"/>
+            <a:r>
+              <a:rPr lang="en-US" b="0" i="0" dirty="0">
+                <a:solidFill>
+                  <a:srgbClr val="000000"/>
+                </a:solidFill>
+                <a:effectLst/>
+                <a:latin typeface="Helvetica Neue"/>
+              </a:rPr>
+              <a:t>csv downloaded 5/11/23</a:t>
+            </a:r>
+          </a:p>
+          <a:p>
+            <a:pPr algn="l"/>
+            <a:endParaRPr lang="en-US" b="0" i="0" dirty="0">
+              <a:solidFill>
+                <a:srgbClr val="000000"/>
+              </a:solidFill>
+              <a:effectLst/>
+              <a:latin typeface="Helvetica Neue"/>
+            </a:endParaRPr>
+          </a:p>
+          <a:p>
+            <a:pPr algn="l"/>
+            <a:r>
+              <a:rPr lang="en-US" b="1" i="0" dirty="0">
+                <a:solidFill>
+                  <a:srgbClr val="000000"/>
+                </a:solidFill>
+                <a:effectLst/>
+                <a:latin typeface="Helvetica Neue"/>
+              </a:rPr>
+              <a:t>EARN/EPI </a:t>
+            </a:r>
+            <a:r>
+              <a:rPr lang="en-US" b="0" i="0" dirty="0">
+                <a:solidFill>
+                  <a:srgbClr val="000000"/>
+                </a:solidFill>
+                <a:effectLst/>
+                <a:latin typeface="Helvetica Neue"/>
+              </a:rPr>
+              <a:t>- "EARN SLFRF Workbook for Q4 2022" compiled by Dave </a:t>
+            </a:r>
+            <a:r>
+              <a:rPr lang="en-US" b="0" i="0" dirty="0" err="1">
+                <a:solidFill>
+                  <a:srgbClr val="000000"/>
+                </a:solidFill>
+                <a:effectLst/>
+                <a:latin typeface="Helvetica Neue"/>
+              </a:rPr>
+              <a:t>Kamper</a:t>
+            </a:r>
+            <a:r>
+              <a:rPr lang="en-US" b="0" i="0" dirty="0">
+                <a:solidFill>
+                  <a:srgbClr val="000000"/>
+                </a:solidFill>
+                <a:effectLst/>
+                <a:latin typeface="Helvetica Neue"/>
+              </a:rPr>
+              <a:t> of the Economic Policy Institute (</a:t>
+            </a:r>
+            <a:r>
+              <a:rPr lang="en-US" b="0" i="0" u="sng" dirty="0">
+                <a:solidFill>
+                  <a:srgbClr val="296EAA"/>
+                </a:solidFill>
+                <a:effectLst/>
+                <a:latin typeface="Helvetica Neue"/>
+                <a:hlinkClick r:id="rId3"/>
+              </a:rPr>
+              <a:t>dkamper@epi.org</a:t>
+            </a:r>
+            <a:r>
+              <a:rPr lang="en-US" b="0" i="0" dirty="0">
+                <a:solidFill>
+                  <a:srgbClr val="000000"/>
+                </a:solidFill>
+                <a:effectLst/>
+                <a:latin typeface="Helvetica Neue"/>
+              </a:rPr>
+              <a:t>) from Treasury reports by states and local </a:t>
+            </a:r>
+            <a:r>
+              <a:rPr lang="en-US" b="0" i="0" dirty="0" err="1">
+                <a:solidFill>
+                  <a:srgbClr val="000000"/>
+                </a:solidFill>
+                <a:effectLst/>
+                <a:latin typeface="Helvetica Neue"/>
+              </a:rPr>
+              <a:t>jurisidictions</a:t>
+            </a:r>
+            <a:r>
+              <a:rPr lang="en-US" b="0" i="0" dirty="0">
+                <a:solidFill>
+                  <a:srgbClr val="000000"/>
+                </a:solidFill>
+                <a:effectLst/>
+                <a:latin typeface="Helvetica Neue"/>
+              </a:rPr>
+              <a:t> who received funding, and other data sources as detailed in the workbook.</a:t>
+            </a:r>
+          </a:p>
+          <a:p>
+            <a:pPr lvl="1">
+              <a:buFont typeface="Wingdings" panose="05000000000000000000" pitchFamily="2" charset="2"/>
+              <a:buChar char="§"/>
+            </a:pPr>
+            <a:endParaRPr lang="en-US" dirty="0"/>
+          </a:p>
+          <a:p>
+            <a:pPr marL="0" indent="0">
+              <a:buNone/>
+            </a:pPr>
+            <a:endParaRPr lang="en-US" dirty="0"/>
+          </a:p>
+        </p:txBody>
+      </p:sp>
+      <p:pic>
+        <p:nvPicPr>
+          <p:cNvPr id="5" name="Picture 4">
+            <a:extLst>
+              <a:ext uri="{FF2B5EF4-FFF2-40B4-BE49-F238E27FC236}">
+                <a16:creationId xmlns:a16="http://schemas.microsoft.com/office/drawing/2014/main" id="{7541DB45-6DC7-A2C4-32D6-0DDBAA0115C4}"/>
+              </a:ext>
+            </a:extLst>
+          </p:cNvPr>
+          <p:cNvPicPr>
+            <a:picLocks noChangeAspect="1"/>
+          </p:cNvPicPr>
+          <p:nvPr/>
+        </p:nvPicPr>
+        <p:blipFill>
+          <a:blip r:embed="rId4"/>
+          <a:stretch>
+            <a:fillRect/>
+          </a:stretch>
+        </p:blipFill>
+        <p:spPr>
+          <a:xfrm>
+            <a:off x="0" y="5374432"/>
+            <a:ext cx="6176865" cy="841105"/>
+          </a:xfrm>
+          <a:prstGeom prst="rect">
+            <a:avLst/>
+          </a:prstGeom>
+        </p:spPr>
+      </p:pic>
+      <p:pic>
+        <p:nvPicPr>
+          <p:cNvPr id="7" name="Picture 6">
+            <a:extLst>
+              <a:ext uri="{FF2B5EF4-FFF2-40B4-BE49-F238E27FC236}">
+                <a16:creationId xmlns:a16="http://schemas.microsoft.com/office/drawing/2014/main" id="{80A2506C-4FBB-934D-ABE1-30E401C8A365}"/>
+              </a:ext>
+            </a:extLst>
+          </p:cNvPr>
+          <p:cNvPicPr>
+            <a:picLocks noChangeAspect="1"/>
+          </p:cNvPicPr>
+          <p:nvPr/>
+        </p:nvPicPr>
+        <p:blipFill>
+          <a:blip r:embed="rId5"/>
+          <a:stretch>
+            <a:fillRect/>
+          </a:stretch>
+        </p:blipFill>
+        <p:spPr>
+          <a:xfrm>
+            <a:off x="6429414" y="5436461"/>
+            <a:ext cx="5762586" cy="779076"/>
+          </a:xfrm>
+          <a:prstGeom prst="rect">
+            <a:avLst/>
+          </a:prstGeom>
+        </p:spPr>
+      </p:pic>
     </p:spTree>
     <p:extLst>
       <p:ext uri="{BB962C8B-B14F-4D97-AF65-F5344CB8AC3E}">
-        <p14:creationId xmlns:p14="http://schemas.microsoft.com/office/powerpoint/2010/main" val="2378928626"/>
+        <p14:creationId xmlns:p14="http://schemas.microsoft.com/office/powerpoint/2010/main" val="1472211333"/>
       </p:ext>
     </p:extLst>
   </p:cSld>
@@ -6320,7 +6430,7 @@
           <p:cNvPr id="2" name="Title 1">
             <a:extLst>
               <a:ext uri="{FF2B5EF4-FFF2-40B4-BE49-F238E27FC236}">
-                <a16:creationId xmlns:a16="http://schemas.microsoft.com/office/drawing/2014/main" id="{516AA0E4-679C-98A1-AAD2-B79F27E86F2D}"/>
+                <a16:creationId xmlns:a16="http://schemas.microsoft.com/office/drawing/2014/main" id="{E4383614-BB37-AA0E-4DA1-3A6D573E1964}"/>
               </a:ext>
             </a:extLst>
           </p:cNvPr>
@@ -6333,14 +6443,12 @@
         </p:nvSpPr>
         <p:spPr/>
         <p:txBody>
-          <a:bodyPr>
-            <a:normAutofit/>
-          </a:bodyPr>
+          <a:bodyPr/>
           <a:lstStyle/>
           <a:p>
             <a:r>
               <a:rPr lang="en-US" dirty="0"/>
-              <a:t>Questions that you found interesting and what motivated you to answer them</a:t>
+              <a:t>Introduce/explain ARPA/SLFRF</a:t>
             </a:r>
           </a:p>
         </p:txBody>
@@ -6350,7 +6458,7 @@
           <p:cNvPr id="3" name="Content Placeholder 2">
             <a:extLst>
               <a:ext uri="{FF2B5EF4-FFF2-40B4-BE49-F238E27FC236}">
-                <a16:creationId xmlns:a16="http://schemas.microsoft.com/office/drawing/2014/main" id="{264C10B3-8E95-F7CC-08C1-580CF9EEFDD4}"/>
+                <a16:creationId xmlns:a16="http://schemas.microsoft.com/office/drawing/2014/main" id="{77B2AE05-E344-4737-67F2-BEB760057B8F}"/>
               </a:ext>
             </a:extLst>
           </p:cNvPr>
@@ -6363,76 +6471,53 @@
         </p:nvSpPr>
         <p:spPr/>
         <p:txBody>
-          <a:bodyPr>
-            <a:normAutofit/>
-          </a:bodyPr>
+          <a:bodyPr/>
           <a:lstStyle/>
           <a:p>
             <a:r>
               <a:rPr lang="en-US" dirty="0"/>
-              <a:t>Did states that spent a higher percentage of their federally-granted budget have higher rates of vaccination?</a:t>
-            </a:r>
-          </a:p>
-          <a:p>
-            <a:pPr>
-              <a:buFont typeface="Wingdings" panose="05000000000000000000" pitchFamily="2" charset="2"/>
-              <a:buChar char="§"/>
-            </a:pPr>
-            <a:r>
-              <a:rPr lang="en-US" dirty="0"/>
-              <a:t> Did states that spent a higher total $ amount of fed budget on </a:t>
-            </a:r>
-            <a:r>
-              <a:rPr lang="en-US" b="1" dirty="0"/>
-              <a:t>COVID</a:t>
-            </a:r>
-            <a:r>
-              <a:rPr lang="en-US" dirty="0"/>
-              <a:t> projects have higher rates of vaccination?</a:t>
-            </a:r>
-          </a:p>
-          <a:p>
-            <a:pPr>
-              <a:buFont typeface="Wingdings" panose="05000000000000000000" pitchFamily="2" charset="2"/>
-              <a:buChar char="§"/>
-            </a:pPr>
-            <a:r>
-              <a:rPr lang="en-US" dirty="0"/>
-              <a:t> Did states that had more vaccine-related projects (count) funded by fed have higher rates of vaccination?</a:t>
-            </a:r>
-          </a:p>
-          <a:p>
-            <a:pPr>
-              <a:buFont typeface="Wingdings" panose="05000000000000000000" pitchFamily="2" charset="2"/>
-              <a:buChar char="§"/>
-            </a:pPr>
-            <a:r>
-              <a:rPr lang="en-US" dirty="0"/>
-              <a:t> What Covid project categories did higher vaccination rate states initiate? (top 4 per state)</a:t>
-            </a:r>
-          </a:p>
-          <a:p>
-            <a:pPr lvl="1">
-              <a:buFont typeface="Wingdings" panose="05000000000000000000" pitchFamily="2" charset="2"/>
-              <a:buChar char="§"/>
-            </a:pPr>
-            <a:r>
-              <a:rPr lang="en-US" dirty="0"/>
-              <a:t>Were there similarities in project categories between these high vaccination states?</a:t>
-            </a:r>
-          </a:p>
-          <a:p>
-            <a:pPr marL="0" indent="0">
-              <a:buNone/>
-            </a:pPr>
-            <a:endParaRPr lang="en-US" dirty="0"/>
+              <a:t>Explanation of program</a:t>
+            </a:r>
+          </a:p>
+          <a:p>
+            <a:r>
+              <a:rPr lang="en-US" dirty="0"/>
+              <a:t>Some states spent almost all money, some spent almost none</a:t>
+            </a:r>
+          </a:p>
+          <a:p>
+            <a:r>
+              <a:rPr lang="en-US" dirty="0">
+                <a:solidFill>
+                  <a:srgbClr val="FF0000"/>
+                </a:solidFill>
+              </a:rPr>
+              <a:t>Insert Bar chart showing state % overall spending (all projects) here</a:t>
+            </a:r>
+          </a:p>
+          <a:p>
+            <a:endParaRPr lang="en-US" dirty="0">
+              <a:solidFill>
+                <a:srgbClr val="FF0000"/>
+              </a:solidFill>
+            </a:endParaRPr>
+          </a:p>
+          <a:p>
+            <a:r>
+              <a:rPr lang="en-US" dirty="0">
+                <a:solidFill>
+                  <a:srgbClr val="FF0000"/>
+                </a:solidFill>
+              </a:rPr>
+              <a:t>Insert Kendal’s pie chart of project categories here or in next slide if this gets too busy.</a:t>
+            </a:r>
           </a:p>
         </p:txBody>
       </p:sp>
     </p:spTree>
     <p:extLst>
       <p:ext uri="{BB962C8B-B14F-4D97-AF65-F5344CB8AC3E}">
-        <p14:creationId xmlns:p14="http://schemas.microsoft.com/office/powerpoint/2010/main" val="1149720348"/>
+        <p14:creationId xmlns:p14="http://schemas.microsoft.com/office/powerpoint/2010/main" val="2378928626"/>
       </p:ext>
     </p:extLst>
   </p:cSld>
@@ -6601,13 +6686,13 @@
         <p:spPr/>
         <p:txBody>
           <a:bodyPr>
-            <a:normAutofit fontScale="90000"/>
+            <a:normAutofit/>
           </a:bodyPr>
           <a:lstStyle/>
           <a:p>
             <a:r>
               <a:rPr lang="en-US" dirty="0"/>
-              <a:t> The data exploration and cleanup process (accompanied by your Jupyter notebook)</a:t>
+              <a:t>Data exploration and cleanup</a:t>
             </a:r>
           </a:p>
         </p:txBody>
@@ -6630,7 +6715,9 @@
         </p:nvSpPr>
         <p:spPr/>
         <p:txBody>
-          <a:bodyPr/>
+          <a:bodyPr>
+            <a:normAutofit lnSpcReduction="10000"/>
+          </a:bodyPr>
           <a:lstStyle/>
           <a:p>
             <a:pPr>
@@ -6639,7 +6726,7 @@
             </a:pPr>
             <a:r>
               <a:rPr lang="en-US" dirty="0"/>
-              <a:t> Imported EARN workbook sheets as CSV files. </a:t>
+              <a:t>Methods:</a:t>
             </a:r>
           </a:p>
           <a:p>
@@ -6649,16 +6736,63 @@
             </a:pPr>
             <a:r>
               <a:rPr lang="en-US" dirty="0"/>
-              <a:t>Cleaned </a:t>
+              <a:t>Import raw data as csv</a:t>
+            </a:r>
+          </a:p>
+          <a:p>
+            <a:pPr lvl="1">
+              <a:buFont typeface="Wingdings" panose="05000000000000000000" pitchFamily="2" charset="2"/>
+              <a:buChar char="§"/>
+            </a:pPr>
+            <a:r>
+              <a:rPr lang="en-US" dirty="0"/>
+              <a:t>Drop rows with NA values  </a:t>
+            </a:r>
+          </a:p>
+          <a:p>
+            <a:pPr lvl="1">
+              <a:buFont typeface="Wingdings" panose="05000000000000000000" pitchFamily="2" charset="2"/>
+              <a:buChar char="§"/>
+            </a:pPr>
+            <a:r>
+              <a:rPr lang="en-US" dirty="0"/>
+              <a:t>Clean column values with string replace functions</a:t>
+            </a:r>
+          </a:p>
+          <a:p>
+            <a:pPr lvl="1">
+              <a:buFont typeface="Wingdings" panose="05000000000000000000" pitchFamily="2" charset="2"/>
+              <a:buChar char="§"/>
+            </a:pPr>
+            <a:r>
+              <a:rPr lang="en-US" dirty="0"/>
+              <a:t>Cast strings as numeric where needed</a:t>
+            </a:r>
+          </a:p>
+          <a:p>
+            <a:pPr lvl="1">
+              <a:buFont typeface="Wingdings" panose="05000000000000000000" pitchFamily="2" charset="2"/>
+              <a:buChar char="§"/>
+            </a:pPr>
+            <a:r>
+              <a:rPr lang="en-US" dirty="0"/>
+              <a:t>Pandas </a:t>
             </a:r>
             <a:r>
               <a:rPr lang="en-US" dirty="0" err="1"/>
-              <a:t>DataFrames</a:t>
-            </a:r>
-            <a:r>
-              <a:rPr lang="en-US" dirty="0"/>
-              <a:t> by converting string number columns to numeric.</a:t>
-            </a:r>
+              <a:t>groupby</a:t>
+            </a:r>
+            <a:r>
+              <a:rPr lang="en-US" dirty="0"/>
+              <a:t> to sum or count values</a:t>
+            </a:r>
+          </a:p>
+          <a:p>
+            <a:pPr lvl="1">
+              <a:buFont typeface="Wingdings" panose="05000000000000000000" pitchFamily="2" charset="2"/>
+              <a:buChar char="§"/>
+            </a:pPr>
+            <a:endParaRPr lang="en-US" dirty="0"/>
           </a:p>
           <a:p>
             <a:pPr>
@@ -6667,15 +6801,7 @@
             </a:pPr>
             <a:r>
               <a:rPr lang="en-US" dirty="0"/>
-              <a:t> Used </a:t>
-            </a:r>
-            <a:r>
-              <a:rPr lang="en-US" dirty="0" err="1"/>
-              <a:t>groupby</a:t>
-            </a:r>
-            <a:r>
-              <a:rPr lang="en-US" dirty="0"/>
-              <a:t> functions to sum numerical values.</a:t>
+              <a:t> Created reduced DFs for specific visuals</a:t>
             </a:r>
           </a:p>
           <a:p>
@@ -6685,34 +6811,13 @@
             </a:pPr>
             <a:r>
               <a:rPr lang="en-US" dirty="0"/>
-              <a:t> Used </a:t>
-            </a:r>
-            <a:r>
-              <a:rPr lang="en-US" dirty="0" err="1"/>
-              <a:t>groupby</a:t>
-            </a:r>
-            <a:r>
-              <a:rPr lang="en-US" dirty="0"/>
-              <a:t> functions to sum count of project types.</a:t>
-            </a:r>
-          </a:p>
-          <a:p>
-            <a:pPr>
-              <a:buFont typeface="Wingdings" panose="05000000000000000000" pitchFamily="2" charset="2"/>
-              <a:buChar char="§"/>
-            </a:pPr>
-            <a:r>
-              <a:rPr lang="en-US" dirty="0"/>
               <a:t> Created calculated percentage columns within relevant </a:t>
             </a:r>
             <a:r>
               <a:rPr lang="en-US" dirty="0" err="1"/>
               <a:t>DataFrames</a:t>
             </a:r>
-            <a:r>
-              <a:rPr lang="en-US" dirty="0"/>
-              <a:t>.</a:t>
-            </a:r>
+            <a:endParaRPr lang="en-US" dirty="0"/>
           </a:p>
           <a:p>
             <a:pPr>
@@ -6722,38 +6827,47 @@
             <a:endParaRPr lang="en-US" dirty="0"/>
           </a:p>
           <a:p>
-            <a:pPr marL="0" indent="0">
-              <a:buNone/>
+            <a:pPr>
+              <a:buFont typeface="Wingdings" panose="05000000000000000000" pitchFamily="2" charset="2"/>
+              <a:buChar char="§"/>
             </a:pPr>
-            <a:endParaRPr lang="en-US" dirty="0"/>
-          </a:p>
-          <a:p>
-            <a:pPr marL="0" indent="0">
-              <a:buNone/>
-            </a:pPr>
-            <a:r>
-              <a:rPr lang="en-US" dirty="0"/>
-              <a:t>(Try to make this explanation align directly with the skills we’ve learned in this class, </a:t>
-            </a:r>
-            <a:r>
-              <a:rPr lang="en-US" dirty="0" err="1"/>
-              <a:t>ie</a:t>
-            </a:r>
-            <a:r>
-              <a:rPr lang="en-US" dirty="0"/>
-              <a:t>) “Used Pandas </a:t>
-            </a:r>
-            <a:r>
-              <a:rPr lang="en-US" dirty="0" err="1"/>
-              <a:t>xyz</a:t>
-            </a:r>
-            <a:r>
-              <a:rPr lang="en-US" dirty="0"/>
-              <a:t> functions. Used Python .replace to drop string characters preventing casting as numeric)</a:t>
-            </a:r>
-          </a:p>
-        </p:txBody>
-      </p:sp>
+            <a:r>
+              <a:rPr lang="en-US" dirty="0"/>
+              <a:t> Defined functions: DRY!</a:t>
+            </a:r>
+          </a:p>
+        </p:txBody>
+      </p:sp>
+      <p:pic>
+        <p:nvPicPr>
+          <p:cNvPr id="5" name="Picture 4">
+            <a:extLst>
+              <a:ext uri="{FF2B5EF4-FFF2-40B4-BE49-F238E27FC236}">
+                <a16:creationId xmlns:a16="http://schemas.microsoft.com/office/drawing/2014/main" id="{06EDBBBB-14BC-CC93-0E38-D61BC229CA53}"/>
+              </a:ext>
+            </a:extLst>
+          </p:cNvPr>
+          <p:cNvPicPr>
+            <a:picLocks noChangeAspect="1"/>
+          </p:cNvPicPr>
+          <p:nvPr/>
+        </p:nvPicPr>
+        <p:blipFill>
+          <a:blip r:embed="rId2"/>
+          <a:stretch>
+            <a:fillRect/>
+          </a:stretch>
+        </p:blipFill>
+        <p:spPr>
+          <a:xfrm>
+            <a:off x="6549576" y="2089635"/>
+            <a:ext cx="5363263" cy="1767779"/>
+          </a:xfrm>
+          <a:prstGeom prst="rect">
+            <a:avLst/>
+          </a:prstGeom>
+        </p:spPr>
+      </p:pic>
     </p:spTree>
     <p:extLst>
       <p:ext uri="{BB962C8B-B14F-4D97-AF65-F5344CB8AC3E}">
@@ -6809,7 +6923,7 @@
           <a:p>
             <a:r>
               <a:rPr lang="en-US" dirty="0"/>
-              <a:t>The analysis process (accompanied by your Jupyter notebook)</a:t>
+              <a:t>The analysis process</a:t>
             </a:r>
           </a:p>
         </p:txBody>
@@ -6833,7 +6947,7 @@
         <p:spPr/>
         <p:txBody>
           <a:bodyPr>
-            <a:normAutofit lnSpcReduction="10000"/>
+            <a:normAutofit/>
           </a:bodyPr>
           <a:lstStyle/>
           <a:p>
@@ -6841,9 +6955,14 @@
               <a:buNone/>
             </a:pPr>
             <a:r>
-              <a:rPr lang="en-US" dirty="0"/>
+              <a:rPr lang="en-US" strike="sngStrike" dirty="0">
+                <a:solidFill>
+                  <a:srgbClr val="FF0000"/>
+                </a:solidFill>
+              </a:rPr>
               <a:t>Here’s where we show, don’t tell:</a:t>
             </a:r>
+            <a:endParaRPr lang="en-US" dirty="0"/>
           </a:p>
           <a:p>
             <a:pPr>
@@ -6852,11 +6971,7 @@
             </a:pPr>
             <a:r>
               <a:rPr lang="en-US" dirty="0"/>
-              <a:t> Start with EARN combination bar/line graph. </a:t>
-            </a:r>
-            <a:r>
-              <a:rPr lang="en-US" sz="1800" dirty="0"/>
-              <a:t>No real conclusions or further analysis on this one. It just summarizes the EARN workbook data which helped answer our questions.</a:t>
+              <a:t> Slides showing state heatmaps.</a:t>
             </a:r>
           </a:p>
           <a:p>
@@ -6872,8 +6987,8 @@
               <a:buChar char="§"/>
             </a:pPr>
             <a:r>
-              <a:rPr lang="en-US" dirty="0"/>
-              <a:t> Then slides showing state heatmaps.</a:t>
+              <a:rPr lang="en-US" strike="sngStrike" dirty="0"/>
+              <a:t> Then bar charts for categories by state (spending or count of charts for top 3 or 4 vaccinator states).</a:t>
             </a:r>
           </a:p>
           <a:p>
@@ -6890,24 +7005,48 @@
             </a:pPr>
             <a:r>
               <a:rPr lang="en-US" dirty="0"/>
-              <a:t> Then bar charts for categories by state (spending or count of charts for top 3 or 4 vaccinator states).</a:t>
-            </a:r>
-          </a:p>
-          <a:p>
-            <a:pPr>
-              <a:buFont typeface="Wingdings" panose="05000000000000000000" pitchFamily="2" charset="2"/>
-              <a:buChar char="§"/>
-            </a:pPr>
-            <a:endParaRPr lang="en-US" dirty="0"/>
-          </a:p>
-          <a:p>
-            <a:pPr>
-              <a:buFont typeface="Wingdings" panose="05000000000000000000" pitchFamily="2" charset="2"/>
-              <a:buChar char="§"/>
-            </a:pPr>
-            <a:r>
-              <a:rPr lang="en-US" dirty="0"/>
               <a:t> Then what?? At least 1 correlation/regression plot? Would be moreso to showcase our ability to use the method.</a:t>
+            </a:r>
+          </a:p>
+        </p:txBody>
+      </p:sp>
+      <p:sp>
+        <p:nvSpPr>
+          <p:cNvPr id="4" name="TextBox 3">
+            <a:extLst>
+              <a:ext uri="{FF2B5EF4-FFF2-40B4-BE49-F238E27FC236}">
+                <a16:creationId xmlns:a16="http://schemas.microsoft.com/office/drawing/2014/main" id="{A6A7A421-47E1-B407-409D-9346D51D5780}"/>
+              </a:ext>
+            </a:extLst>
+          </p:cNvPr>
+          <p:cNvSpPr txBox="1"/>
+          <p:nvPr/>
+        </p:nvSpPr>
+        <p:spPr>
+          <a:xfrm>
+            <a:off x="211494" y="346401"/>
+            <a:ext cx="11522418" cy="523220"/>
+          </a:xfrm>
+          <a:prstGeom prst="rect">
+            <a:avLst/>
+          </a:prstGeom>
+          <a:solidFill>
+            <a:schemeClr val="bg1"/>
+          </a:solidFill>
+        </p:spPr>
+        <p:txBody>
+          <a:bodyPr wrap="square" rtlCol="0">
+            <a:spAutoFit/>
+          </a:bodyPr>
+          <a:lstStyle/>
+          <a:p>
+            <a:r>
+              <a:rPr lang="en-US" sz="2800" dirty="0">
+                <a:solidFill>
+                  <a:srgbClr val="FF0000"/>
+                </a:solidFill>
+              </a:rPr>
+              <a:t>!! We can drop this slide after the analysis plots are in their respective slides</a:t>
             </a:r>
           </a:p>
         </p:txBody>
@@ -6926,7 +7065,7 @@
 </file>
 
 <file path=ppt/slides/slide2.xml><?xml version="1.0" encoding="utf-8"?>
-<p:sld xmlns:a="http://schemas.openxmlformats.org/drawingml/2006/main" xmlns:r="http://schemas.openxmlformats.org/officeDocument/2006/relationships" xmlns:p="http://schemas.openxmlformats.org/presentationml/2006/main">
+<p:sld xmlns:a="http://schemas.openxmlformats.org/drawingml/2006/main" xmlns:r="http://schemas.openxmlformats.org/officeDocument/2006/relationships" xmlns:p="http://schemas.openxmlformats.org/presentationml/2006/main" show="0">
   <p:cSld>
     <p:spTree>
       <p:nvGrpSpPr>
@@ -7276,87 +7415,47 @@
       </p:grpSpPr>
       <p:sp>
         <p:nvSpPr>
-          <p:cNvPr id="2" name="Title 1">
+          <p:cNvPr id="2" name="TextBox 1">
             <a:extLst>
               <a:ext uri="{FF2B5EF4-FFF2-40B4-BE49-F238E27FC236}">
-                <a16:creationId xmlns:a16="http://schemas.microsoft.com/office/drawing/2014/main" id="{7AC685D8-ABCA-82A7-6E46-417501C13A61}"/>
+                <a16:creationId xmlns:a16="http://schemas.microsoft.com/office/drawing/2014/main" id="{A397DB62-FD24-C324-767B-9239114E4DD9}"/>
               </a:ext>
             </a:extLst>
           </p:cNvPr>
-          <p:cNvSpPr>
-            <a:spLocks noGrp="1"/>
-          </p:cNvSpPr>
-          <p:nvPr>
-            <p:ph type="title"/>
-          </p:nvPr>
-        </p:nvSpPr>
-        <p:spPr/>
-        <p:txBody>
-          <a:bodyPr>
-            <a:normAutofit fontScale="90000"/>
+          <p:cNvSpPr txBox="1"/>
+          <p:nvPr/>
+        </p:nvSpPr>
+        <p:spPr>
+          <a:xfrm rot="20548696">
+            <a:off x="367443" y="2955023"/>
+            <a:ext cx="11053134" cy="954107"/>
+          </a:xfrm>
+          <a:prstGeom prst="rect">
+            <a:avLst/>
+          </a:prstGeom>
+          <a:noFill/>
+        </p:spPr>
+        <p:txBody>
+          <a:bodyPr wrap="square" rtlCol="0">
+            <a:spAutoFit/>
           </a:bodyPr>
           <a:lstStyle/>
           <a:p>
             <a:r>
-              <a:rPr lang="en-US" dirty="0"/>
-              <a:t>Your conclusions, including a numerical summary and visualizations of the summary</a:t>
-            </a:r>
-          </a:p>
-        </p:txBody>
-      </p:sp>
-      <p:sp>
-        <p:nvSpPr>
-          <p:cNvPr id="3" name="Content Placeholder 2">
-            <a:extLst>
-              <a:ext uri="{FF2B5EF4-FFF2-40B4-BE49-F238E27FC236}">
-                <a16:creationId xmlns:a16="http://schemas.microsoft.com/office/drawing/2014/main" id="{E7539BA8-7A3E-BB62-6976-0B3BC18A11F4}"/>
-              </a:ext>
-            </a:extLst>
-          </p:cNvPr>
-          <p:cNvSpPr>
-            <a:spLocks noGrp="1"/>
-          </p:cNvSpPr>
-          <p:nvPr>
-            <p:ph idx="1"/>
-          </p:nvPr>
-        </p:nvSpPr>
-        <p:spPr/>
-        <p:txBody>
-          <a:bodyPr/>
-          <a:lstStyle/>
-          <a:p>
-            <a:pPr>
-              <a:buFont typeface="Wingdings" panose="05000000000000000000" pitchFamily="2" charset="2"/>
-              <a:buChar char="§"/>
-            </a:pPr>
-            <a:r>
-              <a:rPr lang="en-US" dirty="0"/>
-              <a:t> Start high level in conclusion bullet points if applicable.</a:t>
-            </a:r>
-          </a:p>
-          <a:p>
-            <a:pPr>
-              <a:buFont typeface="Wingdings" panose="05000000000000000000" pitchFamily="2" charset="2"/>
-              <a:buChar char="§"/>
-            </a:pPr>
-            <a:r>
-              <a:rPr lang="en-US" dirty="0"/>
-              <a:t> Insert repeated copy of the most significant graphs from our analysis to bring the audience back to what was stated earlier in presentation.</a:t>
-            </a:r>
-          </a:p>
-          <a:p>
-            <a:pPr>
-              <a:buFont typeface="Wingdings" panose="05000000000000000000" pitchFamily="2" charset="2"/>
-              <a:buChar char="§"/>
-            </a:pPr>
-            <a:endParaRPr lang="en-US" dirty="0"/>
+              <a:rPr lang="en-US" sz="2800" dirty="0">
+                <a:solidFill>
+                  <a:srgbClr val="FF0000"/>
+                </a:solidFill>
+              </a:rPr>
+              <a:t>Heat map here for State vaccination status- fully vaccinated by state all age groups</a:t>
+            </a:r>
           </a:p>
         </p:txBody>
       </p:sp>
     </p:spTree>
     <p:extLst>
       <p:ext uri="{BB962C8B-B14F-4D97-AF65-F5344CB8AC3E}">
-        <p14:creationId xmlns:p14="http://schemas.microsoft.com/office/powerpoint/2010/main" val="671781281"/>
+        <p14:creationId xmlns:p14="http://schemas.microsoft.com/office/powerpoint/2010/main" val="471067823"/>
       </p:ext>
     </p:extLst>
   </p:cSld>
@@ -7385,62 +7484,117 @@
       </p:grpSpPr>
       <p:sp>
         <p:nvSpPr>
-          <p:cNvPr id="2" name="Title 1">
+          <p:cNvPr id="2" name="TextBox 1">
             <a:extLst>
               <a:ext uri="{FF2B5EF4-FFF2-40B4-BE49-F238E27FC236}">
-                <a16:creationId xmlns:a16="http://schemas.microsoft.com/office/drawing/2014/main" id="{DDB2557C-9949-3B6C-7B73-1B10F2EB142A}"/>
+                <a16:creationId xmlns:a16="http://schemas.microsoft.com/office/drawing/2014/main" id="{2DF6D821-77F6-CCC7-E10E-711ED8A9335F}"/>
               </a:ext>
             </a:extLst>
           </p:cNvPr>
-          <p:cNvSpPr>
-            <a:spLocks noGrp="1"/>
-          </p:cNvSpPr>
-          <p:nvPr>
-            <p:ph type="title"/>
-          </p:nvPr>
-        </p:nvSpPr>
-        <p:spPr/>
-        <p:txBody>
-          <a:bodyPr>
-            <a:normAutofit/>
+          <p:cNvSpPr txBox="1"/>
+          <p:nvPr/>
+        </p:nvSpPr>
+        <p:spPr>
+          <a:xfrm rot="21436254">
+            <a:off x="569432" y="1138663"/>
+            <a:ext cx="11053134" cy="954107"/>
+          </a:xfrm>
+          <a:prstGeom prst="rect">
+            <a:avLst/>
+          </a:prstGeom>
+          <a:noFill/>
+        </p:spPr>
+        <p:txBody>
+          <a:bodyPr wrap="square" rtlCol="0">
+            <a:spAutoFit/>
           </a:bodyPr>
           <a:lstStyle/>
           <a:p>
             <a:r>
-              <a:rPr lang="en-US" dirty="0"/>
-              <a:t>The implications of your findings: what do your findings mean?</a:t>
-            </a:r>
-          </a:p>
-        </p:txBody>
-      </p:sp>
-      <p:sp>
-        <p:nvSpPr>
-          <p:cNvPr id="3" name="Content Placeholder 2">
+              <a:rPr lang="en-US" sz="2800" dirty="0">
+                <a:solidFill>
+                  <a:srgbClr val="FF0000"/>
+                </a:solidFill>
+              </a:rPr>
+              <a:t>Heat map here for State vaccination status- fully vaccinated by state Ages 5+ and…</a:t>
+            </a:r>
+          </a:p>
+        </p:txBody>
+      </p:sp>
+      <p:sp>
+        <p:nvSpPr>
+          <p:cNvPr id="3" name="TextBox 2">
             <a:extLst>
               <a:ext uri="{FF2B5EF4-FFF2-40B4-BE49-F238E27FC236}">
-                <a16:creationId xmlns:a16="http://schemas.microsoft.com/office/drawing/2014/main" id="{C48AB4A4-A926-573B-950A-9061BE172B6A}"/>
+                <a16:creationId xmlns:a16="http://schemas.microsoft.com/office/drawing/2014/main" id="{7C4F374F-50D0-5B52-47C6-A4AD8418BE9E}"/>
               </a:ext>
             </a:extLst>
           </p:cNvPr>
-          <p:cNvSpPr>
-            <a:spLocks noGrp="1"/>
-          </p:cNvSpPr>
-          <p:nvPr>
-            <p:ph idx="1"/>
-          </p:nvPr>
-        </p:nvSpPr>
-        <p:spPr/>
-        <p:txBody>
-          <a:bodyPr/>
+          <p:cNvSpPr txBox="1"/>
+          <p:nvPr/>
+        </p:nvSpPr>
+        <p:spPr>
+          <a:xfrm rot="489123">
+            <a:off x="423427" y="3577064"/>
+            <a:ext cx="11053134" cy="954107"/>
+          </a:xfrm>
+          <a:prstGeom prst="rect">
+            <a:avLst/>
+          </a:prstGeom>
+          <a:noFill/>
+        </p:spPr>
+        <p:txBody>
+          <a:bodyPr wrap="square" rtlCol="0">
+            <a:spAutoFit/>
+          </a:bodyPr>
           <a:lstStyle/>
           <a:p>
-            <a:pPr>
-              <a:buFont typeface="Wingdings" panose="05000000000000000000" pitchFamily="2" charset="2"/>
-              <a:buChar char="§"/>
-            </a:pPr>
-            <a:r>
-              <a:rPr lang="en-US" dirty="0"/>
-              <a:t> (We should put our slide deck together before filling this out because this will need to align with the outcome of our analysis and analysis conclusion presented).</a:t>
+            <a:r>
+              <a:rPr lang="en-US" sz="2800" dirty="0">
+                <a:solidFill>
+                  <a:srgbClr val="FF0000"/>
+                </a:solidFill>
+              </a:rPr>
+              <a:t>Heat map here for State vaccination status- fully vaccinated by state Ages 18+ and…</a:t>
+            </a:r>
+          </a:p>
+        </p:txBody>
+      </p:sp>
+      <p:sp>
+        <p:nvSpPr>
+          <p:cNvPr id="4" name="TextBox 3">
+            <a:extLst>
+              <a:ext uri="{FF2B5EF4-FFF2-40B4-BE49-F238E27FC236}">
+                <a16:creationId xmlns:a16="http://schemas.microsoft.com/office/drawing/2014/main" id="{3DB088A0-1D6D-8B11-57A0-7A447F25D3FB}"/>
+              </a:ext>
+            </a:extLst>
+          </p:cNvPr>
+          <p:cNvSpPr txBox="1"/>
+          <p:nvPr/>
+        </p:nvSpPr>
+        <p:spPr>
+          <a:xfrm>
+            <a:off x="787321" y="4973546"/>
+            <a:ext cx="11053134" cy="523220"/>
+          </a:xfrm>
+          <a:prstGeom prst="rect">
+            <a:avLst/>
+          </a:prstGeom>
+          <a:noFill/>
+        </p:spPr>
+        <p:txBody>
+          <a:bodyPr wrap="square" rtlCol="0">
+            <a:spAutoFit/>
+          </a:bodyPr>
+          <a:lstStyle/>
+          <a:p>
+            <a:r>
+              <a:rPr lang="en-US" sz="2800" dirty="0">
+                <a:solidFill>
+                  <a:srgbClr val="FF0000"/>
+                </a:solidFill>
+              </a:rPr>
+              <a:t>Copy Kendal’s slide deck.</a:t>
             </a:r>
           </a:p>
         </p:txBody>
@@ -7448,7 +7602,7 @@
     </p:spTree>
     <p:extLst>
       <p:ext uri="{BB962C8B-B14F-4D97-AF65-F5344CB8AC3E}">
-        <p14:creationId xmlns:p14="http://schemas.microsoft.com/office/powerpoint/2010/main" val="3187080855"/>
+        <p14:creationId xmlns:p14="http://schemas.microsoft.com/office/powerpoint/2010/main" val="3470800293"/>
       </p:ext>
     </p:extLst>
   </p:cSld>
@@ -7458,7 +7612,7 @@
 </p:sld>
 </file>
 
-<file path=ppt/slides/slide3.xml><?xml version="1.0" encoding="utf-8"?>
+<file path=ppt/slides/slide22.xml><?xml version="1.0" encoding="utf-8"?>
 <p:sld xmlns:a="http://schemas.openxmlformats.org/drawingml/2006/main" xmlns:r="http://schemas.openxmlformats.org/officeDocument/2006/relationships" xmlns:p="http://schemas.openxmlformats.org/presentationml/2006/main">
   <p:cSld>
     <p:spTree>
@@ -7475,216 +7629,79 @@
           <a:chExt cx="0" cy="0"/>
         </a:xfrm>
       </p:grpSpPr>
-      <p:sp>
-        <p:nvSpPr>
-          <p:cNvPr id="2" name="Title 1">
+      <p:pic>
+        <p:nvPicPr>
+          <p:cNvPr id="3" name="Picture 2">
             <a:extLst>
               <a:ext uri="{FF2B5EF4-FFF2-40B4-BE49-F238E27FC236}">
-                <a16:creationId xmlns:a16="http://schemas.microsoft.com/office/drawing/2014/main" id="{ADDD956C-F39F-0B1F-680C-BCC4B1596D4C}"/>
+                <a16:creationId xmlns:a16="http://schemas.microsoft.com/office/drawing/2014/main" id="{8D40AD37-CC71-13CF-0643-866B329836E4}"/>
               </a:ext>
             </a:extLst>
           </p:cNvPr>
-          <p:cNvSpPr>
-            <a:spLocks noGrp="1"/>
-          </p:cNvSpPr>
-          <p:nvPr>
-            <p:ph type="title"/>
-          </p:nvPr>
-        </p:nvSpPr>
-        <p:spPr/>
-        <p:txBody>
-          <a:bodyPr/>
-          <a:lstStyle/>
-          <a:p>
-            <a:r>
-              <a:rPr lang="en-US" dirty="0"/>
-              <a:t>Data Source(s)</a:t>
-            </a:r>
-          </a:p>
-        </p:txBody>
-      </p:sp>
-      <p:sp>
-        <p:nvSpPr>
-          <p:cNvPr id="3" name="Content Placeholder 2">
+          <p:cNvPicPr>
+            <a:picLocks noChangeAspect="1"/>
+          </p:cNvPicPr>
+          <p:nvPr/>
+        </p:nvPicPr>
+        <p:blipFill>
+          <a:blip r:embed="rId2"/>
+          <a:stretch>
+            <a:fillRect/>
+          </a:stretch>
+        </p:blipFill>
+        <p:spPr>
+          <a:xfrm>
+            <a:off x="3271935" y="1052319"/>
+            <a:ext cx="5963081" cy="4567820"/>
+          </a:xfrm>
+          <a:prstGeom prst="rect">
+            <a:avLst/>
+          </a:prstGeom>
+        </p:spPr>
+      </p:pic>
+      <p:sp>
+        <p:nvSpPr>
+          <p:cNvPr id="4" name="TextBox 3">
             <a:extLst>
               <a:ext uri="{FF2B5EF4-FFF2-40B4-BE49-F238E27FC236}">
-                <a16:creationId xmlns:a16="http://schemas.microsoft.com/office/drawing/2014/main" id="{B21C263D-C578-C11E-2FD8-4C82039826FD}"/>
+                <a16:creationId xmlns:a16="http://schemas.microsoft.com/office/drawing/2014/main" id="{DFBF548F-5ADE-8EB4-988D-E329E150539C}"/>
               </a:ext>
             </a:extLst>
           </p:cNvPr>
-          <p:cNvSpPr>
-            <a:spLocks noGrp="1"/>
-          </p:cNvSpPr>
-          <p:nvPr>
-            <p:ph idx="1"/>
-          </p:nvPr>
-        </p:nvSpPr>
-        <p:spPr/>
-        <p:txBody>
-          <a:bodyPr>
-            <a:normAutofit/>
+          <p:cNvSpPr txBox="1"/>
+          <p:nvPr/>
+        </p:nvSpPr>
+        <p:spPr>
+          <a:xfrm rot="21436254">
+            <a:off x="895398" y="1210097"/>
+            <a:ext cx="6639865" cy="523220"/>
+          </a:xfrm>
+          <a:prstGeom prst="rect">
+            <a:avLst/>
+          </a:prstGeom>
+          <a:noFill/>
+        </p:spPr>
+        <p:txBody>
+          <a:bodyPr wrap="square" rtlCol="0">
+            <a:spAutoFit/>
           </a:bodyPr>
           <a:lstStyle/>
           <a:p>
-            <a:pPr algn="l"/>
-            <a:r>
-              <a:rPr lang="en-US" b="1" i="0" dirty="0">
+            <a:r>
+              <a:rPr lang="en-US" sz="2800" dirty="0">
                 <a:solidFill>
-                  <a:srgbClr val="000000"/>
+                  <a:srgbClr val="FF0000"/>
                 </a:solidFill>
-                <a:effectLst/>
-                <a:latin typeface="Helvetica Neue"/>
               </a:rPr>
-              <a:t>CDC</a:t>
-            </a:r>
-            <a:r>
-              <a:rPr lang="en-US" b="0" i="0" dirty="0">
-                <a:solidFill>
-                  <a:srgbClr val="000000"/>
-                </a:solidFill>
-                <a:effectLst/>
-                <a:latin typeface="Helvetica Neue"/>
-              </a:rPr>
-              <a:t> - "COVID-19 Vaccinations in the United States, Jurisdiction" </a:t>
-            </a:r>
-          </a:p>
-          <a:p>
-            <a:pPr lvl="1"/>
-            <a:r>
-              <a:rPr lang="en-US" b="0" i="0" u="sng" dirty="0">
-                <a:solidFill>
-                  <a:srgbClr val="296EAA"/>
-                </a:solidFill>
-                <a:effectLst/>
-                <a:latin typeface="Helvetica Neue"/>
-                <a:hlinkClick r:id="rId2"/>
-              </a:rPr>
-              <a:t>https://data.cdc.gov/Vaccinations/COVID-19-Vaccinations-in-the-United-States-Jurisdi/unsk-b7fc</a:t>
-            </a:r>
-            <a:endParaRPr lang="en-US" b="0" i="0" u="sng" dirty="0">
-              <a:solidFill>
-                <a:srgbClr val="296EAA"/>
-              </a:solidFill>
-              <a:effectLst/>
-              <a:latin typeface="Helvetica Neue"/>
-            </a:endParaRPr>
-          </a:p>
-          <a:p>
-            <a:pPr lvl="1"/>
-            <a:r>
-              <a:rPr lang="en-US" b="0" i="0" dirty="0">
-                <a:solidFill>
-                  <a:srgbClr val="000000"/>
-                </a:solidFill>
-                <a:effectLst/>
-                <a:latin typeface="Helvetica Neue"/>
-              </a:rPr>
-              <a:t>csv downloaded 5/11/23</a:t>
-            </a:r>
-          </a:p>
-          <a:p>
-            <a:pPr algn="l"/>
-            <a:endParaRPr lang="en-US" b="0" i="0" dirty="0">
-              <a:solidFill>
-                <a:srgbClr val="000000"/>
-              </a:solidFill>
-              <a:effectLst/>
-              <a:latin typeface="Helvetica Neue"/>
-            </a:endParaRPr>
-          </a:p>
-          <a:p>
-            <a:pPr algn="l"/>
-            <a:r>
-              <a:rPr lang="en-US" b="1" i="0" dirty="0">
-                <a:solidFill>
-                  <a:srgbClr val="000000"/>
-                </a:solidFill>
-                <a:effectLst/>
-                <a:latin typeface="Helvetica Neue"/>
-              </a:rPr>
-              <a:t>EARN/EPI </a:t>
-            </a:r>
-            <a:r>
-              <a:rPr lang="en-US" b="0" i="0" dirty="0">
-                <a:solidFill>
-                  <a:srgbClr val="000000"/>
-                </a:solidFill>
-                <a:effectLst/>
-                <a:latin typeface="Helvetica Neue"/>
-              </a:rPr>
-              <a:t>- "EARN SLFRF Workbook for Q4 2022" compiled by Dave </a:t>
-            </a:r>
-            <a:r>
-              <a:rPr lang="en-US" b="0" i="0" dirty="0" err="1">
-                <a:solidFill>
-                  <a:srgbClr val="000000"/>
-                </a:solidFill>
-                <a:effectLst/>
-                <a:latin typeface="Helvetica Neue"/>
-              </a:rPr>
-              <a:t>Kamper</a:t>
-            </a:r>
-            <a:r>
-              <a:rPr lang="en-US" b="0" i="0" dirty="0">
-                <a:solidFill>
-                  <a:srgbClr val="000000"/>
-                </a:solidFill>
-                <a:effectLst/>
-                <a:latin typeface="Helvetica Neue"/>
-              </a:rPr>
-              <a:t> of the Economic Policy Institute (</a:t>
-            </a:r>
-            <a:r>
-              <a:rPr lang="en-US" b="0" i="0" u="sng" dirty="0">
-                <a:solidFill>
-                  <a:srgbClr val="296EAA"/>
-                </a:solidFill>
-                <a:effectLst/>
-                <a:latin typeface="Helvetica Neue"/>
-                <a:hlinkClick r:id="rId3"/>
-              </a:rPr>
-              <a:t>dkamper@epi.org</a:t>
-            </a:r>
-            <a:r>
-              <a:rPr lang="en-US" b="0" i="0" dirty="0">
-                <a:solidFill>
-                  <a:srgbClr val="000000"/>
-                </a:solidFill>
-                <a:effectLst/>
-                <a:latin typeface="Helvetica Neue"/>
-              </a:rPr>
-              <a:t>) from Treasury reports by states and local </a:t>
-            </a:r>
-            <a:r>
-              <a:rPr lang="en-US" b="0" i="0" dirty="0" err="1">
-                <a:solidFill>
-                  <a:srgbClr val="000000"/>
-                </a:solidFill>
-                <a:effectLst/>
-                <a:latin typeface="Helvetica Neue"/>
-              </a:rPr>
-              <a:t>jurisidictions</a:t>
-            </a:r>
-            <a:r>
-              <a:rPr lang="en-US" b="0" i="0" dirty="0">
-                <a:solidFill>
-                  <a:srgbClr val="000000"/>
-                </a:solidFill>
-                <a:effectLst/>
-                <a:latin typeface="Helvetica Neue"/>
-              </a:rPr>
-              <a:t> who received funding, and other data sources as detailed in the workbook.</a:t>
-            </a:r>
-          </a:p>
-          <a:p>
-            <a:endParaRPr lang="en-US" dirty="0"/>
+              <a:t>A better box plot figure here (Kendal)</a:t>
+            </a:r>
           </a:p>
         </p:txBody>
       </p:sp>
     </p:spTree>
     <p:extLst>
       <p:ext uri="{BB962C8B-B14F-4D97-AF65-F5344CB8AC3E}">
-        <p14:creationId xmlns:p14="http://schemas.microsoft.com/office/powerpoint/2010/main" val="808098577"/>
+        <p14:creationId xmlns:p14="http://schemas.microsoft.com/office/powerpoint/2010/main" val="272246308"/>
       </p:ext>
     </p:extLst>
   </p:cSld>
@@ -7694,7 +7711,7 @@
 </p:sld>
 </file>
 
-<file path=ppt/slides/slide4.xml><?xml version="1.0" encoding="utf-8"?>
+<file path=ppt/slides/slide23.xml><?xml version="1.0" encoding="utf-8"?>
 <p:sld xmlns:a="http://schemas.openxmlformats.org/drawingml/2006/main" xmlns:r="http://schemas.openxmlformats.org/officeDocument/2006/relationships" xmlns:p="http://schemas.openxmlformats.org/presentationml/2006/main">
   <p:cSld>
     <p:spTree>
@@ -7713,79 +7730,84 @@
       </p:grpSpPr>
       <p:sp>
         <p:nvSpPr>
-          <p:cNvPr id="2" name="Title 1">
+          <p:cNvPr id="2" name="TextBox 1">
             <a:extLst>
               <a:ext uri="{FF2B5EF4-FFF2-40B4-BE49-F238E27FC236}">
-                <a16:creationId xmlns:a16="http://schemas.microsoft.com/office/drawing/2014/main" id="{B312BC9A-7B15-E9B0-96DF-05AA5E13C113}"/>
+                <a16:creationId xmlns:a16="http://schemas.microsoft.com/office/drawing/2014/main" id="{E3DCFDCF-7E8F-94A9-88D5-8EF1F657162B}"/>
               </a:ext>
             </a:extLst>
           </p:cNvPr>
-          <p:cNvSpPr>
-            <a:spLocks noGrp="1"/>
-          </p:cNvSpPr>
-          <p:nvPr>
-            <p:ph type="title"/>
-          </p:nvPr>
-        </p:nvSpPr>
-        <p:spPr/>
-        <p:txBody>
-          <a:bodyPr/>
+          <p:cNvSpPr txBox="1"/>
+          <p:nvPr/>
+        </p:nvSpPr>
+        <p:spPr>
+          <a:xfrm>
+            <a:off x="569433" y="1157324"/>
+            <a:ext cx="11053134" cy="3108543"/>
+          </a:xfrm>
+          <a:prstGeom prst="rect">
+            <a:avLst/>
+          </a:prstGeom>
+          <a:noFill/>
+        </p:spPr>
+        <p:txBody>
+          <a:bodyPr wrap="square" rtlCol="0">
+            <a:spAutoFit/>
+          </a:bodyPr>
           <a:lstStyle/>
           <a:p>
             <a:r>
-              <a:rPr lang="en-US" dirty="0"/>
-              <a:t>Analysis Methods</a:t>
-            </a:r>
-          </a:p>
-        </p:txBody>
-      </p:sp>
-      <p:sp>
-        <p:nvSpPr>
-          <p:cNvPr id="3" name="Content Placeholder 2">
-            <a:extLst>
-              <a:ext uri="{FF2B5EF4-FFF2-40B4-BE49-F238E27FC236}">
-                <a16:creationId xmlns:a16="http://schemas.microsoft.com/office/drawing/2014/main" id="{8150B3B9-A2CD-564D-1DE3-F0A9722F9629}"/>
-              </a:ext>
-            </a:extLst>
-          </p:cNvPr>
-          <p:cNvSpPr>
-            <a:spLocks noGrp="1"/>
-          </p:cNvSpPr>
-          <p:nvPr>
-            <p:ph idx="1"/>
-          </p:nvPr>
-        </p:nvSpPr>
-        <p:spPr/>
-        <p:txBody>
-          <a:bodyPr/>
-          <a:lstStyle/>
-          <a:p>
-            <a:r>
-              <a:rPr lang="en-US" dirty="0"/>
-              <a:t>The analysis process can be broken into two broad phases: (1) exploration and cleanup, and (2) analysis.</a:t>
-            </a:r>
-          </a:p>
-          <a:p>
-            <a:endParaRPr lang="en-US" dirty="0"/>
-          </a:p>
-          <a:p>
-            <a:r>
-              <a:rPr lang="en-US" dirty="0"/>
-              <a:t>Describe here how we plan to answer the questions laid out in our Purpose section.</a:t>
-            </a:r>
-          </a:p>
-          <a:p>
-            <a:pPr lvl="1"/>
-            <a:r>
-              <a:rPr lang="en-US" dirty="0"/>
-              <a:t>Ex) Summarize first, then narrow scope. </a:t>
-            </a:r>
-          </a:p>
-          <a:p>
-            <a:pPr lvl="1"/>
-            <a:r>
-              <a:rPr lang="en-US" dirty="0"/>
-              <a:t>“We recommend focusing your analysis on multiple techniques, such as aggregation, correlation, comparison, summary statistics, sentiment analysis, and time-series analysis.”</a:t>
+              <a:rPr lang="en-US" sz="2800" dirty="0">
+                <a:solidFill>
+                  <a:srgbClr val="FF0000"/>
+                </a:solidFill>
+              </a:rPr>
+              <a:t>Correlation/Regression plots here. Pick the 2 most “interesting” plots. </a:t>
+            </a:r>
+          </a:p>
+          <a:p>
+            <a:r>
+              <a:rPr lang="en-US" sz="2800" dirty="0">
+                <a:solidFill>
+                  <a:srgbClr val="FF0000"/>
+                </a:solidFill>
+              </a:rPr>
+              <a:t>Or whichever plots provide easiest talking point for the speaker.</a:t>
+            </a:r>
+          </a:p>
+          <a:p>
+            <a:endParaRPr lang="en-US" sz="2800" dirty="0">
+              <a:solidFill>
+                <a:srgbClr val="FF0000"/>
+              </a:solidFill>
+            </a:endParaRPr>
+          </a:p>
+          <a:p>
+            <a:endParaRPr lang="en-US" sz="2800" dirty="0">
+              <a:solidFill>
+                <a:srgbClr val="FF0000"/>
+              </a:solidFill>
+            </a:endParaRPr>
+          </a:p>
+          <a:p>
+            <a:endParaRPr lang="en-US" sz="2800" dirty="0">
+              <a:solidFill>
+                <a:srgbClr val="FF0000"/>
+              </a:solidFill>
+            </a:endParaRPr>
+          </a:p>
+          <a:p>
+            <a:pPr marL="457200" indent="-457200">
+              <a:buFont typeface="Arial" panose="020B0604020202020204" pitchFamily="34" charset="0"/>
+              <a:buChar char="•"/>
+            </a:pPr>
+            <a:r>
+              <a:rPr lang="en-US" sz="2800" dirty="0">
+                <a:solidFill>
+                  <a:srgbClr val="FF0000"/>
+                </a:solidFill>
+              </a:rPr>
+              <a:t>Make a clear statement that there are many variables affecting the regression plots.</a:t>
             </a:r>
           </a:p>
         </p:txBody>
@@ -7793,7 +7815,7 @@
     </p:spTree>
     <p:extLst>
       <p:ext uri="{BB962C8B-B14F-4D97-AF65-F5344CB8AC3E}">
-        <p14:creationId xmlns:p14="http://schemas.microsoft.com/office/powerpoint/2010/main" val="3055247817"/>
+        <p14:creationId xmlns:p14="http://schemas.microsoft.com/office/powerpoint/2010/main" val="2755262538"/>
       </p:ext>
     </p:extLst>
   </p:cSld>
@@ -7803,7 +7825,7 @@
 </p:sld>
 </file>
 
-<file path=ppt/slides/slide5.xml><?xml version="1.0" encoding="utf-8"?>
+<file path=ppt/slides/slide24.xml><?xml version="1.0" encoding="utf-8"?>
 <p:sld xmlns:a="http://schemas.openxmlformats.org/drawingml/2006/main" xmlns:r="http://schemas.openxmlformats.org/officeDocument/2006/relationships" xmlns:p="http://schemas.openxmlformats.org/presentationml/2006/main">
   <p:cSld>
     <p:spTree>
@@ -7825,6 +7847,588 @@
           <p:cNvPr id="2" name="Title 1">
             <a:extLst>
               <a:ext uri="{FF2B5EF4-FFF2-40B4-BE49-F238E27FC236}">
+                <a16:creationId xmlns:a16="http://schemas.microsoft.com/office/drawing/2014/main" id="{7AC685D8-ABCA-82A7-6E46-417501C13A61}"/>
+              </a:ext>
+            </a:extLst>
+          </p:cNvPr>
+          <p:cNvSpPr>
+            <a:spLocks noGrp="1"/>
+          </p:cNvSpPr>
+          <p:nvPr>
+            <p:ph type="title"/>
+          </p:nvPr>
+        </p:nvSpPr>
+        <p:spPr/>
+        <p:txBody>
+          <a:bodyPr>
+            <a:normAutofit fontScale="90000"/>
+          </a:bodyPr>
+          <a:lstStyle/>
+          <a:p>
+            <a:r>
+              <a:rPr lang="en-US" dirty="0"/>
+              <a:t>Your conclusions, including a numerical summary and visualizations of the summary</a:t>
+            </a:r>
+          </a:p>
+        </p:txBody>
+      </p:sp>
+      <p:sp>
+        <p:nvSpPr>
+          <p:cNvPr id="3" name="Content Placeholder 2">
+            <a:extLst>
+              <a:ext uri="{FF2B5EF4-FFF2-40B4-BE49-F238E27FC236}">
+                <a16:creationId xmlns:a16="http://schemas.microsoft.com/office/drawing/2014/main" id="{E7539BA8-7A3E-BB62-6976-0B3BC18A11F4}"/>
+              </a:ext>
+            </a:extLst>
+          </p:cNvPr>
+          <p:cNvSpPr>
+            <a:spLocks noGrp="1"/>
+          </p:cNvSpPr>
+          <p:nvPr>
+            <p:ph idx="1"/>
+          </p:nvPr>
+        </p:nvSpPr>
+        <p:spPr/>
+        <p:txBody>
+          <a:bodyPr/>
+          <a:lstStyle/>
+          <a:p>
+            <a:pPr>
+              <a:buFont typeface="Wingdings" panose="05000000000000000000" pitchFamily="2" charset="2"/>
+              <a:buChar char="§"/>
+            </a:pPr>
+            <a:r>
+              <a:rPr lang="en-US" dirty="0">
+                <a:solidFill>
+                  <a:srgbClr val="FF0000"/>
+                </a:solidFill>
+              </a:rPr>
+              <a:t> Joanna to pick the top 2 or three conclusions here.</a:t>
+            </a:r>
+          </a:p>
+          <a:p>
+            <a:pPr lvl="1">
+              <a:buFont typeface="Wingdings" panose="05000000000000000000" pitchFamily="2" charset="2"/>
+              <a:buChar char="§"/>
+            </a:pPr>
+            <a:r>
+              <a:rPr lang="en-US" dirty="0">
+                <a:solidFill>
+                  <a:srgbClr val="FF0000"/>
+                </a:solidFill>
+              </a:rPr>
+              <a:t>Talking about what we did NOT conclude is great too! Or other topics that were out of scope of either the data set or our analysis.</a:t>
+            </a:r>
+          </a:p>
+          <a:p>
+            <a:pPr>
+              <a:buFont typeface="Wingdings" panose="05000000000000000000" pitchFamily="2" charset="2"/>
+              <a:buChar char="§"/>
+            </a:pPr>
+            <a:endParaRPr lang="en-US" dirty="0"/>
+          </a:p>
+          <a:p>
+            <a:pPr>
+              <a:buFont typeface="Wingdings" panose="05000000000000000000" pitchFamily="2" charset="2"/>
+              <a:buChar char="§"/>
+            </a:pPr>
+            <a:r>
+              <a:rPr lang="en-US" dirty="0"/>
+              <a:t>Insert repeated copy of the most significant graphs from our analysis to bring the audience back to what was stated earlier in presentation. (if it helps)</a:t>
+            </a:r>
+          </a:p>
+        </p:txBody>
+      </p:sp>
+    </p:spTree>
+    <p:extLst>
+      <p:ext uri="{BB962C8B-B14F-4D97-AF65-F5344CB8AC3E}">
+        <p14:creationId xmlns:p14="http://schemas.microsoft.com/office/powerpoint/2010/main" val="671781281"/>
+      </p:ext>
+    </p:extLst>
+  </p:cSld>
+  <p:clrMapOvr>
+    <a:masterClrMapping/>
+  </p:clrMapOvr>
+</p:sld>
+</file>
+
+<file path=ppt/slides/slide25.xml><?xml version="1.0" encoding="utf-8"?>
+<p:sld xmlns:a="http://schemas.openxmlformats.org/drawingml/2006/main" xmlns:r="http://schemas.openxmlformats.org/officeDocument/2006/relationships" xmlns:p="http://schemas.openxmlformats.org/presentationml/2006/main">
+  <p:cSld>
+    <p:spTree>
+      <p:nvGrpSpPr>
+        <p:cNvPr id="1" name=""/>
+        <p:cNvGrpSpPr/>
+        <p:nvPr/>
+      </p:nvGrpSpPr>
+      <p:grpSpPr>
+        <a:xfrm>
+          <a:off x="0" y="0"/>
+          <a:ext cx="0" cy="0"/>
+          <a:chOff x="0" y="0"/>
+          <a:chExt cx="0" cy="0"/>
+        </a:xfrm>
+      </p:grpSpPr>
+      <p:sp>
+        <p:nvSpPr>
+          <p:cNvPr id="2" name="Title 1">
+            <a:extLst>
+              <a:ext uri="{FF2B5EF4-FFF2-40B4-BE49-F238E27FC236}">
+                <a16:creationId xmlns:a16="http://schemas.microsoft.com/office/drawing/2014/main" id="{DDB2557C-9949-3B6C-7B73-1B10F2EB142A}"/>
+              </a:ext>
+            </a:extLst>
+          </p:cNvPr>
+          <p:cNvSpPr>
+            <a:spLocks noGrp="1"/>
+          </p:cNvSpPr>
+          <p:nvPr>
+            <p:ph type="title"/>
+          </p:nvPr>
+        </p:nvSpPr>
+        <p:spPr/>
+        <p:txBody>
+          <a:bodyPr>
+            <a:normAutofit/>
+          </a:bodyPr>
+          <a:lstStyle/>
+          <a:p>
+            <a:r>
+              <a:rPr lang="en-US" dirty="0"/>
+              <a:t>The implications of your findings: what do your findings mean?</a:t>
+            </a:r>
+          </a:p>
+        </p:txBody>
+      </p:sp>
+      <p:sp>
+        <p:nvSpPr>
+          <p:cNvPr id="3" name="Content Placeholder 2">
+            <a:extLst>
+              <a:ext uri="{FF2B5EF4-FFF2-40B4-BE49-F238E27FC236}">
+                <a16:creationId xmlns:a16="http://schemas.microsoft.com/office/drawing/2014/main" id="{C48AB4A4-A926-573B-950A-9061BE172B6A}"/>
+              </a:ext>
+            </a:extLst>
+          </p:cNvPr>
+          <p:cNvSpPr>
+            <a:spLocks noGrp="1"/>
+          </p:cNvSpPr>
+          <p:nvPr>
+            <p:ph idx="1"/>
+          </p:nvPr>
+        </p:nvSpPr>
+        <p:spPr/>
+        <p:txBody>
+          <a:bodyPr/>
+          <a:lstStyle/>
+          <a:p>
+            <a:pPr>
+              <a:buFont typeface="Wingdings" panose="05000000000000000000" pitchFamily="2" charset="2"/>
+              <a:buChar char="§"/>
+            </a:pPr>
+            <a:r>
+              <a:rPr lang="en-US" dirty="0"/>
+              <a:t> (We should put our slide deck together before filling this out because this will need to align with the outcome of our analysis and analysis conclusion presented).</a:t>
+            </a:r>
+          </a:p>
+          <a:p>
+            <a:pPr>
+              <a:buFont typeface="Wingdings" panose="05000000000000000000" pitchFamily="2" charset="2"/>
+              <a:buChar char="§"/>
+            </a:pPr>
+            <a:r>
+              <a:rPr lang="en-US" dirty="0"/>
+              <a:t> (What would potential next steps be if this presentation was the “scoping phase”) </a:t>
+            </a:r>
+            <a:r>
+              <a:rPr lang="en-US" dirty="0">
+                <a:solidFill>
+                  <a:srgbClr val="FF0000"/>
+                </a:solidFill>
+              </a:rPr>
+              <a:t>This will depend on our individual conclusions, really.</a:t>
+            </a:r>
+          </a:p>
+        </p:txBody>
+      </p:sp>
+    </p:spTree>
+    <p:extLst>
+      <p:ext uri="{BB962C8B-B14F-4D97-AF65-F5344CB8AC3E}">
+        <p14:creationId xmlns:p14="http://schemas.microsoft.com/office/powerpoint/2010/main" val="3187080855"/>
+      </p:ext>
+    </p:extLst>
+  </p:cSld>
+  <p:clrMapOvr>
+    <a:masterClrMapping/>
+  </p:clrMapOvr>
+</p:sld>
+</file>
+
+<file path=ppt/slides/slide3.xml><?xml version="1.0" encoding="utf-8"?>
+<p:sld xmlns:a="http://schemas.openxmlformats.org/drawingml/2006/main" xmlns:r="http://schemas.openxmlformats.org/officeDocument/2006/relationships" xmlns:p="http://schemas.openxmlformats.org/presentationml/2006/main" show="0">
+  <p:cSld>
+    <p:spTree>
+      <p:nvGrpSpPr>
+        <p:cNvPr id="1" name=""/>
+        <p:cNvGrpSpPr/>
+        <p:nvPr/>
+      </p:nvGrpSpPr>
+      <p:grpSpPr>
+        <a:xfrm>
+          <a:off x="0" y="0"/>
+          <a:ext cx="0" cy="0"/>
+          <a:chOff x="0" y="0"/>
+          <a:chExt cx="0" cy="0"/>
+        </a:xfrm>
+      </p:grpSpPr>
+      <p:sp>
+        <p:nvSpPr>
+          <p:cNvPr id="2" name="Title 1">
+            <a:extLst>
+              <a:ext uri="{FF2B5EF4-FFF2-40B4-BE49-F238E27FC236}">
+                <a16:creationId xmlns:a16="http://schemas.microsoft.com/office/drawing/2014/main" id="{ADDD956C-F39F-0B1F-680C-BCC4B1596D4C}"/>
+              </a:ext>
+            </a:extLst>
+          </p:cNvPr>
+          <p:cNvSpPr>
+            <a:spLocks noGrp="1"/>
+          </p:cNvSpPr>
+          <p:nvPr>
+            <p:ph type="title"/>
+          </p:nvPr>
+        </p:nvSpPr>
+        <p:spPr/>
+        <p:txBody>
+          <a:bodyPr/>
+          <a:lstStyle/>
+          <a:p>
+            <a:r>
+              <a:rPr lang="en-US" dirty="0"/>
+              <a:t>Data Source(s)</a:t>
+            </a:r>
+          </a:p>
+        </p:txBody>
+      </p:sp>
+      <p:sp>
+        <p:nvSpPr>
+          <p:cNvPr id="3" name="Content Placeholder 2">
+            <a:extLst>
+              <a:ext uri="{FF2B5EF4-FFF2-40B4-BE49-F238E27FC236}">
+                <a16:creationId xmlns:a16="http://schemas.microsoft.com/office/drawing/2014/main" id="{B21C263D-C578-C11E-2FD8-4C82039826FD}"/>
+              </a:ext>
+            </a:extLst>
+          </p:cNvPr>
+          <p:cNvSpPr>
+            <a:spLocks noGrp="1"/>
+          </p:cNvSpPr>
+          <p:nvPr>
+            <p:ph idx="1"/>
+          </p:nvPr>
+        </p:nvSpPr>
+        <p:spPr/>
+        <p:txBody>
+          <a:bodyPr>
+            <a:normAutofit/>
+          </a:bodyPr>
+          <a:lstStyle/>
+          <a:p>
+            <a:pPr algn="l"/>
+            <a:r>
+              <a:rPr lang="en-US" b="1" i="0" dirty="0">
+                <a:solidFill>
+                  <a:srgbClr val="000000"/>
+                </a:solidFill>
+                <a:effectLst/>
+                <a:latin typeface="Helvetica Neue"/>
+              </a:rPr>
+              <a:t>CDC</a:t>
+            </a:r>
+            <a:r>
+              <a:rPr lang="en-US" b="0" i="0" dirty="0">
+                <a:solidFill>
+                  <a:srgbClr val="000000"/>
+                </a:solidFill>
+                <a:effectLst/>
+                <a:latin typeface="Helvetica Neue"/>
+              </a:rPr>
+              <a:t> - "COVID-19 Vaccinations in the United States, Jurisdiction" </a:t>
+            </a:r>
+          </a:p>
+          <a:p>
+            <a:pPr lvl="1"/>
+            <a:r>
+              <a:rPr lang="en-US" b="0" i="0" u="sng" dirty="0">
+                <a:solidFill>
+                  <a:srgbClr val="296EAA"/>
+                </a:solidFill>
+                <a:effectLst/>
+                <a:latin typeface="Helvetica Neue"/>
+                <a:hlinkClick r:id="rId2"/>
+              </a:rPr>
+              <a:t>https://data.cdc.gov/Vaccinations/COVID-19-Vaccinations-in-the-United-States-Jurisdi/unsk-b7fc</a:t>
+            </a:r>
+            <a:endParaRPr lang="en-US" b="0" i="0" u="sng" dirty="0">
+              <a:solidFill>
+                <a:srgbClr val="296EAA"/>
+              </a:solidFill>
+              <a:effectLst/>
+              <a:latin typeface="Helvetica Neue"/>
+            </a:endParaRPr>
+          </a:p>
+          <a:p>
+            <a:pPr lvl="1"/>
+            <a:r>
+              <a:rPr lang="en-US" b="0" i="0" dirty="0">
+                <a:solidFill>
+                  <a:srgbClr val="000000"/>
+                </a:solidFill>
+                <a:effectLst/>
+                <a:latin typeface="Helvetica Neue"/>
+              </a:rPr>
+              <a:t>csv downloaded 5/11/23</a:t>
+            </a:r>
+          </a:p>
+          <a:p>
+            <a:pPr algn="l"/>
+            <a:endParaRPr lang="en-US" b="0" i="0" dirty="0">
+              <a:solidFill>
+                <a:srgbClr val="000000"/>
+              </a:solidFill>
+              <a:effectLst/>
+              <a:latin typeface="Helvetica Neue"/>
+            </a:endParaRPr>
+          </a:p>
+          <a:p>
+            <a:pPr algn="l"/>
+            <a:r>
+              <a:rPr lang="en-US" b="1" i="0" dirty="0">
+                <a:solidFill>
+                  <a:srgbClr val="000000"/>
+                </a:solidFill>
+                <a:effectLst/>
+                <a:latin typeface="Helvetica Neue"/>
+              </a:rPr>
+              <a:t>EARN/EPI </a:t>
+            </a:r>
+            <a:r>
+              <a:rPr lang="en-US" b="0" i="0" dirty="0">
+                <a:solidFill>
+                  <a:srgbClr val="000000"/>
+                </a:solidFill>
+                <a:effectLst/>
+                <a:latin typeface="Helvetica Neue"/>
+              </a:rPr>
+              <a:t>- "EARN SLFRF Workbook for Q4 2022" compiled by Dave </a:t>
+            </a:r>
+            <a:r>
+              <a:rPr lang="en-US" b="0" i="0" dirty="0" err="1">
+                <a:solidFill>
+                  <a:srgbClr val="000000"/>
+                </a:solidFill>
+                <a:effectLst/>
+                <a:latin typeface="Helvetica Neue"/>
+              </a:rPr>
+              <a:t>Kamper</a:t>
+            </a:r>
+            <a:r>
+              <a:rPr lang="en-US" b="0" i="0" dirty="0">
+                <a:solidFill>
+                  <a:srgbClr val="000000"/>
+                </a:solidFill>
+                <a:effectLst/>
+                <a:latin typeface="Helvetica Neue"/>
+              </a:rPr>
+              <a:t> of the Economic Policy Institute (</a:t>
+            </a:r>
+            <a:r>
+              <a:rPr lang="en-US" b="0" i="0" u="sng" dirty="0">
+                <a:solidFill>
+                  <a:srgbClr val="296EAA"/>
+                </a:solidFill>
+                <a:effectLst/>
+                <a:latin typeface="Helvetica Neue"/>
+                <a:hlinkClick r:id="rId3"/>
+              </a:rPr>
+              <a:t>dkamper@epi.org</a:t>
+            </a:r>
+            <a:r>
+              <a:rPr lang="en-US" b="0" i="0" dirty="0">
+                <a:solidFill>
+                  <a:srgbClr val="000000"/>
+                </a:solidFill>
+                <a:effectLst/>
+                <a:latin typeface="Helvetica Neue"/>
+              </a:rPr>
+              <a:t>) from Treasury reports by states and local </a:t>
+            </a:r>
+            <a:r>
+              <a:rPr lang="en-US" b="0" i="0" dirty="0" err="1">
+                <a:solidFill>
+                  <a:srgbClr val="000000"/>
+                </a:solidFill>
+                <a:effectLst/>
+                <a:latin typeface="Helvetica Neue"/>
+              </a:rPr>
+              <a:t>jurisidictions</a:t>
+            </a:r>
+            <a:r>
+              <a:rPr lang="en-US" b="0" i="0" dirty="0">
+                <a:solidFill>
+                  <a:srgbClr val="000000"/>
+                </a:solidFill>
+                <a:effectLst/>
+                <a:latin typeface="Helvetica Neue"/>
+              </a:rPr>
+              <a:t> who received funding, and other data sources as detailed in the workbook.</a:t>
+            </a:r>
+          </a:p>
+          <a:p>
+            <a:endParaRPr lang="en-US" dirty="0"/>
+          </a:p>
+        </p:txBody>
+      </p:sp>
+    </p:spTree>
+    <p:extLst>
+      <p:ext uri="{BB962C8B-B14F-4D97-AF65-F5344CB8AC3E}">
+        <p14:creationId xmlns:p14="http://schemas.microsoft.com/office/powerpoint/2010/main" val="808098577"/>
+      </p:ext>
+    </p:extLst>
+  </p:cSld>
+  <p:clrMapOvr>
+    <a:masterClrMapping/>
+  </p:clrMapOvr>
+</p:sld>
+</file>
+
+<file path=ppt/slides/slide4.xml><?xml version="1.0" encoding="utf-8"?>
+<p:sld xmlns:a="http://schemas.openxmlformats.org/drawingml/2006/main" xmlns:r="http://schemas.openxmlformats.org/officeDocument/2006/relationships" xmlns:p="http://schemas.openxmlformats.org/presentationml/2006/main" show="0">
+  <p:cSld>
+    <p:spTree>
+      <p:nvGrpSpPr>
+        <p:cNvPr id="1" name=""/>
+        <p:cNvGrpSpPr/>
+        <p:nvPr/>
+      </p:nvGrpSpPr>
+      <p:grpSpPr>
+        <a:xfrm>
+          <a:off x="0" y="0"/>
+          <a:ext cx="0" cy="0"/>
+          <a:chOff x="0" y="0"/>
+          <a:chExt cx="0" cy="0"/>
+        </a:xfrm>
+      </p:grpSpPr>
+      <p:sp>
+        <p:nvSpPr>
+          <p:cNvPr id="2" name="Title 1">
+            <a:extLst>
+              <a:ext uri="{FF2B5EF4-FFF2-40B4-BE49-F238E27FC236}">
+                <a16:creationId xmlns:a16="http://schemas.microsoft.com/office/drawing/2014/main" id="{B312BC9A-7B15-E9B0-96DF-05AA5E13C113}"/>
+              </a:ext>
+            </a:extLst>
+          </p:cNvPr>
+          <p:cNvSpPr>
+            <a:spLocks noGrp="1"/>
+          </p:cNvSpPr>
+          <p:nvPr>
+            <p:ph type="title"/>
+          </p:nvPr>
+        </p:nvSpPr>
+        <p:spPr/>
+        <p:txBody>
+          <a:bodyPr/>
+          <a:lstStyle/>
+          <a:p>
+            <a:r>
+              <a:rPr lang="en-US" dirty="0"/>
+              <a:t>Analysis Methods</a:t>
+            </a:r>
+          </a:p>
+        </p:txBody>
+      </p:sp>
+      <p:sp>
+        <p:nvSpPr>
+          <p:cNvPr id="3" name="Content Placeholder 2">
+            <a:extLst>
+              <a:ext uri="{FF2B5EF4-FFF2-40B4-BE49-F238E27FC236}">
+                <a16:creationId xmlns:a16="http://schemas.microsoft.com/office/drawing/2014/main" id="{8150B3B9-A2CD-564D-1DE3-F0A9722F9629}"/>
+              </a:ext>
+            </a:extLst>
+          </p:cNvPr>
+          <p:cNvSpPr>
+            <a:spLocks noGrp="1"/>
+          </p:cNvSpPr>
+          <p:nvPr>
+            <p:ph idx="1"/>
+          </p:nvPr>
+        </p:nvSpPr>
+        <p:spPr/>
+        <p:txBody>
+          <a:bodyPr/>
+          <a:lstStyle/>
+          <a:p>
+            <a:r>
+              <a:rPr lang="en-US" dirty="0"/>
+              <a:t>The analysis process can be broken into two broad phases: (1) exploration and cleanup, and (2) analysis.</a:t>
+            </a:r>
+          </a:p>
+          <a:p>
+            <a:endParaRPr lang="en-US" dirty="0"/>
+          </a:p>
+          <a:p>
+            <a:r>
+              <a:rPr lang="en-US" dirty="0"/>
+              <a:t>Describe here how we plan to answer the questions laid out in our Purpose section.</a:t>
+            </a:r>
+          </a:p>
+          <a:p>
+            <a:pPr lvl="1"/>
+            <a:r>
+              <a:rPr lang="en-US" dirty="0"/>
+              <a:t>Ex) Summarize first, then narrow scope. </a:t>
+            </a:r>
+          </a:p>
+          <a:p>
+            <a:pPr lvl="1"/>
+            <a:r>
+              <a:rPr lang="en-US" dirty="0"/>
+              <a:t>“We recommend focusing your analysis on multiple techniques, such as aggregation, correlation, comparison, summary statistics, sentiment analysis, and time-series analysis.”</a:t>
+            </a:r>
+          </a:p>
+        </p:txBody>
+      </p:sp>
+    </p:spTree>
+    <p:extLst>
+      <p:ext uri="{BB962C8B-B14F-4D97-AF65-F5344CB8AC3E}">
+        <p14:creationId xmlns:p14="http://schemas.microsoft.com/office/powerpoint/2010/main" val="3055247817"/>
+      </p:ext>
+    </p:extLst>
+  </p:cSld>
+  <p:clrMapOvr>
+    <a:masterClrMapping/>
+  </p:clrMapOvr>
+</p:sld>
+</file>
+
+<file path=ppt/slides/slide5.xml><?xml version="1.0" encoding="utf-8"?>
+<p:sld xmlns:a="http://schemas.openxmlformats.org/drawingml/2006/main" xmlns:r="http://schemas.openxmlformats.org/officeDocument/2006/relationships" xmlns:p="http://schemas.openxmlformats.org/presentationml/2006/main" show="0">
+  <p:cSld>
+    <p:spTree>
+      <p:nvGrpSpPr>
+        <p:cNvPr id="1" name=""/>
+        <p:cNvGrpSpPr/>
+        <p:nvPr/>
+      </p:nvGrpSpPr>
+      <p:grpSpPr>
+        <a:xfrm>
+          <a:off x="0" y="0"/>
+          <a:ext cx="0" cy="0"/>
+          <a:chOff x="0" y="0"/>
+          <a:chExt cx="0" cy="0"/>
+        </a:xfrm>
+      </p:grpSpPr>
+      <p:sp>
+        <p:nvSpPr>
+          <p:cNvPr id="2" name="Title 1">
+            <a:extLst>
+              <a:ext uri="{FF2B5EF4-FFF2-40B4-BE49-F238E27FC236}">
                 <a16:creationId xmlns:a16="http://schemas.microsoft.com/office/drawing/2014/main" id="{6A03C364-BD8D-E30B-C37E-136CB4BDCA73}"/>
               </a:ext>
             </a:extLst>
@@ -7976,7 +8580,7 @@
 </file>
 
 <file path=ppt/slides/slide6.xml><?xml version="1.0" encoding="utf-8"?>
-<p:sld xmlns:a="http://schemas.openxmlformats.org/drawingml/2006/main" xmlns:r="http://schemas.openxmlformats.org/officeDocument/2006/relationships" xmlns:p="http://schemas.openxmlformats.org/presentationml/2006/main">
+<p:sld xmlns:a="http://schemas.openxmlformats.org/drawingml/2006/main" xmlns:r="http://schemas.openxmlformats.org/officeDocument/2006/relationships" xmlns:p="http://schemas.openxmlformats.org/presentationml/2006/main" show="0">
   <p:cSld>
     <p:spTree>
       <p:nvGrpSpPr>
@@ -8488,7 +9092,7 @@
 </file>
 
 <file path=ppt/slides/slide7.xml><?xml version="1.0" encoding="utf-8"?>
-<p:sld xmlns:a="http://schemas.openxmlformats.org/drawingml/2006/main" xmlns:r="http://schemas.openxmlformats.org/officeDocument/2006/relationships" xmlns:p="http://schemas.openxmlformats.org/presentationml/2006/main">
+<p:sld xmlns:a="http://schemas.openxmlformats.org/drawingml/2006/main" xmlns:r="http://schemas.openxmlformats.org/officeDocument/2006/relationships" xmlns:p="http://schemas.openxmlformats.org/presentationml/2006/main" show="0">
   <p:cSld>
     <p:spTree>
       <p:nvGrpSpPr>
@@ -8647,7 +9251,7 @@
 </file>
 
 <file path=ppt/slides/slide8.xml><?xml version="1.0" encoding="utf-8"?>
-<p:sld xmlns:a="http://schemas.openxmlformats.org/drawingml/2006/main" xmlns:r="http://schemas.openxmlformats.org/officeDocument/2006/relationships" xmlns:p="http://schemas.openxmlformats.org/presentationml/2006/main">
+<p:sld xmlns:a="http://schemas.openxmlformats.org/drawingml/2006/main" xmlns:r="http://schemas.openxmlformats.org/officeDocument/2006/relationships" xmlns:p="http://schemas.openxmlformats.org/presentationml/2006/main" show="0">
   <p:cSld>
     <p:spTree>
       <p:nvGrpSpPr>
@@ -8826,7 +9430,7 @@
 </file>
 
 <file path=ppt/slides/slide9.xml><?xml version="1.0" encoding="utf-8"?>
-<p:sld xmlns:a="http://schemas.openxmlformats.org/drawingml/2006/main" xmlns:r="http://schemas.openxmlformats.org/officeDocument/2006/relationships" xmlns:p="http://schemas.openxmlformats.org/presentationml/2006/main">
+<p:sld xmlns:a="http://schemas.openxmlformats.org/drawingml/2006/main" xmlns:r="http://schemas.openxmlformats.org/officeDocument/2006/relationships" xmlns:p="http://schemas.openxmlformats.org/presentationml/2006/main" show="0">
   <p:cSld>
     <p:spTree>
       <p:nvGrpSpPr>

</xml_diff>

<commit_message>
adding powerpoint updated with Kendal's slides on 17 May 2023
</commit_message>
<xml_diff>
--- a/Project notes.pptx
+++ b/Project notes.pptx
@@ -5,7 +5,7 @@
     <p:sldMasterId id="2147483696" r:id="rId1"/>
   </p:sldMasterIdLst>
   <p:notesMasterIdLst>
-    <p:notesMasterId r:id="rId27"/>
+    <p:notesMasterId r:id="rId29"/>
   </p:notesMasterIdLst>
   <p:sldIdLst>
     <p:sldId id="256" r:id="rId2"/>
@@ -27,12 +27,14 @@
     <p:sldId id="278" r:id="rId18"/>
     <p:sldId id="272" r:id="rId19"/>
     <p:sldId id="273" r:id="rId20"/>
-    <p:sldId id="279" r:id="rId21"/>
-    <p:sldId id="280" r:id="rId22"/>
-    <p:sldId id="281" r:id="rId23"/>
-    <p:sldId id="282" r:id="rId24"/>
-    <p:sldId id="274" r:id="rId25"/>
-    <p:sldId id="275" r:id="rId26"/>
+    <p:sldId id="283" r:id="rId21"/>
+    <p:sldId id="284" r:id="rId22"/>
+    <p:sldId id="285" r:id="rId23"/>
+    <p:sldId id="286" r:id="rId24"/>
+    <p:sldId id="287" r:id="rId25"/>
+    <p:sldId id="282" r:id="rId26"/>
+    <p:sldId id="274" r:id="rId27"/>
+    <p:sldId id="275" r:id="rId28"/>
   </p:sldIdLst>
   <p:sldSz cx="12192000" cy="6858000"/>
   <p:notesSz cx="6858000" cy="9144000"/>
@@ -221,7 +223,7 @@
           <a:p>
             <a:fld id="{C17E1E4B-2B0B-4F18-825C-E1CF4409D9D0}" type="datetimeFigureOut">
               <a:rPr lang="en-US" smtClean="0"/>
-              <a:t>5/16/2023</a:t>
+              <a:t>5/17/23</a:t>
             </a:fld>
             <a:endParaRPr lang="en-US"/>
           </a:p>
@@ -770,6 +772,180 @@
 </p:notes>
 </file>
 
+<file path=ppt/notesSlides/notesSlide3.xml><?xml version="1.0" encoding="utf-8"?>
+<p:notes xmlns:a="http://schemas.openxmlformats.org/drawingml/2006/main" xmlns:r="http://schemas.openxmlformats.org/officeDocument/2006/relationships" xmlns:p="http://schemas.openxmlformats.org/presentationml/2006/main">
+  <p:cSld>
+    <p:spTree>
+      <p:nvGrpSpPr>
+        <p:cNvPr id="1" name=""/>
+        <p:cNvGrpSpPr/>
+        <p:nvPr/>
+      </p:nvGrpSpPr>
+      <p:grpSpPr>
+        <a:xfrm>
+          <a:off x="0" y="0"/>
+          <a:ext cx="0" cy="0"/>
+          <a:chOff x="0" y="0"/>
+          <a:chExt cx="0" cy="0"/>
+        </a:xfrm>
+      </p:grpSpPr>
+      <p:sp>
+        <p:nvSpPr>
+          <p:cNvPr id="2" name="Slide Image Placeholder 1"/>
+          <p:cNvSpPr>
+            <a:spLocks noGrp="1" noRot="1" noChangeAspect="1"/>
+          </p:cNvSpPr>
+          <p:nvPr>
+            <p:ph type="sldImg"/>
+          </p:nvPr>
+        </p:nvSpPr>
+        <p:spPr/>
+      </p:sp>
+      <p:sp>
+        <p:nvSpPr>
+          <p:cNvPr id="3" name="Notes Placeholder 2"/>
+          <p:cNvSpPr>
+            <a:spLocks noGrp="1"/>
+          </p:cNvSpPr>
+          <p:nvPr>
+            <p:ph type="body" idx="1"/>
+          </p:nvPr>
+        </p:nvSpPr>
+        <p:spPr/>
+        <p:txBody>
+          <a:bodyPr/>
+          <a:lstStyle/>
+          <a:p>
+            <a:r>
+              <a:rPr lang="en-US" dirty="0"/>
+              <a:t>Min/Max for 65+ is – 84%-95%; average of 65+ series complete across all states is 92%. Not a lot of difference in the numbers of 65+ people fully vaccinated by state. Does this hold true for the bivalent booster? </a:t>
+            </a:r>
+          </a:p>
+        </p:txBody>
+      </p:sp>
+      <p:sp>
+        <p:nvSpPr>
+          <p:cNvPr id="4" name="Slide Number Placeholder 3"/>
+          <p:cNvSpPr>
+            <a:spLocks noGrp="1"/>
+          </p:cNvSpPr>
+          <p:nvPr>
+            <p:ph type="sldNum" sz="quarter" idx="5"/>
+          </p:nvPr>
+        </p:nvSpPr>
+        <p:spPr/>
+        <p:txBody>
+          <a:bodyPr/>
+          <a:lstStyle/>
+          <a:p>
+            <a:fld id="{F1D59B1D-B0BC-4C10-A0E9-E068C37A006F}" type="slidenum">
+              <a:rPr lang="en-US" smtClean="0"/>
+              <a:t>22</a:t>
+            </a:fld>
+            <a:endParaRPr lang="en-US"/>
+          </a:p>
+        </p:txBody>
+      </p:sp>
+    </p:spTree>
+    <p:extLst>
+      <p:ext uri="{BB962C8B-B14F-4D97-AF65-F5344CB8AC3E}">
+        <p14:creationId xmlns:p14="http://schemas.microsoft.com/office/powerpoint/2010/main" val="1154924229"/>
+      </p:ext>
+    </p:extLst>
+  </p:cSld>
+  <p:clrMapOvr>
+    <a:masterClrMapping/>
+  </p:clrMapOvr>
+</p:notes>
+</file>
+
+<file path=ppt/notesSlides/notesSlide4.xml><?xml version="1.0" encoding="utf-8"?>
+<p:notes xmlns:a="http://schemas.openxmlformats.org/drawingml/2006/main" xmlns:r="http://schemas.openxmlformats.org/officeDocument/2006/relationships" xmlns:p="http://schemas.openxmlformats.org/presentationml/2006/main">
+  <p:cSld>
+    <p:spTree>
+      <p:nvGrpSpPr>
+        <p:cNvPr id="1" name=""/>
+        <p:cNvGrpSpPr/>
+        <p:nvPr/>
+      </p:nvGrpSpPr>
+      <p:grpSpPr>
+        <a:xfrm>
+          <a:off x="0" y="0"/>
+          <a:ext cx="0" cy="0"/>
+          <a:chOff x="0" y="0"/>
+          <a:chExt cx="0" cy="0"/>
+        </a:xfrm>
+      </p:grpSpPr>
+      <p:sp>
+        <p:nvSpPr>
+          <p:cNvPr id="2" name="Slide Image Placeholder 1"/>
+          <p:cNvSpPr>
+            <a:spLocks noGrp="1" noRot="1" noChangeAspect="1"/>
+          </p:cNvSpPr>
+          <p:nvPr>
+            <p:ph type="sldImg"/>
+          </p:nvPr>
+        </p:nvSpPr>
+        <p:spPr/>
+      </p:sp>
+      <p:sp>
+        <p:nvSpPr>
+          <p:cNvPr id="3" name="Notes Placeholder 2"/>
+          <p:cNvSpPr>
+            <a:spLocks noGrp="1"/>
+          </p:cNvSpPr>
+          <p:nvPr>
+            <p:ph type="body" idx="1"/>
+          </p:nvPr>
+        </p:nvSpPr>
+        <p:spPr/>
+        <p:txBody>
+          <a:bodyPr/>
+          <a:lstStyle/>
+          <a:p>
+            <a:r>
+              <a:rPr lang="en-US" dirty="0"/>
+              <a:t>Unlike fully vaccinated, the highest percentage of 65plus folks we see with a bivalent booster is around 60%. The lowest percentage we see is about 18 percent in Mississippi, and the highest we see is around 62% in Maine. So overall percentages are lower, and there is a greater distribution of percentages across states (62-18, vs 95-84)</a:t>
+            </a:r>
+          </a:p>
+        </p:txBody>
+      </p:sp>
+      <p:sp>
+        <p:nvSpPr>
+          <p:cNvPr id="4" name="Slide Number Placeholder 3"/>
+          <p:cNvSpPr>
+            <a:spLocks noGrp="1"/>
+          </p:cNvSpPr>
+          <p:nvPr>
+            <p:ph type="sldNum" sz="quarter" idx="5"/>
+          </p:nvPr>
+        </p:nvSpPr>
+        <p:spPr/>
+        <p:txBody>
+          <a:bodyPr/>
+          <a:lstStyle/>
+          <a:p>
+            <a:fld id="{F1D59B1D-B0BC-4C10-A0E9-E068C37A006F}" type="slidenum">
+              <a:rPr lang="en-US" smtClean="0"/>
+              <a:t>23</a:t>
+            </a:fld>
+            <a:endParaRPr lang="en-US"/>
+          </a:p>
+        </p:txBody>
+      </p:sp>
+    </p:spTree>
+    <p:extLst>
+      <p:ext uri="{BB962C8B-B14F-4D97-AF65-F5344CB8AC3E}">
+        <p14:creationId xmlns:p14="http://schemas.microsoft.com/office/powerpoint/2010/main" val="1469000861"/>
+      </p:ext>
+    </p:extLst>
+  </p:cSld>
+  <p:clrMapOvr>
+    <a:masterClrMapping/>
+  </p:clrMapOvr>
+</p:notes>
+</file>
+
 <file path=ppt/slideLayouts/slideLayout1.xml><?xml version="1.0" encoding="utf-8"?>
 <p:sldLayout xmlns:a="http://schemas.openxmlformats.org/drawingml/2006/main" xmlns:r="http://schemas.openxmlformats.org/officeDocument/2006/relationships" xmlns:p="http://schemas.openxmlformats.org/presentationml/2006/main" showMasterSp="0" type="title" preserve="1">
   <p:cSld name="Title Slide">
@@ -996,7 +1172,7 @@
           <a:p>
             <a:fld id="{925EA6E8-F76E-44A9-9BED-4361634B60BD}" type="datetimeFigureOut">
               <a:rPr lang="en-US" smtClean="0"/>
-              <a:t>5/16/2023</a:t>
+              <a:t>5/17/23</a:t>
             </a:fld>
             <a:endParaRPr lang="en-US"/>
           </a:p>
@@ -1204,7 +1380,7 @@
           <a:p>
             <a:fld id="{925EA6E8-F76E-44A9-9BED-4361634B60BD}" type="datetimeFigureOut">
               <a:rPr lang="en-US" smtClean="0"/>
-              <a:t>5/16/2023</a:t>
+              <a:t>5/17/23</a:t>
             </a:fld>
             <a:endParaRPr lang="en-US"/>
           </a:p>
@@ -1460,7 +1636,7 @@
           <a:p>
             <a:fld id="{925EA6E8-F76E-44A9-9BED-4361634B60BD}" type="datetimeFigureOut">
               <a:rPr lang="en-US" smtClean="0"/>
-              <a:t>5/16/2023</a:t>
+              <a:t>5/17/23</a:t>
             </a:fld>
             <a:endParaRPr lang="en-US"/>
           </a:p>
@@ -1634,7 +1810,7 @@
           <a:p>
             <a:fld id="{925EA6E8-F76E-44A9-9BED-4361634B60BD}" type="datetimeFigureOut">
               <a:rPr lang="en-US" smtClean="0"/>
-              <a:t>5/16/2023</a:t>
+              <a:t>5/17/23</a:t>
             </a:fld>
             <a:endParaRPr lang="en-US"/>
           </a:p>
@@ -1977,7 +2153,7 @@
           <a:p>
             <a:fld id="{925EA6E8-F76E-44A9-9BED-4361634B60BD}" type="datetimeFigureOut">
               <a:rPr lang="en-US" smtClean="0"/>
-              <a:t>5/16/2023</a:t>
+              <a:t>5/17/23</a:t>
             </a:fld>
             <a:endParaRPr lang="en-US"/>
           </a:p>
@@ -2252,7 +2428,7 @@
           <a:p>
             <a:fld id="{925EA6E8-F76E-44A9-9BED-4361634B60BD}" type="datetimeFigureOut">
               <a:rPr lang="en-US" smtClean="0"/>
-              <a:t>5/16/2023</a:t>
+              <a:t>5/17/23</a:t>
             </a:fld>
             <a:endParaRPr lang="en-US"/>
           </a:p>
@@ -2631,7 +2807,7 @@
           <a:p>
             <a:fld id="{925EA6E8-F76E-44A9-9BED-4361634B60BD}" type="datetimeFigureOut">
               <a:rPr lang="en-US" smtClean="0"/>
-              <a:t>5/16/2023</a:t>
+              <a:t>5/17/23</a:t>
             </a:fld>
             <a:endParaRPr lang="en-US"/>
           </a:p>
@@ -2749,7 +2925,7 @@
           <a:p>
             <a:fld id="{925EA6E8-F76E-44A9-9BED-4361634B60BD}" type="datetimeFigureOut">
               <a:rPr lang="en-US" smtClean="0"/>
-              <a:t>5/16/2023</a:t>
+              <a:t>5/17/23</a:t>
             </a:fld>
             <a:endParaRPr lang="en-US"/>
           </a:p>
@@ -2920,7 +3096,7 @@
           <a:p>
             <a:fld id="{925EA6E8-F76E-44A9-9BED-4361634B60BD}" type="datetimeFigureOut">
               <a:rPr lang="en-US" smtClean="0"/>
-              <a:t>5/16/2023</a:t>
+              <a:t>5/17/23</a:t>
             </a:fld>
             <a:endParaRPr lang="en-US"/>
           </a:p>
@@ -3274,7 +3450,7 @@
           <a:p>
             <a:fld id="{925EA6E8-F76E-44A9-9BED-4361634B60BD}" type="datetimeFigureOut">
               <a:rPr lang="en-US" smtClean="0"/>
-              <a:t>5/16/2023</a:t>
+              <a:t>5/17/23</a:t>
             </a:fld>
             <a:endParaRPr lang="en-US"/>
           </a:p>
@@ -3656,7 +3832,7 @@
           <a:p>
             <a:fld id="{925EA6E8-F76E-44A9-9BED-4361634B60BD}" type="datetimeFigureOut">
               <a:rPr lang="en-US" smtClean="0"/>
-              <a:t>5/16/2023</a:t>
+              <a:t>5/17/23</a:t>
             </a:fld>
             <a:endParaRPr lang="en-US"/>
           </a:p>
@@ -3943,7 +4119,7 @@
           <a:p>
             <a:fld id="{925EA6E8-F76E-44A9-9BED-4361634B60BD}" type="datetimeFigureOut">
               <a:rPr lang="en-US" smtClean="0"/>
-              <a:t>5/16/2023</a:t>
+              <a:t>5/17/23</a:t>
             </a:fld>
             <a:endParaRPr lang="en-US"/>
           </a:p>
@@ -7415,10 +7591,38 @@
       </p:grpSpPr>
       <p:sp>
         <p:nvSpPr>
-          <p:cNvPr id="2" name="TextBox 1">
+          <p:cNvPr id="2" name="Title 1">
             <a:extLst>
               <a:ext uri="{FF2B5EF4-FFF2-40B4-BE49-F238E27FC236}">
-                <a16:creationId xmlns:a16="http://schemas.microsoft.com/office/drawing/2014/main" id="{A397DB62-FD24-C324-767B-9239114E4DD9}"/>
+                <a16:creationId xmlns:a16="http://schemas.microsoft.com/office/drawing/2014/main" id="{D2E1FBFD-0843-8952-2571-6477109CBC9D}"/>
+              </a:ext>
+            </a:extLst>
+          </p:cNvPr>
+          <p:cNvSpPr>
+            <a:spLocks noGrp="1"/>
+          </p:cNvSpPr>
+          <p:nvPr>
+            <p:ph type="title"/>
+          </p:nvPr>
+        </p:nvSpPr>
+        <p:spPr/>
+        <p:txBody>
+          <a:bodyPr/>
+          <a:lstStyle/>
+          <a:p>
+            <a:r>
+              <a:rPr lang="en-US" dirty="0"/>
+              <a:t>Vaccination Status by State</a:t>
+            </a:r>
+          </a:p>
+        </p:txBody>
+      </p:sp>
+      <p:sp>
+        <p:nvSpPr>
+          <p:cNvPr id="9" name="TextBox 8">
+            <a:extLst>
+              <a:ext uri="{FF2B5EF4-FFF2-40B4-BE49-F238E27FC236}">
+                <a16:creationId xmlns:a16="http://schemas.microsoft.com/office/drawing/2014/main" id="{2BE1898A-FE02-FCB0-1217-3365C2082860}"/>
               </a:ext>
             </a:extLst>
           </p:cNvPr>
@@ -7426,9 +7630,9 @@
           <p:nvPr/>
         </p:nvSpPr>
         <p:spPr>
-          <a:xfrm rot="20548696">
-            <a:off x="367443" y="2955023"/>
-            <a:ext cx="11053134" cy="954107"/>
+          <a:xfrm>
+            <a:off x="9570720" y="2011680"/>
+            <a:ext cx="2275840" cy="1754326"/>
           </a:xfrm>
           <a:prstGeom prst="rect">
             <a:avLst/>
@@ -7442,20 +7646,72 @@
           <a:lstStyle/>
           <a:p>
             <a:r>
-              <a:rPr lang="en-US" sz="2800" dirty="0">
-                <a:solidFill>
-                  <a:srgbClr val="FF0000"/>
-                </a:solidFill>
-              </a:rPr>
-              <a:t>Heat map here for State vaccination status- fully vaccinated by state all age groups</a:t>
-            </a:r>
-          </a:p>
-        </p:txBody>
-      </p:sp>
+              <a:rPr lang="en-US" dirty="0"/>
+              <a:t>Mean – 68% (WI)</a:t>
+            </a:r>
+          </a:p>
+          <a:p>
+            <a:endParaRPr lang="en-US" dirty="0"/>
+          </a:p>
+          <a:p>
+            <a:r>
+              <a:rPr lang="en-US" dirty="0"/>
+              <a:t>Min – 53% (AL)</a:t>
+            </a:r>
+          </a:p>
+          <a:p>
+            <a:endParaRPr lang="en-US" dirty="0"/>
+          </a:p>
+          <a:p>
+            <a:r>
+              <a:rPr lang="en-US" dirty="0"/>
+              <a:t>Max – 87% (RI)</a:t>
+            </a:r>
+          </a:p>
+          <a:p>
+            <a:endParaRPr lang="en-US" dirty="0"/>
+          </a:p>
+        </p:txBody>
+      </p:sp>
+      <p:pic>
+        <p:nvPicPr>
+          <p:cNvPr id="13" name="Content Placeholder 12">
+            <a:extLst>
+              <a:ext uri="{FF2B5EF4-FFF2-40B4-BE49-F238E27FC236}">
+                <a16:creationId xmlns:a16="http://schemas.microsoft.com/office/drawing/2014/main" id="{CF79CC70-63E6-E0C5-E732-EB2EDCF725E8}"/>
+              </a:ext>
+            </a:extLst>
+          </p:cNvPr>
+          <p:cNvPicPr>
+            <a:picLocks noGrp="1" noChangeAspect="1"/>
+          </p:cNvPicPr>
+          <p:nvPr>
+            <p:ph idx="1"/>
+          </p:nvPr>
+        </p:nvPicPr>
+        <p:blipFill>
+          <a:blip r:embed="rId2">
+            <a:extLst>
+              <a:ext uri="{28A0092B-C50C-407E-A947-70E740481C1C}">
+                <a14:useLocalDpi xmlns:a14="http://schemas.microsoft.com/office/drawing/2010/main" val="0"/>
+              </a:ext>
+            </a:extLst>
+          </a:blip>
+          <a:stretch>
+            <a:fillRect/>
+          </a:stretch>
+        </p:blipFill>
+        <p:spPr>
+          <a:xfrm>
+            <a:off x="1424389" y="1939782"/>
+            <a:ext cx="8006463" cy="4254956"/>
+          </a:xfrm>
+        </p:spPr>
+      </p:pic>
     </p:spTree>
     <p:extLst>
       <p:ext uri="{BB962C8B-B14F-4D97-AF65-F5344CB8AC3E}">
-        <p14:creationId xmlns:p14="http://schemas.microsoft.com/office/powerpoint/2010/main" val="471067823"/>
+        <p14:creationId xmlns:p14="http://schemas.microsoft.com/office/powerpoint/2010/main" val="2541148371"/>
       </p:ext>
     </p:extLst>
   </p:cSld>
@@ -7484,125 +7740,166 @@
       </p:grpSpPr>
       <p:sp>
         <p:nvSpPr>
-          <p:cNvPr id="2" name="TextBox 1">
+          <p:cNvPr id="2" name="Title 1">
             <a:extLst>
               <a:ext uri="{FF2B5EF4-FFF2-40B4-BE49-F238E27FC236}">
-                <a16:creationId xmlns:a16="http://schemas.microsoft.com/office/drawing/2014/main" id="{2DF6D821-77F6-CCC7-E10E-711ED8A9335F}"/>
+                <a16:creationId xmlns:a16="http://schemas.microsoft.com/office/drawing/2014/main" id="{CE09C882-CA28-96A8-EB82-C99D7FAA8D87}"/>
               </a:ext>
             </a:extLst>
           </p:cNvPr>
-          <p:cNvSpPr txBox="1"/>
-          <p:nvPr/>
-        </p:nvSpPr>
-        <p:spPr>
-          <a:xfrm rot="21436254">
-            <a:off x="569432" y="1138663"/>
-            <a:ext cx="11053134" cy="954107"/>
-          </a:xfrm>
-          <a:prstGeom prst="rect">
-            <a:avLst/>
-          </a:prstGeom>
-          <a:noFill/>
-        </p:spPr>
-        <p:txBody>
-          <a:bodyPr wrap="square" rtlCol="0">
-            <a:spAutoFit/>
+          <p:cNvSpPr>
+            <a:spLocks noGrp="1"/>
+          </p:cNvSpPr>
+          <p:nvPr>
+            <p:ph type="title"/>
+          </p:nvPr>
+        </p:nvSpPr>
+        <p:spPr/>
+        <p:txBody>
+          <a:bodyPr>
+            <a:normAutofit/>
           </a:bodyPr>
           <a:lstStyle/>
           <a:p>
             <a:r>
-              <a:rPr lang="en-US" sz="2800" dirty="0">
-                <a:solidFill>
-                  <a:srgbClr val="FF0000"/>
-                </a:solidFill>
-              </a:rPr>
-              <a:t>Heat map here for State vaccination status- fully vaccinated by state Ages 5+ and…</a:t>
-            </a:r>
-          </a:p>
-        </p:txBody>
-      </p:sp>
-      <p:sp>
-        <p:nvSpPr>
-          <p:cNvPr id="3" name="TextBox 2">
+              <a:rPr lang="en-US" sz="4000" dirty="0"/>
+              <a:t>Vaccination Status by State – Age Groups</a:t>
+            </a:r>
+          </a:p>
+        </p:txBody>
+      </p:sp>
+      <p:sp>
+        <p:nvSpPr>
+          <p:cNvPr id="9" name="Text Placeholder 8">
             <a:extLst>
               <a:ext uri="{FF2B5EF4-FFF2-40B4-BE49-F238E27FC236}">
-                <a16:creationId xmlns:a16="http://schemas.microsoft.com/office/drawing/2014/main" id="{7C4F374F-50D0-5B52-47C6-A4AD8418BE9E}"/>
+                <a16:creationId xmlns:a16="http://schemas.microsoft.com/office/drawing/2014/main" id="{6AE53777-E1D7-79E8-D64E-3A241394DBD0}"/>
               </a:ext>
             </a:extLst>
           </p:cNvPr>
-          <p:cNvSpPr txBox="1"/>
-          <p:nvPr/>
-        </p:nvSpPr>
-        <p:spPr>
-          <a:xfrm rot="489123">
-            <a:off x="423427" y="3577064"/>
-            <a:ext cx="11053134" cy="954107"/>
-          </a:xfrm>
-          <a:prstGeom prst="rect">
-            <a:avLst/>
-          </a:prstGeom>
-          <a:noFill/>
-        </p:spPr>
-        <p:txBody>
-          <a:bodyPr wrap="square" rtlCol="0">
-            <a:spAutoFit/>
-          </a:bodyPr>
+          <p:cNvSpPr>
+            <a:spLocks noGrp="1"/>
+          </p:cNvSpPr>
+          <p:nvPr>
+            <p:ph type="body" idx="1"/>
+          </p:nvPr>
+        </p:nvSpPr>
+        <p:spPr/>
+        <p:txBody>
+          <a:bodyPr/>
           <a:lstStyle/>
           <a:p>
-            <a:r>
-              <a:rPr lang="en-US" sz="2800" dirty="0">
-                <a:solidFill>
-                  <a:srgbClr val="FF0000"/>
-                </a:solidFill>
-              </a:rPr>
-              <a:t>Heat map here for State vaccination status- fully vaccinated by state Ages 18+ and…</a:t>
-            </a:r>
-          </a:p>
-        </p:txBody>
-      </p:sp>
-      <p:sp>
-        <p:nvSpPr>
-          <p:cNvPr id="4" name="TextBox 3">
+            <a:pPr algn="ctr"/>
+            <a:r>
+              <a:rPr lang="en-US" dirty="0"/>
+              <a:t>Ages 5 and up</a:t>
+            </a:r>
+          </a:p>
+        </p:txBody>
+      </p:sp>
+      <p:sp>
+        <p:nvSpPr>
+          <p:cNvPr id="10" name="Text Placeholder 9">
             <a:extLst>
               <a:ext uri="{FF2B5EF4-FFF2-40B4-BE49-F238E27FC236}">
-                <a16:creationId xmlns:a16="http://schemas.microsoft.com/office/drawing/2014/main" id="{3DB088A0-1D6D-8B11-57A0-7A447F25D3FB}"/>
+                <a16:creationId xmlns:a16="http://schemas.microsoft.com/office/drawing/2014/main" id="{C76B2DA6-CA3A-E260-1635-0987629F6AE7}"/>
               </a:ext>
             </a:extLst>
           </p:cNvPr>
-          <p:cNvSpPr txBox="1"/>
-          <p:nvPr/>
-        </p:nvSpPr>
+          <p:cNvSpPr>
+            <a:spLocks noGrp="1"/>
+          </p:cNvSpPr>
+          <p:nvPr>
+            <p:ph type="body" sz="quarter" idx="3"/>
+          </p:nvPr>
+        </p:nvSpPr>
+        <p:spPr/>
+        <p:txBody>
+          <a:bodyPr/>
+          <a:lstStyle/>
+          <a:p>
+            <a:pPr algn="ctr"/>
+            <a:r>
+              <a:rPr lang="en-US" dirty="0"/>
+              <a:t>Ages 12 and up</a:t>
+            </a:r>
+          </a:p>
+        </p:txBody>
+      </p:sp>
+      <p:pic>
+        <p:nvPicPr>
+          <p:cNvPr id="14" name="Content Placeholder 13">
+            <a:extLst>
+              <a:ext uri="{FF2B5EF4-FFF2-40B4-BE49-F238E27FC236}">
+                <a16:creationId xmlns:a16="http://schemas.microsoft.com/office/drawing/2014/main" id="{42544D50-2F6B-8CE0-4FAC-8775E57FD5E0}"/>
+              </a:ext>
+            </a:extLst>
+          </p:cNvPr>
+          <p:cNvPicPr>
+            <a:picLocks noGrp="1" noChangeAspect="1"/>
+          </p:cNvPicPr>
+          <p:nvPr>
+            <p:ph sz="half" idx="2"/>
+          </p:nvPr>
+        </p:nvPicPr>
+        <p:blipFill>
+          <a:blip r:embed="rId2">
+            <a:extLst>
+              <a:ext uri="{28A0092B-C50C-407E-A947-70E740481C1C}">
+                <a14:useLocalDpi xmlns:a14="http://schemas.microsoft.com/office/drawing/2010/main" val="0"/>
+              </a:ext>
+            </a:extLst>
+          </a:blip>
+          <a:stretch>
+            <a:fillRect/>
+          </a:stretch>
+        </p:blipFill>
         <p:spPr>
           <a:xfrm>
-            <a:off x="787321" y="4973546"/>
-            <a:ext cx="11053134" cy="523220"/>
+            <a:off x="1096963" y="2959648"/>
+            <a:ext cx="4938712" cy="2624629"/>
           </a:xfrm>
-          <a:prstGeom prst="rect">
-            <a:avLst/>
-          </a:prstGeom>
-          <a:noFill/>
         </p:spPr>
-        <p:txBody>
-          <a:bodyPr wrap="square" rtlCol="0">
-            <a:spAutoFit/>
-          </a:bodyPr>
-          <a:lstStyle/>
-          <a:p>
-            <a:r>
-              <a:rPr lang="en-US" sz="2800" dirty="0">
-                <a:solidFill>
-                  <a:srgbClr val="FF0000"/>
-                </a:solidFill>
-              </a:rPr>
-              <a:t>Copy Kendal’s slide deck.</a:t>
-            </a:r>
-          </a:p>
-        </p:txBody>
-      </p:sp>
+      </p:pic>
+      <p:pic>
+        <p:nvPicPr>
+          <p:cNvPr id="18" name="Content Placeholder 17">
+            <a:extLst>
+              <a:ext uri="{FF2B5EF4-FFF2-40B4-BE49-F238E27FC236}">
+                <a16:creationId xmlns:a16="http://schemas.microsoft.com/office/drawing/2014/main" id="{0B7A7C1A-48DD-0613-7D92-E582E9A906AF}"/>
+              </a:ext>
+            </a:extLst>
+          </p:cNvPr>
+          <p:cNvPicPr>
+            <a:picLocks noGrp="1" noChangeAspect="1"/>
+          </p:cNvPicPr>
+          <p:nvPr>
+            <p:ph sz="quarter" idx="4"/>
+          </p:nvPr>
+        </p:nvPicPr>
+        <p:blipFill>
+          <a:blip r:embed="rId3">
+            <a:extLst>
+              <a:ext uri="{28A0092B-C50C-407E-A947-70E740481C1C}">
+                <a14:useLocalDpi xmlns:a14="http://schemas.microsoft.com/office/drawing/2010/main" val="0"/>
+              </a:ext>
+            </a:extLst>
+          </a:blip>
+          <a:stretch>
+            <a:fillRect/>
+          </a:stretch>
+        </p:blipFill>
+        <p:spPr>
+          <a:xfrm>
+            <a:off x="6218238" y="2960070"/>
+            <a:ext cx="4937125" cy="2623786"/>
+          </a:xfrm>
+        </p:spPr>
+      </p:pic>
     </p:spTree>
     <p:extLst>
       <p:ext uri="{BB962C8B-B14F-4D97-AF65-F5344CB8AC3E}">
-        <p14:creationId xmlns:p14="http://schemas.microsoft.com/office/powerpoint/2010/main" val="3470800293"/>
+        <p14:creationId xmlns:p14="http://schemas.microsoft.com/office/powerpoint/2010/main" val="1878185549"/>
       </p:ext>
     </p:extLst>
   </p:cSld>
@@ -7629,79 +7926,168 @@
           <a:chExt cx="0" cy="0"/>
         </a:xfrm>
       </p:grpSpPr>
+      <p:sp>
+        <p:nvSpPr>
+          <p:cNvPr id="2" name="Title 1">
+            <a:extLst>
+              <a:ext uri="{FF2B5EF4-FFF2-40B4-BE49-F238E27FC236}">
+                <a16:creationId xmlns:a16="http://schemas.microsoft.com/office/drawing/2014/main" id="{9D66785B-0268-B2F3-AA8E-14791707A659}"/>
+              </a:ext>
+            </a:extLst>
+          </p:cNvPr>
+          <p:cNvSpPr>
+            <a:spLocks noGrp="1"/>
+          </p:cNvSpPr>
+          <p:nvPr>
+            <p:ph type="title"/>
+          </p:nvPr>
+        </p:nvSpPr>
+        <p:spPr/>
+        <p:txBody>
+          <a:bodyPr>
+            <a:normAutofit/>
+          </a:bodyPr>
+          <a:lstStyle/>
+          <a:p>
+            <a:r>
+              <a:rPr lang="en-US" sz="3600" dirty="0"/>
+              <a:t>Vaccination Status by State – Age Groups Continued</a:t>
+            </a:r>
+          </a:p>
+        </p:txBody>
+      </p:sp>
+      <p:sp>
+        <p:nvSpPr>
+          <p:cNvPr id="3" name="Text Placeholder 2">
+            <a:extLst>
+              <a:ext uri="{FF2B5EF4-FFF2-40B4-BE49-F238E27FC236}">
+                <a16:creationId xmlns:a16="http://schemas.microsoft.com/office/drawing/2014/main" id="{4AACC4D0-13AE-DE79-30ED-6F0F9459AD57}"/>
+              </a:ext>
+            </a:extLst>
+          </p:cNvPr>
+          <p:cNvSpPr>
+            <a:spLocks noGrp="1"/>
+          </p:cNvSpPr>
+          <p:nvPr>
+            <p:ph type="body" idx="1"/>
+          </p:nvPr>
+        </p:nvSpPr>
+        <p:spPr/>
+        <p:txBody>
+          <a:bodyPr/>
+          <a:lstStyle/>
+          <a:p>
+            <a:pPr algn="ctr"/>
+            <a:r>
+              <a:rPr lang="en-US" dirty="0"/>
+              <a:t>Ages 18 and up</a:t>
+            </a:r>
+          </a:p>
+        </p:txBody>
+      </p:sp>
+      <p:sp>
+        <p:nvSpPr>
+          <p:cNvPr id="5" name="Text Placeholder 4">
+            <a:extLst>
+              <a:ext uri="{FF2B5EF4-FFF2-40B4-BE49-F238E27FC236}">
+                <a16:creationId xmlns:a16="http://schemas.microsoft.com/office/drawing/2014/main" id="{891E569B-933D-38A6-F637-3BAB804D1379}"/>
+              </a:ext>
+            </a:extLst>
+          </p:cNvPr>
+          <p:cNvSpPr>
+            <a:spLocks noGrp="1"/>
+          </p:cNvSpPr>
+          <p:nvPr>
+            <p:ph type="body" sz="quarter" idx="3"/>
+          </p:nvPr>
+        </p:nvSpPr>
+        <p:spPr/>
+        <p:txBody>
+          <a:bodyPr/>
+          <a:lstStyle/>
+          <a:p>
+            <a:pPr algn="ctr"/>
+            <a:r>
+              <a:rPr lang="en-US" dirty="0"/>
+              <a:t>Ages 65 and up</a:t>
+            </a:r>
+          </a:p>
+        </p:txBody>
+      </p:sp>
       <p:pic>
         <p:nvPicPr>
-          <p:cNvPr id="3" name="Picture 2">
+          <p:cNvPr id="14" name="Content Placeholder 13">
             <a:extLst>
               <a:ext uri="{FF2B5EF4-FFF2-40B4-BE49-F238E27FC236}">
-                <a16:creationId xmlns:a16="http://schemas.microsoft.com/office/drawing/2014/main" id="{8D40AD37-CC71-13CF-0643-866B329836E4}"/>
+                <a16:creationId xmlns:a16="http://schemas.microsoft.com/office/drawing/2014/main" id="{70A0F97D-B3E8-E3BE-9512-E18D7E2B6F71}"/>
               </a:ext>
             </a:extLst>
           </p:cNvPr>
           <p:cNvPicPr>
-            <a:picLocks noChangeAspect="1"/>
+            <a:picLocks noGrp="1" noChangeAspect="1"/>
           </p:cNvPicPr>
-          <p:nvPr/>
+          <p:nvPr>
+            <p:ph sz="half" idx="2"/>
+          </p:nvPr>
         </p:nvPicPr>
         <p:blipFill>
-          <a:blip r:embed="rId2"/>
+          <a:blip r:embed="rId3">
+            <a:extLst>
+              <a:ext uri="{28A0092B-C50C-407E-A947-70E740481C1C}">
+                <a14:useLocalDpi xmlns:a14="http://schemas.microsoft.com/office/drawing/2010/main" val="0"/>
+              </a:ext>
+            </a:extLst>
+          </a:blip>
           <a:stretch>
             <a:fillRect/>
           </a:stretch>
         </p:blipFill>
         <p:spPr>
           <a:xfrm>
-            <a:off x="3271935" y="1052319"/>
-            <a:ext cx="5963081" cy="4567820"/>
+            <a:off x="1096963" y="2959648"/>
+            <a:ext cx="4938712" cy="2624629"/>
           </a:xfrm>
-          <a:prstGeom prst="rect">
-            <a:avLst/>
-          </a:prstGeom>
         </p:spPr>
       </p:pic>
-      <p:sp>
-        <p:nvSpPr>
-          <p:cNvPr id="4" name="TextBox 3">
+      <p:pic>
+        <p:nvPicPr>
+          <p:cNvPr id="18" name="Content Placeholder 17">
             <a:extLst>
               <a:ext uri="{FF2B5EF4-FFF2-40B4-BE49-F238E27FC236}">
-                <a16:creationId xmlns:a16="http://schemas.microsoft.com/office/drawing/2014/main" id="{DFBF548F-5ADE-8EB4-988D-E329E150539C}"/>
+                <a16:creationId xmlns:a16="http://schemas.microsoft.com/office/drawing/2014/main" id="{73BC84EE-71B8-4A2B-17B0-1E2404A887BD}"/>
               </a:ext>
             </a:extLst>
           </p:cNvPr>
-          <p:cNvSpPr txBox="1"/>
-          <p:nvPr/>
-        </p:nvSpPr>
+          <p:cNvPicPr>
+            <a:picLocks noGrp="1" noChangeAspect="1"/>
+          </p:cNvPicPr>
+          <p:nvPr>
+            <p:ph sz="quarter" idx="4"/>
+          </p:nvPr>
+        </p:nvPicPr>
+        <p:blipFill>
+          <a:blip r:embed="rId4">
+            <a:extLst>
+              <a:ext uri="{28A0092B-C50C-407E-A947-70E740481C1C}">
+                <a14:useLocalDpi xmlns:a14="http://schemas.microsoft.com/office/drawing/2010/main" val="0"/>
+              </a:ext>
+            </a:extLst>
+          </a:blip>
+          <a:stretch>
+            <a:fillRect/>
+          </a:stretch>
+        </p:blipFill>
         <p:spPr>
-          <a:xfrm rot="21436254">
-            <a:off x="895398" y="1210097"/>
-            <a:ext cx="6639865" cy="523220"/>
+          <a:xfrm>
+            <a:off x="6218238" y="2960070"/>
+            <a:ext cx="4937125" cy="2623786"/>
           </a:xfrm>
-          <a:prstGeom prst="rect">
-            <a:avLst/>
-          </a:prstGeom>
-          <a:noFill/>
         </p:spPr>
-        <p:txBody>
-          <a:bodyPr wrap="square" rtlCol="0">
-            <a:spAutoFit/>
-          </a:bodyPr>
-          <a:lstStyle/>
-          <a:p>
-            <a:r>
-              <a:rPr lang="en-US" sz="2800" dirty="0">
-                <a:solidFill>
-                  <a:srgbClr val="FF0000"/>
-                </a:solidFill>
-              </a:rPr>
-              <a:t>A better box plot figure here (Kendal)</a:t>
-            </a:r>
-          </a:p>
-        </p:txBody>
-      </p:sp>
+      </p:pic>
     </p:spTree>
     <p:extLst>
       <p:ext uri="{BB962C8B-B14F-4D97-AF65-F5344CB8AC3E}">
-        <p14:creationId xmlns:p14="http://schemas.microsoft.com/office/powerpoint/2010/main" val="272246308"/>
+        <p14:creationId xmlns:p14="http://schemas.microsoft.com/office/powerpoint/2010/main" val="2662703547"/>
       </p:ext>
     </p:extLst>
   </p:cSld>
@@ -7730,92 +8116,70 @@
       </p:grpSpPr>
       <p:sp>
         <p:nvSpPr>
-          <p:cNvPr id="2" name="TextBox 1">
+          <p:cNvPr id="2" name="Title 1">
             <a:extLst>
               <a:ext uri="{FF2B5EF4-FFF2-40B4-BE49-F238E27FC236}">
-                <a16:creationId xmlns:a16="http://schemas.microsoft.com/office/drawing/2014/main" id="{E3DCFDCF-7E8F-94A9-88D5-8EF1F657162B}"/>
+                <a16:creationId xmlns:a16="http://schemas.microsoft.com/office/drawing/2014/main" id="{EDECD4D6-B973-A1CD-ABE8-3EAA277FD6A0}"/>
               </a:ext>
             </a:extLst>
           </p:cNvPr>
-          <p:cNvSpPr txBox="1"/>
-          <p:nvPr/>
-        </p:nvSpPr>
+          <p:cNvSpPr>
+            <a:spLocks noGrp="1"/>
+          </p:cNvSpPr>
+          <p:nvPr>
+            <p:ph type="title"/>
+          </p:nvPr>
+        </p:nvSpPr>
+        <p:spPr/>
+        <p:txBody>
+          <a:bodyPr/>
+          <a:lstStyle/>
+          <a:p>
+            <a:r>
+              <a:rPr lang="en-US" dirty="0"/>
+              <a:t>Bivalent Booster Status – 65 plus</a:t>
+            </a:r>
+          </a:p>
+        </p:txBody>
+      </p:sp>
+      <p:pic>
+        <p:nvPicPr>
+          <p:cNvPr id="9" name="Content Placeholder 8">
+            <a:extLst>
+              <a:ext uri="{FF2B5EF4-FFF2-40B4-BE49-F238E27FC236}">
+                <a16:creationId xmlns:a16="http://schemas.microsoft.com/office/drawing/2014/main" id="{833C7D89-BCB1-38A9-4EDF-914309E230B7}"/>
+              </a:ext>
+            </a:extLst>
+          </p:cNvPr>
+          <p:cNvPicPr>
+            <a:picLocks noGrp="1" noChangeAspect="1"/>
+          </p:cNvPicPr>
+          <p:nvPr>
+            <p:ph idx="1"/>
+          </p:nvPr>
+        </p:nvPicPr>
+        <p:blipFill rotWithShape="1">
+          <a:blip r:embed="rId3">
+            <a:extLst>
+              <a:ext uri="{28A0092B-C50C-407E-A947-70E740481C1C}">
+                <a14:useLocalDpi xmlns:a14="http://schemas.microsoft.com/office/drawing/2010/main" val="0"/>
+              </a:ext>
+            </a:extLst>
+          </a:blip>
+          <a:srcRect l="3785" t="4896" r="1388" b="11887"/>
+          <a:stretch/>
+        </p:blipFill>
         <p:spPr>
           <a:xfrm>
-            <a:off x="569433" y="1157324"/>
-            <a:ext cx="11053134" cy="3108543"/>
+            <a:off x="1262129" y="1828800"/>
+            <a:ext cx="9311425" cy="4342638"/>
           </a:xfrm>
-          <a:prstGeom prst="rect">
-            <a:avLst/>
-          </a:prstGeom>
-          <a:noFill/>
         </p:spPr>
-        <p:txBody>
-          <a:bodyPr wrap="square" rtlCol="0">
-            <a:spAutoFit/>
-          </a:bodyPr>
-          <a:lstStyle/>
-          <a:p>
-            <a:r>
-              <a:rPr lang="en-US" sz="2800" dirty="0">
-                <a:solidFill>
-                  <a:srgbClr val="FF0000"/>
-                </a:solidFill>
-              </a:rPr>
-              <a:t>Correlation/Regression plots here. Pick the 2 most “interesting” plots. </a:t>
-            </a:r>
-          </a:p>
-          <a:p>
-            <a:r>
-              <a:rPr lang="en-US" sz="2800" dirty="0">
-                <a:solidFill>
-                  <a:srgbClr val="FF0000"/>
-                </a:solidFill>
-              </a:rPr>
-              <a:t>Or whichever plots provide easiest talking point for the speaker.</a:t>
-            </a:r>
-          </a:p>
-          <a:p>
-            <a:endParaRPr lang="en-US" sz="2800" dirty="0">
-              <a:solidFill>
-                <a:srgbClr val="FF0000"/>
-              </a:solidFill>
-            </a:endParaRPr>
-          </a:p>
-          <a:p>
-            <a:endParaRPr lang="en-US" sz="2800" dirty="0">
-              <a:solidFill>
-                <a:srgbClr val="FF0000"/>
-              </a:solidFill>
-            </a:endParaRPr>
-          </a:p>
-          <a:p>
-            <a:endParaRPr lang="en-US" sz="2800" dirty="0">
-              <a:solidFill>
-                <a:srgbClr val="FF0000"/>
-              </a:solidFill>
-            </a:endParaRPr>
-          </a:p>
-          <a:p>
-            <a:pPr marL="457200" indent="-457200">
-              <a:buFont typeface="Arial" panose="020B0604020202020204" pitchFamily="34" charset="0"/>
-              <a:buChar char="•"/>
-            </a:pPr>
-            <a:r>
-              <a:rPr lang="en-US" sz="2800" dirty="0">
-                <a:solidFill>
-                  <a:srgbClr val="FF0000"/>
-                </a:solidFill>
-              </a:rPr>
-              <a:t>Make a clear statement that there are many variables affecting the regression plots.</a:t>
-            </a:r>
-          </a:p>
-        </p:txBody>
-      </p:sp>
+      </p:pic>
     </p:spTree>
     <p:extLst>
       <p:ext uri="{BB962C8B-B14F-4D97-AF65-F5344CB8AC3E}">
-        <p14:creationId xmlns:p14="http://schemas.microsoft.com/office/powerpoint/2010/main" val="2755262538"/>
+        <p14:creationId xmlns:p14="http://schemas.microsoft.com/office/powerpoint/2010/main" val="3544784985"/>
       </p:ext>
     </p:extLst>
   </p:cSld>
@@ -7842,6 +8206,186 @@
           <a:chExt cx="0" cy="0"/>
         </a:xfrm>
       </p:grpSpPr>
+      <p:pic>
+        <p:nvPicPr>
+          <p:cNvPr id="21" name="Picture 20">
+            <a:extLst>
+              <a:ext uri="{FF2B5EF4-FFF2-40B4-BE49-F238E27FC236}">
+                <a16:creationId xmlns:a16="http://schemas.microsoft.com/office/drawing/2014/main" id="{FCAC4CE1-2D49-45F7-2A45-D622BCDEEB79}"/>
+              </a:ext>
+            </a:extLst>
+          </p:cNvPr>
+          <p:cNvPicPr>
+            <a:picLocks noChangeAspect="1"/>
+          </p:cNvPicPr>
+          <p:nvPr/>
+        </p:nvPicPr>
+        <p:blipFill>
+          <a:blip r:embed="rId2">
+            <a:extLst>
+              <a:ext uri="{28A0092B-C50C-407E-A947-70E740481C1C}">
+                <a14:useLocalDpi xmlns:a14="http://schemas.microsoft.com/office/drawing/2010/main" val="0"/>
+              </a:ext>
+            </a:extLst>
+          </a:blip>
+          <a:stretch>
+            <a:fillRect/>
+          </a:stretch>
+        </p:blipFill>
+        <p:spPr>
+          <a:xfrm>
+            <a:off x="1524000" y="0"/>
+            <a:ext cx="8444248" cy="6333186"/>
+          </a:xfrm>
+          <a:prstGeom prst="rect">
+            <a:avLst/>
+          </a:prstGeom>
+        </p:spPr>
+      </p:pic>
+    </p:spTree>
+    <p:extLst>
+      <p:ext uri="{BB962C8B-B14F-4D97-AF65-F5344CB8AC3E}">
+        <p14:creationId xmlns:p14="http://schemas.microsoft.com/office/powerpoint/2010/main" val="2516737796"/>
+      </p:ext>
+    </p:extLst>
+  </p:cSld>
+  <p:clrMapOvr>
+    <a:masterClrMapping/>
+  </p:clrMapOvr>
+</p:sld>
+</file>
+
+<file path=ppt/slides/slide25.xml><?xml version="1.0" encoding="utf-8"?>
+<p:sld xmlns:a="http://schemas.openxmlformats.org/drawingml/2006/main" xmlns:r="http://schemas.openxmlformats.org/officeDocument/2006/relationships" xmlns:p="http://schemas.openxmlformats.org/presentationml/2006/main">
+  <p:cSld>
+    <p:spTree>
+      <p:nvGrpSpPr>
+        <p:cNvPr id="1" name=""/>
+        <p:cNvGrpSpPr/>
+        <p:nvPr/>
+      </p:nvGrpSpPr>
+      <p:grpSpPr>
+        <a:xfrm>
+          <a:off x="0" y="0"/>
+          <a:ext cx="0" cy="0"/>
+          <a:chOff x="0" y="0"/>
+          <a:chExt cx="0" cy="0"/>
+        </a:xfrm>
+      </p:grpSpPr>
+      <p:sp>
+        <p:nvSpPr>
+          <p:cNvPr id="2" name="TextBox 1">
+            <a:extLst>
+              <a:ext uri="{FF2B5EF4-FFF2-40B4-BE49-F238E27FC236}">
+                <a16:creationId xmlns:a16="http://schemas.microsoft.com/office/drawing/2014/main" id="{E3DCFDCF-7E8F-94A9-88D5-8EF1F657162B}"/>
+              </a:ext>
+            </a:extLst>
+          </p:cNvPr>
+          <p:cNvSpPr txBox="1"/>
+          <p:nvPr/>
+        </p:nvSpPr>
+        <p:spPr>
+          <a:xfrm>
+            <a:off x="569433" y="1157324"/>
+            <a:ext cx="11053134" cy="3108543"/>
+          </a:xfrm>
+          <a:prstGeom prst="rect">
+            <a:avLst/>
+          </a:prstGeom>
+          <a:noFill/>
+        </p:spPr>
+        <p:txBody>
+          <a:bodyPr wrap="square" rtlCol="0">
+            <a:spAutoFit/>
+          </a:bodyPr>
+          <a:lstStyle/>
+          <a:p>
+            <a:r>
+              <a:rPr lang="en-US" sz="2800" dirty="0">
+                <a:solidFill>
+                  <a:srgbClr val="FF0000"/>
+                </a:solidFill>
+              </a:rPr>
+              <a:t>Correlation/Regression plots here. Pick the 2 most “interesting” plots. </a:t>
+            </a:r>
+          </a:p>
+          <a:p>
+            <a:r>
+              <a:rPr lang="en-US" sz="2800" dirty="0">
+                <a:solidFill>
+                  <a:srgbClr val="FF0000"/>
+                </a:solidFill>
+              </a:rPr>
+              <a:t>Or whichever plots provide easiest talking point for the speaker.</a:t>
+            </a:r>
+          </a:p>
+          <a:p>
+            <a:endParaRPr lang="en-US" sz="2800" dirty="0">
+              <a:solidFill>
+                <a:srgbClr val="FF0000"/>
+              </a:solidFill>
+            </a:endParaRPr>
+          </a:p>
+          <a:p>
+            <a:endParaRPr lang="en-US" sz="2800" dirty="0">
+              <a:solidFill>
+                <a:srgbClr val="FF0000"/>
+              </a:solidFill>
+            </a:endParaRPr>
+          </a:p>
+          <a:p>
+            <a:endParaRPr lang="en-US" sz="2800" dirty="0">
+              <a:solidFill>
+                <a:srgbClr val="FF0000"/>
+              </a:solidFill>
+            </a:endParaRPr>
+          </a:p>
+          <a:p>
+            <a:pPr marL="457200" indent="-457200">
+              <a:buFont typeface="Arial" panose="020B0604020202020204" pitchFamily="34" charset="0"/>
+              <a:buChar char="•"/>
+            </a:pPr>
+            <a:r>
+              <a:rPr lang="en-US" sz="2800" dirty="0">
+                <a:solidFill>
+                  <a:srgbClr val="FF0000"/>
+                </a:solidFill>
+              </a:rPr>
+              <a:t>Make a clear statement that there are many variables affecting the regression plots.</a:t>
+            </a:r>
+          </a:p>
+        </p:txBody>
+      </p:sp>
+    </p:spTree>
+    <p:extLst>
+      <p:ext uri="{BB962C8B-B14F-4D97-AF65-F5344CB8AC3E}">
+        <p14:creationId xmlns:p14="http://schemas.microsoft.com/office/powerpoint/2010/main" val="2755262538"/>
+      </p:ext>
+    </p:extLst>
+  </p:cSld>
+  <p:clrMapOvr>
+    <a:masterClrMapping/>
+  </p:clrMapOvr>
+</p:sld>
+</file>
+
+<file path=ppt/slides/slide26.xml><?xml version="1.0" encoding="utf-8"?>
+<p:sld xmlns:a="http://schemas.openxmlformats.org/drawingml/2006/main" xmlns:r="http://schemas.openxmlformats.org/officeDocument/2006/relationships" xmlns:p="http://schemas.openxmlformats.org/presentationml/2006/main">
+  <p:cSld>
+    <p:spTree>
+      <p:nvGrpSpPr>
+        <p:cNvPr id="1" name=""/>
+        <p:cNvGrpSpPr/>
+        <p:nvPr/>
+      </p:nvGrpSpPr>
+      <p:grpSpPr>
+        <a:xfrm>
+          <a:off x="0" y="0"/>
+          <a:ext cx="0" cy="0"/>
+          <a:chOff x="0" y="0"/>
+          <a:chExt cx="0" cy="0"/>
+        </a:xfrm>
+      </p:grpSpPr>
       <p:sp>
         <p:nvSpPr>
           <p:cNvPr id="2" name="Title 1">
@@ -7952,7 +8496,7 @@
 </p:sld>
 </file>
 
-<file path=ppt/slides/slide25.xml><?xml version="1.0" encoding="utf-8"?>
+<file path=ppt/slides/slide27.xml><?xml version="1.0" encoding="utf-8"?>
 <p:sld xmlns:a="http://schemas.openxmlformats.org/drawingml/2006/main" xmlns:r="http://schemas.openxmlformats.org/officeDocument/2006/relationships" xmlns:p="http://schemas.openxmlformats.org/presentationml/2006/main">
   <p:cSld>
     <p:spTree>

</xml_diff>

<commit_message>
adding one last slide to pptx Kendal 17 May 2023
</commit_message>
<xml_diff>
--- a/Project notes.pptx
+++ b/Project notes.pptx
@@ -5,7 +5,7 @@
     <p:sldMasterId id="2147483696" r:id="rId1"/>
   </p:sldMasterIdLst>
   <p:notesMasterIdLst>
-    <p:notesMasterId r:id="rId29"/>
+    <p:notesMasterId r:id="rId30"/>
   </p:notesMasterIdLst>
   <p:sldIdLst>
     <p:sldId id="256" r:id="rId2"/>
@@ -24,17 +24,18 @@
     <p:sldId id="269" r:id="rId15"/>
     <p:sldId id="271" r:id="rId16"/>
     <p:sldId id="277" r:id="rId17"/>
-    <p:sldId id="278" r:id="rId18"/>
-    <p:sldId id="272" r:id="rId19"/>
-    <p:sldId id="273" r:id="rId20"/>
-    <p:sldId id="283" r:id="rId21"/>
-    <p:sldId id="284" r:id="rId22"/>
-    <p:sldId id="285" r:id="rId23"/>
-    <p:sldId id="286" r:id="rId24"/>
-    <p:sldId id="287" r:id="rId25"/>
-    <p:sldId id="282" r:id="rId26"/>
-    <p:sldId id="274" r:id="rId27"/>
-    <p:sldId id="275" r:id="rId28"/>
+    <p:sldId id="288" r:id="rId18"/>
+    <p:sldId id="278" r:id="rId19"/>
+    <p:sldId id="272" r:id="rId20"/>
+    <p:sldId id="273" r:id="rId21"/>
+    <p:sldId id="283" r:id="rId22"/>
+    <p:sldId id="284" r:id="rId23"/>
+    <p:sldId id="285" r:id="rId24"/>
+    <p:sldId id="286" r:id="rId25"/>
+    <p:sldId id="287" r:id="rId26"/>
+    <p:sldId id="282" r:id="rId27"/>
+    <p:sldId id="274" r:id="rId28"/>
+    <p:sldId id="275" r:id="rId29"/>
   </p:sldIdLst>
   <p:sldSz cx="12192000" cy="6858000"/>
   <p:notesSz cx="6858000" cy="9144000"/>
@@ -840,7 +841,7 @@
           <a:p>
             <a:fld id="{F1D59B1D-B0BC-4C10-A0E9-E068C37A006F}" type="slidenum">
               <a:rPr lang="en-US" smtClean="0"/>
-              <a:t>22</a:t>
+              <a:t>23</a:t>
             </a:fld>
             <a:endParaRPr lang="en-US"/>
           </a:p>
@@ -927,7 +928,7 @@
           <a:p>
             <a:fld id="{F1D59B1D-B0BC-4C10-A0E9-E068C37A006F}" type="slidenum">
               <a:rPr lang="en-US" smtClean="0"/>
-              <a:t>23</a:t>
+              <a:t>24</a:t>
             </a:fld>
             <a:endParaRPr lang="en-US"/>
           </a:p>
@@ -6704,6 +6705,136 @@
 </file>
 
 <file path=ppt/slides/slide17.xml><?xml version="1.0" encoding="utf-8"?>
+<p:sld xmlns:a="http://schemas.openxmlformats.org/drawingml/2006/main" xmlns:r="http://schemas.openxmlformats.org/officeDocument/2006/relationships" xmlns:p="http://schemas.openxmlformats.org/presentationml/2006/main">
+  <p:cSld>
+    <p:spTree>
+      <p:nvGrpSpPr>
+        <p:cNvPr id="1" name=""/>
+        <p:cNvGrpSpPr/>
+        <p:nvPr/>
+      </p:nvGrpSpPr>
+      <p:grpSpPr>
+        <a:xfrm>
+          <a:off x="0" y="0"/>
+          <a:ext cx="0" cy="0"/>
+          <a:chOff x="0" y="0"/>
+          <a:chExt cx="0" cy="0"/>
+        </a:xfrm>
+      </p:grpSpPr>
+      <p:sp>
+        <p:nvSpPr>
+          <p:cNvPr id="6" name="Title 5">
+            <a:extLst>
+              <a:ext uri="{FF2B5EF4-FFF2-40B4-BE49-F238E27FC236}">
+                <a16:creationId xmlns:a16="http://schemas.microsoft.com/office/drawing/2014/main" id="{3435514F-098A-5E0B-B259-D04424AF5714}"/>
+              </a:ext>
+            </a:extLst>
+          </p:cNvPr>
+          <p:cNvSpPr>
+            <a:spLocks noGrp="1"/>
+          </p:cNvSpPr>
+          <p:nvPr>
+            <p:ph type="title"/>
+          </p:nvPr>
+        </p:nvSpPr>
+        <p:spPr/>
+        <p:txBody>
+          <a:bodyPr>
+            <a:normAutofit/>
+          </a:bodyPr>
+          <a:lstStyle/>
+          <a:p>
+            <a:r>
+              <a:rPr lang="en-US" sz="4000" dirty="0"/>
+              <a:t>Spending Categories – Vaccine Programs vs. All</a:t>
+            </a:r>
+          </a:p>
+        </p:txBody>
+      </p:sp>
+      <p:pic>
+        <p:nvPicPr>
+          <p:cNvPr id="5" name="Content Placeholder 4">
+            <a:extLst>
+              <a:ext uri="{FF2B5EF4-FFF2-40B4-BE49-F238E27FC236}">
+                <a16:creationId xmlns:a16="http://schemas.microsoft.com/office/drawing/2014/main" id="{6378681D-6641-8C47-8966-F540AEC89672}"/>
+              </a:ext>
+            </a:extLst>
+          </p:cNvPr>
+          <p:cNvPicPr>
+            <a:picLocks noGrp="1" noChangeAspect="1"/>
+          </p:cNvPicPr>
+          <p:nvPr>
+            <p:ph sz="half" idx="1"/>
+          </p:nvPr>
+        </p:nvPicPr>
+        <p:blipFill>
+          <a:blip r:embed="rId2">
+            <a:extLst>
+              <a:ext uri="{28A0092B-C50C-407E-A947-70E740481C1C}">
+                <a14:useLocalDpi xmlns:a14="http://schemas.microsoft.com/office/drawing/2010/main" val="0"/>
+              </a:ext>
+            </a:extLst>
+          </a:blip>
+          <a:stretch>
+            <a:fillRect/>
+          </a:stretch>
+        </p:blipFill>
+        <p:spPr>
+          <a:xfrm>
+            <a:off x="1096963" y="2184713"/>
+            <a:ext cx="4938712" cy="3345824"/>
+          </a:xfrm>
+        </p:spPr>
+      </p:pic>
+      <p:pic>
+        <p:nvPicPr>
+          <p:cNvPr id="9" name="Content Placeholder 8">
+            <a:extLst>
+              <a:ext uri="{FF2B5EF4-FFF2-40B4-BE49-F238E27FC236}">
+                <a16:creationId xmlns:a16="http://schemas.microsoft.com/office/drawing/2014/main" id="{6178E1A5-BC4A-0506-FA91-8BD00FADFF29}"/>
+              </a:ext>
+            </a:extLst>
+          </p:cNvPr>
+          <p:cNvPicPr>
+            <a:picLocks noGrp="1" noChangeAspect="1"/>
+          </p:cNvPicPr>
+          <p:nvPr>
+            <p:ph sz="half" idx="2"/>
+          </p:nvPr>
+        </p:nvPicPr>
+        <p:blipFill>
+          <a:blip r:embed="rId3">
+            <a:extLst>
+              <a:ext uri="{28A0092B-C50C-407E-A947-70E740481C1C}">
+                <a14:useLocalDpi xmlns:a14="http://schemas.microsoft.com/office/drawing/2010/main" val="0"/>
+              </a:ext>
+            </a:extLst>
+          </a:blip>
+          <a:stretch>
+            <a:fillRect/>
+          </a:stretch>
+        </p:blipFill>
+        <p:spPr>
+          <a:xfrm>
+            <a:off x="6218238" y="2185251"/>
+            <a:ext cx="4937125" cy="3344749"/>
+          </a:xfrm>
+        </p:spPr>
+      </p:pic>
+    </p:spTree>
+    <p:extLst>
+      <p:ext uri="{BB962C8B-B14F-4D97-AF65-F5344CB8AC3E}">
+        <p14:creationId xmlns:p14="http://schemas.microsoft.com/office/powerpoint/2010/main" val="949853168"/>
+      </p:ext>
+    </p:extLst>
+  </p:cSld>
+  <p:clrMapOvr>
+    <a:masterClrMapping/>
+  </p:clrMapOvr>
+</p:sld>
+</file>
+
+<file path=ppt/slides/slide18.xml><?xml version="1.0" encoding="utf-8"?>
 <p:sld xmlns:a="http://schemas.openxmlformats.org/drawingml/2006/main" xmlns:r="http://schemas.openxmlformats.org/officeDocument/2006/relationships" xmlns:p="http://schemas.openxmlformats.org/presentationml/2006/main" show="0">
   <p:cSld>
     <p:spTree>
@@ -6826,7 +6957,7 @@
 </p:sld>
 </file>
 
-<file path=ppt/slides/slide18.xml><?xml version="1.0" encoding="utf-8"?>
+<file path=ppt/slides/slide19.xml><?xml version="1.0" encoding="utf-8"?>
 <p:sld xmlns:a="http://schemas.openxmlformats.org/drawingml/2006/main" xmlns:r="http://schemas.openxmlformats.org/officeDocument/2006/relationships" xmlns:p="http://schemas.openxmlformats.org/presentationml/2006/main">
   <p:cSld>
     <p:spTree>
@@ -7057,189 +7188,6 @@
 </p:sld>
 </file>
 
-<file path=ppt/slides/slide19.xml><?xml version="1.0" encoding="utf-8"?>
-<p:sld xmlns:a="http://schemas.openxmlformats.org/drawingml/2006/main" xmlns:r="http://schemas.openxmlformats.org/officeDocument/2006/relationships" xmlns:p="http://schemas.openxmlformats.org/presentationml/2006/main">
-  <p:cSld>
-    <p:spTree>
-      <p:nvGrpSpPr>
-        <p:cNvPr id="1" name=""/>
-        <p:cNvGrpSpPr/>
-        <p:nvPr/>
-      </p:nvGrpSpPr>
-      <p:grpSpPr>
-        <a:xfrm>
-          <a:off x="0" y="0"/>
-          <a:ext cx="0" cy="0"/>
-          <a:chOff x="0" y="0"/>
-          <a:chExt cx="0" cy="0"/>
-        </a:xfrm>
-      </p:grpSpPr>
-      <p:sp>
-        <p:nvSpPr>
-          <p:cNvPr id="2" name="Title 1">
-            <a:extLst>
-              <a:ext uri="{FF2B5EF4-FFF2-40B4-BE49-F238E27FC236}">
-                <a16:creationId xmlns:a16="http://schemas.microsoft.com/office/drawing/2014/main" id="{8D762A82-5C67-55DD-9A6F-0C7827E11DE6}"/>
-              </a:ext>
-            </a:extLst>
-          </p:cNvPr>
-          <p:cNvSpPr>
-            <a:spLocks noGrp="1"/>
-          </p:cNvSpPr>
-          <p:nvPr>
-            <p:ph type="title"/>
-          </p:nvPr>
-        </p:nvSpPr>
-        <p:spPr/>
-        <p:txBody>
-          <a:bodyPr>
-            <a:normAutofit/>
-          </a:bodyPr>
-          <a:lstStyle/>
-          <a:p>
-            <a:r>
-              <a:rPr lang="en-US" dirty="0"/>
-              <a:t>The analysis process</a:t>
-            </a:r>
-          </a:p>
-        </p:txBody>
-      </p:sp>
-      <p:sp>
-        <p:nvSpPr>
-          <p:cNvPr id="3" name="Content Placeholder 2">
-            <a:extLst>
-              <a:ext uri="{FF2B5EF4-FFF2-40B4-BE49-F238E27FC236}">
-                <a16:creationId xmlns:a16="http://schemas.microsoft.com/office/drawing/2014/main" id="{AF3F6DD1-CDA7-163A-9A93-EF1AD6EE2659}"/>
-              </a:ext>
-            </a:extLst>
-          </p:cNvPr>
-          <p:cNvSpPr>
-            <a:spLocks noGrp="1"/>
-          </p:cNvSpPr>
-          <p:nvPr>
-            <p:ph idx="1"/>
-          </p:nvPr>
-        </p:nvSpPr>
-        <p:spPr/>
-        <p:txBody>
-          <a:bodyPr>
-            <a:normAutofit/>
-          </a:bodyPr>
-          <a:lstStyle/>
-          <a:p>
-            <a:pPr marL="0" indent="0">
-              <a:buNone/>
-            </a:pPr>
-            <a:r>
-              <a:rPr lang="en-US" strike="sngStrike" dirty="0">
-                <a:solidFill>
-                  <a:srgbClr val="FF0000"/>
-                </a:solidFill>
-              </a:rPr>
-              <a:t>Here’s where we show, don’t tell:</a:t>
-            </a:r>
-            <a:endParaRPr lang="en-US" dirty="0"/>
-          </a:p>
-          <a:p>
-            <a:pPr>
-              <a:buFont typeface="Wingdings" panose="05000000000000000000" pitchFamily="2" charset="2"/>
-              <a:buChar char="§"/>
-            </a:pPr>
-            <a:r>
-              <a:rPr lang="en-US" dirty="0"/>
-              <a:t> Slides showing state heatmaps.</a:t>
-            </a:r>
-          </a:p>
-          <a:p>
-            <a:pPr>
-              <a:buFont typeface="Wingdings" panose="05000000000000000000" pitchFamily="2" charset="2"/>
-              <a:buChar char="§"/>
-            </a:pPr>
-            <a:endParaRPr lang="en-US" dirty="0"/>
-          </a:p>
-          <a:p>
-            <a:pPr>
-              <a:buFont typeface="Wingdings" panose="05000000000000000000" pitchFamily="2" charset="2"/>
-              <a:buChar char="§"/>
-            </a:pPr>
-            <a:r>
-              <a:rPr lang="en-US" strike="sngStrike" dirty="0"/>
-              <a:t> Then bar charts for categories by state (spending or count of charts for top 3 or 4 vaccinator states).</a:t>
-            </a:r>
-          </a:p>
-          <a:p>
-            <a:pPr>
-              <a:buFont typeface="Wingdings" panose="05000000000000000000" pitchFamily="2" charset="2"/>
-              <a:buChar char="§"/>
-            </a:pPr>
-            <a:endParaRPr lang="en-US" dirty="0"/>
-          </a:p>
-          <a:p>
-            <a:pPr>
-              <a:buFont typeface="Wingdings" panose="05000000000000000000" pitchFamily="2" charset="2"/>
-              <a:buChar char="§"/>
-            </a:pPr>
-            <a:r>
-              <a:rPr lang="en-US" dirty="0"/>
-              <a:t> Then what?? At least 1 correlation/regression plot? Would be moreso to showcase our ability to use the method.</a:t>
-            </a:r>
-          </a:p>
-        </p:txBody>
-      </p:sp>
-      <p:sp>
-        <p:nvSpPr>
-          <p:cNvPr id="4" name="TextBox 3">
-            <a:extLst>
-              <a:ext uri="{FF2B5EF4-FFF2-40B4-BE49-F238E27FC236}">
-                <a16:creationId xmlns:a16="http://schemas.microsoft.com/office/drawing/2014/main" id="{A6A7A421-47E1-B407-409D-9346D51D5780}"/>
-              </a:ext>
-            </a:extLst>
-          </p:cNvPr>
-          <p:cNvSpPr txBox="1"/>
-          <p:nvPr/>
-        </p:nvSpPr>
-        <p:spPr>
-          <a:xfrm>
-            <a:off x="211494" y="346401"/>
-            <a:ext cx="11522418" cy="523220"/>
-          </a:xfrm>
-          <a:prstGeom prst="rect">
-            <a:avLst/>
-          </a:prstGeom>
-          <a:solidFill>
-            <a:schemeClr val="bg1"/>
-          </a:solidFill>
-        </p:spPr>
-        <p:txBody>
-          <a:bodyPr wrap="square" rtlCol="0">
-            <a:spAutoFit/>
-          </a:bodyPr>
-          <a:lstStyle/>
-          <a:p>
-            <a:r>
-              <a:rPr lang="en-US" sz="2800" dirty="0">
-                <a:solidFill>
-                  <a:srgbClr val="FF0000"/>
-                </a:solidFill>
-              </a:rPr>
-              <a:t>!! We can drop this slide after the analysis plots are in their respective slides</a:t>
-            </a:r>
-          </a:p>
-        </p:txBody>
-      </p:sp>
-    </p:spTree>
-    <p:extLst>
-      <p:ext uri="{BB962C8B-B14F-4D97-AF65-F5344CB8AC3E}">
-        <p14:creationId xmlns:p14="http://schemas.microsoft.com/office/powerpoint/2010/main" val="1611749723"/>
-      </p:ext>
-    </p:extLst>
-  </p:cSld>
-  <p:clrMapOvr>
-    <a:masterClrMapping/>
-  </p:clrMapOvr>
-</p:sld>
-</file>
-
 <file path=ppt/slides/slide2.xml><?xml version="1.0" encoding="utf-8"?>
 <p:sld xmlns:a="http://schemas.openxmlformats.org/drawingml/2006/main" xmlns:r="http://schemas.openxmlformats.org/officeDocument/2006/relationships" xmlns:p="http://schemas.openxmlformats.org/presentationml/2006/main" show="0">
   <p:cSld>
@@ -7573,6 +7521,189 @@
 </file>
 
 <file path=ppt/slides/slide20.xml><?xml version="1.0" encoding="utf-8"?>
+<p:sld xmlns:a="http://schemas.openxmlformats.org/drawingml/2006/main" xmlns:r="http://schemas.openxmlformats.org/officeDocument/2006/relationships" xmlns:p="http://schemas.openxmlformats.org/presentationml/2006/main">
+  <p:cSld>
+    <p:spTree>
+      <p:nvGrpSpPr>
+        <p:cNvPr id="1" name=""/>
+        <p:cNvGrpSpPr/>
+        <p:nvPr/>
+      </p:nvGrpSpPr>
+      <p:grpSpPr>
+        <a:xfrm>
+          <a:off x="0" y="0"/>
+          <a:ext cx="0" cy="0"/>
+          <a:chOff x="0" y="0"/>
+          <a:chExt cx="0" cy="0"/>
+        </a:xfrm>
+      </p:grpSpPr>
+      <p:sp>
+        <p:nvSpPr>
+          <p:cNvPr id="2" name="Title 1">
+            <a:extLst>
+              <a:ext uri="{FF2B5EF4-FFF2-40B4-BE49-F238E27FC236}">
+                <a16:creationId xmlns:a16="http://schemas.microsoft.com/office/drawing/2014/main" id="{8D762A82-5C67-55DD-9A6F-0C7827E11DE6}"/>
+              </a:ext>
+            </a:extLst>
+          </p:cNvPr>
+          <p:cNvSpPr>
+            <a:spLocks noGrp="1"/>
+          </p:cNvSpPr>
+          <p:nvPr>
+            <p:ph type="title"/>
+          </p:nvPr>
+        </p:nvSpPr>
+        <p:spPr/>
+        <p:txBody>
+          <a:bodyPr>
+            <a:normAutofit/>
+          </a:bodyPr>
+          <a:lstStyle/>
+          <a:p>
+            <a:r>
+              <a:rPr lang="en-US" dirty="0"/>
+              <a:t>The analysis process</a:t>
+            </a:r>
+          </a:p>
+        </p:txBody>
+      </p:sp>
+      <p:sp>
+        <p:nvSpPr>
+          <p:cNvPr id="3" name="Content Placeholder 2">
+            <a:extLst>
+              <a:ext uri="{FF2B5EF4-FFF2-40B4-BE49-F238E27FC236}">
+                <a16:creationId xmlns:a16="http://schemas.microsoft.com/office/drawing/2014/main" id="{AF3F6DD1-CDA7-163A-9A93-EF1AD6EE2659}"/>
+              </a:ext>
+            </a:extLst>
+          </p:cNvPr>
+          <p:cNvSpPr>
+            <a:spLocks noGrp="1"/>
+          </p:cNvSpPr>
+          <p:nvPr>
+            <p:ph idx="1"/>
+          </p:nvPr>
+        </p:nvSpPr>
+        <p:spPr/>
+        <p:txBody>
+          <a:bodyPr>
+            <a:normAutofit/>
+          </a:bodyPr>
+          <a:lstStyle/>
+          <a:p>
+            <a:pPr marL="0" indent="0">
+              <a:buNone/>
+            </a:pPr>
+            <a:r>
+              <a:rPr lang="en-US" strike="sngStrike" dirty="0">
+                <a:solidFill>
+                  <a:srgbClr val="FF0000"/>
+                </a:solidFill>
+              </a:rPr>
+              <a:t>Here’s where we show, don’t tell:</a:t>
+            </a:r>
+            <a:endParaRPr lang="en-US" dirty="0"/>
+          </a:p>
+          <a:p>
+            <a:pPr>
+              <a:buFont typeface="Wingdings" panose="05000000000000000000" pitchFamily="2" charset="2"/>
+              <a:buChar char="§"/>
+            </a:pPr>
+            <a:r>
+              <a:rPr lang="en-US" dirty="0"/>
+              <a:t> Slides showing state heatmaps.</a:t>
+            </a:r>
+          </a:p>
+          <a:p>
+            <a:pPr>
+              <a:buFont typeface="Wingdings" panose="05000000000000000000" pitchFamily="2" charset="2"/>
+              <a:buChar char="§"/>
+            </a:pPr>
+            <a:endParaRPr lang="en-US" dirty="0"/>
+          </a:p>
+          <a:p>
+            <a:pPr>
+              <a:buFont typeface="Wingdings" panose="05000000000000000000" pitchFamily="2" charset="2"/>
+              <a:buChar char="§"/>
+            </a:pPr>
+            <a:r>
+              <a:rPr lang="en-US" strike="sngStrike" dirty="0"/>
+              <a:t> Then bar charts for categories by state (spending or count of charts for top 3 or 4 vaccinator states).</a:t>
+            </a:r>
+          </a:p>
+          <a:p>
+            <a:pPr>
+              <a:buFont typeface="Wingdings" panose="05000000000000000000" pitchFamily="2" charset="2"/>
+              <a:buChar char="§"/>
+            </a:pPr>
+            <a:endParaRPr lang="en-US" dirty="0"/>
+          </a:p>
+          <a:p>
+            <a:pPr>
+              <a:buFont typeface="Wingdings" panose="05000000000000000000" pitchFamily="2" charset="2"/>
+              <a:buChar char="§"/>
+            </a:pPr>
+            <a:r>
+              <a:rPr lang="en-US" dirty="0"/>
+              <a:t> Then what?? At least 1 correlation/regression plot? Would be moreso to showcase our ability to use the method.</a:t>
+            </a:r>
+          </a:p>
+        </p:txBody>
+      </p:sp>
+      <p:sp>
+        <p:nvSpPr>
+          <p:cNvPr id="4" name="TextBox 3">
+            <a:extLst>
+              <a:ext uri="{FF2B5EF4-FFF2-40B4-BE49-F238E27FC236}">
+                <a16:creationId xmlns:a16="http://schemas.microsoft.com/office/drawing/2014/main" id="{A6A7A421-47E1-B407-409D-9346D51D5780}"/>
+              </a:ext>
+            </a:extLst>
+          </p:cNvPr>
+          <p:cNvSpPr txBox="1"/>
+          <p:nvPr/>
+        </p:nvSpPr>
+        <p:spPr>
+          <a:xfrm>
+            <a:off x="211494" y="346401"/>
+            <a:ext cx="11522418" cy="523220"/>
+          </a:xfrm>
+          <a:prstGeom prst="rect">
+            <a:avLst/>
+          </a:prstGeom>
+          <a:solidFill>
+            <a:schemeClr val="bg1"/>
+          </a:solidFill>
+        </p:spPr>
+        <p:txBody>
+          <a:bodyPr wrap="square" rtlCol="0">
+            <a:spAutoFit/>
+          </a:bodyPr>
+          <a:lstStyle/>
+          <a:p>
+            <a:r>
+              <a:rPr lang="en-US" sz="2800" dirty="0">
+                <a:solidFill>
+                  <a:srgbClr val="FF0000"/>
+                </a:solidFill>
+              </a:rPr>
+              <a:t>!! We can drop this slide after the analysis plots are in their respective slides</a:t>
+            </a:r>
+          </a:p>
+        </p:txBody>
+      </p:sp>
+    </p:spTree>
+    <p:extLst>
+      <p:ext uri="{BB962C8B-B14F-4D97-AF65-F5344CB8AC3E}">
+        <p14:creationId xmlns:p14="http://schemas.microsoft.com/office/powerpoint/2010/main" val="1611749723"/>
+      </p:ext>
+    </p:extLst>
+  </p:cSld>
+  <p:clrMapOvr>
+    <a:masterClrMapping/>
+  </p:clrMapOvr>
+</p:sld>
+</file>
+
+<file path=ppt/slides/slide21.xml><?xml version="1.0" encoding="utf-8"?>
 <p:sld xmlns:a="http://schemas.openxmlformats.org/drawingml/2006/main" xmlns:r="http://schemas.openxmlformats.org/officeDocument/2006/relationships" xmlns:p="http://schemas.openxmlformats.org/presentationml/2006/main">
   <p:cSld>
     <p:spTree>
@@ -7721,7 +7852,7 @@
 </p:sld>
 </file>
 
-<file path=ppt/slides/slide21.xml><?xml version="1.0" encoding="utf-8"?>
+<file path=ppt/slides/slide22.xml><?xml version="1.0" encoding="utf-8"?>
 <p:sld xmlns:a="http://schemas.openxmlformats.org/drawingml/2006/main" xmlns:r="http://schemas.openxmlformats.org/officeDocument/2006/relationships" xmlns:p="http://schemas.openxmlformats.org/presentationml/2006/main">
   <p:cSld>
     <p:spTree>
@@ -7909,7 +8040,7 @@
 </p:sld>
 </file>
 
-<file path=ppt/slides/slide22.xml><?xml version="1.0" encoding="utf-8"?>
+<file path=ppt/slides/slide23.xml><?xml version="1.0" encoding="utf-8"?>
 <p:sld xmlns:a="http://schemas.openxmlformats.org/drawingml/2006/main" xmlns:r="http://schemas.openxmlformats.org/officeDocument/2006/relationships" xmlns:p="http://schemas.openxmlformats.org/presentationml/2006/main">
   <p:cSld>
     <p:spTree>
@@ -8097,7 +8228,7 @@
 </p:sld>
 </file>
 
-<file path=ppt/slides/slide23.xml><?xml version="1.0" encoding="utf-8"?>
+<file path=ppt/slides/slide24.xml><?xml version="1.0" encoding="utf-8"?>
 <p:sld xmlns:a="http://schemas.openxmlformats.org/drawingml/2006/main" xmlns:r="http://schemas.openxmlformats.org/officeDocument/2006/relationships" xmlns:p="http://schemas.openxmlformats.org/presentationml/2006/main">
   <p:cSld>
     <p:spTree>
@@ -8189,7 +8320,7 @@
 </p:sld>
 </file>
 
-<file path=ppt/slides/slide24.xml><?xml version="1.0" encoding="utf-8"?>
+<file path=ppt/slides/slide25.xml><?xml version="1.0" encoding="utf-8"?>
 <p:sld xmlns:a="http://schemas.openxmlformats.org/drawingml/2006/main" xmlns:r="http://schemas.openxmlformats.org/officeDocument/2006/relationships" xmlns:p="http://schemas.openxmlformats.org/presentationml/2006/main">
   <p:cSld>
     <p:spTree>
@@ -8255,120 +8386,6 @@
 </p:sld>
 </file>
 
-<file path=ppt/slides/slide25.xml><?xml version="1.0" encoding="utf-8"?>
-<p:sld xmlns:a="http://schemas.openxmlformats.org/drawingml/2006/main" xmlns:r="http://schemas.openxmlformats.org/officeDocument/2006/relationships" xmlns:p="http://schemas.openxmlformats.org/presentationml/2006/main">
-  <p:cSld>
-    <p:spTree>
-      <p:nvGrpSpPr>
-        <p:cNvPr id="1" name=""/>
-        <p:cNvGrpSpPr/>
-        <p:nvPr/>
-      </p:nvGrpSpPr>
-      <p:grpSpPr>
-        <a:xfrm>
-          <a:off x="0" y="0"/>
-          <a:ext cx="0" cy="0"/>
-          <a:chOff x="0" y="0"/>
-          <a:chExt cx="0" cy="0"/>
-        </a:xfrm>
-      </p:grpSpPr>
-      <p:sp>
-        <p:nvSpPr>
-          <p:cNvPr id="2" name="TextBox 1">
-            <a:extLst>
-              <a:ext uri="{FF2B5EF4-FFF2-40B4-BE49-F238E27FC236}">
-                <a16:creationId xmlns:a16="http://schemas.microsoft.com/office/drawing/2014/main" id="{E3DCFDCF-7E8F-94A9-88D5-8EF1F657162B}"/>
-              </a:ext>
-            </a:extLst>
-          </p:cNvPr>
-          <p:cNvSpPr txBox="1"/>
-          <p:nvPr/>
-        </p:nvSpPr>
-        <p:spPr>
-          <a:xfrm>
-            <a:off x="569433" y="1157324"/>
-            <a:ext cx="11053134" cy="3108543"/>
-          </a:xfrm>
-          <a:prstGeom prst="rect">
-            <a:avLst/>
-          </a:prstGeom>
-          <a:noFill/>
-        </p:spPr>
-        <p:txBody>
-          <a:bodyPr wrap="square" rtlCol="0">
-            <a:spAutoFit/>
-          </a:bodyPr>
-          <a:lstStyle/>
-          <a:p>
-            <a:r>
-              <a:rPr lang="en-US" sz="2800" dirty="0">
-                <a:solidFill>
-                  <a:srgbClr val="FF0000"/>
-                </a:solidFill>
-              </a:rPr>
-              <a:t>Correlation/Regression plots here. Pick the 2 most “interesting” plots. </a:t>
-            </a:r>
-          </a:p>
-          <a:p>
-            <a:r>
-              <a:rPr lang="en-US" sz="2800" dirty="0">
-                <a:solidFill>
-                  <a:srgbClr val="FF0000"/>
-                </a:solidFill>
-              </a:rPr>
-              <a:t>Or whichever plots provide easiest talking point for the speaker.</a:t>
-            </a:r>
-          </a:p>
-          <a:p>
-            <a:endParaRPr lang="en-US" sz="2800" dirty="0">
-              <a:solidFill>
-                <a:srgbClr val="FF0000"/>
-              </a:solidFill>
-            </a:endParaRPr>
-          </a:p>
-          <a:p>
-            <a:endParaRPr lang="en-US" sz="2800" dirty="0">
-              <a:solidFill>
-                <a:srgbClr val="FF0000"/>
-              </a:solidFill>
-            </a:endParaRPr>
-          </a:p>
-          <a:p>
-            <a:endParaRPr lang="en-US" sz="2800" dirty="0">
-              <a:solidFill>
-                <a:srgbClr val="FF0000"/>
-              </a:solidFill>
-            </a:endParaRPr>
-          </a:p>
-          <a:p>
-            <a:pPr marL="457200" indent="-457200">
-              <a:buFont typeface="Arial" panose="020B0604020202020204" pitchFamily="34" charset="0"/>
-              <a:buChar char="•"/>
-            </a:pPr>
-            <a:r>
-              <a:rPr lang="en-US" sz="2800" dirty="0">
-                <a:solidFill>
-                  <a:srgbClr val="FF0000"/>
-                </a:solidFill>
-              </a:rPr>
-              <a:t>Make a clear statement that there are many variables affecting the regression plots.</a:t>
-            </a:r>
-          </a:p>
-        </p:txBody>
-      </p:sp>
-    </p:spTree>
-    <p:extLst>
-      <p:ext uri="{BB962C8B-B14F-4D97-AF65-F5344CB8AC3E}">
-        <p14:creationId xmlns:p14="http://schemas.microsoft.com/office/powerpoint/2010/main" val="2755262538"/>
-      </p:ext>
-    </p:extLst>
-  </p:cSld>
-  <p:clrMapOvr>
-    <a:masterClrMapping/>
-  </p:clrMapOvr>
-</p:sld>
-</file>
-
 <file path=ppt/slides/slide26.xml><?xml version="1.0" encoding="utf-8"?>
 <p:sld xmlns:a="http://schemas.openxmlformats.org/drawingml/2006/main" xmlns:r="http://schemas.openxmlformats.org/officeDocument/2006/relationships" xmlns:p="http://schemas.openxmlformats.org/presentationml/2006/main">
   <p:cSld>
@@ -8388,6 +8405,120 @@
       </p:grpSpPr>
       <p:sp>
         <p:nvSpPr>
+          <p:cNvPr id="2" name="TextBox 1">
+            <a:extLst>
+              <a:ext uri="{FF2B5EF4-FFF2-40B4-BE49-F238E27FC236}">
+                <a16:creationId xmlns:a16="http://schemas.microsoft.com/office/drawing/2014/main" id="{E3DCFDCF-7E8F-94A9-88D5-8EF1F657162B}"/>
+              </a:ext>
+            </a:extLst>
+          </p:cNvPr>
+          <p:cNvSpPr txBox="1"/>
+          <p:nvPr/>
+        </p:nvSpPr>
+        <p:spPr>
+          <a:xfrm>
+            <a:off x="569433" y="1157324"/>
+            <a:ext cx="11053134" cy="3108543"/>
+          </a:xfrm>
+          <a:prstGeom prst="rect">
+            <a:avLst/>
+          </a:prstGeom>
+          <a:noFill/>
+        </p:spPr>
+        <p:txBody>
+          <a:bodyPr wrap="square" rtlCol="0">
+            <a:spAutoFit/>
+          </a:bodyPr>
+          <a:lstStyle/>
+          <a:p>
+            <a:r>
+              <a:rPr lang="en-US" sz="2800" dirty="0">
+                <a:solidFill>
+                  <a:srgbClr val="FF0000"/>
+                </a:solidFill>
+              </a:rPr>
+              <a:t>Correlation/Regression plots here. Pick the 2 most “interesting” plots. </a:t>
+            </a:r>
+          </a:p>
+          <a:p>
+            <a:r>
+              <a:rPr lang="en-US" sz="2800" dirty="0">
+                <a:solidFill>
+                  <a:srgbClr val="FF0000"/>
+                </a:solidFill>
+              </a:rPr>
+              <a:t>Or whichever plots provide easiest talking point for the speaker.</a:t>
+            </a:r>
+          </a:p>
+          <a:p>
+            <a:endParaRPr lang="en-US" sz="2800" dirty="0">
+              <a:solidFill>
+                <a:srgbClr val="FF0000"/>
+              </a:solidFill>
+            </a:endParaRPr>
+          </a:p>
+          <a:p>
+            <a:endParaRPr lang="en-US" sz="2800" dirty="0">
+              <a:solidFill>
+                <a:srgbClr val="FF0000"/>
+              </a:solidFill>
+            </a:endParaRPr>
+          </a:p>
+          <a:p>
+            <a:endParaRPr lang="en-US" sz="2800" dirty="0">
+              <a:solidFill>
+                <a:srgbClr val="FF0000"/>
+              </a:solidFill>
+            </a:endParaRPr>
+          </a:p>
+          <a:p>
+            <a:pPr marL="457200" indent="-457200">
+              <a:buFont typeface="Arial" panose="020B0604020202020204" pitchFamily="34" charset="0"/>
+              <a:buChar char="•"/>
+            </a:pPr>
+            <a:r>
+              <a:rPr lang="en-US" sz="2800" dirty="0">
+                <a:solidFill>
+                  <a:srgbClr val="FF0000"/>
+                </a:solidFill>
+              </a:rPr>
+              <a:t>Make a clear statement that there are many variables affecting the regression plots.</a:t>
+            </a:r>
+          </a:p>
+        </p:txBody>
+      </p:sp>
+    </p:spTree>
+    <p:extLst>
+      <p:ext uri="{BB962C8B-B14F-4D97-AF65-F5344CB8AC3E}">
+        <p14:creationId xmlns:p14="http://schemas.microsoft.com/office/powerpoint/2010/main" val="2755262538"/>
+      </p:ext>
+    </p:extLst>
+  </p:cSld>
+  <p:clrMapOvr>
+    <a:masterClrMapping/>
+  </p:clrMapOvr>
+</p:sld>
+</file>
+
+<file path=ppt/slides/slide27.xml><?xml version="1.0" encoding="utf-8"?>
+<p:sld xmlns:a="http://schemas.openxmlformats.org/drawingml/2006/main" xmlns:r="http://schemas.openxmlformats.org/officeDocument/2006/relationships" xmlns:p="http://schemas.openxmlformats.org/presentationml/2006/main">
+  <p:cSld>
+    <p:spTree>
+      <p:nvGrpSpPr>
+        <p:cNvPr id="1" name=""/>
+        <p:cNvGrpSpPr/>
+        <p:nvPr/>
+      </p:nvGrpSpPr>
+      <p:grpSpPr>
+        <a:xfrm>
+          <a:off x="0" y="0"/>
+          <a:ext cx="0" cy="0"/>
+          <a:chOff x="0" y="0"/>
+          <a:chExt cx="0" cy="0"/>
+        </a:xfrm>
+      </p:grpSpPr>
+      <p:sp>
+        <p:nvSpPr>
           <p:cNvPr id="2" name="Title 1">
             <a:extLst>
               <a:ext uri="{FF2B5EF4-FFF2-40B4-BE49-F238E27FC236}">
@@ -8496,7 +8627,7 @@
 </p:sld>
 </file>
 
-<file path=ppt/slides/slide27.xml><?xml version="1.0" encoding="utf-8"?>
+<file path=ppt/slides/slide28.xml><?xml version="1.0" encoding="utf-8"?>
 <p:sld xmlns:a="http://schemas.openxmlformats.org/drawingml/2006/main" xmlns:r="http://schemas.openxmlformats.org/officeDocument/2006/relationships" xmlns:p="http://schemas.openxmlformats.org/presentationml/2006/main">
   <p:cSld>
     <p:spTree>

</xml_diff>

<commit_message>
5/18/2023 GM adding more code for regression analysis and .ppt slides
</commit_message>
<xml_diff>
--- a/Project notes.pptx
+++ b/Project notes.pptx
@@ -5,7 +5,7 @@
     <p:sldMasterId id="2147483696" r:id="rId1"/>
   </p:sldMasterIdLst>
   <p:notesMasterIdLst>
-    <p:notesMasterId r:id="rId27"/>
+    <p:notesMasterId r:id="rId30"/>
   </p:notesMasterIdLst>
   <p:sldIdLst>
     <p:sldId id="256" r:id="rId2"/>
@@ -30,9 +30,12 @@
     <p:sldId id="279" r:id="rId21"/>
     <p:sldId id="280" r:id="rId22"/>
     <p:sldId id="281" r:id="rId23"/>
-    <p:sldId id="282" r:id="rId24"/>
-    <p:sldId id="274" r:id="rId25"/>
-    <p:sldId id="275" r:id="rId26"/>
+    <p:sldId id="285" r:id="rId24"/>
+    <p:sldId id="282" r:id="rId25"/>
+    <p:sldId id="283" r:id="rId26"/>
+    <p:sldId id="284" r:id="rId27"/>
+    <p:sldId id="274" r:id="rId28"/>
+    <p:sldId id="275" r:id="rId29"/>
   </p:sldIdLst>
   <p:sldSz cx="12192000" cy="6858000"/>
   <p:notesSz cx="6858000" cy="9144000"/>
@@ -139,6 +142,144 @@
 </p:presentation>
 </file>
 
+<file path=ppt/revisionInfo.xml><?xml version="1.0" encoding="utf-8"?>
+<p1510:revInfo xmlns:a="http://schemas.openxmlformats.org/drawingml/2006/main" xmlns:r="http://schemas.openxmlformats.org/officeDocument/2006/relationships" xmlns:p1510="http://schemas.microsoft.com/office/powerpoint/2015/10/main">
+  <p1510:revLst>
+    <p1510:client id="{8317314F-C7B3-4D46-9540-B62669A81E7C}" v="4" dt="2023-05-18T16:58:12.180"/>
+  </p1510:revLst>
+</p1510:revInfo>
+</file>
+
+<file path=ppt/changesInfos/changesInfo1.xml><?xml version="1.0" encoding="utf-8"?>
+<pc:chgInfo xmlns:a="http://schemas.openxmlformats.org/drawingml/2006/main" xmlns:r="http://schemas.openxmlformats.org/officeDocument/2006/relationships" xmlns:ac="http://schemas.microsoft.com/office/drawing/2013/main/command" xmlns:pc="http://schemas.microsoft.com/office/powerpoint/2013/main/command">
+  <pc:docChgLst>
+    <pc:chgData name="Gregory" userId="d89f6f42b2c227ac" providerId="LiveId" clId="{8317314F-C7B3-4D46-9540-B62669A81E7C}"/>
+    <pc:docChg chg="undo custSel addSld modSld">
+      <pc:chgData name="Gregory" userId="d89f6f42b2c227ac" providerId="LiveId" clId="{8317314F-C7B3-4D46-9540-B62669A81E7C}" dt="2023-05-18T16:58:37.010" v="1254" actId="20577"/>
+      <pc:docMkLst>
+        <pc:docMk/>
+      </pc:docMkLst>
+      <pc:sldChg chg="addSp modSp mod">
+        <pc:chgData name="Gregory" userId="d89f6f42b2c227ac" providerId="LiveId" clId="{8317314F-C7B3-4D46-9540-B62669A81E7C}" dt="2023-05-18T16:52:19.850" v="1079" actId="1076"/>
+        <pc:sldMkLst>
+          <pc:docMk/>
+          <pc:sldMk cId="2755262538" sldId="282"/>
+        </pc:sldMkLst>
+        <pc:spChg chg="mod">
+          <ac:chgData name="Gregory" userId="d89f6f42b2c227ac" providerId="LiveId" clId="{8317314F-C7B3-4D46-9540-B62669A81E7C}" dt="2023-05-18T16:50:54.554" v="1067" actId="20577"/>
+          <ac:spMkLst>
+            <pc:docMk/>
+            <pc:sldMk cId="2755262538" sldId="282"/>
+            <ac:spMk id="2" creationId="{E3DCFDCF-7E8F-94A9-88D5-8EF1F657162B}"/>
+          </ac:spMkLst>
+        </pc:spChg>
+        <pc:spChg chg="add mod">
+          <ac:chgData name="Gregory" userId="d89f6f42b2c227ac" providerId="LiveId" clId="{8317314F-C7B3-4D46-9540-B62669A81E7C}" dt="2023-05-17T21:10:50.525" v="798" actId="20577"/>
+          <ac:spMkLst>
+            <pc:docMk/>
+            <pc:sldMk cId="2755262538" sldId="282"/>
+            <ac:spMk id="3" creationId="{7BDCAE3D-4443-CCA7-3CA9-BE1DFA8640F8}"/>
+          </ac:spMkLst>
+        </pc:spChg>
+        <pc:picChg chg="add mod">
+          <ac:chgData name="Gregory" userId="d89f6f42b2c227ac" providerId="LiveId" clId="{8317314F-C7B3-4D46-9540-B62669A81E7C}" dt="2023-05-18T16:52:19.850" v="1079" actId="1076"/>
+          <ac:picMkLst>
+            <pc:docMk/>
+            <pc:sldMk cId="2755262538" sldId="282"/>
+            <ac:picMk id="5" creationId="{445C3D45-7C3F-4155-6DED-EC0B2EADC9AF}"/>
+          </ac:picMkLst>
+        </pc:picChg>
+        <pc:picChg chg="add mod">
+          <ac:chgData name="Gregory" userId="d89f6f42b2c227ac" providerId="LiveId" clId="{8317314F-C7B3-4D46-9540-B62669A81E7C}" dt="2023-05-18T16:52:18.153" v="1078" actId="1076"/>
+          <ac:picMkLst>
+            <pc:docMk/>
+            <pc:sldMk cId="2755262538" sldId="282"/>
+            <ac:picMk id="7" creationId="{5C3F0923-7AC3-0154-CEE0-D00818455B52}"/>
+          </ac:picMkLst>
+        </pc:picChg>
+      </pc:sldChg>
+      <pc:sldChg chg="addSp modSp new mod">
+        <pc:chgData name="Gregory" userId="d89f6f42b2c227ac" providerId="LiveId" clId="{8317314F-C7B3-4D46-9540-B62669A81E7C}" dt="2023-05-18T16:58:33.586" v="1253" actId="20577"/>
+        <pc:sldMkLst>
+          <pc:docMk/>
+          <pc:sldMk cId="2456213870" sldId="283"/>
+        </pc:sldMkLst>
+        <pc:spChg chg="add mod">
+          <ac:chgData name="Gregory" userId="d89f6f42b2c227ac" providerId="LiveId" clId="{8317314F-C7B3-4D46-9540-B62669A81E7C}" dt="2023-05-18T16:58:33.586" v="1253" actId="20577"/>
+          <ac:spMkLst>
+            <pc:docMk/>
+            <pc:sldMk cId="2456213870" sldId="283"/>
+            <ac:spMk id="6" creationId="{828721F6-6FAA-3D1E-747F-FB9F62230AC2}"/>
+          </ac:spMkLst>
+        </pc:spChg>
+        <pc:picChg chg="add mod">
+          <ac:chgData name="Gregory" userId="d89f6f42b2c227ac" providerId="LiveId" clId="{8317314F-C7B3-4D46-9540-B62669A81E7C}" dt="2023-05-18T16:55:19.032" v="1094" actId="1076"/>
+          <ac:picMkLst>
+            <pc:docMk/>
+            <pc:sldMk cId="2456213870" sldId="283"/>
+            <ac:picMk id="3" creationId="{42E9E16D-1FEB-EACC-D930-BCADDB42E98E}"/>
+          </ac:picMkLst>
+        </pc:picChg>
+        <pc:picChg chg="add mod">
+          <ac:chgData name="Gregory" userId="d89f6f42b2c227ac" providerId="LiveId" clId="{8317314F-C7B3-4D46-9540-B62669A81E7C}" dt="2023-05-18T16:55:21.780" v="1095" actId="1076"/>
+          <ac:picMkLst>
+            <pc:docMk/>
+            <pc:sldMk cId="2456213870" sldId="283"/>
+            <ac:picMk id="5" creationId="{59919C74-8EC2-6838-CD1B-32DBA8EF28C1}"/>
+          </ac:picMkLst>
+        </pc:picChg>
+      </pc:sldChg>
+      <pc:sldChg chg="addSp modSp new mod">
+        <pc:chgData name="Gregory" userId="d89f6f42b2c227ac" providerId="LiveId" clId="{8317314F-C7B3-4D46-9540-B62669A81E7C}" dt="2023-05-18T16:58:37.010" v="1254" actId="20577"/>
+        <pc:sldMkLst>
+          <pc:docMk/>
+          <pc:sldMk cId="3584246277" sldId="284"/>
+        </pc:sldMkLst>
+        <pc:spChg chg="add mod">
+          <ac:chgData name="Gregory" userId="d89f6f42b2c227ac" providerId="LiveId" clId="{8317314F-C7B3-4D46-9540-B62669A81E7C}" dt="2023-05-18T16:58:37.010" v="1254" actId="20577"/>
+          <ac:spMkLst>
+            <pc:docMk/>
+            <pc:sldMk cId="3584246277" sldId="284"/>
+            <ac:spMk id="2" creationId="{BDCA52CA-C5AE-5935-4154-685291794150}"/>
+          </ac:spMkLst>
+        </pc:spChg>
+        <pc:picChg chg="add mod">
+          <ac:chgData name="Gregory" userId="d89f6f42b2c227ac" providerId="LiveId" clId="{8317314F-C7B3-4D46-9540-B62669A81E7C}" dt="2023-05-18T16:57:12.567" v="1216" actId="1076"/>
+          <ac:picMkLst>
+            <pc:docMk/>
+            <pc:sldMk cId="3584246277" sldId="284"/>
+            <ac:picMk id="4" creationId="{65EE036F-F999-785E-3335-D3B0A2F31994}"/>
+          </ac:picMkLst>
+        </pc:picChg>
+        <pc:picChg chg="add mod">
+          <ac:chgData name="Gregory" userId="d89f6f42b2c227ac" providerId="LiveId" clId="{8317314F-C7B3-4D46-9540-B62669A81E7C}" dt="2023-05-18T16:57:40.850" v="1220" actId="1076"/>
+          <ac:picMkLst>
+            <pc:docMk/>
+            <pc:sldMk cId="3584246277" sldId="284"/>
+            <ac:picMk id="6" creationId="{730C3028-BA73-9F09-DB9E-F6EC3B8E232D}"/>
+          </ac:picMkLst>
+        </pc:picChg>
+      </pc:sldChg>
+      <pc:sldChg chg="addSp modSp new mod">
+        <pc:chgData name="Gregory" userId="d89f6f42b2c227ac" providerId="LiveId" clId="{8317314F-C7B3-4D46-9540-B62669A81E7C}" dt="2023-05-18T16:58:21.119" v="1252" actId="20577"/>
+        <pc:sldMkLst>
+          <pc:docMk/>
+          <pc:sldMk cId="3005452185" sldId="285"/>
+        </pc:sldMkLst>
+        <pc:spChg chg="add mod">
+          <ac:chgData name="Gregory" userId="d89f6f42b2c227ac" providerId="LiveId" clId="{8317314F-C7B3-4D46-9540-B62669A81E7C}" dt="2023-05-18T16:58:21.119" v="1252" actId="20577"/>
+          <ac:spMkLst>
+            <pc:docMk/>
+            <pc:sldMk cId="3005452185" sldId="285"/>
+            <ac:spMk id="2" creationId="{E0EC49A9-0F35-EBF2-DE3D-A8D0CE61DC3A}"/>
+          </ac:spMkLst>
+        </pc:spChg>
+      </pc:sldChg>
+    </pc:docChg>
+  </pc:docChgLst>
+</pc:chgInfo>
+</file>
+
 <file path=ppt/notesMasters/notesMaster1.xml><?xml version="1.0" encoding="utf-8"?>
 <p:notesMaster xmlns:a="http://schemas.openxmlformats.org/drawingml/2006/main" xmlns:r="http://schemas.openxmlformats.org/officeDocument/2006/relationships" xmlns:p="http://schemas.openxmlformats.org/presentationml/2006/main">
   <p:cSld>
@@ -221,7 +362,7 @@
           <a:p>
             <a:fld id="{C17E1E4B-2B0B-4F18-825C-E1CF4409D9D0}" type="datetimeFigureOut">
               <a:rPr lang="en-US" smtClean="0"/>
-              <a:t>5/16/2023</a:t>
+              <a:t>5/17/2023</a:t>
             </a:fld>
             <a:endParaRPr lang="en-US"/>
           </a:p>
@@ -996,7 +1137,7 @@
           <a:p>
             <a:fld id="{925EA6E8-F76E-44A9-9BED-4361634B60BD}" type="datetimeFigureOut">
               <a:rPr lang="en-US" smtClean="0"/>
-              <a:t>5/16/2023</a:t>
+              <a:t>5/17/2023</a:t>
             </a:fld>
             <a:endParaRPr lang="en-US"/>
           </a:p>
@@ -1204,7 +1345,7 @@
           <a:p>
             <a:fld id="{925EA6E8-F76E-44A9-9BED-4361634B60BD}" type="datetimeFigureOut">
               <a:rPr lang="en-US" smtClean="0"/>
-              <a:t>5/16/2023</a:t>
+              <a:t>5/17/2023</a:t>
             </a:fld>
             <a:endParaRPr lang="en-US"/>
           </a:p>
@@ -1460,7 +1601,7 @@
           <a:p>
             <a:fld id="{925EA6E8-F76E-44A9-9BED-4361634B60BD}" type="datetimeFigureOut">
               <a:rPr lang="en-US" smtClean="0"/>
-              <a:t>5/16/2023</a:t>
+              <a:t>5/17/2023</a:t>
             </a:fld>
             <a:endParaRPr lang="en-US"/>
           </a:p>
@@ -1634,7 +1775,7 @@
           <a:p>
             <a:fld id="{925EA6E8-F76E-44A9-9BED-4361634B60BD}" type="datetimeFigureOut">
               <a:rPr lang="en-US" smtClean="0"/>
-              <a:t>5/16/2023</a:t>
+              <a:t>5/17/2023</a:t>
             </a:fld>
             <a:endParaRPr lang="en-US"/>
           </a:p>
@@ -1977,7 +2118,7 @@
           <a:p>
             <a:fld id="{925EA6E8-F76E-44A9-9BED-4361634B60BD}" type="datetimeFigureOut">
               <a:rPr lang="en-US" smtClean="0"/>
-              <a:t>5/16/2023</a:t>
+              <a:t>5/17/2023</a:t>
             </a:fld>
             <a:endParaRPr lang="en-US"/>
           </a:p>
@@ -2252,7 +2393,7 @@
           <a:p>
             <a:fld id="{925EA6E8-F76E-44A9-9BED-4361634B60BD}" type="datetimeFigureOut">
               <a:rPr lang="en-US" smtClean="0"/>
-              <a:t>5/16/2023</a:t>
+              <a:t>5/17/2023</a:t>
             </a:fld>
             <a:endParaRPr lang="en-US"/>
           </a:p>
@@ -2631,7 +2772,7 @@
           <a:p>
             <a:fld id="{925EA6E8-F76E-44A9-9BED-4361634B60BD}" type="datetimeFigureOut">
               <a:rPr lang="en-US" smtClean="0"/>
-              <a:t>5/16/2023</a:t>
+              <a:t>5/17/2023</a:t>
             </a:fld>
             <a:endParaRPr lang="en-US"/>
           </a:p>
@@ -2749,7 +2890,7 @@
           <a:p>
             <a:fld id="{925EA6E8-F76E-44A9-9BED-4361634B60BD}" type="datetimeFigureOut">
               <a:rPr lang="en-US" smtClean="0"/>
-              <a:t>5/16/2023</a:t>
+              <a:t>5/17/2023</a:t>
             </a:fld>
             <a:endParaRPr lang="en-US"/>
           </a:p>
@@ -2920,7 +3061,7 @@
           <a:p>
             <a:fld id="{925EA6E8-F76E-44A9-9BED-4361634B60BD}" type="datetimeFigureOut">
               <a:rPr lang="en-US" smtClean="0"/>
-              <a:t>5/16/2023</a:t>
+              <a:t>5/17/2023</a:t>
             </a:fld>
             <a:endParaRPr lang="en-US"/>
           </a:p>
@@ -3274,7 +3415,7 @@
           <a:p>
             <a:fld id="{925EA6E8-F76E-44A9-9BED-4361634B60BD}" type="datetimeFigureOut">
               <a:rPr lang="en-US" smtClean="0"/>
-              <a:t>5/16/2023</a:t>
+              <a:t>5/17/2023</a:t>
             </a:fld>
             <a:endParaRPr lang="en-US"/>
           </a:p>
@@ -3656,7 +3797,7 @@
           <a:p>
             <a:fld id="{925EA6E8-F76E-44A9-9BED-4361634B60BD}" type="datetimeFigureOut">
               <a:rPr lang="en-US" smtClean="0"/>
-              <a:t>5/16/2023</a:t>
+              <a:t>5/17/2023</a:t>
             </a:fld>
             <a:endParaRPr lang="en-US"/>
           </a:p>
@@ -3943,7 +4084,7 @@
           <a:p>
             <a:fld id="{925EA6E8-F76E-44A9-9BED-4361634B60BD}" type="datetimeFigureOut">
               <a:rPr lang="en-US" smtClean="0"/>
-              <a:t>5/16/2023</a:t>
+              <a:t>5/17/2023</a:t>
             </a:fld>
             <a:endParaRPr lang="en-US"/>
           </a:p>
@@ -7730,84 +7871,57 @@
       </p:grpSpPr>
       <p:sp>
         <p:nvSpPr>
-          <p:cNvPr id="2" name="TextBox 1">
+          <p:cNvPr id="2" name="Title 1">
             <a:extLst>
               <a:ext uri="{FF2B5EF4-FFF2-40B4-BE49-F238E27FC236}">
-                <a16:creationId xmlns:a16="http://schemas.microsoft.com/office/drawing/2014/main" id="{E3DCFDCF-7E8F-94A9-88D5-8EF1F657162B}"/>
+                <a16:creationId xmlns:a16="http://schemas.microsoft.com/office/drawing/2014/main" id="{E0EC49A9-0F35-EBF2-DE3D-A8D0CE61DC3A}"/>
               </a:ext>
             </a:extLst>
           </p:cNvPr>
-          <p:cNvSpPr txBox="1"/>
+          <p:cNvSpPr txBox="1">
+            <a:spLocks/>
+          </p:cNvSpPr>
           <p:nvPr/>
         </p:nvSpPr>
         <p:spPr>
           <a:xfrm>
-            <a:off x="569433" y="1157324"/>
-            <a:ext cx="11053134" cy="3108543"/>
+            <a:off x="1066800" y="547860"/>
+            <a:ext cx="10058400" cy="814409"/>
           </a:xfrm>
           <a:prstGeom prst="rect">
             <a:avLst/>
           </a:prstGeom>
-          <a:noFill/>
         </p:spPr>
         <p:txBody>
-          <a:bodyPr wrap="square" rtlCol="0">
-            <a:spAutoFit/>
+          <a:bodyPr>
+            <a:normAutofit/>
           </a:bodyPr>
-          <a:lstStyle/>
-          <a:p>
-            <a:r>
-              <a:rPr lang="en-US" sz="2800" dirty="0">
+          <a:lstStyle>
+            <a:lvl1pPr algn="l" defTabSz="914400" rtl="0" eaLnBrk="1" latinLnBrk="0" hangingPunct="1">
+              <a:lnSpc>
+                <a:spcPct val="85000"/>
+              </a:lnSpc>
+              <a:spcBef>
+                <a:spcPct val="0"/>
+              </a:spcBef>
+              <a:buNone/>
+              <a:defRPr sz="4800" kern="1200" spc="-50" baseline="0">
                 <a:solidFill>
-                  <a:srgbClr val="FF0000"/>
+                  <a:schemeClr val="tx1">
+                    <a:lumMod val="75000"/>
+                    <a:lumOff val="25000"/>
+                  </a:schemeClr>
                 </a:solidFill>
-              </a:rPr>
-              <a:t>Correlation/Regression plots here. Pick the 2 most “interesting” plots. </a:t>
-            </a:r>
-          </a:p>
-          <a:p>
-            <a:r>
-              <a:rPr lang="en-US" sz="2800" dirty="0">
-                <a:solidFill>
-                  <a:srgbClr val="FF0000"/>
-                </a:solidFill>
-              </a:rPr>
-              <a:t>Or whichever plots provide easiest talking point for the speaker.</a:t>
-            </a:r>
-          </a:p>
-          <a:p>
-            <a:endParaRPr lang="en-US" sz="2800" dirty="0">
-              <a:solidFill>
-                <a:srgbClr val="FF0000"/>
-              </a:solidFill>
-            </a:endParaRPr>
-          </a:p>
-          <a:p>
-            <a:endParaRPr lang="en-US" sz="2800" dirty="0">
-              <a:solidFill>
-                <a:srgbClr val="FF0000"/>
-              </a:solidFill>
-            </a:endParaRPr>
-          </a:p>
-          <a:p>
-            <a:endParaRPr lang="en-US" sz="2800" dirty="0">
-              <a:solidFill>
-                <a:srgbClr val="FF0000"/>
-              </a:solidFill>
-            </a:endParaRPr>
-          </a:p>
-          <a:p>
-            <a:pPr marL="457200" indent="-457200">
-              <a:buFont typeface="Arial" panose="020B0604020202020204" pitchFamily="34" charset="0"/>
-              <a:buChar char="•"/>
-            </a:pPr>
-            <a:r>
-              <a:rPr lang="en-US" sz="2800" dirty="0">
-                <a:solidFill>
-                  <a:srgbClr val="FF0000"/>
-                </a:solidFill>
-              </a:rPr>
-              <a:t>Make a clear statement that there are many variables affecting the regression plots.</a:t>
+                <a:latin typeface="+mj-lt"/>
+                <a:ea typeface="+mj-ea"/>
+                <a:cs typeface="+mj-cs"/>
+              </a:defRPr>
+            </a:lvl1pPr>
+          </a:lstStyle>
+          <a:p>
+            <a:r>
+              <a:rPr lang="en-US" dirty="0"/>
+              <a:t>Greg slides</a:t>
             </a:r>
           </a:p>
         </p:txBody>
@@ -7815,7 +7929,7 @@
     </p:spTree>
     <p:extLst>
       <p:ext uri="{BB962C8B-B14F-4D97-AF65-F5344CB8AC3E}">
-        <p14:creationId xmlns:p14="http://schemas.microsoft.com/office/powerpoint/2010/main" val="2755262538"/>
+        <p14:creationId xmlns:p14="http://schemas.microsoft.com/office/powerpoint/2010/main" val="3005452185"/>
       </p:ext>
     </p:extLst>
   </p:cSld>
@@ -7844,6 +7958,697 @@
       </p:grpSpPr>
       <p:sp>
         <p:nvSpPr>
+          <p:cNvPr id="2" name="TextBox 1">
+            <a:extLst>
+              <a:ext uri="{FF2B5EF4-FFF2-40B4-BE49-F238E27FC236}">
+                <a16:creationId xmlns:a16="http://schemas.microsoft.com/office/drawing/2014/main" id="{E3DCFDCF-7E8F-94A9-88D5-8EF1F657162B}"/>
+              </a:ext>
+            </a:extLst>
+          </p:cNvPr>
+          <p:cNvSpPr txBox="1"/>
+          <p:nvPr/>
+        </p:nvSpPr>
+        <p:spPr>
+          <a:xfrm>
+            <a:off x="672070" y="1427912"/>
+            <a:ext cx="11053134" cy="2707408"/>
+          </a:xfrm>
+          <a:prstGeom prst="rect">
+            <a:avLst/>
+          </a:prstGeom>
+          <a:noFill/>
+        </p:spPr>
+        <p:txBody>
+          <a:bodyPr wrap="square" rtlCol="0">
+            <a:spAutoFit/>
+          </a:bodyPr>
+          <a:lstStyle/>
+          <a:p>
+            <a:pPr marL="91440" indent="-91440" defTabSz="914400">
+              <a:lnSpc>
+                <a:spcPct val="90000"/>
+              </a:lnSpc>
+              <a:spcBef>
+                <a:spcPts val="1200"/>
+              </a:spcBef>
+              <a:spcAft>
+                <a:spcPts val="200"/>
+              </a:spcAft>
+              <a:buClr>
+                <a:schemeClr val="accent1"/>
+              </a:buClr>
+              <a:buSzPct val="100000"/>
+              <a:buFont typeface="Wingdings" panose="05000000000000000000" pitchFamily="2" charset="2"/>
+              <a:buChar char="§"/>
+            </a:pPr>
+            <a:r>
+              <a:rPr lang="en-US" sz="2000" dirty="0">
+                <a:solidFill>
+                  <a:schemeClr val="tx1">
+                    <a:lumMod val="75000"/>
+                    <a:lumOff val="25000"/>
+                  </a:schemeClr>
+                </a:solidFill>
+              </a:rPr>
+              <a:t>Method was used to find relationship between EARN and vaccination data</a:t>
+            </a:r>
+          </a:p>
+          <a:p>
+            <a:pPr marL="91440" indent="-91440" defTabSz="914400">
+              <a:lnSpc>
+                <a:spcPct val="90000"/>
+              </a:lnSpc>
+              <a:spcBef>
+                <a:spcPts val="1200"/>
+              </a:spcBef>
+              <a:spcAft>
+                <a:spcPts val="200"/>
+              </a:spcAft>
+              <a:buClr>
+                <a:schemeClr val="accent1"/>
+              </a:buClr>
+              <a:buSzPct val="100000"/>
+              <a:buFont typeface="Wingdings" panose="05000000000000000000" pitchFamily="2" charset="2"/>
+              <a:buChar char="§"/>
+            </a:pPr>
+            <a:r>
+              <a:rPr lang="en-US" sz="2000" dirty="0">
+                <a:solidFill>
+                  <a:schemeClr val="tx1">
+                    <a:lumMod val="75000"/>
+                    <a:lumOff val="25000"/>
+                  </a:schemeClr>
+                </a:solidFill>
+              </a:rPr>
+              <a:t>EARN and vaccine data were merged by state</a:t>
+            </a:r>
+          </a:p>
+          <a:p>
+            <a:pPr marL="91440" indent="-91440" defTabSz="914400">
+              <a:lnSpc>
+                <a:spcPct val="90000"/>
+              </a:lnSpc>
+              <a:spcBef>
+                <a:spcPts val="1200"/>
+              </a:spcBef>
+              <a:spcAft>
+                <a:spcPts val="200"/>
+              </a:spcAft>
+              <a:buClr>
+                <a:schemeClr val="accent1"/>
+              </a:buClr>
+              <a:buSzPct val="100000"/>
+              <a:buFont typeface="Wingdings" panose="05000000000000000000" pitchFamily="2" charset="2"/>
+              <a:buChar char="§"/>
+            </a:pPr>
+            <a:r>
+              <a:rPr lang="en-US" sz="2000" dirty="0" err="1">
+                <a:solidFill>
+                  <a:schemeClr val="tx1">
+                    <a:lumMod val="75000"/>
+                    <a:lumOff val="25000"/>
+                  </a:schemeClr>
+                </a:solidFill>
+              </a:rPr>
+              <a:t>Sklearn</a:t>
+            </a:r>
+            <a:r>
+              <a:rPr lang="en-US" sz="2000" dirty="0">
+                <a:solidFill>
+                  <a:schemeClr val="tx1">
+                    <a:lumMod val="75000"/>
+                    <a:lumOff val="25000"/>
+                  </a:schemeClr>
+                </a:solidFill>
+              </a:rPr>
+              <a:t> linear regression library and Seaborn </a:t>
+            </a:r>
+            <a:r>
+              <a:rPr lang="en-US" sz="2000" dirty="0" err="1">
+                <a:solidFill>
+                  <a:schemeClr val="tx1">
+                    <a:lumMod val="75000"/>
+                    <a:lumOff val="25000"/>
+                  </a:schemeClr>
+                </a:solidFill>
+              </a:rPr>
+              <a:t>lmplot</a:t>
+            </a:r>
+            <a:r>
+              <a:rPr lang="en-US" sz="2000" dirty="0">
+                <a:solidFill>
+                  <a:schemeClr val="tx1">
+                    <a:lumMod val="75000"/>
+                    <a:lumOff val="25000"/>
+                  </a:schemeClr>
+                </a:solidFill>
+              </a:rPr>
+              <a:t> </a:t>
+            </a:r>
+          </a:p>
+          <a:p>
+            <a:pPr marL="548640" lvl="1" indent="-91440" defTabSz="914400">
+              <a:lnSpc>
+                <a:spcPct val="90000"/>
+              </a:lnSpc>
+              <a:spcBef>
+                <a:spcPts val="1200"/>
+              </a:spcBef>
+              <a:spcAft>
+                <a:spcPts val="200"/>
+              </a:spcAft>
+              <a:buClr>
+                <a:schemeClr val="accent1"/>
+              </a:buClr>
+              <a:buSzPct val="100000"/>
+              <a:buFont typeface="Wingdings" panose="05000000000000000000" pitchFamily="2" charset="2"/>
+              <a:buChar char="§"/>
+            </a:pPr>
+            <a:r>
+              <a:rPr lang="en-US" sz="2000" dirty="0">
+                <a:solidFill>
+                  <a:schemeClr val="tx1">
+                    <a:lumMod val="75000"/>
+                    <a:lumOff val="25000"/>
+                  </a:schemeClr>
+                </a:solidFill>
+              </a:rPr>
+              <a:t>Output targets were vaccination rates for 1 dose and completed vaccination series</a:t>
+            </a:r>
+          </a:p>
+          <a:p>
+            <a:pPr marL="548640" lvl="1" indent="-91440" defTabSz="914400">
+              <a:lnSpc>
+                <a:spcPct val="90000"/>
+              </a:lnSpc>
+              <a:spcBef>
+                <a:spcPts val="1200"/>
+              </a:spcBef>
+              <a:spcAft>
+                <a:spcPts val="200"/>
+              </a:spcAft>
+              <a:buClr>
+                <a:schemeClr val="accent1"/>
+              </a:buClr>
+              <a:buSzPct val="100000"/>
+              <a:buFont typeface="Wingdings" panose="05000000000000000000" pitchFamily="2" charset="2"/>
+              <a:buChar char="§"/>
+            </a:pPr>
+            <a:r>
+              <a:rPr lang="en-US" sz="2000" dirty="0">
+                <a:solidFill>
+                  <a:schemeClr val="tx1">
+                    <a:lumMod val="75000"/>
+                    <a:lumOff val="25000"/>
+                  </a:schemeClr>
+                </a:solidFill>
+              </a:rPr>
+              <a:t>Input features were spending levels and number of projects aimed at delivering vaccines</a:t>
+            </a:r>
+          </a:p>
+          <a:p>
+            <a:pPr marL="548640" lvl="1" indent="-91440" defTabSz="914400">
+              <a:lnSpc>
+                <a:spcPct val="90000"/>
+              </a:lnSpc>
+              <a:spcBef>
+                <a:spcPts val="1200"/>
+              </a:spcBef>
+              <a:spcAft>
+                <a:spcPts val="200"/>
+              </a:spcAft>
+              <a:buClr>
+                <a:schemeClr val="accent1"/>
+              </a:buClr>
+              <a:buSzPct val="100000"/>
+              <a:buFont typeface="Wingdings" panose="05000000000000000000" pitchFamily="2" charset="2"/>
+              <a:buChar char="§"/>
+            </a:pPr>
+            <a:r>
+              <a:rPr lang="en-US" sz="2000" dirty="0">
+                <a:solidFill>
+                  <a:schemeClr val="tx1">
+                    <a:lumMod val="75000"/>
+                    <a:lumOff val="25000"/>
+                  </a:schemeClr>
+                </a:solidFill>
+              </a:rPr>
+              <a:t>Function reported the linear model and diagnostics, as well as the visualizations</a:t>
+            </a:r>
+            <a:endParaRPr lang="en-US" sz="2400" dirty="0">
+              <a:solidFill>
+                <a:schemeClr val="tx1">
+                  <a:lumMod val="75000"/>
+                  <a:lumOff val="25000"/>
+                </a:schemeClr>
+              </a:solidFill>
+            </a:endParaRPr>
+          </a:p>
+        </p:txBody>
+      </p:sp>
+      <p:sp>
+        <p:nvSpPr>
+          <p:cNvPr id="3" name="Title 1">
+            <a:extLst>
+              <a:ext uri="{FF2B5EF4-FFF2-40B4-BE49-F238E27FC236}">
+                <a16:creationId xmlns:a16="http://schemas.microsoft.com/office/drawing/2014/main" id="{7BDCAE3D-4443-CCA7-3CA9-BE1DFA8640F8}"/>
+              </a:ext>
+            </a:extLst>
+          </p:cNvPr>
+          <p:cNvSpPr txBox="1">
+            <a:spLocks/>
+          </p:cNvSpPr>
+          <p:nvPr/>
+        </p:nvSpPr>
+        <p:spPr>
+          <a:xfrm>
+            <a:off x="1066800" y="547860"/>
+            <a:ext cx="10058400" cy="814409"/>
+          </a:xfrm>
+          <a:prstGeom prst="rect">
+            <a:avLst/>
+          </a:prstGeom>
+        </p:spPr>
+        <p:txBody>
+          <a:bodyPr>
+            <a:normAutofit/>
+          </a:bodyPr>
+          <a:lstStyle>
+            <a:lvl1pPr algn="l" defTabSz="914400" rtl="0" eaLnBrk="1" latinLnBrk="0" hangingPunct="1">
+              <a:lnSpc>
+                <a:spcPct val="85000"/>
+              </a:lnSpc>
+              <a:spcBef>
+                <a:spcPct val="0"/>
+              </a:spcBef>
+              <a:buNone/>
+              <a:defRPr sz="4800" kern="1200" spc="-50" baseline="0">
+                <a:solidFill>
+                  <a:schemeClr val="tx1">
+                    <a:lumMod val="75000"/>
+                    <a:lumOff val="25000"/>
+                  </a:schemeClr>
+                </a:solidFill>
+                <a:latin typeface="+mj-lt"/>
+                <a:ea typeface="+mj-ea"/>
+                <a:cs typeface="+mj-cs"/>
+              </a:defRPr>
+            </a:lvl1pPr>
+          </a:lstStyle>
+          <a:p>
+            <a:r>
+              <a:rPr lang="en-US" dirty="0"/>
+              <a:t>Regression analysis</a:t>
+            </a:r>
+          </a:p>
+        </p:txBody>
+      </p:sp>
+      <p:pic>
+        <p:nvPicPr>
+          <p:cNvPr id="5" name="Picture 4">
+            <a:extLst>
+              <a:ext uri="{FF2B5EF4-FFF2-40B4-BE49-F238E27FC236}">
+                <a16:creationId xmlns:a16="http://schemas.microsoft.com/office/drawing/2014/main" id="{445C3D45-7C3F-4155-6DED-EC0B2EADC9AF}"/>
+              </a:ext>
+            </a:extLst>
+          </p:cNvPr>
+          <p:cNvPicPr>
+            <a:picLocks noChangeAspect="1"/>
+          </p:cNvPicPr>
+          <p:nvPr/>
+        </p:nvPicPr>
+        <p:blipFill>
+          <a:blip r:embed="rId2"/>
+          <a:stretch>
+            <a:fillRect/>
+          </a:stretch>
+        </p:blipFill>
+        <p:spPr>
+          <a:xfrm>
+            <a:off x="353890" y="4195855"/>
+            <a:ext cx="4002833" cy="2414407"/>
+          </a:xfrm>
+          <a:prstGeom prst="rect">
+            <a:avLst/>
+          </a:prstGeom>
+        </p:spPr>
+      </p:pic>
+      <p:pic>
+        <p:nvPicPr>
+          <p:cNvPr id="7" name="Picture 6">
+            <a:extLst>
+              <a:ext uri="{FF2B5EF4-FFF2-40B4-BE49-F238E27FC236}">
+                <a16:creationId xmlns:a16="http://schemas.microsoft.com/office/drawing/2014/main" id="{5C3F0923-7AC3-0154-CEE0-D00818455B52}"/>
+              </a:ext>
+            </a:extLst>
+          </p:cNvPr>
+          <p:cNvPicPr>
+            <a:picLocks noChangeAspect="1"/>
+          </p:cNvPicPr>
+          <p:nvPr/>
+        </p:nvPicPr>
+        <p:blipFill>
+          <a:blip r:embed="rId3"/>
+          <a:stretch>
+            <a:fillRect/>
+          </a:stretch>
+        </p:blipFill>
+        <p:spPr>
+          <a:xfrm>
+            <a:off x="4468424" y="4195855"/>
+            <a:ext cx="7369686" cy="1102735"/>
+          </a:xfrm>
+          <a:prstGeom prst="rect">
+            <a:avLst/>
+          </a:prstGeom>
+        </p:spPr>
+      </p:pic>
+    </p:spTree>
+    <p:extLst>
+      <p:ext uri="{BB962C8B-B14F-4D97-AF65-F5344CB8AC3E}">
+        <p14:creationId xmlns:p14="http://schemas.microsoft.com/office/powerpoint/2010/main" val="2755262538"/>
+      </p:ext>
+    </p:extLst>
+  </p:cSld>
+  <p:clrMapOvr>
+    <a:masterClrMapping/>
+  </p:clrMapOvr>
+</p:sld>
+</file>
+
+<file path=ppt/slides/slide25.xml><?xml version="1.0" encoding="utf-8"?>
+<p:sld xmlns:a="http://schemas.openxmlformats.org/drawingml/2006/main" xmlns:r="http://schemas.openxmlformats.org/officeDocument/2006/relationships" xmlns:p="http://schemas.openxmlformats.org/presentationml/2006/main">
+  <p:cSld>
+    <p:spTree>
+      <p:nvGrpSpPr>
+        <p:cNvPr id="1" name=""/>
+        <p:cNvGrpSpPr/>
+        <p:nvPr/>
+      </p:nvGrpSpPr>
+      <p:grpSpPr>
+        <a:xfrm>
+          <a:off x="0" y="0"/>
+          <a:ext cx="0" cy="0"/>
+          <a:chOff x="0" y="0"/>
+          <a:chExt cx="0" cy="0"/>
+        </a:xfrm>
+      </p:grpSpPr>
+      <p:pic>
+        <p:nvPicPr>
+          <p:cNvPr id="3" name="Picture 2">
+            <a:extLst>
+              <a:ext uri="{FF2B5EF4-FFF2-40B4-BE49-F238E27FC236}">
+                <a16:creationId xmlns:a16="http://schemas.microsoft.com/office/drawing/2014/main" id="{42E9E16D-1FEB-EACC-D930-BCADDB42E98E}"/>
+              </a:ext>
+            </a:extLst>
+          </p:cNvPr>
+          <p:cNvPicPr>
+            <a:picLocks noChangeAspect="1"/>
+          </p:cNvPicPr>
+          <p:nvPr/>
+        </p:nvPicPr>
+        <p:blipFill>
+          <a:blip r:embed="rId2"/>
+          <a:stretch>
+            <a:fillRect/>
+          </a:stretch>
+        </p:blipFill>
+        <p:spPr>
+          <a:xfrm>
+            <a:off x="1112576" y="955270"/>
+            <a:ext cx="4526223" cy="4947459"/>
+          </a:xfrm>
+          <a:prstGeom prst="rect">
+            <a:avLst/>
+          </a:prstGeom>
+        </p:spPr>
+      </p:pic>
+      <p:pic>
+        <p:nvPicPr>
+          <p:cNvPr id="5" name="Picture 4">
+            <a:extLst>
+              <a:ext uri="{FF2B5EF4-FFF2-40B4-BE49-F238E27FC236}">
+                <a16:creationId xmlns:a16="http://schemas.microsoft.com/office/drawing/2014/main" id="{59919C74-8EC2-6838-CD1B-32DBA8EF28C1}"/>
+              </a:ext>
+            </a:extLst>
+          </p:cNvPr>
+          <p:cNvPicPr>
+            <a:picLocks noChangeAspect="1"/>
+          </p:cNvPicPr>
+          <p:nvPr/>
+        </p:nvPicPr>
+        <p:blipFill>
+          <a:blip r:embed="rId3"/>
+          <a:stretch>
+            <a:fillRect/>
+          </a:stretch>
+        </p:blipFill>
+        <p:spPr>
+          <a:xfrm>
+            <a:off x="5859624" y="899285"/>
+            <a:ext cx="5771433" cy="5059427"/>
+          </a:xfrm>
+          <a:prstGeom prst="rect">
+            <a:avLst/>
+          </a:prstGeom>
+        </p:spPr>
+      </p:pic>
+      <p:sp>
+        <p:nvSpPr>
+          <p:cNvPr id="6" name="Title 1">
+            <a:extLst>
+              <a:ext uri="{FF2B5EF4-FFF2-40B4-BE49-F238E27FC236}">
+                <a16:creationId xmlns:a16="http://schemas.microsoft.com/office/drawing/2014/main" id="{828721F6-6FAA-3D1E-747F-FB9F62230AC2}"/>
+              </a:ext>
+            </a:extLst>
+          </p:cNvPr>
+          <p:cNvSpPr txBox="1">
+            <a:spLocks/>
+          </p:cNvSpPr>
+          <p:nvPr/>
+        </p:nvSpPr>
+        <p:spPr>
+          <a:xfrm>
+            <a:off x="348343" y="140861"/>
+            <a:ext cx="10058400" cy="814409"/>
+          </a:xfrm>
+          <a:prstGeom prst="rect">
+            <a:avLst/>
+          </a:prstGeom>
+        </p:spPr>
+        <p:txBody>
+          <a:bodyPr>
+            <a:normAutofit/>
+          </a:bodyPr>
+          <a:lstStyle>
+            <a:lvl1pPr algn="l" defTabSz="914400" rtl="0" eaLnBrk="1" latinLnBrk="0" hangingPunct="1">
+              <a:lnSpc>
+                <a:spcPct val="85000"/>
+              </a:lnSpc>
+              <a:spcBef>
+                <a:spcPct val="0"/>
+              </a:spcBef>
+              <a:buNone/>
+              <a:defRPr sz="4800" kern="1200" spc="-50" baseline="0">
+                <a:solidFill>
+                  <a:schemeClr val="tx1">
+                    <a:lumMod val="75000"/>
+                    <a:lumOff val="25000"/>
+                  </a:schemeClr>
+                </a:solidFill>
+                <a:latin typeface="+mj-lt"/>
+                <a:ea typeface="+mj-ea"/>
+                <a:cs typeface="+mj-cs"/>
+              </a:defRPr>
+            </a:lvl1pPr>
+          </a:lstStyle>
+          <a:p>
+            <a:r>
+              <a:rPr lang="en-US" dirty="0"/>
+              <a:t>Effect on first dose delivered</a:t>
+            </a:r>
+          </a:p>
+        </p:txBody>
+      </p:sp>
+    </p:spTree>
+    <p:extLst>
+      <p:ext uri="{BB962C8B-B14F-4D97-AF65-F5344CB8AC3E}">
+        <p14:creationId xmlns:p14="http://schemas.microsoft.com/office/powerpoint/2010/main" val="2456213870"/>
+      </p:ext>
+    </p:extLst>
+  </p:cSld>
+  <p:clrMapOvr>
+    <a:masterClrMapping/>
+  </p:clrMapOvr>
+</p:sld>
+</file>
+
+<file path=ppt/slides/slide26.xml><?xml version="1.0" encoding="utf-8"?>
+<p:sld xmlns:a="http://schemas.openxmlformats.org/drawingml/2006/main" xmlns:r="http://schemas.openxmlformats.org/officeDocument/2006/relationships" xmlns:p="http://schemas.openxmlformats.org/presentationml/2006/main">
+  <p:cSld>
+    <p:spTree>
+      <p:nvGrpSpPr>
+        <p:cNvPr id="1" name=""/>
+        <p:cNvGrpSpPr/>
+        <p:nvPr/>
+      </p:nvGrpSpPr>
+      <p:grpSpPr>
+        <a:xfrm>
+          <a:off x="0" y="0"/>
+          <a:ext cx="0" cy="0"/>
+          <a:chOff x="0" y="0"/>
+          <a:chExt cx="0" cy="0"/>
+        </a:xfrm>
+      </p:grpSpPr>
+      <p:sp>
+        <p:nvSpPr>
+          <p:cNvPr id="2" name="Title 1">
+            <a:extLst>
+              <a:ext uri="{FF2B5EF4-FFF2-40B4-BE49-F238E27FC236}">
+                <a16:creationId xmlns:a16="http://schemas.microsoft.com/office/drawing/2014/main" id="{BDCA52CA-C5AE-5935-4154-685291794150}"/>
+              </a:ext>
+            </a:extLst>
+          </p:cNvPr>
+          <p:cNvSpPr txBox="1">
+            <a:spLocks/>
+          </p:cNvSpPr>
+          <p:nvPr/>
+        </p:nvSpPr>
+        <p:spPr>
+          <a:xfrm>
+            <a:off x="348343" y="140861"/>
+            <a:ext cx="10058400" cy="814409"/>
+          </a:xfrm>
+          <a:prstGeom prst="rect">
+            <a:avLst/>
+          </a:prstGeom>
+        </p:spPr>
+        <p:txBody>
+          <a:bodyPr>
+            <a:normAutofit/>
+          </a:bodyPr>
+          <a:lstStyle>
+            <a:lvl1pPr algn="l" defTabSz="914400" rtl="0" eaLnBrk="1" latinLnBrk="0" hangingPunct="1">
+              <a:lnSpc>
+                <a:spcPct val="85000"/>
+              </a:lnSpc>
+              <a:spcBef>
+                <a:spcPct val="0"/>
+              </a:spcBef>
+              <a:buNone/>
+              <a:defRPr sz="4800" kern="1200" spc="-50" baseline="0">
+                <a:solidFill>
+                  <a:schemeClr val="tx1">
+                    <a:lumMod val="75000"/>
+                    <a:lumOff val="25000"/>
+                  </a:schemeClr>
+                </a:solidFill>
+                <a:latin typeface="+mj-lt"/>
+                <a:ea typeface="+mj-ea"/>
+                <a:cs typeface="+mj-cs"/>
+              </a:defRPr>
+            </a:lvl1pPr>
+          </a:lstStyle>
+          <a:p>
+            <a:r>
+              <a:rPr lang="en-US" dirty="0"/>
+              <a:t>Effect on complete vaccination series</a:t>
+            </a:r>
+          </a:p>
+        </p:txBody>
+      </p:sp>
+      <p:pic>
+        <p:nvPicPr>
+          <p:cNvPr id="4" name="Picture 3">
+            <a:extLst>
+              <a:ext uri="{FF2B5EF4-FFF2-40B4-BE49-F238E27FC236}">
+                <a16:creationId xmlns:a16="http://schemas.microsoft.com/office/drawing/2014/main" id="{65EE036F-F999-785E-3335-D3B0A2F31994}"/>
+              </a:ext>
+            </a:extLst>
+          </p:cNvPr>
+          <p:cNvPicPr>
+            <a:picLocks noChangeAspect="1"/>
+          </p:cNvPicPr>
+          <p:nvPr/>
+        </p:nvPicPr>
+        <p:blipFill>
+          <a:blip r:embed="rId2"/>
+          <a:stretch>
+            <a:fillRect/>
+          </a:stretch>
+        </p:blipFill>
+        <p:spPr>
+          <a:xfrm>
+            <a:off x="1216763" y="1011715"/>
+            <a:ext cx="4529903" cy="4834569"/>
+          </a:xfrm>
+          <a:prstGeom prst="rect">
+            <a:avLst/>
+          </a:prstGeom>
+        </p:spPr>
+      </p:pic>
+      <p:pic>
+        <p:nvPicPr>
+          <p:cNvPr id="6" name="Picture 5">
+            <a:extLst>
+              <a:ext uri="{FF2B5EF4-FFF2-40B4-BE49-F238E27FC236}">
+                <a16:creationId xmlns:a16="http://schemas.microsoft.com/office/drawing/2014/main" id="{730C3028-BA73-9F09-DB9E-F6EC3B8E232D}"/>
+              </a:ext>
+            </a:extLst>
+          </p:cNvPr>
+          <p:cNvPicPr>
+            <a:picLocks noChangeAspect="1"/>
+          </p:cNvPicPr>
+          <p:nvPr/>
+        </p:nvPicPr>
+        <p:blipFill>
+          <a:blip r:embed="rId3"/>
+          <a:stretch>
+            <a:fillRect/>
+          </a:stretch>
+        </p:blipFill>
+        <p:spPr>
+          <a:xfrm>
+            <a:off x="5886625" y="955270"/>
+            <a:ext cx="5235445" cy="4834569"/>
+          </a:xfrm>
+          <a:prstGeom prst="rect">
+            <a:avLst/>
+          </a:prstGeom>
+        </p:spPr>
+      </p:pic>
+    </p:spTree>
+    <p:extLst>
+      <p:ext uri="{BB962C8B-B14F-4D97-AF65-F5344CB8AC3E}">
+        <p14:creationId xmlns:p14="http://schemas.microsoft.com/office/powerpoint/2010/main" val="3584246277"/>
+      </p:ext>
+    </p:extLst>
+  </p:cSld>
+  <p:clrMapOvr>
+    <a:masterClrMapping/>
+  </p:clrMapOvr>
+</p:sld>
+</file>
+
+<file path=ppt/slides/slide27.xml><?xml version="1.0" encoding="utf-8"?>
+<p:sld xmlns:a="http://schemas.openxmlformats.org/drawingml/2006/main" xmlns:r="http://schemas.openxmlformats.org/officeDocument/2006/relationships" xmlns:p="http://schemas.openxmlformats.org/presentationml/2006/main">
+  <p:cSld>
+    <p:spTree>
+      <p:nvGrpSpPr>
+        <p:cNvPr id="1" name=""/>
+        <p:cNvGrpSpPr/>
+        <p:nvPr/>
+      </p:nvGrpSpPr>
+      <p:grpSpPr>
+        <a:xfrm>
+          <a:off x="0" y="0"/>
+          <a:ext cx="0" cy="0"/>
+          <a:chOff x="0" y="0"/>
+          <a:chExt cx="0" cy="0"/>
+        </a:xfrm>
+      </p:grpSpPr>
+      <p:sp>
+        <p:nvSpPr>
           <p:cNvPr id="2" name="Title 1">
             <a:extLst>
               <a:ext uri="{FF2B5EF4-FFF2-40B4-BE49-F238E27FC236}">
@@ -7952,7 +8757,7 @@
 </p:sld>
 </file>
 
-<file path=ppt/slides/slide25.xml><?xml version="1.0" encoding="utf-8"?>
+<file path=ppt/slides/slide28.xml><?xml version="1.0" encoding="utf-8"?>
 <p:sld xmlns:a="http://schemas.openxmlformats.org/drawingml/2006/main" xmlns:r="http://schemas.openxmlformats.org/officeDocument/2006/relationships" xmlns:p="http://schemas.openxmlformats.org/presentationml/2006/main">
   <p:cSld>
     <p:spTree>

</xml_diff>